<commit_message>
starte to add business functions in CRUD services
</commit_message>
<xml_diff>
--- a/com.supeyou.project/doc/SupeYou.entities.pptx
+++ b/com.supeyou.project/doc/SupeYou.entities.pptx
@@ -330,7 +330,7 @@
               <a:pPr>
                 <a:defRPr/>
               </a:pPr>
-              <a:t>08.07.2015</a:t>
+              <a:t>09.07.2015</a:t>
             </a:fld>
             <a:endParaRPr lang="de-CH"/>
           </a:p>
@@ -527,7 +527,7 @@
               <a:pPr>
                 <a:defRPr/>
               </a:pPr>
-              <a:t>08.07.2015</a:t>
+              <a:t>09.07.2015</a:t>
             </a:fld>
             <a:endParaRPr lang="de-CH"/>
           </a:p>
@@ -734,7 +734,7 @@
               <a:pPr>
                 <a:defRPr/>
               </a:pPr>
-              <a:t>08.07.2015</a:t>
+              <a:t>09.07.2015</a:t>
             </a:fld>
             <a:endParaRPr lang="de-CH"/>
           </a:p>
@@ -931,7 +931,7 @@
               <a:pPr>
                 <a:defRPr/>
               </a:pPr>
-              <a:t>08.07.2015</a:t>
+              <a:t>09.07.2015</a:t>
             </a:fld>
             <a:endParaRPr lang="de-CH"/>
           </a:p>
@@ -1204,7 +1204,7 @@
               <a:pPr>
                 <a:defRPr/>
               </a:pPr>
-              <a:t>08.07.2015</a:t>
+              <a:t>09.07.2015</a:t>
             </a:fld>
             <a:endParaRPr lang="de-CH"/>
           </a:p>
@@ -1519,7 +1519,7 @@
               <a:pPr>
                 <a:defRPr/>
               </a:pPr>
-              <a:t>08.07.2015</a:t>
+              <a:t>09.07.2015</a:t>
             </a:fld>
             <a:endParaRPr lang="de-CH"/>
           </a:p>
@@ -1968,7 +1968,7 @@
               <a:pPr>
                 <a:defRPr/>
               </a:pPr>
-              <a:t>08.07.2015</a:t>
+              <a:t>09.07.2015</a:t>
             </a:fld>
             <a:endParaRPr lang="de-CH"/>
           </a:p>
@@ -2113,7 +2113,7 @@
               <a:pPr>
                 <a:defRPr/>
               </a:pPr>
-              <a:t>08.07.2015</a:t>
+              <a:t>09.07.2015</a:t>
             </a:fld>
             <a:endParaRPr lang="de-CH"/>
           </a:p>
@@ -2235,7 +2235,7 @@
               <a:pPr>
                 <a:defRPr/>
               </a:pPr>
-              <a:t>08.07.2015</a:t>
+              <a:t>09.07.2015</a:t>
             </a:fld>
             <a:endParaRPr lang="de-CH"/>
           </a:p>
@@ -2539,7 +2539,7 @@
               <a:pPr>
                 <a:defRPr/>
               </a:pPr>
-              <a:t>08.07.2015</a:t>
+              <a:t>09.07.2015</a:t>
             </a:fld>
             <a:endParaRPr lang="de-CH"/>
           </a:p>
@@ -2822,7 +2822,7 @@
               <a:pPr>
                 <a:defRPr/>
               </a:pPr>
-              <a:t>08.07.2015</a:t>
+              <a:t>09.07.2015</a:t>
             </a:fld>
             <a:endParaRPr lang="de-CH"/>
           </a:p>
@@ -3120,7 +3120,7 @@
               <a:pPr>
                 <a:defRPr/>
               </a:pPr>
-              <a:t>08.07.2015</a:t>
+              <a:t>09.07.2015</a:t>
             </a:fld>
             <a:endParaRPr lang="de-CH"/>
           </a:p>
@@ -4553,7 +4553,6 @@
               <a:rPr lang="de-DE" altLang="de-DE" sz="1800" dirty="0" smtClean="0"/>
               <a:t>Session2User</a:t>
             </a:r>
-            <a:endParaRPr lang="de-DE" altLang="de-DE" sz="1800" dirty="0" smtClean="0"/>
           </a:p>
           <a:p>
             <a:pPr eaLnBrk="1" hangingPunct="1">
@@ -4777,6 +4776,76 @@
               <a:t>1</a:t>
             </a:r>
             <a:endParaRPr lang="de-DE" altLang="de-DE" sz="1800" dirty="0"/>
+          </a:p>
+        </p:txBody>
+      </p:sp>
+      <p:sp>
+        <p:nvSpPr>
+          <p:cNvPr id="5" name="Rechteck 4"/>
+          <p:cNvSpPr/>
+          <p:nvPr/>
+        </p:nvSpPr>
+        <p:spPr>
+          <a:xfrm>
+            <a:off x="2123728" y="3780924"/>
+            <a:ext cx="3456384" cy="2240364"/>
+          </a:xfrm>
+          <a:prstGeom prst="rect">
+            <a:avLst/>
+          </a:prstGeom>
+          <a:solidFill>
+            <a:schemeClr val="bg1">
+              <a:alpha val="75000"/>
+            </a:schemeClr>
+          </a:solidFill>
+          <a:ln w="12700">
+            <a:solidFill>
+              <a:schemeClr val="tx1">
+                <a:lumMod val="65000"/>
+                <a:lumOff val="35000"/>
+              </a:schemeClr>
+            </a:solidFill>
+          </a:ln>
+        </p:spPr>
+        <p:style>
+          <a:lnRef idx="2">
+            <a:schemeClr val="accent1">
+              <a:shade val="50000"/>
+            </a:schemeClr>
+          </a:lnRef>
+          <a:fillRef idx="1">
+            <a:schemeClr val="accent1"/>
+          </a:fillRef>
+          <a:effectRef idx="0">
+            <a:schemeClr val="accent1"/>
+          </a:effectRef>
+          <a:fontRef idx="minor">
+            <a:schemeClr val="lt1"/>
+          </a:fontRef>
+        </p:style>
+        <p:txBody>
+          <a:bodyPr rtlCol="0" anchor="t" anchorCtr="0"/>
+          <a:lstStyle/>
+          <a:p>
+            <a:r>
+              <a:rPr lang="de-DE" dirty="0" smtClean="0">
+                <a:solidFill>
+                  <a:schemeClr val="tx1">
+                    <a:lumMod val="50000"/>
+                    <a:lumOff val="50000"/>
+                  </a:schemeClr>
+                </a:solidFill>
+              </a:rPr>
+              <a:t>Core</a:t>
+            </a:r>
+            <a:endParaRPr lang="en-US" dirty="0">
+              <a:solidFill>
+                <a:schemeClr val="tx1">
+                  <a:lumMod val="50000"/>
+                  <a:lumOff val="50000"/>
+                </a:schemeClr>
+              </a:solidFill>
+            </a:endParaRPr>
           </a:p>
         </p:txBody>
       </p:sp>
@@ -5224,76 +5293,6 @@
           </a:p>
         </p:txBody>
       </p:sp>
-      <p:sp>
-        <p:nvSpPr>
-          <p:cNvPr id="5" name="Rechteck 4"/>
-          <p:cNvSpPr/>
-          <p:nvPr/>
-        </p:nvSpPr>
-        <p:spPr>
-          <a:xfrm>
-            <a:off x="2123728" y="3780924"/>
-            <a:ext cx="3456384" cy="2240364"/>
-          </a:xfrm>
-          <a:prstGeom prst="rect">
-            <a:avLst/>
-          </a:prstGeom>
-          <a:solidFill>
-            <a:schemeClr val="bg1">
-              <a:alpha val="75000"/>
-            </a:schemeClr>
-          </a:solidFill>
-          <a:ln w="12700">
-            <a:solidFill>
-              <a:schemeClr val="tx1">
-                <a:lumMod val="65000"/>
-                <a:lumOff val="35000"/>
-              </a:schemeClr>
-            </a:solidFill>
-          </a:ln>
-        </p:spPr>
-        <p:style>
-          <a:lnRef idx="2">
-            <a:schemeClr val="accent1">
-              <a:shade val="50000"/>
-            </a:schemeClr>
-          </a:lnRef>
-          <a:fillRef idx="1">
-            <a:schemeClr val="accent1"/>
-          </a:fillRef>
-          <a:effectRef idx="0">
-            <a:schemeClr val="accent1"/>
-          </a:effectRef>
-          <a:fontRef idx="minor">
-            <a:schemeClr val="lt1"/>
-          </a:fontRef>
-        </p:style>
-        <p:txBody>
-          <a:bodyPr rtlCol="0" anchor="t" anchorCtr="0"/>
-          <a:lstStyle/>
-          <a:p>
-            <a:r>
-              <a:rPr lang="de-DE" dirty="0" smtClean="0">
-                <a:solidFill>
-                  <a:schemeClr val="tx1">
-                    <a:lumMod val="50000"/>
-                    <a:lumOff val="50000"/>
-                  </a:schemeClr>
-                </a:solidFill>
-              </a:rPr>
-              <a:t>Core</a:t>
-            </a:r>
-            <a:endParaRPr lang="en-US" dirty="0">
-              <a:solidFill>
-                <a:schemeClr val="tx1">
-                  <a:lumMod val="50000"/>
-                  <a:lumOff val="50000"/>
-                </a:schemeClr>
-              </a:solidFill>
-            </a:endParaRPr>
-          </a:p>
-        </p:txBody>
-      </p:sp>
     </p:spTree>
     <p:extLst>
       <p:ext uri="{BB962C8B-B14F-4D97-AF65-F5344CB8AC3E}">
@@ -5304,6 +5303,13 @@
   <p:clrMapOvr>
     <a:masterClrMapping/>
   </p:clrMapOvr>
+  <p:timing>
+    <p:tnLst>
+      <p:par>
+        <p:cTn id="1" dur="indefinite" restart="never" nodeType="tmRoot"/>
+      </p:par>
+    </p:tnLst>
+  </p:timing>
 </p:sld>
 </file>
 
@@ -5334,8 +5340,8 @@
         </p:nvSpPr>
         <p:spPr bwMode="auto">
           <a:xfrm>
-            <a:off x="539552" y="611187"/>
-            <a:ext cx="1676400" cy="795338"/>
+            <a:off x="1044499" y="782075"/>
+            <a:ext cx="1676400" cy="454764"/>
           </a:xfrm>
           <a:prstGeom prst="rect">
             <a:avLst/>
@@ -5512,7 +5518,7 @@
               <a:buNone/>
             </a:pPr>
             <a:r>
-              <a:rPr lang="de-DE" altLang="de-DE" sz="1800" dirty="0"/>
+              <a:rPr lang="de-DE" altLang="de-DE" sz="1400" dirty="0"/>
               <a:t>User</a:t>
             </a:r>
           </a:p>
@@ -5525,14 +5531,14 @@
               <a:buNone/>
             </a:pPr>
             <a:r>
-              <a:rPr lang="de-DE" altLang="de-DE" sz="800" dirty="0"/>
+              <a:rPr lang="de-DE" altLang="de-DE" sz="600" dirty="0"/>
               <a:t>String </a:t>
             </a:r>
             <a:r>
-              <a:rPr lang="de-DE" altLang="de-DE" sz="800" dirty="0" err="1" smtClean="0"/>
+              <a:rPr lang="de-DE" altLang="de-DE" sz="600" dirty="0" err="1" smtClean="0"/>
               <a:t>loginId</a:t>
             </a:r>
-            <a:endParaRPr lang="de-DE" altLang="de-DE" sz="800" dirty="0"/>
+            <a:endParaRPr lang="de-DE" altLang="de-DE" sz="600" dirty="0"/>
           </a:p>
         </p:txBody>
       </p:sp>
@@ -5546,226 +5552,75 @@
         </p:nvSpPr>
         <p:spPr bwMode="auto">
           <a:xfrm>
-            <a:off x="3479281" y="2207791"/>
-            <a:ext cx="3062287" cy="946150"/>
+            <a:off x="6742249" y="723677"/>
+            <a:ext cx="1214127" cy="5501058"/>
           </a:xfrm>
           <a:prstGeom prst="rect">
             <a:avLst/>
           </a:prstGeom>
-          <a:noFill/>
+          <a:solidFill>
+            <a:schemeClr val="bg1"/>
+          </a:solidFill>
           <a:ln w="9525">
             <a:solidFill>
               <a:schemeClr val="tx1"/>
             </a:solidFill>
-            <a:prstDash val="sysDot"/>
+            <a:prstDash val="solid"/>
             <a:miter lim="800000"/>
             <a:headEnd/>
             <a:tailEnd/>
           </a:ln>
           <a:effectLst/>
-          <a:extLst>
-            <a:ext uri="{909E8E84-426E-40DD-AFC4-6F175D3DCCD1}">
-              <a14:hiddenFill xmlns:a14="http://schemas.microsoft.com/office/drawing/2010/main">
-                <a:solidFill>
-                  <a:schemeClr val="accent1"/>
-                </a:solidFill>
-              </a14:hiddenFill>
-            </a:ext>
-            <a:ext uri="{AF507438-7753-43E0-B8FC-AC1667EBCBE1}">
-              <a14:hiddenEffects xmlns:a14="http://schemas.microsoft.com/office/drawing/2010/main">
-                <a:effectLst>
-                  <a:outerShdw dist="35921" dir="2700000" algn="ctr" rotWithShape="0">
-                    <a:schemeClr val="bg2"/>
-                  </a:outerShdw>
-                </a:effectLst>
-              </a14:hiddenEffects>
-            </a:ext>
-          </a:extLst>
+          <a:extLst/>
         </p:spPr>
         <p:txBody>
           <a:bodyPr wrap="none"/>
-          <a:lstStyle>
-            <a:lvl1pPr eaLnBrk="0" hangingPunct="0">
-              <a:spcBef>
-                <a:spcPct val="20000"/>
-              </a:spcBef>
-              <a:buFont typeface="Arial" charset="0"/>
-              <a:buChar char="•"/>
-              <a:defRPr sz="3200">
-                <a:solidFill>
-                  <a:schemeClr val="tx1"/>
-                </a:solidFill>
-                <a:latin typeface="Calibri" pitchFamily="34" charset="0"/>
-              </a:defRPr>
-            </a:lvl1pPr>
-            <a:lvl2pPr marL="742950" indent="-285750" eaLnBrk="0" hangingPunct="0">
-              <a:spcBef>
-                <a:spcPct val="20000"/>
-              </a:spcBef>
-              <a:buFont typeface="Arial" charset="0"/>
-              <a:buChar char="–"/>
-              <a:defRPr sz="2800">
-                <a:solidFill>
-                  <a:schemeClr val="tx1"/>
-                </a:solidFill>
-                <a:latin typeface="Calibri" pitchFamily="34" charset="0"/>
-              </a:defRPr>
-            </a:lvl2pPr>
-            <a:lvl3pPr marL="1143000" indent="-228600" eaLnBrk="0" hangingPunct="0">
-              <a:spcBef>
-                <a:spcPct val="20000"/>
-              </a:spcBef>
-              <a:buFont typeface="Arial" charset="0"/>
-              <a:buChar char="•"/>
-              <a:defRPr sz="2400">
-                <a:solidFill>
-                  <a:schemeClr val="tx1"/>
-                </a:solidFill>
-                <a:latin typeface="Calibri" pitchFamily="34" charset="0"/>
-              </a:defRPr>
-            </a:lvl3pPr>
-            <a:lvl4pPr marL="1600200" indent="-228600" eaLnBrk="0" hangingPunct="0">
-              <a:spcBef>
-                <a:spcPct val="20000"/>
-              </a:spcBef>
-              <a:buFont typeface="Arial" charset="0"/>
-              <a:buChar char="–"/>
-              <a:defRPr sz="2000">
-                <a:solidFill>
-                  <a:schemeClr val="tx1"/>
-                </a:solidFill>
-                <a:latin typeface="Calibri" pitchFamily="34" charset="0"/>
-              </a:defRPr>
-            </a:lvl4pPr>
-            <a:lvl5pPr marL="2057400" indent="-228600" eaLnBrk="0" hangingPunct="0">
-              <a:spcBef>
-                <a:spcPct val="20000"/>
-              </a:spcBef>
-              <a:buFont typeface="Arial" charset="0"/>
-              <a:buChar char="»"/>
-              <a:defRPr sz="2000">
-                <a:solidFill>
-                  <a:schemeClr val="tx1"/>
-                </a:solidFill>
-                <a:latin typeface="Calibri" pitchFamily="34" charset="0"/>
-              </a:defRPr>
-            </a:lvl5pPr>
-            <a:lvl6pPr marL="2514600" indent="-228600" eaLnBrk="0" fontAlgn="base" hangingPunct="0">
-              <a:spcBef>
-                <a:spcPct val="20000"/>
-              </a:spcBef>
-              <a:spcAft>
-                <a:spcPct val="0"/>
-              </a:spcAft>
-              <a:buFont typeface="Arial" charset="0"/>
-              <a:buChar char="»"/>
-              <a:defRPr sz="2000">
-                <a:solidFill>
-                  <a:schemeClr val="tx1"/>
-                </a:solidFill>
-                <a:latin typeface="Calibri" pitchFamily="34" charset="0"/>
-              </a:defRPr>
-            </a:lvl6pPr>
-            <a:lvl7pPr marL="2971800" indent="-228600" eaLnBrk="0" fontAlgn="base" hangingPunct="0">
-              <a:spcBef>
-                <a:spcPct val="20000"/>
-              </a:spcBef>
-              <a:spcAft>
-                <a:spcPct val="0"/>
-              </a:spcAft>
-              <a:buFont typeface="Arial" charset="0"/>
-              <a:buChar char="»"/>
-              <a:defRPr sz="2000">
-                <a:solidFill>
-                  <a:schemeClr val="tx1"/>
-                </a:solidFill>
-                <a:latin typeface="Calibri" pitchFamily="34" charset="0"/>
-              </a:defRPr>
-            </a:lvl7pPr>
-            <a:lvl8pPr marL="3429000" indent="-228600" eaLnBrk="0" fontAlgn="base" hangingPunct="0">
-              <a:spcBef>
-                <a:spcPct val="20000"/>
-              </a:spcBef>
-              <a:spcAft>
-                <a:spcPct val="0"/>
-              </a:spcAft>
-              <a:buFont typeface="Arial" charset="0"/>
-              <a:buChar char="»"/>
-              <a:defRPr sz="2000">
-                <a:solidFill>
-                  <a:schemeClr val="tx1"/>
-                </a:solidFill>
-                <a:latin typeface="Calibri" pitchFamily="34" charset="0"/>
-              </a:defRPr>
-            </a:lvl8pPr>
-            <a:lvl9pPr marL="3886200" indent="-228600" eaLnBrk="0" fontAlgn="base" hangingPunct="0">
-              <a:spcBef>
-                <a:spcPct val="20000"/>
-              </a:spcBef>
-              <a:spcAft>
-                <a:spcPct val="0"/>
-              </a:spcAft>
-              <a:buFont typeface="Arial" charset="0"/>
-              <a:buChar char="»"/>
-              <a:defRPr sz="2000">
-                <a:solidFill>
-                  <a:schemeClr val="tx1"/>
-                </a:solidFill>
-                <a:latin typeface="Calibri" pitchFamily="34" charset="0"/>
-              </a:defRPr>
-            </a:lvl9pPr>
-          </a:lstStyle>
-          <a:p>
-            <a:pPr eaLnBrk="1" hangingPunct="1">
-              <a:spcBef>
-                <a:spcPct val="0"/>
-              </a:spcBef>
-              <a:buFontTx/>
-              <a:buNone/>
-            </a:pPr>
-            <a:r>
-              <a:rPr lang="de-DE" altLang="de-DE" sz="1800"/>
+          <a:lstStyle/>
+          <a:p>
+            <a:r>
+              <a:rPr lang="de-DE" altLang="de-DE" sz="1100" dirty="0" err="1" smtClean="0"/>
               <a:t>Supporter</a:t>
             </a:r>
-          </a:p>
-          <a:p>
-            <a:pPr eaLnBrk="1" hangingPunct="1">
-              <a:spcBef>
-                <a:spcPct val="0"/>
-              </a:spcBef>
-              <a:buFontTx/>
-              <a:buNone/>
-            </a:pPr>
-            <a:r>
-              <a:rPr lang="de-DE" altLang="de-DE" sz="800"/>
-              <a:t>long creationTimestamp</a:t>
-            </a:r>
-          </a:p>
-          <a:p>
-            <a:pPr eaLnBrk="1" hangingPunct="1">
-              <a:spcBef>
-                <a:spcPct val="0"/>
-              </a:spcBef>
-              <a:buFontTx/>
-              <a:buNone/>
-            </a:pPr>
-            <a:r>
-              <a:rPr lang="de-DE" altLang="de-DE" sz="800"/>
-              <a:t>enum MOOD</a:t>
-            </a:r>
-          </a:p>
-          <a:p>
-            <a:pPr eaLnBrk="1" hangingPunct="1">
-              <a:spcBef>
-                <a:spcPct val="0"/>
-              </a:spcBef>
-              <a:buFontTx/>
-              <a:buNone/>
-            </a:pPr>
-            <a:r>
-              <a:rPr lang="de-DE" altLang="de-DE" sz="800"/>
-              <a:t>String shoutout</a:t>
-            </a:r>
+            <a:endParaRPr lang="de-DE" altLang="de-DE" sz="1100" dirty="0"/>
+          </a:p>
+          <a:p>
+            <a:endParaRPr lang="de-DE" altLang="de-DE" sz="700" dirty="0" smtClean="0"/>
+          </a:p>
+          <a:p>
+            <a:r>
+              <a:rPr lang="de-DE" altLang="de-DE" sz="700" dirty="0" err="1" smtClean="0"/>
+              <a:t>long</a:t>
+            </a:r>
+            <a:r>
+              <a:rPr lang="de-DE" altLang="de-DE" sz="700" dirty="0" smtClean="0"/>
+              <a:t> </a:t>
+            </a:r>
+            <a:r>
+              <a:rPr lang="de-DE" altLang="de-DE" sz="700" dirty="0" err="1"/>
+              <a:t>creationTimestamp</a:t>
+            </a:r>
+            <a:endParaRPr lang="de-DE" altLang="de-DE" sz="700" dirty="0"/>
+          </a:p>
+          <a:p>
+            <a:r>
+              <a:rPr lang="de-DE" altLang="de-DE" sz="700" dirty="0" err="1"/>
+              <a:t>enum</a:t>
+            </a:r>
+            <a:r>
+              <a:rPr lang="de-DE" altLang="de-DE" sz="700" dirty="0"/>
+              <a:t> MOOD</a:t>
+            </a:r>
+          </a:p>
+          <a:p>
+            <a:r>
+              <a:rPr lang="de-DE" altLang="de-DE" sz="700" dirty="0"/>
+              <a:t>String </a:t>
+            </a:r>
+            <a:r>
+              <a:rPr lang="de-DE" altLang="de-DE" sz="700" dirty="0" err="1"/>
+              <a:t>shoutout</a:t>
+            </a:r>
+            <a:endParaRPr lang="de-DE" altLang="de-DE" sz="700" dirty="0"/>
           </a:p>
         </p:txBody>
       </p:sp>
@@ -5779,8 +5634,8 @@
         </p:nvSpPr>
         <p:spPr bwMode="auto">
           <a:xfrm>
-            <a:off x="572889" y="2290342"/>
-            <a:ext cx="1119188" cy="1112838"/>
+            <a:off x="1044498" y="2676202"/>
+            <a:ext cx="1676325" cy="896814"/>
           </a:xfrm>
           <a:prstGeom prst="rect">
             <a:avLst/>
@@ -5957,7 +5812,7 @@
               <a:buNone/>
             </a:pPr>
             <a:r>
-              <a:rPr lang="de-DE" altLang="de-DE" sz="1800" dirty="0"/>
+              <a:rPr lang="de-DE" altLang="de-DE" sz="1400" dirty="0"/>
               <a:t>Hero</a:t>
             </a:r>
           </a:p>
@@ -5970,7 +5825,7 @@
               <a:buNone/>
             </a:pPr>
             <a:r>
-              <a:rPr lang="de-DE" altLang="de-DE" sz="800" dirty="0"/>
+              <a:rPr lang="de-DE" altLang="de-DE" sz="600" dirty="0"/>
               <a:t>String name</a:t>
             </a:r>
           </a:p>
@@ -5983,14 +5838,14 @@
               <a:buNone/>
             </a:pPr>
             <a:r>
-              <a:rPr lang="de-DE" altLang="de-DE" sz="800" dirty="0"/>
+              <a:rPr lang="de-DE" altLang="de-DE" sz="600" dirty="0"/>
               <a:t>File </a:t>
             </a:r>
             <a:r>
-              <a:rPr lang="de-DE" altLang="de-DE" sz="800" dirty="0" err="1"/>
+              <a:rPr lang="de-DE" altLang="de-DE" sz="600" dirty="0" err="1"/>
               <a:t>profilePic</a:t>
             </a:r>
-            <a:endParaRPr lang="de-DE" altLang="de-DE" sz="800" dirty="0"/>
+            <a:endParaRPr lang="de-DE" altLang="de-DE" sz="600" dirty="0"/>
           </a:p>
           <a:p>
             <a:pPr eaLnBrk="1" hangingPunct="1">
@@ -6001,14 +5856,14 @@
               <a:buNone/>
             </a:pPr>
             <a:r>
-              <a:rPr lang="de-DE" altLang="de-DE" sz="800" dirty="0"/>
+              <a:rPr lang="de-DE" altLang="de-DE" sz="600" dirty="0"/>
               <a:t>File </a:t>
             </a:r>
             <a:r>
-              <a:rPr lang="de-DE" altLang="de-DE" sz="800" dirty="0" err="1"/>
+              <a:rPr lang="de-DE" altLang="de-DE" sz="600" dirty="0" err="1"/>
               <a:t>idScan</a:t>
             </a:r>
-            <a:endParaRPr lang="de-DE" altLang="de-DE" sz="800" dirty="0"/>
+            <a:endParaRPr lang="de-DE" altLang="de-DE" sz="600" dirty="0"/>
           </a:p>
           <a:p>
             <a:pPr eaLnBrk="1" hangingPunct="1">
@@ -6019,14 +5874,14 @@
               <a:buNone/>
             </a:pPr>
             <a:r>
-              <a:rPr lang="de-DE" altLang="de-DE" sz="800" dirty="0"/>
+              <a:rPr lang="de-DE" altLang="de-DE" sz="600" dirty="0"/>
               <a:t>String </a:t>
             </a:r>
             <a:r>
-              <a:rPr lang="de-DE" altLang="de-DE" sz="800" dirty="0" err="1"/>
+              <a:rPr lang="de-DE" altLang="de-DE" sz="600" dirty="0" err="1"/>
               <a:t>homepageLink</a:t>
             </a:r>
-            <a:endParaRPr lang="de-DE" altLang="de-DE" sz="800" dirty="0"/>
+            <a:endParaRPr lang="de-DE" altLang="de-DE" sz="600" dirty="0"/>
           </a:p>
           <a:p>
             <a:pPr eaLnBrk="1" hangingPunct="1">
@@ -6037,14 +5892,14 @@
               <a:buNone/>
             </a:pPr>
             <a:r>
-              <a:rPr lang="de-DE" altLang="de-DE" sz="800" dirty="0"/>
+              <a:rPr lang="de-DE" altLang="de-DE" sz="600" dirty="0"/>
               <a:t>String </a:t>
             </a:r>
             <a:r>
-              <a:rPr lang="de-DE" altLang="de-DE" sz="800" dirty="0" err="1"/>
+              <a:rPr lang="de-DE" altLang="de-DE" sz="600" dirty="0" err="1"/>
               <a:t>description</a:t>
             </a:r>
-            <a:endParaRPr lang="de-DE" altLang="de-DE" sz="800" dirty="0"/>
+            <a:endParaRPr lang="de-DE" altLang="de-DE" sz="600" dirty="0"/>
           </a:p>
           <a:p>
             <a:pPr eaLnBrk="1" hangingPunct="1">
@@ -6055,18 +5910,18 @@
               <a:buNone/>
             </a:pPr>
             <a:r>
-              <a:rPr lang="de-DE" altLang="de-DE" sz="800" dirty="0" err="1"/>
+              <a:rPr lang="de-DE" altLang="de-DE" sz="600" dirty="0" err="1"/>
               <a:t>boolean</a:t>
             </a:r>
             <a:r>
-              <a:rPr lang="de-DE" altLang="de-DE" sz="800" dirty="0"/>
+              <a:rPr lang="de-DE" altLang="de-DE" sz="600" dirty="0"/>
               <a:t> </a:t>
             </a:r>
             <a:r>
-              <a:rPr lang="de-DE" altLang="de-DE" sz="800" dirty="0" err="1"/>
+              <a:rPr lang="de-DE" altLang="de-DE" sz="600" dirty="0" err="1"/>
               <a:t>enabled</a:t>
             </a:r>
-            <a:endParaRPr lang="de-DE" altLang="de-DE" sz="800" dirty="0"/>
+            <a:endParaRPr lang="de-DE" altLang="de-DE" sz="600" dirty="0"/>
           </a:p>
           <a:p>
             <a:pPr eaLnBrk="1" hangingPunct="1">
@@ -6076,7 +5931,7 @@
               <a:buFontTx/>
               <a:buNone/>
             </a:pPr>
-            <a:endParaRPr lang="de-DE" altLang="de-DE" sz="800" dirty="0"/>
+            <a:endParaRPr lang="de-DE" altLang="de-DE" sz="600" dirty="0"/>
           </a:p>
           <a:p>
             <a:pPr eaLnBrk="1" hangingPunct="1">
@@ -6086,7 +5941,7 @@
               <a:buFontTx/>
               <a:buNone/>
             </a:pPr>
-            <a:endParaRPr lang="de-DE" altLang="de-DE" sz="800" dirty="0"/>
+            <a:endParaRPr lang="de-DE" altLang="de-DE" sz="600" dirty="0"/>
           </a:p>
         </p:txBody>
       </p:sp>
@@ -6100,8 +5955,8 @@
         </p:nvSpPr>
         <p:spPr bwMode="auto">
           <a:xfrm>
-            <a:off x="828750" y="1412875"/>
-            <a:ext cx="147637" cy="138112"/>
+            <a:off x="1755744" y="2138373"/>
+            <a:ext cx="147637" cy="138499"/>
           </a:xfrm>
           <a:prstGeom prst="rect">
             <a:avLst/>
@@ -6284,10 +6139,9 @@
               <a:buNone/>
             </a:pPr>
             <a:r>
-              <a:rPr lang="de-DE" altLang="de-DE" sz="900"/>
+              <a:rPr lang="de-DE" altLang="de-DE" sz="900" dirty="0"/>
               <a:t> 1</a:t>
             </a:r>
-            <a:endParaRPr lang="de-DE" altLang="de-DE" sz="1800"/>
           </a:p>
         </p:txBody>
       </p:sp>
@@ -6301,8 +6155,8 @@
         </p:nvSpPr>
         <p:spPr bwMode="auto">
           <a:xfrm>
-            <a:off x="3274493" y="2642815"/>
-            <a:ext cx="204788" cy="138113"/>
+            <a:off x="6551500" y="2998389"/>
+            <a:ext cx="204788" cy="138499"/>
           </a:xfrm>
           <a:prstGeom prst="rect">
             <a:avLst/>
@@ -6485,10 +6339,14 @@
               <a:buNone/>
             </a:pPr>
             <a:r>
-              <a:rPr lang="de-DE" altLang="de-DE" sz="900"/>
-              <a:t> 0..*</a:t>
-            </a:r>
-            <a:endParaRPr lang="de-DE" altLang="de-DE" sz="1800"/>
+              <a:rPr lang="de-DE" altLang="de-DE" sz="900" dirty="0"/>
+              <a:t> </a:t>
+            </a:r>
+            <a:r>
+              <a:rPr lang="de-DE" altLang="de-DE" sz="900" dirty="0" smtClean="0"/>
+              <a:t>1</a:t>
+            </a:r>
+            <a:endParaRPr lang="de-DE" altLang="de-DE" sz="900" dirty="0"/>
           </a:p>
         </p:txBody>
       </p:sp>
@@ -6502,8 +6360,461 @@
         </p:nvSpPr>
         <p:spPr bwMode="auto">
           <a:xfrm>
-            <a:off x="1692077" y="2648148"/>
-            <a:ext cx="147638" cy="138113"/>
+            <a:off x="5300017" y="3015266"/>
+            <a:ext cx="259083" cy="138499"/>
+          </a:xfrm>
+          <a:prstGeom prst="rect">
+            <a:avLst/>
+          </a:prstGeom>
+          <a:noFill/>
+          <a:ln>
+            <a:noFill/>
+          </a:ln>
+          <a:effectLst/>
+          <a:extLst>
+            <a:ext uri="{909E8E84-426E-40DD-AFC4-6F175D3DCCD1}">
+              <a14:hiddenFill xmlns:a14="http://schemas.microsoft.com/office/drawing/2010/main">
+                <a:solidFill>
+                  <a:schemeClr val="accent1"/>
+                </a:solidFill>
+              </a14:hiddenFill>
+            </a:ext>
+            <a:ext uri="{91240B29-F687-4F45-9708-019B960494DF}">
+              <a14:hiddenLine xmlns:a14="http://schemas.microsoft.com/office/drawing/2010/main" w="9525">
+                <a:solidFill>
+                  <a:schemeClr val="tx1"/>
+                </a:solidFill>
+                <a:miter lim="800000"/>
+                <a:headEnd/>
+                <a:tailEnd/>
+              </a14:hiddenLine>
+            </a:ext>
+            <a:ext uri="{AF507438-7753-43E0-B8FC-AC1667EBCBE1}">
+              <a14:hiddenEffects xmlns:a14="http://schemas.microsoft.com/office/drawing/2010/main">
+                <a:effectLst>
+                  <a:outerShdw dist="35921" dir="2700000" algn="ctr" rotWithShape="0">
+                    <a:schemeClr val="bg2"/>
+                  </a:outerShdw>
+                </a:effectLst>
+              </a14:hiddenEffects>
+            </a:ext>
+          </a:extLst>
+        </p:spPr>
+        <p:txBody>
+          <a:bodyPr wrap="square" lIns="0" tIns="0" rIns="0" bIns="0">
+            <a:spAutoFit/>
+          </a:bodyPr>
+          <a:lstStyle>
+            <a:lvl1pPr eaLnBrk="0" hangingPunct="0">
+              <a:spcBef>
+                <a:spcPct val="20000"/>
+              </a:spcBef>
+              <a:buFont typeface="Arial" charset="0"/>
+              <a:buChar char="•"/>
+              <a:defRPr sz="3200">
+                <a:solidFill>
+                  <a:schemeClr val="tx1"/>
+                </a:solidFill>
+                <a:latin typeface="Calibri" pitchFamily="34" charset="0"/>
+              </a:defRPr>
+            </a:lvl1pPr>
+            <a:lvl2pPr marL="742950" indent="-285750" eaLnBrk="0" hangingPunct="0">
+              <a:spcBef>
+                <a:spcPct val="20000"/>
+              </a:spcBef>
+              <a:buFont typeface="Arial" charset="0"/>
+              <a:buChar char="–"/>
+              <a:defRPr sz="2800">
+                <a:solidFill>
+                  <a:schemeClr val="tx1"/>
+                </a:solidFill>
+                <a:latin typeface="Calibri" pitchFamily="34" charset="0"/>
+              </a:defRPr>
+            </a:lvl2pPr>
+            <a:lvl3pPr marL="1143000" indent="-228600" eaLnBrk="0" hangingPunct="0">
+              <a:spcBef>
+                <a:spcPct val="20000"/>
+              </a:spcBef>
+              <a:buFont typeface="Arial" charset="0"/>
+              <a:buChar char="•"/>
+              <a:defRPr sz="2400">
+                <a:solidFill>
+                  <a:schemeClr val="tx1"/>
+                </a:solidFill>
+                <a:latin typeface="Calibri" pitchFamily="34" charset="0"/>
+              </a:defRPr>
+            </a:lvl3pPr>
+            <a:lvl4pPr marL="1600200" indent="-228600" eaLnBrk="0" hangingPunct="0">
+              <a:spcBef>
+                <a:spcPct val="20000"/>
+              </a:spcBef>
+              <a:buFont typeface="Arial" charset="0"/>
+              <a:buChar char="–"/>
+              <a:defRPr sz="2000">
+                <a:solidFill>
+                  <a:schemeClr val="tx1"/>
+                </a:solidFill>
+                <a:latin typeface="Calibri" pitchFamily="34" charset="0"/>
+              </a:defRPr>
+            </a:lvl4pPr>
+            <a:lvl5pPr marL="2057400" indent="-228600" eaLnBrk="0" hangingPunct="0">
+              <a:spcBef>
+                <a:spcPct val="20000"/>
+              </a:spcBef>
+              <a:buFont typeface="Arial" charset="0"/>
+              <a:buChar char="»"/>
+              <a:defRPr sz="2000">
+                <a:solidFill>
+                  <a:schemeClr val="tx1"/>
+                </a:solidFill>
+                <a:latin typeface="Calibri" pitchFamily="34" charset="0"/>
+              </a:defRPr>
+            </a:lvl5pPr>
+            <a:lvl6pPr marL="2514600" indent="-228600" eaLnBrk="0" fontAlgn="base" hangingPunct="0">
+              <a:spcBef>
+                <a:spcPct val="20000"/>
+              </a:spcBef>
+              <a:spcAft>
+                <a:spcPct val="0"/>
+              </a:spcAft>
+              <a:buFont typeface="Arial" charset="0"/>
+              <a:buChar char="»"/>
+              <a:defRPr sz="2000">
+                <a:solidFill>
+                  <a:schemeClr val="tx1"/>
+                </a:solidFill>
+                <a:latin typeface="Calibri" pitchFamily="34" charset="0"/>
+              </a:defRPr>
+            </a:lvl6pPr>
+            <a:lvl7pPr marL="2971800" indent="-228600" eaLnBrk="0" fontAlgn="base" hangingPunct="0">
+              <a:spcBef>
+                <a:spcPct val="20000"/>
+              </a:spcBef>
+              <a:spcAft>
+                <a:spcPct val="0"/>
+              </a:spcAft>
+              <a:buFont typeface="Arial" charset="0"/>
+              <a:buChar char="»"/>
+              <a:defRPr sz="2000">
+                <a:solidFill>
+                  <a:schemeClr val="tx1"/>
+                </a:solidFill>
+                <a:latin typeface="Calibri" pitchFamily="34" charset="0"/>
+              </a:defRPr>
+            </a:lvl7pPr>
+            <a:lvl8pPr marL="3429000" indent="-228600" eaLnBrk="0" fontAlgn="base" hangingPunct="0">
+              <a:spcBef>
+                <a:spcPct val="20000"/>
+              </a:spcBef>
+              <a:spcAft>
+                <a:spcPct val="0"/>
+              </a:spcAft>
+              <a:buFont typeface="Arial" charset="0"/>
+              <a:buChar char="»"/>
+              <a:defRPr sz="2000">
+                <a:solidFill>
+                  <a:schemeClr val="tx1"/>
+                </a:solidFill>
+                <a:latin typeface="Calibri" pitchFamily="34" charset="0"/>
+              </a:defRPr>
+            </a:lvl8pPr>
+            <a:lvl9pPr marL="3886200" indent="-228600" eaLnBrk="0" fontAlgn="base" hangingPunct="0">
+              <a:spcBef>
+                <a:spcPct val="20000"/>
+              </a:spcBef>
+              <a:spcAft>
+                <a:spcPct val="0"/>
+              </a:spcAft>
+              <a:buFont typeface="Arial" charset="0"/>
+              <a:buChar char="»"/>
+              <a:defRPr sz="2000">
+                <a:solidFill>
+                  <a:schemeClr val="tx1"/>
+                </a:solidFill>
+                <a:latin typeface="Calibri" pitchFamily="34" charset="0"/>
+              </a:defRPr>
+            </a:lvl9pPr>
+          </a:lstStyle>
+          <a:p>
+            <a:pPr eaLnBrk="1" hangingPunct="1">
+              <a:spcBef>
+                <a:spcPct val="0"/>
+              </a:spcBef>
+              <a:buFontTx/>
+              <a:buNone/>
+            </a:pPr>
+            <a:r>
+              <a:rPr lang="de-DE" altLang="de-DE" sz="900" dirty="0"/>
+              <a:t> </a:t>
+            </a:r>
+            <a:r>
+              <a:rPr lang="de-DE" altLang="de-DE" sz="900" dirty="0"/>
+              <a:t>1</a:t>
+            </a:r>
+            <a:endParaRPr lang="de-DE" altLang="de-DE" sz="900" dirty="0"/>
+          </a:p>
+        </p:txBody>
+      </p:sp>
+      <p:sp>
+        <p:nvSpPr>
+          <p:cNvPr id="30731" name="Rectangle 4"/>
+          <p:cNvSpPr>
+            <a:spLocks noChangeArrowheads="1"/>
+          </p:cNvSpPr>
+          <p:nvPr/>
+        </p:nvSpPr>
+        <p:spPr bwMode="auto">
+          <a:xfrm>
+            <a:off x="1044967" y="4326985"/>
+            <a:ext cx="1675932" cy="805104"/>
+          </a:xfrm>
+          <a:prstGeom prst="rect">
+            <a:avLst/>
+          </a:prstGeom>
+          <a:noFill/>
+          <a:ln w="9525">
+            <a:solidFill>
+              <a:schemeClr val="tx1"/>
+            </a:solidFill>
+            <a:prstDash val="solid"/>
+            <a:miter lim="800000"/>
+            <a:headEnd/>
+            <a:tailEnd/>
+          </a:ln>
+          <a:effectLst/>
+          <a:extLst>
+            <a:ext uri="{909E8E84-426E-40DD-AFC4-6F175D3DCCD1}">
+              <a14:hiddenFill xmlns:a14="http://schemas.microsoft.com/office/drawing/2010/main">
+                <a:solidFill>
+                  <a:schemeClr val="accent1"/>
+                </a:solidFill>
+              </a14:hiddenFill>
+            </a:ext>
+            <a:ext uri="{AF507438-7753-43E0-B8FC-AC1667EBCBE1}">
+              <a14:hiddenEffects xmlns:a14="http://schemas.microsoft.com/office/drawing/2010/main">
+                <a:effectLst>
+                  <a:outerShdw dist="35921" dir="2700000" algn="ctr" rotWithShape="0">
+                    <a:schemeClr val="bg2"/>
+                  </a:outerShdw>
+                </a:effectLst>
+              </a14:hiddenEffects>
+            </a:ext>
+          </a:extLst>
+        </p:spPr>
+        <p:txBody>
+          <a:bodyPr wrap="none"/>
+          <a:lstStyle>
+            <a:lvl1pPr eaLnBrk="0" hangingPunct="0">
+              <a:spcBef>
+                <a:spcPct val="20000"/>
+              </a:spcBef>
+              <a:buFont typeface="Arial" charset="0"/>
+              <a:buChar char="•"/>
+              <a:defRPr sz="3200">
+                <a:solidFill>
+                  <a:schemeClr val="tx1"/>
+                </a:solidFill>
+                <a:latin typeface="Calibri" pitchFamily="34" charset="0"/>
+              </a:defRPr>
+            </a:lvl1pPr>
+            <a:lvl2pPr marL="742950" indent="-285750" eaLnBrk="0" hangingPunct="0">
+              <a:spcBef>
+                <a:spcPct val="20000"/>
+              </a:spcBef>
+              <a:buFont typeface="Arial" charset="0"/>
+              <a:buChar char="–"/>
+              <a:defRPr sz="2800">
+                <a:solidFill>
+                  <a:schemeClr val="tx1"/>
+                </a:solidFill>
+                <a:latin typeface="Calibri" pitchFamily="34" charset="0"/>
+              </a:defRPr>
+            </a:lvl2pPr>
+            <a:lvl3pPr marL="1143000" indent="-228600" eaLnBrk="0" hangingPunct="0">
+              <a:spcBef>
+                <a:spcPct val="20000"/>
+              </a:spcBef>
+              <a:buFont typeface="Arial" charset="0"/>
+              <a:buChar char="•"/>
+              <a:defRPr sz="2400">
+                <a:solidFill>
+                  <a:schemeClr val="tx1"/>
+                </a:solidFill>
+                <a:latin typeface="Calibri" pitchFamily="34" charset="0"/>
+              </a:defRPr>
+            </a:lvl3pPr>
+            <a:lvl4pPr marL="1600200" indent="-228600" eaLnBrk="0" hangingPunct="0">
+              <a:spcBef>
+                <a:spcPct val="20000"/>
+              </a:spcBef>
+              <a:buFont typeface="Arial" charset="0"/>
+              <a:buChar char="–"/>
+              <a:defRPr sz="2000">
+                <a:solidFill>
+                  <a:schemeClr val="tx1"/>
+                </a:solidFill>
+                <a:latin typeface="Calibri" pitchFamily="34" charset="0"/>
+              </a:defRPr>
+            </a:lvl4pPr>
+            <a:lvl5pPr marL="2057400" indent="-228600" eaLnBrk="0" hangingPunct="0">
+              <a:spcBef>
+                <a:spcPct val="20000"/>
+              </a:spcBef>
+              <a:buFont typeface="Arial" charset="0"/>
+              <a:buChar char="»"/>
+              <a:defRPr sz="2000">
+                <a:solidFill>
+                  <a:schemeClr val="tx1"/>
+                </a:solidFill>
+                <a:latin typeface="Calibri" pitchFamily="34" charset="0"/>
+              </a:defRPr>
+            </a:lvl5pPr>
+            <a:lvl6pPr marL="2514600" indent="-228600" eaLnBrk="0" fontAlgn="base" hangingPunct="0">
+              <a:spcBef>
+                <a:spcPct val="20000"/>
+              </a:spcBef>
+              <a:spcAft>
+                <a:spcPct val="0"/>
+              </a:spcAft>
+              <a:buFont typeface="Arial" charset="0"/>
+              <a:buChar char="»"/>
+              <a:defRPr sz="2000">
+                <a:solidFill>
+                  <a:schemeClr val="tx1"/>
+                </a:solidFill>
+                <a:latin typeface="Calibri" pitchFamily="34" charset="0"/>
+              </a:defRPr>
+            </a:lvl6pPr>
+            <a:lvl7pPr marL="2971800" indent="-228600" eaLnBrk="0" fontAlgn="base" hangingPunct="0">
+              <a:spcBef>
+                <a:spcPct val="20000"/>
+              </a:spcBef>
+              <a:spcAft>
+                <a:spcPct val="0"/>
+              </a:spcAft>
+              <a:buFont typeface="Arial" charset="0"/>
+              <a:buChar char="»"/>
+              <a:defRPr sz="2000">
+                <a:solidFill>
+                  <a:schemeClr val="tx1"/>
+                </a:solidFill>
+                <a:latin typeface="Calibri" pitchFamily="34" charset="0"/>
+              </a:defRPr>
+            </a:lvl7pPr>
+            <a:lvl8pPr marL="3429000" indent="-228600" eaLnBrk="0" fontAlgn="base" hangingPunct="0">
+              <a:spcBef>
+                <a:spcPct val="20000"/>
+              </a:spcBef>
+              <a:spcAft>
+                <a:spcPct val="0"/>
+              </a:spcAft>
+              <a:buFont typeface="Arial" charset="0"/>
+              <a:buChar char="»"/>
+              <a:defRPr sz="2000">
+                <a:solidFill>
+                  <a:schemeClr val="tx1"/>
+                </a:solidFill>
+                <a:latin typeface="Calibri" pitchFamily="34" charset="0"/>
+              </a:defRPr>
+            </a:lvl8pPr>
+            <a:lvl9pPr marL="3886200" indent="-228600" eaLnBrk="0" fontAlgn="base" hangingPunct="0">
+              <a:spcBef>
+                <a:spcPct val="20000"/>
+              </a:spcBef>
+              <a:spcAft>
+                <a:spcPct val="0"/>
+              </a:spcAft>
+              <a:buFont typeface="Arial" charset="0"/>
+              <a:buChar char="»"/>
+              <a:defRPr sz="2000">
+                <a:solidFill>
+                  <a:schemeClr val="tx1"/>
+                </a:solidFill>
+                <a:latin typeface="Calibri" pitchFamily="34" charset="0"/>
+              </a:defRPr>
+            </a:lvl9pPr>
+          </a:lstStyle>
+          <a:p>
+            <a:pPr eaLnBrk="1" hangingPunct="1">
+              <a:spcBef>
+                <a:spcPct val="0"/>
+              </a:spcBef>
+              <a:buFontTx/>
+              <a:buNone/>
+            </a:pPr>
+            <a:r>
+              <a:rPr lang="de-DE" altLang="de-DE" sz="1400" dirty="0" smtClean="0"/>
+              <a:t>Invitation</a:t>
+            </a:r>
+            <a:endParaRPr lang="de-DE" altLang="de-DE" sz="1400" dirty="0"/>
+          </a:p>
+          <a:p>
+            <a:pPr eaLnBrk="1" hangingPunct="1">
+              <a:spcBef>
+                <a:spcPct val="0"/>
+              </a:spcBef>
+              <a:buFontTx/>
+              <a:buNone/>
+            </a:pPr>
+            <a:r>
+              <a:rPr lang="de-DE" altLang="de-DE" sz="600" dirty="0" err="1"/>
+              <a:t>long</a:t>
+            </a:r>
+            <a:r>
+              <a:rPr lang="de-DE" altLang="de-DE" sz="600" dirty="0"/>
+              <a:t> </a:t>
+            </a:r>
+            <a:r>
+              <a:rPr lang="de-DE" altLang="de-DE" sz="600" dirty="0" err="1"/>
+              <a:t>creationTimestamp</a:t>
+            </a:r>
+            <a:endParaRPr lang="de-DE" altLang="de-DE" sz="600" dirty="0"/>
+          </a:p>
+          <a:p>
+            <a:pPr eaLnBrk="1" hangingPunct="1">
+              <a:spcBef>
+                <a:spcPct val="0"/>
+              </a:spcBef>
+              <a:buFontTx/>
+              <a:buNone/>
+            </a:pPr>
+            <a:r>
+              <a:rPr lang="de-DE" altLang="de-DE" sz="600" dirty="0"/>
+              <a:t>String name</a:t>
+            </a:r>
+          </a:p>
+          <a:p>
+            <a:pPr eaLnBrk="1" hangingPunct="1">
+              <a:spcBef>
+                <a:spcPct val="0"/>
+              </a:spcBef>
+              <a:buFontTx/>
+              <a:buNone/>
+            </a:pPr>
+            <a:r>
+              <a:rPr lang="de-DE" altLang="de-DE" sz="600" dirty="0"/>
+              <a:t>String </a:t>
+            </a:r>
+            <a:r>
+              <a:rPr lang="de-DE" altLang="de-DE" sz="600" dirty="0" err="1"/>
+              <a:t>invitID</a:t>
+            </a:r>
+            <a:endParaRPr lang="de-DE" altLang="de-DE" sz="600" dirty="0"/>
+          </a:p>
+        </p:txBody>
+      </p:sp>
+      <p:sp>
+        <p:nvSpPr>
+          <p:cNvPr id="30733" name="Text Box 9"/>
+          <p:cNvSpPr txBox="1">
+            <a:spLocks noChangeArrowheads="1"/>
+          </p:cNvSpPr>
+          <p:nvPr/>
+        </p:nvSpPr>
+        <p:spPr bwMode="auto">
+          <a:xfrm>
+            <a:off x="6601048" y="4503521"/>
+            <a:ext cx="203200" cy="138499"/>
           </a:xfrm>
           <a:prstGeom prst="rect">
             <a:avLst/>
@@ -6686,459 +6997,14 @@
               <a:buNone/>
             </a:pPr>
             <a:r>
-              <a:rPr lang="de-DE" altLang="de-DE" sz="900"/>
-              <a:t> 1</a:t>
-            </a:r>
-            <a:endParaRPr lang="de-DE" altLang="de-DE" sz="1800"/>
-          </a:p>
-        </p:txBody>
-      </p:sp>
-      <p:sp>
-        <p:nvSpPr>
-          <p:cNvPr id="30731" name="Rectangle 4"/>
-          <p:cNvSpPr>
-            <a:spLocks noChangeArrowheads="1"/>
-          </p:cNvSpPr>
-          <p:nvPr/>
-        </p:nvSpPr>
-        <p:spPr bwMode="auto">
-          <a:xfrm>
-            <a:off x="3560292" y="5366916"/>
-            <a:ext cx="2981275" cy="1014412"/>
-          </a:xfrm>
-          <a:prstGeom prst="rect">
-            <a:avLst/>
-          </a:prstGeom>
-          <a:noFill/>
-          <a:ln w="9525">
-            <a:solidFill>
-              <a:schemeClr val="tx1"/>
-            </a:solidFill>
-            <a:prstDash val="solid"/>
-            <a:miter lim="800000"/>
-            <a:headEnd/>
-            <a:tailEnd/>
-          </a:ln>
-          <a:effectLst/>
-          <a:extLst>
-            <a:ext uri="{909E8E84-426E-40DD-AFC4-6F175D3DCCD1}">
-              <a14:hiddenFill xmlns:a14="http://schemas.microsoft.com/office/drawing/2010/main">
-                <a:solidFill>
-                  <a:schemeClr val="accent1"/>
-                </a:solidFill>
-              </a14:hiddenFill>
-            </a:ext>
-            <a:ext uri="{AF507438-7753-43E0-B8FC-AC1667EBCBE1}">
-              <a14:hiddenEffects xmlns:a14="http://schemas.microsoft.com/office/drawing/2010/main">
-                <a:effectLst>
-                  <a:outerShdw dist="35921" dir="2700000" algn="ctr" rotWithShape="0">
-                    <a:schemeClr val="bg2"/>
-                  </a:outerShdw>
-                </a:effectLst>
-              </a14:hiddenEffects>
-            </a:ext>
-          </a:extLst>
-        </p:spPr>
-        <p:txBody>
-          <a:bodyPr wrap="none"/>
-          <a:lstStyle>
-            <a:lvl1pPr eaLnBrk="0" hangingPunct="0">
-              <a:spcBef>
-                <a:spcPct val="20000"/>
-              </a:spcBef>
-              <a:buFont typeface="Arial" charset="0"/>
-              <a:buChar char="•"/>
-              <a:defRPr sz="3200">
-                <a:solidFill>
-                  <a:schemeClr val="tx1"/>
-                </a:solidFill>
-                <a:latin typeface="Calibri" pitchFamily="34" charset="0"/>
-              </a:defRPr>
-            </a:lvl1pPr>
-            <a:lvl2pPr marL="742950" indent="-285750" eaLnBrk="0" hangingPunct="0">
-              <a:spcBef>
-                <a:spcPct val="20000"/>
-              </a:spcBef>
-              <a:buFont typeface="Arial" charset="0"/>
-              <a:buChar char="–"/>
-              <a:defRPr sz="2800">
-                <a:solidFill>
-                  <a:schemeClr val="tx1"/>
-                </a:solidFill>
-                <a:latin typeface="Calibri" pitchFamily="34" charset="0"/>
-              </a:defRPr>
-            </a:lvl2pPr>
-            <a:lvl3pPr marL="1143000" indent="-228600" eaLnBrk="0" hangingPunct="0">
-              <a:spcBef>
-                <a:spcPct val="20000"/>
-              </a:spcBef>
-              <a:buFont typeface="Arial" charset="0"/>
-              <a:buChar char="•"/>
-              <a:defRPr sz="2400">
-                <a:solidFill>
-                  <a:schemeClr val="tx1"/>
-                </a:solidFill>
-                <a:latin typeface="Calibri" pitchFamily="34" charset="0"/>
-              </a:defRPr>
-            </a:lvl3pPr>
-            <a:lvl4pPr marL="1600200" indent="-228600" eaLnBrk="0" hangingPunct="0">
-              <a:spcBef>
-                <a:spcPct val="20000"/>
-              </a:spcBef>
-              <a:buFont typeface="Arial" charset="0"/>
-              <a:buChar char="–"/>
-              <a:defRPr sz="2000">
-                <a:solidFill>
-                  <a:schemeClr val="tx1"/>
-                </a:solidFill>
-                <a:latin typeface="Calibri" pitchFamily="34" charset="0"/>
-              </a:defRPr>
-            </a:lvl4pPr>
-            <a:lvl5pPr marL="2057400" indent="-228600" eaLnBrk="0" hangingPunct="0">
-              <a:spcBef>
-                <a:spcPct val="20000"/>
-              </a:spcBef>
-              <a:buFont typeface="Arial" charset="0"/>
-              <a:buChar char="»"/>
-              <a:defRPr sz="2000">
-                <a:solidFill>
-                  <a:schemeClr val="tx1"/>
-                </a:solidFill>
-                <a:latin typeface="Calibri" pitchFamily="34" charset="0"/>
-              </a:defRPr>
-            </a:lvl5pPr>
-            <a:lvl6pPr marL="2514600" indent="-228600" eaLnBrk="0" fontAlgn="base" hangingPunct="0">
-              <a:spcBef>
-                <a:spcPct val="20000"/>
-              </a:spcBef>
-              <a:spcAft>
-                <a:spcPct val="0"/>
-              </a:spcAft>
-              <a:buFont typeface="Arial" charset="0"/>
-              <a:buChar char="»"/>
-              <a:defRPr sz="2000">
-                <a:solidFill>
-                  <a:schemeClr val="tx1"/>
-                </a:solidFill>
-                <a:latin typeface="Calibri" pitchFamily="34" charset="0"/>
-              </a:defRPr>
-            </a:lvl6pPr>
-            <a:lvl7pPr marL="2971800" indent="-228600" eaLnBrk="0" fontAlgn="base" hangingPunct="0">
-              <a:spcBef>
-                <a:spcPct val="20000"/>
-              </a:spcBef>
-              <a:spcAft>
-                <a:spcPct val="0"/>
-              </a:spcAft>
-              <a:buFont typeface="Arial" charset="0"/>
-              <a:buChar char="»"/>
-              <a:defRPr sz="2000">
-                <a:solidFill>
-                  <a:schemeClr val="tx1"/>
-                </a:solidFill>
-                <a:latin typeface="Calibri" pitchFamily="34" charset="0"/>
-              </a:defRPr>
-            </a:lvl7pPr>
-            <a:lvl8pPr marL="3429000" indent="-228600" eaLnBrk="0" fontAlgn="base" hangingPunct="0">
-              <a:spcBef>
-                <a:spcPct val="20000"/>
-              </a:spcBef>
-              <a:spcAft>
-                <a:spcPct val="0"/>
-              </a:spcAft>
-              <a:buFont typeface="Arial" charset="0"/>
-              <a:buChar char="»"/>
-              <a:defRPr sz="2000">
-                <a:solidFill>
-                  <a:schemeClr val="tx1"/>
-                </a:solidFill>
-                <a:latin typeface="Calibri" pitchFamily="34" charset="0"/>
-              </a:defRPr>
-            </a:lvl8pPr>
-            <a:lvl9pPr marL="3886200" indent="-228600" eaLnBrk="0" fontAlgn="base" hangingPunct="0">
-              <a:spcBef>
-                <a:spcPct val="20000"/>
-              </a:spcBef>
-              <a:spcAft>
-                <a:spcPct val="0"/>
-              </a:spcAft>
-              <a:buFont typeface="Arial" charset="0"/>
-              <a:buChar char="»"/>
-              <a:defRPr sz="2000">
-                <a:solidFill>
-                  <a:schemeClr val="tx1"/>
-                </a:solidFill>
-                <a:latin typeface="Calibri" pitchFamily="34" charset="0"/>
-              </a:defRPr>
-            </a:lvl9pPr>
-          </a:lstStyle>
-          <a:p>
-            <a:pPr eaLnBrk="1" hangingPunct="1">
-              <a:spcBef>
-                <a:spcPct val="0"/>
-              </a:spcBef>
-              <a:buFontTx/>
-              <a:buNone/>
-            </a:pPr>
-            <a:r>
-              <a:rPr lang="de-DE" altLang="de-DE" sz="1800" dirty="0" smtClean="0"/>
-              <a:t>Invitation</a:t>
-            </a:r>
-            <a:endParaRPr lang="de-DE" altLang="de-DE" sz="1800" dirty="0"/>
-          </a:p>
-          <a:p>
-            <a:pPr eaLnBrk="1" hangingPunct="1">
-              <a:spcBef>
-                <a:spcPct val="0"/>
-              </a:spcBef>
-              <a:buFontTx/>
-              <a:buNone/>
-            </a:pPr>
-            <a:r>
-              <a:rPr lang="de-DE" altLang="de-DE" sz="800" dirty="0" err="1"/>
-              <a:t>long</a:t>
-            </a:r>
-            <a:r>
-              <a:rPr lang="de-DE" altLang="de-DE" sz="800" dirty="0"/>
+              <a:rPr lang="de-DE" altLang="de-DE" sz="900" dirty="0"/>
               <a:t> </a:t>
             </a:r>
             <a:r>
-              <a:rPr lang="de-DE" altLang="de-DE" sz="800" dirty="0" err="1"/>
-              <a:t>creationTimestamp</a:t>
-            </a:r>
-            <a:endParaRPr lang="de-DE" altLang="de-DE" sz="800" dirty="0"/>
-          </a:p>
-          <a:p>
-            <a:pPr eaLnBrk="1" hangingPunct="1">
-              <a:spcBef>
-                <a:spcPct val="0"/>
-              </a:spcBef>
-              <a:buFontTx/>
-              <a:buNone/>
-            </a:pPr>
-            <a:r>
-              <a:rPr lang="de-DE" altLang="de-DE" sz="800" dirty="0"/>
-              <a:t>String name</a:t>
-            </a:r>
-          </a:p>
-          <a:p>
-            <a:pPr eaLnBrk="1" hangingPunct="1">
-              <a:spcBef>
-                <a:spcPct val="0"/>
-              </a:spcBef>
-              <a:buFontTx/>
-              <a:buNone/>
-            </a:pPr>
-            <a:r>
-              <a:rPr lang="de-DE" altLang="de-DE" sz="800" dirty="0"/>
-              <a:t>String </a:t>
-            </a:r>
-            <a:r>
-              <a:rPr lang="de-DE" altLang="de-DE" sz="800" dirty="0" err="1"/>
-              <a:t>invitID</a:t>
-            </a:r>
-            <a:endParaRPr lang="de-DE" altLang="de-DE" sz="800" dirty="0"/>
-          </a:p>
-        </p:txBody>
-      </p:sp>
-      <p:sp>
-        <p:nvSpPr>
-          <p:cNvPr id="30733" name="Text Box 9"/>
-          <p:cNvSpPr txBox="1">
-            <a:spLocks noChangeArrowheads="1"/>
-          </p:cNvSpPr>
-          <p:nvPr/>
-        </p:nvSpPr>
-        <p:spPr bwMode="auto">
-          <a:xfrm>
-            <a:off x="3680718" y="3144143"/>
-            <a:ext cx="203200" cy="139700"/>
-          </a:xfrm>
-          <a:prstGeom prst="rect">
-            <a:avLst/>
-          </a:prstGeom>
-          <a:noFill/>
-          <a:ln>
-            <a:noFill/>
-          </a:ln>
-          <a:effectLst/>
-          <a:extLst>
-            <a:ext uri="{909E8E84-426E-40DD-AFC4-6F175D3DCCD1}">
-              <a14:hiddenFill xmlns:a14="http://schemas.microsoft.com/office/drawing/2010/main">
-                <a:solidFill>
-                  <a:schemeClr val="accent1"/>
-                </a:solidFill>
-              </a14:hiddenFill>
-            </a:ext>
-            <a:ext uri="{91240B29-F687-4F45-9708-019B960494DF}">
-              <a14:hiddenLine xmlns:a14="http://schemas.microsoft.com/office/drawing/2010/main" w="9525">
-                <a:solidFill>
-                  <a:schemeClr val="tx1"/>
-                </a:solidFill>
-                <a:miter lim="800000"/>
-                <a:headEnd/>
-                <a:tailEnd/>
-              </a14:hiddenLine>
-            </a:ext>
-            <a:ext uri="{AF507438-7753-43E0-B8FC-AC1667EBCBE1}">
-              <a14:hiddenEffects xmlns:a14="http://schemas.microsoft.com/office/drawing/2010/main">
-                <a:effectLst>
-                  <a:outerShdw dist="35921" dir="2700000" algn="ctr" rotWithShape="0">
-                    <a:schemeClr val="bg2"/>
-                  </a:outerShdw>
-                </a:effectLst>
-              </a14:hiddenEffects>
-            </a:ext>
-          </a:extLst>
-        </p:spPr>
-        <p:txBody>
-          <a:bodyPr lIns="0" tIns="0" rIns="0" bIns="0">
-            <a:spAutoFit/>
-          </a:bodyPr>
-          <a:lstStyle>
-            <a:lvl1pPr eaLnBrk="0" hangingPunct="0">
-              <a:spcBef>
-                <a:spcPct val="20000"/>
-              </a:spcBef>
-              <a:buFont typeface="Arial" charset="0"/>
-              <a:buChar char="•"/>
-              <a:defRPr sz="3200">
-                <a:solidFill>
-                  <a:schemeClr val="tx1"/>
-                </a:solidFill>
-                <a:latin typeface="Calibri" pitchFamily="34" charset="0"/>
-              </a:defRPr>
-            </a:lvl1pPr>
-            <a:lvl2pPr marL="742950" indent="-285750" eaLnBrk="0" hangingPunct="0">
-              <a:spcBef>
-                <a:spcPct val="20000"/>
-              </a:spcBef>
-              <a:buFont typeface="Arial" charset="0"/>
-              <a:buChar char="–"/>
-              <a:defRPr sz="2800">
-                <a:solidFill>
-                  <a:schemeClr val="tx1"/>
-                </a:solidFill>
-                <a:latin typeface="Calibri" pitchFamily="34" charset="0"/>
-              </a:defRPr>
-            </a:lvl2pPr>
-            <a:lvl3pPr marL="1143000" indent="-228600" eaLnBrk="0" hangingPunct="0">
-              <a:spcBef>
-                <a:spcPct val="20000"/>
-              </a:spcBef>
-              <a:buFont typeface="Arial" charset="0"/>
-              <a:buChar char="•"/>
-              <a:defRPr sz="2400">
-                <a:solidFill>
-                  <a:schemeClr val="tx1"/>
-                </a:solidFill>
-                <a:latin typeface="Calibri" pitchFamily="34" charset="0"/>
-              </a:defRPr>
-            </a:lvl3pPr>
-            <a:lvl4pPr marL="1600200" indent="-228600" eaLnBrk="0" hangingPunct="0">
-              <a:spcBef>
-                <a:spcPct val="20000"/>
-              </a:spcBef>
-              <a:buFont typeface="Arial" charset="0"/>
-              <a:buChar char="–"/>
-              <a:defRPr sz="2000">
-                <a:solidFill>
-                  <a:schemeClr val="tx1"/>
-                </a:solidFill>
-                <a:latin typeface="Calibri" pitchFamily="34" charset="0"/>
-              </a:defRPr>
-            </a:lvl4pPr>
-            <a:lvl5pPr marL="2057400" indent="-228600" eaLnBrk="0" hangingPunct="0">
-              <a:spcBef>
-                <a:spcPct val="20000"/>
-              </a:spcBef>
-              <a:buFont typeface="Arial" charset="0"/>
-              <a:buChar char="»"/>
-              <a:defRPr sz="2000">
-                <a:solidFill>
-                  <a:schemeClr val="tx1"/>
-                </a:solidFill>
-                <a:latin typeface="Calibri" pitchFamily="34" charset="0"/>
-              </a:defRPr>
-            </a:lvl5pPr>
-            <a:lvl6pPr marL="2514600" indent="-228600" eaLnBrk="0" fontAlgn="base" hangingPunct="0">
-              <a:spcBef>
-                <a:spcPct val="20000"/>
-              </a:spcBef>
-              <a:spcAft>
-                <a:spcPct val="0"/>
-              </a:spcAft>
-              <a:buFont typeface="Arial" charset="0"/>
-              <a:buChar char="»"/>
-              <a:defRPr sz="2000">
-                <a:solidFill>
-                  <a:schemeClr val="tx1"/>
-                </a:solidFill>
-                <a:latin typeface="Calibri" pitchFamily="34" charset="0"/>
-              </a:defRPr>
-            </a:lvl6pPr>
-            <a:lvl7pPr marL="2971800" indent="-228600" eaLnBrk="0" fontAlgn="base" hangingPunct="0">
-              <a:spcBef>
-                <a:spcPct val="20000"/>
-              </a:spcBef>
-              <a:spcAft>
-                <a:spcPct val="0"/>
-              </a:spcAft>
-              <a:buFont typeface="Arial" charset="0"/>
-              <a:buChar char="»"/>
-              <a:defRPr sz="2000">
-                <a:solidFill>
-                  <a:schemeClr val="tx1"/>
-                </a:solidFill>
-                <a:latin typeface="Calibri" pitchFamily="34" charset="0"/>
-              </a:defRPr>
-            </a:lvl7pPr>
-            <a:lvl8pPr marL="3429000" indent="-228600" eaLnBrk="0" fontAlgn="base" hangingPunct="0">
-              <a:spcBef>
-                <a:spcPct val="20000"/>
-              </a:spcBef>
-              <a:spcAft>
-                <a:spcPct val="0"/>
-              </a:spcAft>
-              <a:buFont typeface="Arial" charset="0"/>
-              <a:buChar char="»"/>
-              <a:defRPr sz="2000">
-                <a:solidFill>
-                  <a:schemeClr val="tx1"/>
-                </a:solidFill>
-                <a:latin typeface="Calibri" pitchFamily="34" charset="0"/>
-              </a:defRPr>
-            </a:lvl8pPr>
-            <a:lvl9pPr marL="3886200" indent="-228600" eaLnBrk="0" fontAlgn="base" hangingPunct="0">
-              <a:spcBef>
-                <a:spcPct val="20000"/>
-              </a:spcBef>
-              <a:spcAft>
-                <a:spcPct val="0"/>
-              </a:spcAft>
-              <a:buFont typeface="Arial" charset="0"/>
-              <a:buChar char="»"/>
-              <a:defRPr sz="2000">
-                <a:solidFill>
-                  <a:schemeClr val="tx1"/>
-                </a:solidFill>
-                <a:latin typeface="Calibri" pitchFamily="34" charset="0"/>
-              </a:defRPr>
-            </a:lvl9pPr>
-          </a:lstStyle>
-          <a:p>
-            <a:pPr eaLnBrk="1" hangingPunct="1">
-              <a:spcBef>
-                <a:spcPct val="0"/>
-              </a:spcBef>
-              <a:buFontTx/>
-              <a:buNone/>
-            </a:pPr>
-            <a:r>
-              <a:rPr lang="de-DE" altLang="de-DE" sz="900"/>
-              <a:t> 0..1</a:t>
-            </a:r>
-            <a:endParaRPr lang="de-DE" altLang="de-DE" sz="1800"/>
+              <a:rPr lang="de-DE" altLang="de-DE" sz="900" dirty="0" smtClean="0"/>
+              <a:t>1</a:t>
+            </a:r>
+            <a:endParaRPr lang="de-DE" altLang="de-DE" sz="900" dirty="0"/>
           </a:p>
         </p:txBody>
       </p:sp>
@@ -7146,15 +7012,15 @@
         <p:nvCxnSpPr>
           <p:cNvPr id="108" name="Gewinkelte Verbindung 107"/>
           <p:cNvCxnSpPr>
-            <a:stCxn id="30733" idx="2"/>
-            <a:endCxn id="38" idx="0"/>
+            <a:stCxn id="30733" idx="1"/>
+            <a:endCxn id="38" idx="3"/>
           </p:cNvCxnSpPr>
           <p:nvPr/>
         </p:nvCxnSpPr>
         <p:spPr>
-          <a:xfrm rot="16200000" flipH="1">
-            <a:off x="3565793" y="3500368"/>
-            <a:ext cx="438706" cy="5656"/>
+          <a:xfrm rot="10800000" flipV="1">
+            <a:off x="5559102" y="4572770"/>
+            <a:ext cx="1041946" cy="1201"/>
           </a:xfrm>
           <a:prstGeom prst="bentConnector3">
             <a:avLst>
@@ -7185,13 +7051,13 @@
         </p:nvSpPr>
         <p:spPr>
           <a:xfrm>
-            <a:off x="3866456" y="3394968"/>
+            <a:off x="5524025" y="4293096"/>
             <a:ext cx="388937" cy="114300"/>
           </a:xfrm>
           <a:prstGeom prst="wedgeRoundRectCallout">
             <a:avLst>
-              <a:gd name="adj1" fmla="val -70103"/>
-              <a:gd name="adj2" fmla="val -13029"/>
+              <a:gd name="adj1" fmla="val -57858"/>
+              <a:gd name="adj2" fmla="val 95304"/>
               <a:gd name="adj3" fmla="val 16667"/>
             </a:avLst>
           </a:prstGeom>
@@ -7259,8 +7125,8 @@
         </p:nvSpPr>
         <p:spPr bwMode="auto">
           <a:xfrm>
-            <a:off x="788938" y="2152229"/>
-            <a:ext cx="230187" cy="138112"/>
+            <a:off x="1709784" y="2546301"/>
+            <a:ext cx="230187" cy="138499"/>
           </a:xfrm>
           <a:prstGeom prst="rect">
             <a:avLst/>
@@ -7443,10 +7309,14 @@
               <a:buNone/>
             </a:pPr>
             <a:r>
-              <a:rPr lang="de-DE" altLang="de-DE" sz="900"/>
-              <a:t> 0..1</a:t>
-            </a:r>
-            <a:endParaRPr lang="de-DE" altLang="de-DE" sz="1800"/>
+              <a:rPr lang="de-DE" altLang="de-DE" sz="900" dirty="0"/>
+              <a:t> </a:t>
+            </a:r>
+            <a:r>
+              <a:rPr lang="de-DE" altLang="de-DE" sz="900" dirty="0" smtClean="0"/>
+              <a:t>1</a:t>
+            </a:r>
+            <a:endParaRPr lang="de-DE" altLang="de-DE" sz="900" dirty="0"/>
           </a:p>
         </p:txBody>
       </p:sp>
@@ -7460,8 +7330,8 @@
         </p:nvSpPr>
         <p:spPr bwMode="auto">
           <a:xfrm>
-            <a:off x="5187430" y="3785058"/>
-            <a:ext cx="3200994" cy="792163"/>
+            <a:off x="3798712" y="4766856"/>
+            <a:ext cx="1435900" cy="270487"/>
           </a:xfrm>
           <a:prstGeom prst="rect">
             <a:avLst/>
@@ -7638,31 +7508,10 @@
               <a:buNone/>
             </a:pPr>
             <a:r>
-              <a:rPr lang="de-DE" altLang="de-DE" sz="1800" dirty="0" smtClean="0"/>
+              <a:rPr lang="de-DE" altLang="de-DE" sz="1100" dirty="0" smtClean="0"/>
               <a:t>Invitation2Supporter</a:t>
             </a:r>
-          </a:p>
-          <a:p>
-            <a:pPr eaLnBrk="1" hangingPunct="1">
-              <a:spcBef>
-                <a:spcPct val="0"/>
-              </a:spcBef>
-              <a:buFontTx/>
-              <a:buNone/>
-            </a:pPr>
-            <a:r>
-              <a:rPr lang="de-DE" altLang="de-DE" sz="800" dirty="0" err="1" smtClean="0"/>
-              <a:t>long</a:t>
-            </a:r>
-            <a:r>
-              <a:rPr lang="de-DE" altLang="de-DE" sz="800" dirty="0" smtClean="0"/>
-              <a:t> </a:t>
-            </a:r>
-            <a:r>
-              <a:rPr lang="de-DE" altLang="de-DE" sz="800" dirty="0" err="1"/>
-              <a:t>timestamp</a:t>
-            </a:r>
-            <a:endParaRPr lang="de-DE" altLang="de-DE" sz="800" dirty="0"/>
+            <a:endParaRPr lang="de-DE" altLang="de-DE" sz="1100" dirty="0" smtClean="0"/>
           </a:p>
         </p:txBody>
       </p:sp>
@@ -7676,8 +7525,8 @@
         </p:nvSpPr>
         <p:spPr bwMode="auto">
           <a:xfrm>
-            <a:off x="5699298" y="3640584"/>
-            <a:ext cx="96838" cy="138112"/>
+            <a:off x="5276822" y="4879802"/>
+            <a:ext cx="213002" cy="138499"/>
           </a:xfrm>
           <a:prstGeom prst="rect">
             <a:avLst/>
@@ -7865,9 +7714,9 @@
             </a:r>
             <a:r>
               <a:rPr lang="de-DE" altLang="de-DE" sz="900" dirty="0" smtClean="0"/>
-              <a:t>1</a:t>
-            </a:r>
-            <a:endParaRPr lang="de-DE" altLang="de-DE" sz="1800" dirty="0"/>
+              <a:t>0..*</a:t>
+            </a:r>
+            <a:endParaRPr lang="de-DE" altLang="de-DE" sz="900" dirty="0"/>
           </a:p>
         </p:txBody>
       </p:sp>
@@ -7881,8 +7730,8 @@
         </p:nvSpPr>
         <p:spPr bwMode="auto">
           <a:xfrm>
-            <a:off x="5697091" y="3209230"/>
-            <a:ext cx="96838" cy="139700"/>
+            <a:off x="6587442" y="4902407"/>
+            <a:ext cx="96838" cy="138499"/>
           </a:xfrm>
           <a:prstGeom prst="rect">
             <a:avLst/>
@@ -8065,10 +7914,9 @@
               <a:buNone/>
             </a:pPr>
             <a:r>
-              <a:rPr lang="de-DE" altLang="de-DE" sz="900"/>
+              <a:rPr lang="de-DE" altLang="de-DE" sz="900" dirty="0"/>
               <a:t> 1</a:t>
             </a:r>
-            <a:endParaRPr lang="de-DE" altLang="de-DE" sz="1800"/>
           </a:p>
         </p:txBody>
       </p:sp>
@@ -8076,15 +7924,15 @@
         <p:nvCxnSpPr>
           <p:cNvPr id="47" name="Gewinkelte Verbindung 46"/>
           <p:cNvCxnSpPr>
-            <a:stCxn id="30749" idx="2"/>
-            <a:endCxn id="30748" idx="0"/>
+            <a:stCxn id="30749" idx="1"/>
+            <a:endCxn id="30748" idx="3"/>
           </p:cNvCxnSpPr>
           <p:nvPr/>
         </p:nvCxnSpPr>
         <p:spPr>
-          <a:xfrm rot="16200000" flipH="1">
-            <a:off x="5600786" y="3493653"/>
-            <a:ext cx="291654" cy="2207"/>
+          <a:xfrm rot="10800000">
+            <a:off x="5489824" y="4949053"/>
+            <a:ext cx="1097618" cy="22605"/>
           </a:xfrm>
           <a:prstGeom prst="bentConnector3">
             <a:avLst>
@@ -8118,8 +7966,8 @@
         </p:nvCxnSpPr>
         <p:spPr>
           <a:xfrm rot="10800000" flipV="1">
-            <a:off x="1839715" y="2711871"/>
-            <a:ext cx="1434778" cy="5333"/>
+            <a:off x="5559100" y="3067638"/>
+            <a:ext cx="992400" cy="16877"/>
           </a:xfrm>
           <a:prstGeom prst="bentConnector3">
             <a:avLst>
@@ -8152,9 +8000,9 @@
           <p:nvPr/>
         </p:nvCxnSpPr>
         <p:spPr>
-          <a:xfrm rot="16200000" flipH="1">
-            <a:off x="602679" y="1850876"/>
-            <a:ext cx="601242" cy="1463"/>
+          <a:xfrm rot="5400000">
+            <a:off x="1692507" y="2409244"/>
+            <a:ext cx="269429" cy="4685"/>
           </a:xfrm>
           <a:prstGeom prst="bentConnector3">
             <a:avLst/>
@@ -8185,7 +8033,7 @@
         </p:nvSpPr>
         <p:spPr bwMode="auto">
           <a:xfrm>
-            <a:off x="5796136" y="5222932"/>
+            <a:off x="2739845" y="4879801"/>
             <a:ext cx="103187" cy="138499"/>
           </a:xfrm>
           <a:prstGeom prst="rect">
@@ -8372,6 +8220,7 @@
               <a:rPr lang="de-DE" altLang="de-DE" sz="900" dirty="0" smtClean="0"/>
               <a:t>1</a:t>
             </a:r>
+            <a:endParaRPr lang="de-DE" altLang="de-DE" sz="900" dirty="0" smtClean="0"/>
           </a:p>
         </p:txBody>
       </p:sp>
@@ -8385,7 +8234,7 @@
         </p:nvSpPr>
         <p:spPr bwMode="auto">
           <a:xfrm>
-            <a:off x="5754241" y="4448145"/>
+            <a:off x="3510679" y="4823675"/>
             <a:ext cx="188466" cy="276999"/>
           </a:xfrm>
           <a:prstGeom prst="rect">
@@ -8576,7 +8425,7 @@
               <a:rPr lang="de-DE" altLang="de-DE" sz="900" dirty="0" smtClean="0"/>
               <a:t>0..*</a:t>
             </a:r>
-            <a:endParaRPr lang="de-DE" altLang="de-DE" sz="1800" dirty="0"/>
+            <a:endParaRPr lang="de-DE" altLang="de-DE" sz="900" dirty="0"/>
           </a:p>
         </p:txBody>
       </p:sp>
@@ -8584,15 +8433,15 @@
         <p:nvCxnSpPr>
           <p:cNvPr id="75" name="Gewinkelte Verbindung 74"/>
           <p:cNvCxnSpPr>
-            <a:stCxn id="74" idx="2"/>
-            <a:endCxn id="73" idx="0"/>
+            <a:stCxn id="74" idx="1"/>
+            <a:endCxn id="73" idx="3"/>
           </p:cNvCxnSpPr>
           <p:nvPr/>
         </p:nvCxnSpPr>
         <p:spPr>
-          <a:xfrm rot="5400000">
-            <a:off x="5599208" y="4973666"/>
-            <a:ext cx="497788" cy="744"/>
+          <a:xfrm rot="10800000">
+            <a:off x="2843033" y="4949051"/>
+            <a:ext cx="667647" cy="13124"/>
           </a:xfrm>
           <a:prstGeom prst="bentConnector3">
             <a:avLst>
@@ -8625,8 +8474,8 @@
         </p:nvSpPr>
         <p:spPr bwMode="auto">
           <a:xfrm>
-            <a:off x="6428482" y="745702"/>
-            <a:ext cx="1676400" cy="397669"/>
+            <a:off x="1044497" y="5827066"/>
+            <a:ext cx="1676325" cy="397669"/>
           </a:xfrm>
           <a:prstGeom prst="rect">
             <a:avLst/>
@@ -8803,10 +8652,10 @@
               <a:buNone/>
             </a:pPr>
             <a:r>
-              <a:rPr lang="de-DE" altLang="de-DE" sz="1800" dirty="0" smtClean="0"/>
+              <a:rPr lang="de-DE" altLang="de-DE" sz="1400" dirty="0" smtClean="0"/>
               <a:t>Donation</a:t>
             </a:r>
-            <a:endParaRPr lang="de-DE" altLang="de-DE" sz="1800" dirty="0"/>
+            <a:endParaRPr lang="de-DE" altLang="de-DE" sz="1400" dirty="0"/>
           </a:p>
           <a:p>
             <a:pPr eaLnBrk="1" hangingPunct="1">
@@ -8816,7 +8665,7 @@
               <a:buFontTx/>
               <a:buNone/>
             </a:pPr>
-            <a:endParaRPr lang="de-DE" altLang="de-DE" sz="800" dirty="0"/>
+            <a:endParaRPr lang="de-DE" altLang="de-DE" sz="600" dirty="0"/>
           </a:p>
         </p:txBody>
       </p:sp>
@@ -8830,8 +8679,8 @@
         </p:nvSpPr>
         <p:spPr bwMode="auto">
           <a:xfrm>
-            <a:off x="7110972" y="2014116"/>
-            <a:ext cx="204788" cy="138113"/>
+            <a:off x="5285036" y="5881410"/>
+            <a:ext cx="204788" cy="138499"/>
           </a:xfrm>
           <a:prstGeom prst="rect">
             <a:avLst/>
@@ -9014,10 +8863,10 @@
               <a:buNone/>
             </a:pPr>
             <a:r>
-              <a:rPr lang="de-DE" altLang="de-DE" sz="900" dirty="0"/>
+              <a:rPr lang="de-DE" altLang="de-DE" sz="900" dirty="0" smtClean="0"/>
               <a:t> 0..*</a:t>
             </a:r>
-            <a:endParaRPr lang="de-DE" altLang="de-DE" sz="1800" dirty="0"/>
+            <a:endParaRPr lang="de-DE" altLang="de-DE" sz="900" dirty="0"/>
           </a:p>
         </p:txBody>
       </p:sp>
@@ -9031,8 +8880,8 @@
         </p:nvSpPr>
         <p:spPr bwMode="auto">
           <a:xfrm>
-            <a:off x="6573591" y="2434606"/>
-            <a:ext cx="147638" cy="138113"/>
+            <a:off x="6612272" y="5883175"/>
+            <a:ext cx="147638" cy="138499"/>
           </a:xfrm>
           <a:prstGeom prst="rect">
             <a:avLst/>
@@ -9215,10 +9064,14 @@
               <a:buNone/>
             </a:pPr>
             <a:r>
-              <a:rPr lang="de-DE" altLang="de-DE" sz="900"/>
-              <a:t> 1</a:t>
-            </a:r>
-            <a:endParaRPr lang="de-DE" altLang="de-DE" sz="1800"/>
+              <a:rPr lang="de-DE" altLang="de-DE" sz="900" dirty="0"/>
+              <a:t> </a:t>
+            </a:r>
+            <a:r>
+              <a:rPr lang="de-DE" altLang="de-DE" sz="900" dirty="0" smtClean="0"/>
+              <a:t>1</a:t>
+            </a:r>
+            <a:endParaRPr lang="de-DE" altLang="de-DE" sz="900" dirty="0"/>
           </a:p>
         </p:txBody>
       </p:sp>
@@ -9226,18 +9079,20 @@
         <p:nvCxnSpPr>
           <p:cNvPr id="84" name="Gewinkelte Verbindung 83"/>
           <p:cNvCxnSpPr>
-            <a:stCxn id="81" idx="2"/>
-            <a:endCxn id="83" idx="3"/>
+            <a:stCxn id="81" idx="3"/>
+            <a:endCxn id="83" idx="1"/>
           </p:cNvCxnSpPr>
           <p:nvPr/>
         </p:nvCxnSpPr>
         <p:spPr>
-          <a:xfrm rot="5400000">
-            <a:off x="6791581" y="2081878"/>
-            <a:ext cx="351434" cy="492137"/>
+          <a:xfrm>
+            <a:off x="5489824" y="5950660"/>
+            <a:ext cx="1122448" cy="1765"/>
           </a:xfrm>
-          <a:prstGeom prst="bentConnector2">
-            <a:avLst/>
+          <a:prstGeom prst="bentConnector3">
+            <a:avLst>
+              <a:gd name="adj1" fmla="val 50000"/>
+            </a:avLst>
           </a:prstGeom>
         </p:spPr>
         <p:style>
@@ -9265,8 +9120,8 @@
         </p:nvSpPr>
         <p:spPr bwMode="auto">
           <a:xfrm>
-            <a:off x="2566147" y="3857066"/>
-            <a:ext cx="2221877" cy="591079"/>
+            <a:off x="3798712" y="4326984"/>
+            <a:ext cx="1435900" cy="267050"/>
           </a:xfrm>
           <a:prstGeom prst="rect">
             <a:avLst/>
@@ -9428,31 +9283,10 @@
               <a:buNone/>
             </a:pPr>
             <a:r>
-              <a:rPr lang="de-DE" altLang="de-DE" sz="1800" dirty="0" smtClean="0"/>
+              <a:rPr lang="de-DE" altLang="de-DE" sz="1100" dirty="0" smtClean="0"/>
               <a:t>Supporter2Invitation</a:t>
             </a:r>
-          </a:p>
-          <a:p>
-            <a:pPr eaLnBrk="1" hangingPunct="1">
-              <a:spcBef>
-                <a:spcPct val="0"/>
-              </a:spcBef>
-              <a:buFontTx/>
-              <a:buNone/>
-            </a:pPr>
-            <a:r>
-              <a:rPr lang="de-DE" altLang="de-DE" sz="800" dirty="0" err="1" smtClean="0"/>
-              <a:t>long</a:t>
-            </a:r>
-            <a:r>
-              <a:rPr lang="de-DE" altLang="de-DE" sz="800" dirty="0" smtClean="0"/>
-              <a:t> </a:t>
-            </a:r>
-            <a:r>
-              <a:rPr lang="de-DE" altLang="de-DE" sz="800" dirty="0" err="1"/>
-              <a:t>timestamp</a:t>
-            </a:r>
-            <a:endParaRPr lang="de-DE" altLang="de-DE" sz="800" dirty="0"/>
+            <a:endParaRPr lang="de-DE" altLang="de-DE" sz="1100" dirty="0" smtClean="0"/>
           </a:p>
         </p:txBody>
       </p:sp>
@@ -9466,8 +9300,8 @@
         </p:nvSpPr>
         <p:spPr bwMode="auto">
           <a:xfrm>
-            <a:off x="6196190" y="1628800"/>
-            <a:ext cx="2221877" cy="368245"/>
+            <a:off x="3798711" y="5827066"/>
+            <a:ext cx="1435900" cy="260713"/>
           </a:xfrm>
           <a:prstGeom prst="rect">
             <a:avLst/>
@@ -9629,7 +9463,7 @@
               <a:buNone/>
             </a:pPr>
             <a:r>
-              <a:rPr lang="de-DE" altLang="de-DE" sz="1800" dirty="0" smtClean="0"/>
+              <a:rPr lang="de-DE" altLang="de-DE" sz="1100" dirty="0" smtClean="0"/>
               <a:t>Supporter2Donations</a:t>
             </a:r>
           </a:p>
@@ -9641,7 +9475,7 @@
               <a:buFontTx/>
               <a:buNone/>
             </a:pPr>
-            <a:endParaRPr lang="de-DE" altLang="de-DE" sz="800" dirty="0"/>
+            <a:endParaRPr lang="de-DE" altLang="de-DE" sz="400" dirty="0"/>
           </a:p>
         </p:txBody>
       </p:sp>
@@ -9655,8 +9489,8 @@
         </p:nvSpPr>
         <p:spPr bwMode="auto">
           <a:xfrm>
-            <a:off x="7107797" y="1484784"/>
-            <a:ext cx="96838" cy="138112"/>
+            <a:off x="2756542" y="5949280"/>
+            <a:ext cx="96838" cy="138499"/>
           </a:xfrm>
           <a:prstGeom prst="rect">
             <a:avLst/>
@@ -9846,7 +9680,7 @@
               <a:rPr lang="de-DE" altLang="de-DE" sz="900" dirty="0" smtClean="0"/>
               <a:t>1</a:t>
             </a:r>
-            <a:endParaRPr lang="de-DE" altLang="de-DE" sz="1800" dirty="0"/>
+            <a:endParaRPr lang="de-DE" altLang="de-DE" sz="900" dirty="0"/>
           </a:p>
         </p:txBody>
       </p:sp>
@@ -9860,8 +9694,8 @@
         </p:nvSpPr>
         <p:spPr bwMode="auto">
           <a:xfrm>
-            <a:off x="7105590" y="1183506"/>
-            <a:ext cx="96838" cy="139700"/>
+            <a:off x="3671748" y="5949280"/>
+            <a:ext cx="96838" cy="138499"/>
           </a:xfrm>
           <a:prstGeom prst="rect">
             <a:avLst/>
@@ -10044,10 +9878,9 @@
               <a:buNone/>
             </a:pPr>
             <a:r>
-              <a:rPr lang="de-DE" altLang="de-DE" sz="900"/>
+              <a:rPr lang="de-DE" altLang="de-DE" sz="900" dirty="0"/>
               <a:t> 1</a:t>
             </a:r>
-            <a:endParaRPr lang="de-DE" altLang="de-DE" sz="1800"/>
           </a:p>
         </p:txBody>
       </p:sp>
@@ -10055,15 +9888,15 @@
         <p:nvCxnSpPr>
           <p:cNvPr id="37" name="Gewinkelte Verbindung 36"/>
           <p:cNvCxnSpPr>
-            <a:stCxn id="36" idx="2"/>
-            <a:endCxn id="35" idx="0"/>
+            <a:stCxn id="36" idx="1"/>
+            <a:endCxn id="35" idx="3"/>
           </p:cNvCxnSpPr>
           <p:nvPr/>
         </p:nvCxnSpPr>
         <p:spPr>
-          <a:xfrm rot="16200000" flipH="1">
-            <a:off x="7074323" y="1402891"/>
-            <a:ext cx="161578" cy="2207"/>
+          <a:xfrm rot="10800000">
+            <a:off x="2853380" y="6018530"/>
+            <a:ext cx="818368" cy="12700"/>
           </a:xfrm>
           <a:prstGeom prst="bentConnector3">
             <a:avLst>
@@ -10096,7 +9929,7 @@
         </p:nvSpPr>
         <p:spPr bwMode="auto">
           <a:xfrm>
-            <a:off x="3652020" y="3722549"/>
+            <a:off x="5287194" y="4504722"/>
             <a:ext cx="271908" cy="138499"/>
           </a:xfrm>
           <a:prstGeom prst="rect">
@@ -10280,14 +10113,10 @@
               <a:buNone/>
             </a:pPr>
             <a:r>
-              <a:rPr lang="de-DE" altLang="de-DE" sz="900" dirty="0"/>
-              <a:t> </a:t>
-            </a:r>
-            <a:r>
               <a:rPr lang="de-DE" altLang="de-DE" sz="900" dirty="0" smtClean="0"/>
-              <a:t>0..*</a:t>
-            </a:r>
-            <a:endParaRPr lang="de-DE" altLang="de-DE" sz="1800" dirty="0"/>
+              <a:t> 0..*</a:t>
+            </a:r>
+            <a:endParaRPr lang="de-DE" altLang="de-DE" sz="900" dirty="0"/>
           </a:p>
         </p:txBody>
       </p:sp>
@@ -10301,8 +10130,8 @@
         </p:nvSpPr>
         <p:spPr bwMode="auto">
           <a:xfrm>
-            <a:off x="3741762" y="5228804"/>
-            <a:ext cx="96838" cy="138112"/>
+            <a:off x="2727421" y="4407396"/>
+            <a:ext cx="96838" cy="138499"/>
           </a:xfrm>
           <a:prstGeom prst="rect">
             <a:avLst/>
@@ -10492,7 +10321,7 @@
               <a:rPr lang="de-DE" altLang="de-DE" sz="900" dirty="0" smtClean="0"/>
               <a:t>1</a:t>
             </a:r>
-            <a:endParaRPr lang="de-DE" altLang="de-DE" sz="1800" dirty="0"/>
+            <a:endParaRPr lang="de-DE" altLang="de-DE" sz="900" dirty="0"/>
           </a:p>
         </p:txBody>
       </p:sp>
@@ -10506,8 +10335,8 @@
         </p:nvSpPr>
         <p:spPr bwMode="auto">
           <a:xfrm>
-            <a:off x="3739555" y="4504656"/>
-            <a:ext cx="96838" cy="139700"/>
+            <a:off x="3595808" y="4410823"/>
+            <a:ext cx="96838" cy="138499"/>
           </a:xfrm>
           <a:prstGeom prst="rect">
             <a:avLst/>
@@ -10693,7 +10522,6 @@
               <a:rPr lang="de-DE" altLang="de-DE" sz="900"/>
               <a:t> 1</a:t>
             </a:r>
-            <a:endParaRPr lang="de-DE" altLang="de-DE" sz="1800"/>
           </a:p>
         </p:txBody>
       </p:sp>
@@ -10701,15 +10529,15 @@
         <p:nvCxnSpPr>
           <p:cNvPr id="42" name="Gewinkelte Verbindung 41"/>
           <p:cNvCxnSpPr>
-            <a:stCxn id="41" idx="2"/>
-            <a:endCxn id="40" idx="0"/>
+            <a:stCxn id="41" idx="1"/>
+            <a:endCxn id="40" idx="3"/>
           </p:cNvCxnSpPr>
           <p:nvPr/>
         </p:nvCxnSpPr>
         <p:spPr>
-          <a:xfrm rot="16200000" flipH="1">
-            <a:off x="3496853" y="4935476"/>
-            <a:ext cx="584448" cy="2207"/>
+          <a:xfrm rot="10800000">
+            <a:off x="2824260" y="4476647"/>
+            <a:ext cx="771549" cy="3427"/>
           </a:xfrm>
           <a:prstGeom prst="bentConnector3">
             <a:avLst>
@@ -10740,13 +10568,13 @@
         </p:nvSpPr>
         <p:spPr>
           <a:xfrm>
-            <a:off x="5964808" y="4916888"/>
+            <a:off x="3245713" y="4709375"/>
             <a:ext cx="388937" cy="114300"/>
           </a:xfrm>
           <a:prstGeom prst="wedgeRoundRectCallout">
             <a:avLst>
-              <a:gd name="adj1" fmla="val -70103"/>
-              <a:gd name="adj2" fmla="val -13029"/>
+              <a:gd name="adj1" fmla="val 32755"/>
+              <a:gd name="adj2" fmla="val 145304"/>
               <a:gd name="adj3" fmla="val 16667"/>
             </a:avLst>
           </a:prstGeom>
@@ -10814,8 +10642,8 @@
         </p:nvSpPr>
         <p:spPr bwMode="auto">
           <a:xfrm>
-            <a:off x="3419872" y="828507"/>
-            <a:ext cx="2221877" cy="368245"/>
+            <a:off x="3798712" y="811499"/>
+            <a:ext cx="1435900" cy="260713"/>
           </a:xfrm>
           <a:prstGeom prst="rect">
             <a:avLst/>
@@ -10977,9 +10805,10 @@
               <a:buNone/>
             </a:pPr>
             <a:r>
-              <a:rPr lang="de-DE" altLang="de-DE" sz="1800" dirty="0" smtClean="0"/>
-              <a:t>User2Supporters</a:t>
-            </a:r>
+              <a:rPr lang="de-DE" altLang="de-DE" sz="1100" dirty="0" smtClean="0"/>
+              <a:t>User2Supporter</a:t>
+            </a:r>
+            <a:endParaRPr lang="de-DE" altLang="de-DE" sz="1100" dirty="0" smtClean="0"/>
           </a:p>
           <a:p>
             <a:pPr eaLnBrk="1" hangingPunct="1">
@@ -10989,7 +10818,7 @@
               <a:buFontTx/>
               <a:buNone/>
             </a:pPr>
-            <a:endParaRPr lang="de-DE" altLang="de-DE" sz="800" dirty="0"/>
+            <a:endParaRPr lang="de-DE" altLang="de-DE" sz="400" dirty="0"/>
           </a:p>
         </p:txBody>
       </p:sp>
@@ -11003,8 +10832,8 @@
         </p:nvSpPr>
         <p:spPr bwMode="auto">
           <a:xfrm>
-            <a:off x="4440520" y="2005634"/>
-            <a:ext cx="96838" cy="138112"/>
+            <a:off x="6612272" y="982294"/>
+            <a:ext cx="96838" cy="138499"/>
           </a:xfrm>
           <a:prstGeom prst="rect">
             <a:avLst/>
@@ -11194,7 +11023,7 @@
               <a:rPr lang="de-DE" altLang="de-DE" sz="900" dirty="0" smtClean="0"/>
               <a:t>1</a:t>
             </a:r>
-            <a:endParaRPr lang="de-DE" altLang="de-DE" sz="1800" dirty="0"/>
+            <a:endParaRPr lang="de-DE" altLang="de-DE" sz="900" dirty="0"/>
           </a:p>
         </p:txBody>
       </p:sp>
@@ -11208,8 +11037,8 @@
         </p:nvSpPr>
         <p:spPr bwMode="auto">
           <a:xfrm>
-            <a:off x="4438313" y="1281486"/>
-            <a:ext cx="96838" cy="139700"/>
+            <a:off x="5287194" y="847745"/>
+            <a:ext cx="80114" cy="276999"/>
           </a:xfrm>
           <a:prstGeom prst="rect">
             <a:avLst/>
@@ -11249,7 +11078,7 @@
           </a:extLst>
         </p:spPr>
         <p:txBody>
-          <a:bodyPr lIns="0" tIns="0" rIns="0" bIns="0">
+          <a:bodyPr wrap="square" lIns="0" tIns="0" rIns="0" bIns="0">
             <a:spAutoFit/>
           </a:bodyPr>
           <a:lstStyle>
@@ -11392,10 +11221,14 @@
               <a:buNone/>
             </a:pPr>
             <a:r>
-              <a:rPr lang="de-DE" altLang="de-DE" sz="900"/>
-              <a:t> 1</a:t>
-            </a:r>
-            <a:endParaRPr lang="de-DE" altLang="de-DE" sz="1800"/>
+              <a:rPr lang="de-DE" altLang="de-DE" sz="900" dirty="0"/>
+              <a:t> </a:t>
+            </a:r>
+            <a:r>
+              <a:rPr lang="de-DE" altLang="de-DE" sz="900" dirty="0" smtClean="0"/>
+              <a:t>1</a:t>
+            </a:r>
+            <a:endParaRPr lang="de-DE" altLang="de-DE" sz="900" dirty="0"/>
           </a:p>
         </p:txBody>
       </p:sp>
@@ -11403,15 +11236,15 @@
         <p:nvCxnSpPr>
           <p:cNvPr id="49" name="Gewinkelte Verbindung 48"/>
           <p:cNvCxnSpPr>
-            <a:stCxn id="48" idx="2"/>
-            <a:endCxn id="46" idx="0"/>
+            <a:stCxn id="48" idx="3"/>
+            <a:endCxn id="46" idx="1"/>
           </p:cNvCxnSpPr>
           <p:nvPr/>
         </p:nvCxnSpPr>
         <p:spPr>
-          <a:xfrm rot="16200000" flipH="1">
-            <a:off x="4195611" y="1712306"/>
-            <a:ext cx="584448" cy="2207"/>
+          <a:xfrm>
+            <a:off x="5367308" y="986245"/>
+            <a:ext cx="1244964" cy="65299"/>
           </a:xfrm>
           <a:prstGeom prst="bentConnector3">
             <a:avLst>
@@ -11444,8 +11277,8 @@
         </p:nvSpPr>
         <p:spPr bwMode="auto">
           <a:xfrm>
-            <a:off x="3200674" y="943573"/>
-            <a:ext cx="204788" cy="138113"/>
+            <a:off x="2767778" y="864476"/>
+            <a:ext cx="204788" cy="138499"/>
           </a:xfrm>
           <a:prstGeom prst="rect">
             <a:avLst/>
@@ -11628,10 +11461,14 @@
               <a:buNone/>
             </a:pPr>
             <a:r>
-              <a:rPr lang="de-DE" altLang="de-DE" sz="900"/>
-              <a:t> 0..*</a:t>
-            </a:r>
-            <a:endParaRPr lang="de-DE" altLang="de-DE" sz="1800"/>
+              <a:rPr lang="de-DE" altLang="de-DE" sz="900" dirty="0"/>
+              <a:t> </a:t>
+            </a:r>
+            <a:r>
+              <a:rPr lang="de-DE" altLang="de-DE" sz="900" dirty="0"/>
+              <a:t>1</a:t>
+            </a:r>
+            <a:endParaRPr lang="de-DE" altLang="de-DE" sz="900" dirty="0"/>
           </a:p>
         </p:txBody>
       </p:sp>
@@ -11645,8 +11482,8 @@
         </p:nvSpPr>
         <p:spPr bwMode="auto">
           <a:xfrm>
-            <a:off x="2230214" y="948906"/>
-            <a:ext cx="147638" cy="138113"/>
+            <a:off x="3510680" y="870958"/>
+            <a:ext cx="288031" cy="138499"/>
           </a:xfrm>
           <a:prstGeom prst="rect">
             <a:avLst/>
@@ -11686,7 +11523,7 @@
           </a:extLst>
         </p:spPr>
         <p:txBody>
-          <a:bodyPr lIns="0" tIns="0" rIns="0" bIns="0">
+          <a:bodyPr wrap="square" lIns="0" tIns="0" rIns="0" bIns="0">
             <a:spAutoFit/>
           </a:bodyPr>
           <a:lstStyle>
@@ -11830,9 +11667,13 @@
             </a:pPr>
             <a:r>
               <a:rPr lang="de-DE" altLang="de-DE" sz="900" dirty="0"/>
-              <a:t> 1</a:t>
-            </a:r>
-            <a:endParaRPr lang="de-DE" altLang="de-DE" sz="1800" dirty="0"/>
+              <a:t> </a:t>
+            </a:r>
+            <a:r>
+              <a:rPr lang="de-DE" altLang="de-DE" sz="900" dirty="0" smtClean="0"/>
+              <a:t>0..*</a:t>
+            </a:r>
+            <a:endParaRPr lang="de-DE" altLang="de-DE" sz="900" dirty="0"/>
           </a:p>
         </p:txBody>
       </p:sp>
@@ -11840,15 +11681,15 @@
         <p:nvCxnSpPr>
           <p:cNvPr id="52" name="Gewinkelte Verbindung 51"/>
           <p:cNvCxnSpPr>
-            <a:stCxn id="50" idx="1"/>
-            <a:endCxn id="51" idx="3"/>
+            <a:stCxn id="50" idx="3"/>
+            <a:endCxn id="51" idx="1"/>
           </p:cNvCxnSpPr>
           <p:nvPr/>
         </p:nvCxnSpPr>
         <p:spPr>
-          <a:xfrm rot="10800000" flipV="1">
-            <a:off x="2377852" y="1012629"/>
-            <a:ext cx="822822" cy="5333"/>
+          <a:xfrm>
+            <a:off x="2972566" y="933726"/>
+            <a:ext cx="538114" cy="6482"/>
           </a:xfrm>
           <a:prstGeom prst="bentConnector3">
             <a:avLst>
@@ -11879,8 +11720,8 @@
         </p:nvSpPr>
         <p:spPr>
           <a:xfrm>
-            <a:off x="6852554" y="4314582"/>
-            <a:ext cx="1188146" cy="261610"/>
+            <a:off x="4124695" y="5373796"/>
+            <a:ext cx="968898" cy="215444"/>
           </a:xfrm>
           <a:prstGeom prst="rect">
             <a:avLst/>
@@ -11888,14 +11729,14 @@
           <a:noFill/>
         </p:spPr>
         <p:txBody>
-          <a:bodyPr wrap="none" rtlCol="0">
+          <a:bodyPr wrap="square" rtlCol="0">
             <a:spAutoFit/>
           </a:bodyPr>
           <a:lstStyle/>
           <a:p>
             <a:pPr lvl="0"/>
             <a:r>
-              <a:rPr lang="de-DE" altLang="de-DE" sz="1100" dirty="0" smtClean="0">
+              <a:rPr lang="de-DE" altLang="de-DE" sz="800" dirty="0" smtClean="0">
                 <a:solidFill>
                   <a:schemeClr val="bg1">
                     <a:lumMod val="75000"/>
@@ -11905,7 +11746,7 @@
               <a:t>(=</a:t>
             </a:r>
             <a:r>
-              <a:rPr lang="de-DE" altLang="de-DE" sz="1100" dirty="0" err="1" smtClean="0">
+              <a:rPr lang="de-DE" altLang="de-DE" sz="800" dirty="0" err="1" smtClean="0">
                 <a:solidFill>
                   <a:schemeClr val="bg1">
                     <a:lumMod val="75000"/>
@@ -11915,7 +11756,7 @@
               <a:t>Invitationclicks</a:t>
             </a:r>
             <a:r>
-              <a:rPr lang="de-DE" altLang="de-DE" sz="1100" dirty="0" smtClean="0">
+              <a:rPr lang="de-DE" altLang="de-DE" sz="800" dirty="0" smtClean="0">
                 <a:solidFill>
                   <a:schemeClr val="bg1">
                     <a:lumMod val="75000"/>
@@ -11924,7 +11765,7 @@
               </a:rPr>
               <a:t>)</a:t>
             </a:r>
-            <a:endParaRPr lang="de-DE" altLang="de-DE" sz="1050" dirty="0">
+            <a:endParaRPr lang="de-DE" altLang="de-DE" sz="700" dirty="0">
               <a:solidFill>
                 <a:schemeClr val="bg1">
                   <a:lumMod val="75000"/>
@@ -11955,10 +11796,1515 @@
           <a:lstStyle/>
           <a:p>
             <a:r>
-              <a:rPr lang="de-DE" dirty="0" smtClean="0"/>
+              <a:rPr lang="de-DE" sz="3600" dirty="0" smtClean="0"/>
               <a:t>Core</a:t>
             </a:r>
-            <a:endParaRPr lang="en-US" dirty="0"/>
+            <a:endParaRPr lang="en-US" sz="3600" dirty="0"/>
+          </a:p>
+        </p:txBody>
+      </p:sp>
+      <p:sp>
+        <p:nvSpPr>
+          <p:cNvPr id="53" name="Rectangle 4"/>
+          <p:cNvSpPr>
+            <a:spLocks noChangeArrowheads="1"/>
+          </p:cNvSpPr>
+          <p:nvPr/>
+        </p:nvSpPr>
+        <p:spPr bwMode="auto">
+          <a:xfrm>
+            <a:off x="3798712" y="2931640"/>
+            <a:ext cx="1435900" cy="250164"/>
+          </a:xfrm>
+          <a:prstGeom prst="rect">
+            <a:avLst/>
+          </a:prstGeom>
+          <a:solidFill>
+            <a:schemeClr val="bg1"/>
+          </a:solidFill>
+          <a:ln w="9525">
+            <a:solidFill>
+              <a:schemeClr val="tx1"/>
+            </a:solidFill>
+            <a:prstDash val="solid"/>
+            <a:miter lim="800000"/>
+            <a:headEnd/>
+            <a:tailEnd/>
+          </a:ln>
+          <a:effectLst/>
+          <a:extLst/>
+        </p:spPr>
+        <p:txBody>
+          <a:bodyPr wrap="none"/>
+          <a:lstStyle>
+            <a:lvl1pPr eaLnBrk="0" hangingPunct="0">
+              <a:spcBef>
+                <a:spcPct val="20000"/>
+              </a:spcBef>
+              <a:buFont typeface="Arial" charset="0"/>
+              <a:buChar char="•"/>
+              <a:defRPr sz="3200">
+                <a:solidFill>
+                  <a:schemeClr val="tx1"/>
+                </a:solidFill>
+                <a:latin typeface="Calibri" pitchFamily="34" charset="0"/>
+              </a:defRPr>
+            </a:lvl1pPr>
+            <a:lvl2pPr marL="742950" indent="-285750" eaLnBrk="0" hangingPunct="0">
+              <a:spcBef>
+                <a:spcPct val="20000"/>
+              </a:spcBef>
+              <a:buFont typeface="Arial" charset="0"/>
+              <a:buChar char="–"/>
+              <a:defRPr sz="2800">
+                <a:solidFill>
+                  <a:schemeClr val="tx1"/>
+                </a:solidFill>
+                <a:latin typeface="Calibri" pitchFamily="34" charset="0"/>
+              </a:defRPr>
+            </a:lvl2pPr>
+            <a:lvl3pPr marL="1143000" indent="-228600" eaLnBrk="0" hangingPunct="0">
+              <a:spcBef>
+                <a:spcPct val="20000"/>
+              </a:spcBef>
+              <a:buFont typeface="Arial" charset="0"/>
+              <a:buChar char="•"/>
+              <a:defRPr sz="2400">
+                <a:solidFill>
+                  <a:schemeClr val="tx1"/>
+                </a:solidFill>
+                <a:latin typeface="Calibri" pitchFamily="34" charset="0"/>
+              </a:defRPr>
+            </a:lvl3pPr>
+            <a:lvl4pPr marL="1600200" indent="-228600" eaLnBrk="0" hangingPunct="0">
+              <a:spcBef>
+                <a:spcPct val="20000"/>
+              </a:spcBef>
+              <a:buFont typeface="Arial" charset="0"/>
+              <a:buChar char="–"/>
+              <a:defRPr sz="2000">
+                <a:solidFill>
+                  <a:schemeClr val="tx1"/>
+                </a:solidFill>
+                <a:latin typeface="Calibri" pitchFamily="34" charset="0"/>
+              </a:defRPr>
+            </a:lvl4pPr>
+            <a:lvl5pPr marL="2057400" indent="-228600" eaLnBrk="0" hangingPunct="0">
+              <a:spcBef>
+                <a:spcPct val="20000"/>
+              </a:spcBef>
+              <a:buFont typeface="Arial" charset="0"/>
+              <a:buChar char="»"/>
+              <a:defRPr sz="2000">
+                <a:solidFill>
+                  <a:schemeClr val="tx1"/>
+                </a:solidFill>
+                <a:latin typeface="Calibri" pitchFamily="34" charset="0"/>
+              </a:defRPr>
+            </a:lvl5pPr>
+            <a:lvl6pPr marL="2514600" indent="-228600" eaLnBrk="0" fontAlgn="base" hangingPunct="0">
+              <a:spcBef>
+                <a:spcPct val="20000"/>
+              </a:spcBef>
+              <a:spcAft>
+                <a:spcPct val="0"/>
+              </a:spcAft>
+              <a:buFont typeface="Arial" charset="0"/>
+              <a:buChar char="»"/>
+              <a:defRPr sz="2000">
+                <a:solidFill>
+                  <a:schemeClr val="tx1"/>
+                </a:solidFill>
+                <a:latin typeface="Calibri" pitchFamily="34" charset="0"/>
+              </a:defRPr>
+            </a:lvl6pPr>
+            <a:lvl7pPr marL="2971800" indent="-228600" eaLnBrk="0" fontAlgn="base" hangingPunct="0">
+              <a:spcBef>
+                <a:spcPct val="20000"/>
+              </a:spcBef>
+              <a:spcAft>
+                <a:spcPct val="0"/>
+              </a:spcAft>
+              <a:buFont typeface="Arial" charset="0"/>
+              <a:buChar char="»"/>
+              <a:defRPr sz="2000">
+                <a:solidFill>
+                  <a:schemeClr val="tx1"/>
+                </a:solidFill>
+                <a:latin typeface="Calibri" pitchFamily="34" charset="0"/>
+              </a:defRPr>
+            </a:lvl7pPr>
+            <a:lvl8pPr marL="3429000" indent="-228600" eaLnBrk="0" fontAlgn="base" hangingPunct="0">
+              <a:spcBef>
+                <a:spcPct val="20000"/>
+              </a:spcBef>
+              <a:spcAft>
+                <a:spcPct val="0"/>
+              </a:spcAft>
+              <a:buFont typeface="Arial" charset="0"/>
+              <a:buChar char="»"/>
+              <a:defRPr sz="2000">
+                <a:solidFill>
+                  <a:schemeClr val="tx1"/>
+                </a:solidFill>
+                <a:latin typeface="Calibri" pitchFamily="34" charset="0"/>
+              </a:defRPr>
+            </a:lvl8pPr>
+            <a:lvl9pPr marL="3886200" indent="-228600" eaLnBrk="0" fontAlgn="base" hangingPunct="0">
+              <a:spcBef>
+                <a:spcPct val="20000"/>
+              </a:spcBef>
+              <a:spcAft>
+                <a:spcPct val="0"/>
+              </a:spcAft>
+              <a:buFont typeface="Arial" charset="0"/>
+              <a:buChar char="»"/>
+              <a:defRPr sz="2000">
+                <a:solidFill>
+                  <a:schemeClr val="tx1"/>
+                </a:solidFill>
+                <a:latin typeface="Calibri" pitchFamily="34" charset="0"/>
+              </a:defRPr>
+            </a:lvl9pPr>
+          </a:lstStyle>
+          <a:p>
+            <a:pPr eaLnBrk="1" hangingPunct="1">
+              <a:spcBef>
+                <a:spcPct val="0"/>
+              </a:spcBef>
+              <a:buFontTx/>
+              <a:buNone/>
+            </a:pPr>
+            <a:r>
+              <a:rPr lang="de-DE" altLang="de-DE" sz="1100" dirty="0" smtClean="0"/>
+              <a:t>Hero2Supporter</a:t>
+            </a:r>
+            <a:endParaRPr lang="de-DE" altLang="de-DE" sz="1100" dirty="0" smtClean="0"/>
+          </a:p>
+          <a:p>
+            <a:pPr eaLnBrk="1" hangingPunct="1">
+              <a:spcBef>
+                <a:spcPct val="0"/>
+              </a:spcBef>
+              <a:buFontTx/>
+              <a:buNone/>
+            </a:pPr>
+            <a:endParaRPr lang="de-DE" altLang="de-DE" sz="400" dirty="0"/>
+          </a:p>
+        </p:txBody>
+      </p:sp>
+      <p:sp>
+        <p:nvSpPr>
+          <p:cNvPr id="85" name="Text Box 9"/>
+          <p:cNvSpPr txBox="1">
+            <a:spLocks noChangeArrowheads="1"/>
+          </p:cNvSpPr>
+          <p:nvPr/>
+        </p:nvSpPr>
+        <p:spPr bwMode="auto">
+          <a:xfrm>
+            <a:off x="2803360" y="3007672"/>
+            <a:ext cx="96838" cy="138499"/>
+          </a:xfrm>
+          <a:prstGeom prst="rect">
+            <a:avLst/>
+          </a:prstGeom>
+          <a:noFill/>
+          <a:ln>
+            <a:noFill/>
+          </a:ln>
+          <a:effectLst/>
+          <a:extLst>
+            <a:ext uri="{909E8E84-426E-40DD-AFC4-6F175D3DCCD1}">
+              <a14:hiddenFill xmlns:a14="http://schemas.microsoft.com/office/drawing/2010/main">
+                <a:solidFill>
+                  <a:schemeClr val="accent1"/>
+                </a:solidFill>
+              </a14:hiddenFill>
+            </a:ext>
+            <a:ext uri="{91240B29-F687-4F45-9708-019B960494DF}">
+              <a14:hiddenLine xmlns:a14="http://schemas.microsoft.com/office/drawing/2010/main" w="9525">
+                <a:solidFill>
+                  <a:schemeClr val="tx1"/>
+                </a:solidFill>
+                <a:miter lim="800000"/>
+                <a:headEnd/>
+                <a:tailEnd/>
+              </a14:hiddenLine>
+            </a:ext>
+            <a:ext uri="{AF507438-7753-43E0-B8FC-AC1667EBCBE1}">
+              <a14:hiddenEffects xmlns:a14="http://schemas.microsoft.com/office/drawing/2010/main">
+                <a:effectLst>
+                  <a:outerShdw dist="35921" dir="2700000" algn="ctr" rotWithShape="0">
+                    <a:schemeClr val="bg2"/>
+                  </a:outerShdw>
+                </a:effectLst>
+              </a14:hiddenEffects>
+            </a:ext>
+          </a:extLst>
+        </p:spPr>
+        <p:txBody>
+          <a:bodyPr wrap="square" lIns="0" tIns="0" rIns="0" bIns="0">
+            <a:spAutoFit/>
+          </a:bodyPr>
+          <a:lstStyle>
+            <a:lvl1pPr eaLnBrk="0" hangingPunct="0">
+              <a:spcBef>
+                <a:spcPct val="20000"/>
+              </a:spcBef>
+              <a:buFont typeface="Arial" charset="0"/>
+              <a:buChar char="•"/>
+              <a:defRPr sz="3200">
+                <a:solidFill>
+                  <a:schemeClr val="tx1"/>
+                </a:solidFill>
+                <a:latin typeface="Calibri" pitchFamily="34" charset="0"/>
+              </a:defRPr>
+            </a:lvl1pPr>
+            <a:lvl2pPr marL="742950" indent="-285750" eaLnBrk="0" hangingPunct="0">
+              <a:spcBef>
+                <a:spcPct val="20000"/>
+              </a:spcBef>
+              <a:buFont typeface="Arial" charset="0"/>
+              <a:buChar char="–"/>
+              <a:defRPr sz="2800">
+                <a:solidFill>
+                  <a:schemeClr val="tx1"/>
+                </a:solidFill>
+                <a:latin typeface="Calibri" pitchFamily="34" charset="0"/>
+              </a:defRPr>
+            </a:lvl2pPr>
+            <a:lvl3pPr marL="1143000" indent="-228600" eaLnBrk="0" hangingPunct="0">
+              <a:spcBef>
+                <a:spcPct val="20000"/>
+              </a:spcBef>
+              <a:buFont typeface="Arial" charset="0"/>
+              <a:buChar char="•"/>
+              <a:defRPr sz="2400">
+                <a:solidFill>
+                  <a:schemeClr val="tx1"/>
+                </a:solidFill>
+                <a:latin typeface="Calibri" pitchFamily="34" charset="0"/>
+              </a:defRPr>
+            </a:lvl3pPr>
+            <a:lvl4pPr marL="1600200" indent="-228600" eaLnBrk="0" hangingPunct="0">
+              <a:spcBef>
+                <a:spcPct val="20000"/>
+              </a:spcBef>
+              <a:buFont typeface="Arial" charset="0"/>
+              <a:buChar char="–"/>
+              <a:defRPr sz="2000">
+                <a:solidFill>
+                  <a:schemeClr val="tx1"/>
+                </a:solidFill>
+                <a:latin typeface="Calibri" pitchFamily="34" charset="0"/>
+              </a:defRPr>
+            </a:lvl4pPr>
+            <a:lvl5pPr marL="2057400" indent="-228600" eaLnBrk="0" hangingPunct="0">
+              <a:spcBef>
+                <a:spcPct val="20000"/>
+              </a:spcBef>
+              <a:buFont typeface="Arial" charset="0"/>
+              <a:buChar char="»"/>
+              <a:defRPr sz="2000">
+                <a:solidFill>
+                  <a:schemeClr val="tx1"/>
+                </a:solidFill>
+                <a:latin typeface="Calibri" pitchFamily="34" charset="0"/>
+              </a:defRPr>
+            </a:lvl5pPr>
+            <a:lvl6pPr marL="2514600" indent="-228600" eaLnBrk="0" fontAlgn="base" hangingPunct="0">
+              <a:spcBef>
+                <a:spcPct val="20000"/>
+              </a:spcBef>
+              <a:spcAft>
+                <a:spcPct val="0"/>
+              </a:spcAft>
+              <a:buFont typeface="Arial" charset="0"/>
+              <a:buChar char="»"/>
+              <a:defRPr sz="2000">
+                <a:solidFill>
+                  <a:schemeClr val="tx1"/>
+                </a:solidFill>
+                <a:latin typeface="Calibri" pitchFamily="34" charset="0"/>
+              </a:defRPr>
+            </a:lvl6pPr>
+            <a:lvl7pPr marL="2971800" indent="-228600" eaLnBrk="0" fontAlgn="base" hangingPunct="0">
+              <a:spcBef>
+                <a:spcPct val="20000"/>
+              </a:spcBef>
+              <a:spcAft>
+                <a:spcPct val="0"/>
+              </a:spcAft>
+              <a:buFont typeface="Arial" charset="0"/>
+              <a:buChar char="»"/>
+              <a:defRPr sz="2000">
+                <a:solidFill>
+                  <a:schemeClr val="tx1"/>
+                </a:solidFill>
+                <a:latin typeface="Calibri" pitchFamily="34" charset="0"/>
+              </a:defRPr>
+            </a:lvl7pPr>
+            <a:lvl8pPr marL="3429000" indent="-228600" eaLnBrk="0" fontAlgn="base" hangingPunct="0">
+              <a:spcBef>
+                <a:spcPct val="20000"/>
+              </a:spcBef>
+              <a:spcAft>
+                <a:spcPct val="0"/>
+              </a:spcAft>
+              <a:buFont typeface="Arial" charset="0"/>
+              <a:buChar char="»"/>
+              <a:defRPr sz="2000">
+                <a:solidFill>
+                  <a:schemeClr val="tx1"/>
+                </a:solidFill>
+                <a:latin typeface="Calibri" pitchFamily="34" charset="0"/>
+              </a:defRPr>
+            </a:lvl8pPr>
+            <a:lvl9pPr marL="3886200" indent="-228600" eaLnBrk="0" fontAlgn="base" hangingPunct="0">
+              <a:spcBef>
+                <a:spcPct val="20000"/>
+              </a:spcBef>
+              <a:spcAft>
+                <a:spcPct val="0"/>
+              </a:spcAft>
+              <a:buFont typeface="Arial" charset="0"/>
+              <a:buChar char="»"/>
+              <a:defRPr sz="2000">
+                <a:solidFill>
+                  <a:schemeClr val="tx1"/>
+                </a:solidFill>
+                <a:latin typeface="Calibri" pitchFamily="34" charset="0"/>
+              </a:defRPr>
+            </a:lvl9pPr>
+          </a:lstStyle>
+          <a:p>
+            <a:pPr eaLnBrk="1" hangingPunct="1">
+              <a:spcBef>
+                <a:spcPct val="0"/>
+              </a:spcBef>
+              <a:buFontTx/>
+              <a:buNone/>
+            </a:pPr>
+            <a:r>
+              <a:rPr lang="de-DE" altLang="de-DE" sz="900" dirty="0"/>
+              <a:t> </a:t>
+            </a:r>
+            <a:r>
+              <a:rPr lang="de-DE" altLang="de-DE" sz="900" dirty="0" smtClean="0"/>
+              <a:t>1</a:t>
+            </a:r>
+            <a:endParaRPr lang="de-DE" altLang="de-DE" sz="900" dirty="0"/>
+          </a:p>
+        </p:txBody>
+      </p:sp>
+      <p:sp>
+        <p:nvSpPr>
+          <p:cNvPr id="86" name="Text Box 9"/>
+          <p:cNvSpPr txBox="1">
+            <a:spLocks noChangeArrowheads="1"/>
+          </p:cNvSpPr>
+          <p:nvPr/>
+        </p:nvSpPr>
+        <p:spPr bwMode="auto">
+          <a:xfrm>
+            <a:off x="3510680" y="3011099"/>
+            <a:ext cx="257905" cy="138499"/>
+          </a:xfrm>
+          <a:prstGeom prst="rect">
+            <a:avLst/>
+          </a:prstGeom>
+          <a:noFill/>
+          <a:ln>
+            <a:noFill/>
+          </a:ln>
+          <a:effectLst/>
+          <a:extLst>
+            <a:ext uri="{909E8E84-426E-40DD-AFC4-6F175D3DCCD1}">
+              <a14:hiddenFill xmlns:a14="http://schemas.microsoft.com/office/drawing/2010/main">
+                <a:solidFill>
+                  <a:schemeClr val="accent1"/>
+                </a:solidFill>
+              </a14:hiddenFill>
+            </a:ext>
+            <a:ext uri="{91240B29-F687-4F45-9708-019B960494DF}">
+              <a14:hiddenLine xmlns:a14="http://schemas.microsoft.com/office/drawing/2010/main" w="9525">
+                <a:solidFill>
+                  <a:schemeClr val="tx1"/>
+                </a:solidFill>
+                <a:miter lim="800000"/>
+                <a:headEnd/>
+                <a:tailEnd/>
+              </a14:hiddenLine>
+            </a:ext>
+            <a:ext uri="{AF507438-7753-43E0-B8FC-AC1667EBCBE1}">
+              <a14:hiddenEffects xmlns:a14="http://schemas.microsoft.com/office/drawing/2010/main">
+                <a:effectLst>
+                  <a:outerShdw dist="35921" dir="2700000" algn="ctr" rotWithShape="0">
+                    <a:schemeClr val="bg2"/>
+                  </a:outerShdw>
+                </a:effectLst>
+              </a14:hiddenEffects>
+            </a:ext>
+          </a:extLst>
+        </p:spPr>
+        <p:txBody>
+          <a:bodyPr wrap="square" lIns="0" tIns="0" rIns="0" bIns="0">
+            <a:spAutoFit/>
+          </a:bodyPr>
+          <a:lstStyle>
+            <a:lvl1pPr eaLnBrk="0" hangingPunct="0">
+              <a:spcBef>
+                <a:spcPct val="20000"/>
+              </a:spcBef>
+              <a:buFont typeface="Arial" charset="0"/>
+              <a:buChar char="•"/>
+              <a:defRPr sz="3200">
+                <a:solidFill>
+                  <a:schemeClr val="tx1"/>
+                </a:solidFill>
+                <a:latin typeface="Calibri" pitchFamily="34" charset="0"/>
+              </a:defRPr>
+            </a:lvl1pPr>
+            <a:lvl2pPr marL="742950" indent="-285750" eaLnBrk="0" hangingPunct="0">
+              <a:spcBef>
+                <a:spcPct val="20000"/>
+              </a:spcBef>
+              <a:buFont typeface="Arial" charset="0"/>
+              <a:buChar char="–"/>
+              <a:defRPr sz="2800">
+                <a:solidFill>
+                  <a:schemeClr val="tx1"/>
+                </a:solidFill>
+                <a:latin typeface="Calibri" pitchFamily="34" charset="0"/>
+              </a:defRPr>
+            </a:lvl2pPr>
+            <a:lvl3pPr marL="1143000" indent="-228600" eaLnBrk="0" hangingPunct="0">
+              <a:spcBef>
+                <a:spcPct val="20000"/>
+              </a:spcBef>
+              <a:buFont typeface="Arial" charset="0"/>
+              <a:buChar char="•"/>
+              <a:defRPr sz="2400">
+                <a:solidFill>
+                  <a:schemeClr val="tx1"/>
+                </a:solidFill>
+                <a:latin typeface="Calibri" pitchFamily="34" charset="0"/>
+              </a:defRPr>
+            </a:lvl3pPr>
+            <a:lvl4pPr marL="1600200" indent="-228600" eaLnBrk="0" hangingPunct="0">
+              <a:spcBef>
+                <a:spcPct val="20000"/>
+              </a:spcBef>
+              <a:buFont typeface="Arial" charset="0"/>
+              <a:buChar char="–"/>
+              <a:defRPr sz="2000">
+                <a:solidFill>
+                  <a:schemeClr val="tx1"/>
+                </a:solidFill>
+                <a:latin typeface="Calibri" pitchFamily="34" charset="0"/>
+              </a:defRPr>
+            </a:lvl4pPr>
+            <a:lvl5pPr marL="2057400" indent="-228600" eaLnBrk="0" hangingPunct="0">
+              <a:spcBef>
+                <a:spcPct val="20000"/>
+              </a:spcBef>
+              <a:buFont typeface="Arial" charset="0"/>
+              <a:buChar char="»"/>
+              <a:defRPr sz="2000">
+                <a:solidFill>
+                  <a:schemeClr val="tx1"/>
+                </a:solidFill>
+                <a:latin typeface="Calibri" pitchFamily="34" charset="0"/>
+              </a:defRPr>
+            </a:lvl5pPr>
+            <a:lvl6pPr marL="2514600" indent="-228600" eaLnBrk="0" fontAlgn="base" hangingPunct="0">
+              <a:spcBef>
+                <a:spcPct val="20000"/>
+              </a:spcBef>
+              <a:spcAft>
+                <a:spcPct val="0"/>
+              </a:spcAft>
+              <a:buFont typeface="Arial" charset="0"/>
+              <a:buChar char="»"/>
+              <a:defRPr sz="2000">
+                <a:solidFill>
+                  <a:schemeClr val="tx1"/>
+                </a:solidFill>
+                <a:latin typeface="Calibri" pitchFamily="34" charset="0"/>
+              </a:defRPr>
+            </a:lvl6pPr>
+            <a:lvl7pPr marL="2971800" indent="-228600" eaLnBrk="0" fontAlgn="base" hangingPunct="0">
+              <a:spcBef>
+                <a:spcPct val="20000"/>
+              </a:spcBef>
+              <a:spcAft>
+                <a:spcPct val="0"/>
+              </a:spcAft>
+              <a:buFont typeface="Arial" charset="0"/>
+              <a:buChar char="»"/>
+              <a:defRPr sz="2000">
+                <a:solidFill>
+                  <a:schemeClr val="tx1"/>
+                </a:solidFill>
+                <a:latin typeface="Calibri" pitchFamily="34" charset="0"/>
+              </a:defRPr>
+            </a:lvl7pPr>
+            <a:lvl8pPr marL="3429000" indent="-228600" eaLnBrk="0" fontAlgn="base" hangingPunct="0">
+              <a:spcBef>
+                <a:spcPct val="20000"/>
+              </a:spcBef>
+              <a:spcAft>
+                <a:spcPct val="0"/>
+              </a:spcAft>
+              <a:buFont typeface="Arial" charset="0"/>
+              <a:buChar char="»"/>
+              <a:defRPr sz="2000">
+                <a:solidFill>
+                  <a:schemeClr val="tx1"/>
+                </a:solidFill>
+                <a:latin typeface="Calibri" pitchFamily="34" charset="0"/>
+              </a:defRPr>
+            </a:lvl8pPr>
+            <a:lvl9pPr marL="3886200" indent="-228600" eaLnBrk="0" fontAlgn="base" hangingPunct="0">
+              <a:spcBef>
+                <a:spcPct val="20000"/>
+              </a:spcBef>
+              <a:spcAft>
+                <a:spcPct val="0"/>
+              </a:spcAft>
+              <a:buFont typeface="Arial" charset="0"/>
+              <a:buChar char="»"/>
+              <a:defRPr sz="2000">
+                <a:solidFill>
+                  <a:schemeClr val="tx1"/>
+                </a:solidFill>
+                <a:latin typeface="Calibri" pitchFamily="34" charset="0"/>
+              </a:defRPr>
+            </a:lvl9pPr>
+          </a:lstStyle>
+          <a:p>
+            <a:pPr eaLnBrk="1" hangingPunct="1">
+              <a:spcBef>
+                <a:spcPct val="0"/>
+              </a:spcBef>
+              <a:buFontTx/>
+              <a:buNone/>
+            </a:pPr>
+            <a:r>
+              <a:rPr lang="de-DE" altLang="de-DE" sz="900" dirty="0"/>
+              <a:t> </a:t>
+            </a:r>
+            <a:r>
+              <a:rPr lang="de-DE" altLang="de-DE" sz="900" dirty="0" smtClean="0"/>
+              <a:t>0..*</a:t>
+            </a:r>
+            <a:endParaRPr lang="de-DE" altLang="de-DE" sz="900" dirty="0"/>
+          </a:p>
+        </p:txBody>
+      </p:sp>
+      <p:cxnSp>
+        <p:nvCxnSpPr>
+          <p:cNvPr id="87" name="Gewinkelte Verbindung 86"/>
+          <p:cNvCxnSpPr>
+            <a:stCxn id="86" idx="1"/>
+            <a:endCxn id="85" idx="3"/>
+          </p:cNvCxnSpPr>
+          <p:nvPr/>
+        </p:nvCxnSpPr>
+        <p:spPr>
+          <a:xfrm rot="10800000">
+            <a:off x="2900198" y="3076923"/>
+            <a:ext cx="610482" cy="3427"/>
+          </a:xfrm>
+          <a:prstGeom prst="bentConnector3">
+            <a:avLst>
+              <a:gd name="adj1" fmla="val 50000"/>
+            </a:avLst>
+          </a:prstGeom>
+        </p:spPr>
+        <p:style>
+          <a:lnRef idx="1">
+            <a:schemeClr val="accent1"/>
+          </a:lnRef>
+          <a:fillRef idx="0">
+            <a:schemeClr val="accent1"/>
+          </a:fillRef>
+          <a:effectRef idx="0">
+            <a:schemeClr val="accent1"/>
+          </a:effectRef>
+          <a:fontRef idx="minor">
+            <a:schemeClr val="tx1"/>
+          </a:fontRef>
+        </p:style>
+      </p:cxnSp>
+      <p:sp>
+        <p:nvSpPr>
+          <p:cNvPr id="88" name="Rectangle 4"/>
+          <p:cNvSpPr>
+            <a:spLocks noChangeArrowheads="1"/>
+          </p:cNvSpPr>
+          <p:nvPr/>
+        </p:nvSpPr>
+        <p:spPr bwMode="auto">
+          <a:xfrm>
+            <a:off x="1244374" y="1847654"/>
+            <a:ext cx="1224136" cy="290719"/>
+          </a:xfrm>
+          <a:prstGeom prst="rect">
+            <a:avLst/>
+          </a:prstGeom>
+          <a:solidFill>
+            <a:schemeClr val="bg1"/>
+          </a:solidFill>
+          <a:ln w="9525">
+            <a:solidFill>
+              <a:schemeClr val="tx1"/>
+            </a:solidFill>
+            <a:prstDash val="solid"/>
+            <a:miter lim="800000"/>
+            <a:headEnd/>
+            <a:tailEnd/>
+          </a:ln>
+          <a:effectLst/>
+          <a:extLst/>
+        </p:spPr>
+        <p:txBody>
+          <a:bodyPr wrap="none"/>
+          <a:lstStyle>
+            <a:lvl1pPr eaLnBrk="0" hangingPunct="0">
+              <a:spcBef>
+                <a:spcPct val="20000"/>
+              </a:spcBef>
+              <a:buFont typeface="Arial" charset="0"/>
+              <a:buChar char="•"/>
+              <a:defRPr sz="3200">
+                <a:solidFill>
+                  <a:schemeClr val="tx1"/>
+                </a:solidFill>
+                <a:latin typeface="Calibri" pitchFamily="34" charset="0"/>
+              </a:defRPr>
+            </a:lvl1pPr>
+            <a:lvl2pPr marL="742950" indent="-285750" eaLnBrk="0" hangingPunct="0">
+              <a:spcBef>
+                <a:spcPct val="20000"/>
+              </a:spcBef>
+              <a:buFont typeface="Arial" charset="0"/>
+              <a:buChar char="–"/>
+              <a:defRPr sz="2800">
+                <a:solidFill>
+                  <a:schemeClr val="tx1"/>
+                </a:solidFill>
+                <a:latin typeface="Calibri" pitchFamily="34" charset="0"/>
+              </a:defRPr>
+            </a:lvl2pPr>
+            <a:lvl3pPr marL="1143000" indent="-228600" eaLnBrk="0" hangingPunct="0">
+              <a:spcBef>
+                <a:spcPct val="20000"/>
+              </a:spcBef>
+              <a:buFont typeface="Arial" charset="0"/>
+              <a:buChar char="•"/>
+              <a:defRPr sz="2400">
+                <a:solidFill>
+                  <a:schemeClr val="tx1"/>
+                </a:solidFill>
+                <a:latin typeface="Calibri" pitchFamily="34" charset="0"/>
+              </a:defRPr>
+            </a:lvl3pPr>
+            <a:lvl4pPr marL="1600200" indent="-228600" eaLnBrk="0" hangingPunct="0">
+              <a:spcBef>
+                <a:spcPct val="20000"/>
+              </a:spcBef>
+              <a:buFont typeface="Arial" charset="0"/>
+              <a:buChar char="–"/>
+              <a:defRPr sz="2000">
+                <a:solidFill>
+                  <a:schemeClr val="tx1"/>
+                </a:solidFill>
+                <a:latin typeface="Calibri" pitchFamily="34" charset="0"/>
+              </a:defRPr>
+            </a:lvl4pPr>
+            <a:lvl5pPr marL="2057400" indent="-228600" eaLnBrk="0" hangingPunct="0">
+              <a:spcBef>
+                <a:spcPct val="20000"/>
+              </a:spcBef>
+              <a:buFont typeface="Arial" charset="0"/>
+              <a:buChar char="»"/>
+              <a:defRPr sz="2000">
+                <a:solidFill>
+                  <a:schemeClr val="tx1"/>
+                </a:solidFill>
+                <a:latin typeface="Calibri" pitchFamily="34" charset="0"/>
+              </a:defRPr>
+            </a:lvl5pPr>
+            <a:lvl6pPr marL="2514600" indent="-228600" eaLnBrk="0" fontAlgn="base" hangingPunct="0">
+              <a:spcBef>
+                <a:spcPct val="20000"/>
+              </a:spcBef>
+              <a:spcAft>
+                <a:spcPct val="0"/>
+              </a:spcAft>
+              <a:buFont typeface="Arial" charset="0"/>
+              <a:buChar char="»"/>
+              <a:defRPr sz="2000">
+                <a:solidFill>
+                  <a:schemeClr val="tx1"/>
+                </a:solidFill>
+                <a:latin typeface="Calibri" pitchFamily="34" charset="0"/>
+              </a:defRPr>
+            </a:lvl6pPr>
+            <a:lvl7pPr marL="2971800" indent="-228600" eaLnBrk="0" fontAlgn="base" hangingPunct="0">
+              <a:spcBef>
+                <a:spcPct val="20000"/>
+              </a:spcBef>
+              <a:spcAft>
+                <a:spcPct val="0"/>
+              </a:spcAft>
+              <a:buFont typeface="Arial" charset="0"/>
+              <a:buChar char="»"/>
+              <a:defRPr sz="2000">
+                <a:solidFill>
+                  <a:schemeClr val="tx1"/>
+                </a:solidFill>
+                <a:latin typeface="Calibri" pitchFamily="34" charset="0"/>
+              </a:defRPr>
+            </a:lvl7pPr>
+            <a:lvl8pPr marL="3429000" indent="-228600" eaLnBrk="0" fontAlgn="base" hangingPunct="0">
+              <a:spcBef>
+                <a:spcPct val="20000"/>
+              </a:spcBef>
+              <a:spcAft>
+                <a:spcPct val="0"/>
+              </a:spcAft>
+              <a:buFont typeface="Arial" charset="0"/>
+              <a:buChar char="»"/>
+              <a:defRPr sz="2000">
+                <a:solidFill>
+                  <a:schemeClr val="tx1"/>
+                </a:solidFill>
+                <a:latin typeface="Calibri" pitchFamily="34" charset="0"/>
+              </a:defRPr>
+            </a:lvl8pPr>
+            <a:lvl9pPr marL="3886200" indent="-228600" eaLnBrk="0" fontAlgn="base" hangingPunct="0">
+              <a:spcBef>
+                <a:spcPct val="20000"/>
+              </a:spcBef>
+              <a:spcAft>
+                <a:spcPct val="0"/>
+              </a:spcAft>
+              <a:buFont typeface="Arial" charset="0"/>
+              <a:buChar char="»"/>
+              <a:defRPr sz="2000">
+                <a:solidFill>
+                  <a:schemeClr val="tx1"/>
+                </a:solidFill>
+                <a:latin typeface="Calibri" pitchFamily="34" charset="0"/>
+              </a:defRPr>
+            </a:lvl9pPr>
+          </a:lstStyle>
+          <a:p>
+            <a:pPr eaLnBrk="1" hangingPunct="1">
+              <a:spcBef>
+                <a:spcPct val="0"/>
+              </a:spcBef>
+              <a:buFontTx/>
+              <a:buNone/>
+            </a:pPr>
+            <a:r>
+              <a:rPr lang="de-DE" altLang="de-DE" sz="1100" dirty="0" smtClean="0"/>
+              <a:t>User2Hero</a:t>
+            </a:r>
+            <a:endParaRPr lang="de-DE" altLang="de-DE" sz="1100" dirty="0" smtClean="0"/>
+          </a:p>
+          <a:p>
+            <a:pPr eaLnBrk="1" hangingPunct="1">
+              <a:spcBef>
+                <a:spcPct val="0"/>
+              </a:spcBef>
+              <a:buFontTx/>
+              <a:buNone/>
+            </a:pPr>
+            <a:endParaRPr lang="de-DE" altLang="de-DE" sz="400" dirty="0"/>
+          </a:p>
+        </p:txBody>
+      </p:sp>
+      <p:sp>
+        <p:nvSpPr>
+          <p:cNvPr id="89" name="Text Box 9"/>
+          <p:cNvSpPr txBox="1">
+            <a:spLocks noChangeArrowheads="1"/>
+          </p:cNvSpPr>
+          <p:nvPr/>
+        </p:nvSpPr>
+        <p:spPr bwMode="auto">
+          <a:xfrm flipH="1">
+            <a:off x="1683737" y="1706325"/>
+            <a:ext cx="352725" cy="138499"/>
+          </a:xfrm>
+          <a:prstGeom prst="rect">
+            <a:avLst/>
+          </a:prstGeom>
+          <a:noFill/>
+          <a:ln>
+            <a:noFill/>
+          </a:ln>
+          <a:effectLst/>
+          <a:extLst>
+            <a:ext uri="{909E8E84-426E-40DD-AFC4-6F175D3DCCD1}">
+              <a14:hiddenFill xmlns:a14="http://schemas.microsoft.com/office/drawing/2010/main">
+                <a:solidFill>
+                  <a:schemeClr val="accent1"/>
+                </a:solidFill>
+              </a14:hiddenFill>
+            </a:ext>
+            <a:ext uri="{91240B29-F687-4F45-9708-019B960494DF}">
+              <a14:hiddenLine xmlns:a14="http://schemas.microsoft.com/office/drawing/2010/main" w="9525">
+                <a:solidFill>
+                  <a:schemeClr val="tx1"/>
+                </a:solidFill>
+                <a:miter lim="800000"/>
+                <a:headEnd/>
+                <a:tailEnd/>
+              </a14:hiddenLine>
+            </a:ext>
+            <a:ext uri="{AF507438-7753-43E0-B8FC-AC1667EBCBE1}">
+              <a14:hiddenEffects xmlns:a14="http://schemas.microsoft.com/office/drawing/2010/main">
+                <a:effectLst>
+                  <a:outerShdw dist="35921" dir="2700000" algn="ctr" rotWithShape="0">
+                    <a:schemeClr val="bg2"/>
+                  </a:outerShdw>
+                </a:effectLst>
+              </a14:hiddenEffects>
+            </a:ext>
+          </a:extLst>
+        </p:spPr>
+        <p:txBody>
+          <a:bodyPr wrap="square" lIns="0" tIns="0" rIns="0" bIns="0">
+            <a:spAutoFit/>
+          </a:bodyPr>
+          <a:lstStyle>
+            <a:lvl1pPr eaLnBrk="0" hangingPunct="0">
+              <a:spcBef>
+                <a:spcPct val="20000"/>
+              </a:spcBef>
+              <a:buFont typeface="Arial" charset="0"/>
+              <a:buChar char="•"/>
+              <a:defRPr sz="3200">
+                <a:solidFill>
+                  <a:schemeClr val="tx1"/>
+                </a:solidFill>
+                <a:latin typeface="Calibri" pitchFamily="34" charset="0"/>
+              </a:defRPr>
+            </a:lvl1pPr>
+            <a:lvl2pPr marL="742950" indent="-285750" eaLnBrk="0" hangingPunct="0">
+              <a:spcBef>
+                <a:spcPct val="20000"/>
+              </a:spcBef>
+              <a:buFont typeface="Arial" charset="0"/>
+              <a:buChar char="–"/>
+              <a:defRPr sz="2800">
+                <a:solidFill>
+                  <a:schemeClr val="tx1"/>
+                </a:solidFill>
+                <a:latin typeface="Calibri" pitchFamily="34" charset="0"/>
+              </a:defRPr>
+            </a:lvl2pPr>
+            <a:lvl3pPr marL="1143000" indent="-228600" eaLnBrk="0" hangingPunct="0">
+              <a:spcBef>
+                <a:spcPct val="20000"/>
+              </a:spcBef>
+              <a:buFont typeface="Arial" charset="0"/>
+              <a:buChar char="•"/>
+              <a:defRPr sz="2400">
+                <a:solidFill>
+                  <a:schemeClr val="tx1"/>
+                </a:solidFill>
+                <a:latin typeface="Calibri" pitchFamily="34" charset="0"/>
+              </a:defRPr>
+            </a:lvl3pPr>
+            <a:lvl4pPr marL="1600200" indent="-228600" eaLnBrk="0" hangingPunct="0">
+              <a:spcBef>
+                <a:spcPct val="20000"/>
+              </a:spcBef>
+              <a:buFont typeface="Arial" charset="0"/>
+              <a:buChar char="–"/>
+              <a:defRPr sz="2000">
+                <a:solidFill>
+                  <a:schemeClr val="tx1"/>
+                </a:solidFill>
+                <a:latin typeface="Calibri" pitchFamily="34" charset="0"/>
+              </a:defRPr>
+            </a:lvl4pPr>
+            <a:lvl5pPr marL="2057400" indent="-228600" eaLnBrk="0" hangingPunct="0">
+              <a:spcBef>
+                <a:spcPct val="20000"/>
+              </a:spcBef>
+              <a:buFont typeface="Arial" charset="0"/>
+              <a:buChar char="»"/>
+              <a:defRPr sz="2000">
+                <a:solidFill>
+                  <a:schemeClr val="tx1"/>
+                </a:solidFill>
+                <a:latin typeface="Calibri" pitchFamily="34" charset="0"/>
+              </a:defRPr>
+            </a:lvl5pPr>
+            <a:lvl6pPr marL="2514600" indent="-228600" eaLnBrk="0" fontAlgn="base" hangingPunct="0">
+              <a:spcBef>
+                <a:spcPct val="20000"/>
+              </a:spcBef>
+              <a:spcAft>
+                <a:spcPct val="0"/>
+              </a:spcAft>
+              <a:buFont typeface="Arial" charset="0"/>
+              <a:buChar char="»"/>
+              <a:defRPr sz="2000">
+                <a:solidFill>
+                  <a:schemeClr val="tx1"/>
+                </a:solidFill>
+                <a:latin typeface="Calibri" pitchFamily="34" charset="0"/>
+              </a:defRPr>
+            </a:lvl6pPr>
+            <a:lvl7pPr marL="2971800" indent="-228600" eaLnBrk="0" fontAlgn="base" hangingPunct="0">
+              <a:spcBef>
+                <a:spcPct val="20000"/>
+              </a:spcBef>
+              <a:spcAft>
+                <a:spcPct val="0"/>
+              </a:spcAft>
+              <a:buFont typeface="Arial" charset="0"/>
+              <a:buChar char="»"/>
+              <a:defRPr sz="2000">
+                <a:solidFill>
+                  <a:schemeClr val="tx1"/>
+                </a:solidFill>
+                <a:latin typeface="Calibri" pitchFamily="34" charset="0"/>
+              </a:defRPr>
+            </a:lvl7pPr>
+            <a:lvl8pPr marL="3429000" indent="-228600" eaLnBrk="0" fontAlgn="base" hangingPunct="0">
+              <a:spcBef>
+                <a:spcPct val="20000"/>
+              </a:spcBef>
+              <a:spcAft>
+                <a:spcPct val="0"/>
+              </a:spcAft>
+              <a:buFont typeface="Arial" charset="0"/>
+              <a:buChar char="»"/>
+              <a:defRPr sz="2000">
+                <a:solidFill>
+                  <a:schemeClr val="tx1"/>
+                </a:solidFill>
+                <a:latin typeface="Calibri" pitchFamily="34" charset="0"/>
+              </a:defRPr>
+            </a:lvl8pPr>
+            <a:lvl9pPr marL="3886200" indent="-228600" eaLnBrk="0" fontAlgn="base" hangingPunct="0">
+              <a:spcBef>
+                <a:spcPct val="20000"/>
+              </a:spcBef>
+              <a:spcAft>
+                <a:spcPct val="0"/>
+              </a:spcAft>
+              <a:buFont typeface="Arial" charset="0"/>
+              <a:buChar char="»"/>
+              <a:defRPr sz="2000">
+                <a:solidFill>
+                  <a:schemeClr val="tx1"/>
+                </a:solidFill>
+                <a:latin typeface="Calibri" pitchFamily="34" charset="0"/>
+              </a:defRPr>
+            </a:lvl9pPr>
+          </a:lstStyle>
+          <a:p>
+            <a:pPr eaLnBrk="1" hangingPunct="1">
+              <a:spcBef>
+                <a:spcPct val="0"/>
+              </a:spcBef>
+              <a:buFontTx/>
+              <a:buNone/>
+            </a:pPr>
+            <a:r>
+              <a:rPr lang="de-DE" altLang="de-DE" sz="900" dirty="0"/>
+              <a:t> </a:t>
+            </a:r>
+            <a:r>
+              <a:rPr lang="de-DE" altLang="de-DE" sz="900" dirty="0" smtClean="0"/>
+              <a:t>0..</a:t>
+            </a:r>
+            <a:r>
+              <a:rPr lang="de-DE" altLang="de-DE" sz="900" dirty="0" smtClean="0"/>
+              <a:t>1</a:t>
+            </a:r>
+            <a:endParaRPr lang="de-DE" altLang="de-DE" sz="900" dirty="0"/>
+          </a:p>
+        </p:txBody>
+      </p:sp>
+      <p:sp>
+        <p:nvSpPr>
+          <p:cNvPr id="90" name="Text Box 9"/>
+          <p:cNvSpPr txBox="1">
+            <a:spLocks noChangeArrowheads="1"/>
+          </p:cNvSpPr>
+          <p:nvPr/>
+        </p:nvSpPr>
+        <p:spPr bwMode="auto">
+          <a:xfrm>
+            <a:off x="1763981" y="1246577"/>
+            <a:ext cx="147637" cy="138499"/>
+          </a:xfrm>
+          <a:prstGeom prst="rect">
+            <a:avLst/>
+          </a:prstGeom>
+          <a:noFill/>
+          <a:ln>
+            <a:noFill/>
+          </a:ln>
+          <a:effectLst/>
+          <a:extLst>
+            <a:ext uri="{909E8E84-426E-40DD-AFC4-6F175D3DCCD1}">
+              <a14:hiddenFill xmlns:a14="http://schemas.microsoft.com/office/drawing/2010/main">
+                <a:solidFill>
+                  <a:schemeClr val="accent1"/>
+                </a:solidFill>
+              </a14:hiddenFill>
+            </a:ext>
+            <a:ext uri="{91240B29-F687-4F45-9708-019B960494DF}">
+              <a14:hiddenLine xmlns:a14="http://schemas.microsoft.com/office/drawing/2010/main" w="9525">
+                <a:solidFill>
+                  <a:schemeClr val="tx1"/>
+                </a:solidFill>
+                <a:miter lim="800000"/>
+                <a:headEnd/>
+                <a:tailEnd/>
+              </a14:hiddenLine>
+            </a:ext>
+            <a:ext uri="{AF507438-7753-43E0-B8FC-AC1667EBCBE1}">
+              <a14:hiddenEffects xmlns:a14="http://schemas.microsoft.com/office/drawing/2010/main">
+                <a:effectLst>
+                  <a:outerShdw dist="35921" dir="2700000" algn="ctr" rotWithShape="0">
+                    <a:schemeClr val="bg2"/>
+                  </a:outerShdw>
+                </a:effectLst>
+              </a14:hiddenEffects>
+            </a:ext>
+          </a:extLst>
+        </p:spPr>
+        <p:txBody>
+          <a:bodyPr lIns="0" tIns="0" rIns="0" bIns="0">
+            <a:spAutoFit/>
+          </a:bodyPr>
+          <a:lstStyle>
+            <a:lvl1pPr eaLnBrk="0" hangingPunct="0">
+              <a:spcBef>
+                <a:spcPct val="20000"/>
+              </a:spcBef>
+              <a:buFont typeface="Arial" charset="0"/>
+              <a:buChar char="•"/>
+              <a:defRPr sz="3200">
+                <a:solidFill>
+                  <a:schemeClr val="tx1"/>
+                </a:solidFill>
+                <a:latin typeface="Calibri" pitchFamily="34" charset="0"/>
+              </a:defRPr>
+            </a:lvl1pPr>
+            <a:lvl2pPr marL="742950" indent="-285750" eaLnBrk="0" hangingPunct="0">
+              <a:spcBef>
+                <a:spcPct val="20000"/>
+              </a:spcBef>
+              <a:buFont typeface="Arial" charset="0"/>
+              <a:buChar char="–"/>
+              <a:defRPr sz="2800">
+                <a:solidFill>
+                  <a:schemeClr val="tx1"/>
+                </a:solidFill>
+                <a:latin typeface="Calibri" pitchFamily="34" charset="0"/>
+              </a:defRPr>
+            </a:lvl2pPr>
+            <a:lvl3pPr marL="1143000" indent="-228600" eaLnBrk="0" hangingPunct="0">
+              <a:spcBef>
+                <a:spcPct val="20000"/>
+              </a:spcBef>
+              <a:buFont typeface="Arial" charset="0"/>
+              <a:buChar char="•"/>
+              <a:defRPr sz="2400">
+                <a:solidFill>
+                  <a:schemeClr val="tx1"/>
+                </a:solidFill>
+                <a:latin typeface="Calibri" pitchFamily="34" charset="0"/>
+              </a:defRPr>
+            </a:lvl3pPr>
+            <a:lvl4pPr marL="1600200" indent="-228600" eaLnBrk="0" hangingPunct="0">
+              <a:spcBef>
+                <a:spcPct val="20000"/>
+              </a:spcBef>
+              <a:buFont typeface="Arial" charset="0"/>
+              <a:buChar char="–"/>
+              <a:defRPr sz="2000">
+                <a:solidFill>
+                  <a:schemeClr val="tx1"/>
+                </a:solidFill>
+                <a:latin typeface="Calibri" pitchFamily="34" charset="0"/>
+              </a:defRPr>
+            </a:lvl4pPr>
+            <a:lvl5pPr marL="2057400" indent="-228600" eaLnBrk="0" hangingPunct="0">
+              <a:spcBef>
+                <a:spcPct val="20000"/>
+              </a:spcBef>
+              <a:buFont typeface="Arial" charset="0"/>
+              <a:buChar char="»"/>
+              <a:defRPr sz="2000">
+                <a:solidFill>
+                  <a:schemeClr val="tx1"/>
+                </a:solidFill>
+                <a:latin typeface="Calibri" pitchFamily="34" charset="0"/>
+              </a:defRPr>
+            </a:lvl5pPr>
+            <a:lvl6pPr marL="2514600" indent="-228600" eaLnBrk="0" fontAlgn="base" hangingPunct="0">
+              <a:spcBef>
+                <a:spcPct val="20000"/>
+              </a:spcBef>
+              <a:spcAft>
+                <a:spcPct val="0"/>
+              </a:spcAft>
+              <a:buFont typeface="Arial" charset="0"/>
+              <a:buChar char="»"/>
+              <a:defRPr sz="2000">
+                <a:solidFill>
+                  <a:schemeClr val="tx1"/>
+                </a:solidFill>
+                <a:latin typeface="Calibri" pitchFamily="34" charset="0"/>
+              </a:defRPr>
+            </a:lvl6pPr>
+            <a:lvl7pPr marL="2971800" indent="-228600" eaLnBrk="0" fontAlgn="base" hangingPunct="0">
+              <a:spcBef>
+                <a:spcPct val="20000"/>
+              </a:spcBef>
+              <a:spcAft>
+                <a:spcPct val="0"/>
+              </a:spcAft>
+              <a:buFont typeface="Arial" charset="0"/>
+              <a:buChar char="»"/>
+              <a:defRPr sz="2000">
+                <a:solidFill>
+                  <a:schemeClr val="tx1"/>
+                </a:solidFill>
+                <a:latin typeface="Calibri" pitchFamily="34" charset="0"/>
+              </a:defRPr>
+            </a:lvl7pPr>
+            <a:lvl8pPr marL="3429000" indent="-228600" eaLnBrk="0" fontAlgn="base" hangingPunct="0">
+              <a:spcBef>
+                <a:spcPct val="20000"/>
+              </a:spcBef>
+              <a:spcAft>
+                <a:spcPct val="0"/>
+              </a:spcAft>
+              <a:buFont typeface="Arial" charset="0"/>
+              <a:buChar char="»"/>
+              <a:defRPr sz="2000">
+                <a:solidFill>
+                  <a:schemeClr val="tx1"/>
+                </a:solidFill>
+                <a:latin typeface="Calibri" pitchFamily="34" charset="0"/>
+              </a:defRPr>
+            </a:lvl8pPr>
+            <a:lvl9pPr marL="3886200" indent="-228600" eaLnBrk="0" fontAlgn="base" hangingPunct="0">
+              <a:spcBef>
+                <a:spcPct val="20000"/>
+              </a:spcBef>
+              <a:spcAft>
+                <a:spcPct val="0"/>
+              </a:spcAft>
+              <a:buFont typeface="Arial" charset="0"/>
+              <a:buChar char="»"/>
+              <a:defRPr sz="2000">
+                <a:solidFill>
+                  <a:schemeClr val="tx1"/>
+                </a:solidFill>
+                <a:latin typeface="Calibri" pitchFamily="34" charset="0"/>
+              </a:defRPr>
+            </a:lvl9pPr>
+          </a:lstStyle>
+          <a:p>
+            <a:pPr eaLnBrk="1" hangingPunct="1">
+              <a:spcBef>
+                <a:spcPct val="0"/>
+              </a:spcBef>
+              <a:buFontTx/>
+              <a:buNone/>
+            </a:pPr>
+            <a:r>
+              <a:rPr lang="de-DE" altLang="de-DE" sz="900" dirty="0"/>
+              <a:t> 1</a:t>
+            </a:r>
+          </a:p>
+        </p:txBody>
+      </p:sp>
+      <p:cxnSp>
+        <p:nvCxnSpPr>
+          <p:cNvPr id="91" name="Gewinkelte Verbindung 90"/>
+          <p:cNvCxnSpPr>
+            <a:stCxn id="90" idx="2"/>
+            <a:endCxn id="89" idx="0"/>
+          </p:cNvCxnSpPr>
+          <p:nvPr/>
+        </p:nvCxnSpPr>
+        <p:spPr>
+          <a:xfrm rot="16200000" flipH="1">
+            <a:off x="1688325" y="1534550"/>
+            <a:ext cx="321249" cy="22299"/>
+          </a:xfrm>
+          <a:prstGeom prst="bentConnector3">
+            <a:avLst/>
+          </a:prstGeom>
+        </p:spPr>
+        <p:style>
+          <a:lnRef idx="1">
+            <a:schemeClr val="accent1"/>
+          </a:lnRef>
+          <a:fillRef idx="0">
+            <a:schemeClr val="accent1"/>
+          </a:fillRef>
+          <a:effectRef idx="0">
+            <a:schemeClr val="accent1"/>
+          </a:effectRef>
+          <a:fontRef idx="minor">
+            <a:schemeClr val="tx1"/>
+          </a:fontRef>
+        </p:style>
+      </p:cxnSp>
+      <p:sp>
+        <p:nvSpPr>
+          <p:cNvPr id="111" name="Abgerundete rechteckige Legende 110"/>
+          <p:cNvSpPr/>
+          <p:nvPr/>
+        </p:nvSpPr>
+        <p:spPr>
+          <a:xfrm>
+            <a:off x="5524026" y="2817340"/>
+            <a:ext cx="388937" cy="114300"/>
+          </a:xfrm>
+          <a:prstGeom prst="wedgeRoundRectCallout">
+            <a:avLst>
+              <a:gd name="adj1" fmla="val -67654"/>
+              <a:gd name="adj2" fmla="val 136970"/>
+              <a:gd name="adj3" fmla="val 16667"/>
+            </a:avLst>
+          </a:prstGeom>
+          <a:noFill/>
+          <a:ln w="12700">
+            <a:solidFill>
+              <a:schemeClr val="bg1">
+                <a:lumMod val="50000"/>
+              </a:schemeClr>
+            </a:solidFill>
+          </a:ln>
+        </p:spPr>
+        <p:style>
+          <a:lnRef idx="2">
+            <a:schemeClr val="accent1">
+              <a:shade val="50000"/>
+            </a:schemeClr>
+          </a:lnRef>
+          <a:fillRef idx="1">
+            <a:schemeClr val="accent1"/>
+          </a:fillRef>
+          <a:effectRef idx="0">
+            <a:schemeClr val="accent1"/>
+          </a:effectRef>
+          <a:fontRef idx="minor">
+            <a:schemeClr val="lt1"/>
+          </a:fontRef>
+        </p:style>
+        <p:txBody>
+          <a:bodyPr lIns="18000" tIns="0" rIns="0" bIns="0" anchor="ctr"/>
+          <a:lstStyle/>
+          <a:p>
+            <a:pPr>
+              <a:defRPr/>
+            </a:pPr>
+            <a:r>
+              <a:rPr lang="de-DE" sz="700" dirty="0" err="1" smtClean="0">
+                <a:solidFill>
+                  <a:schemeClr val="tx1">
+                    <a:lumMod val="50000"/>
+                    <a:lumOff val="50000"/>
+                  </a:schemeClr>
+                </a:solidFill>
+              </a:rPr>
+              <a:t>supports</a:t>
+            </a:r>
+            <a:endParaRPr lang="de-CH" sz="700" dirty="0">
+              <a:solidFill>
+                <a:schemeClr val="tx1">
+                  <a:lumMod val="50000"/>
+                  <a:lumOff val="50000"/>
+                </a:schemeClr>
+              </a:solidFill>
+            </a:endParaRPr>
+          </a:p>
+        </p:txBody>
+      </p:sp>
+      <p:sp>
+        <p:nvSpPr>
+          <p:cNvPr id="121" name="Abgerundete rechteckige Legende 120"/>
+          <p:cNvSpPr/>
+          <p:nvPr/>
+        </p:nvSpPr>
+        <p:spPr>
+          <a:xfrm>
+            <a:off x="1244374" y="1445597"/>
+            <a:ext cx="388937" cy="114300"/>
+          </a:xfrm>
+          <a:prstGeom prst="wedgeRoundRectCallout">
+            <a:avLst>
+              <a:gd name="adj1" fmla="val 59693"/>
+              <a:gd name="adj2" fmla="val 145304"/>
+              <a:gd name="adj3" fmla="val 16667"/>
+            </a:avLst>
+          </a:prstGeom>
+          <a:noFill/>
+          <a:ln w="12700">
+            <a:solidFill>
+              <a:schemeClr val="bg1">
+                <a:lumMod val="50000"/>
+              </a:schemeClr>
+            </a:solidFill>
+          </a:ln>
+        </p:spPr>
+        <p:style>
+          <a:lnRef idx="2">
+            <a:schemeClr val="accent1">
+              <a:shade val="50000"/>
+            </a:schemeClr>
+          </a:lnRef>
+          <a:fillRef idx="1">
+            <a:schemeClr val="accent1"/>
+          </a:fillRef>
+          <a:effectRef idx="0">
+            <a:schemeClr val="accent1"/>
+          </a:effectRef>
+          <a:fontRef idx="minor">
+            <a:schemeClr val="lt1"/>
+          </a:fontRef>
+        </p:style>
+        <p:txBody>
+          <a:bodyPr lIns="18000" tIns="0" rIns="0" bIns="0" anchor="ctr"/>
+          <a:lstStyle/>
+          <a:p>
+            <a:pPr>
+              <a:defRPr/>
+            </a:pPr>
+            <a:r>
+              <a:rPr lang="de-DE" sz="700" dirty="0" err="1" smtClean="0">
+                <a:solidFill>
+                  <a:schemeClr val="tx1">
+                    <a:lumMod val="50000"/>
+                    <a:lumOff val="50000"/>
+                  </a:schemeClr>
+                </a:solidFill>
+              </a:rPr>
+              <a:t>Is</a:t>
+            </a:r>
+            <a:r>
+              <a:rPr lang="de-DE" sz="700" dirty="0" smtClean="0">
+                <a:solidFill>
+                  <a:schemeClr val="tx1">
+                    <a:lumMod val="50000"/>
+                    <a:lumOff val="50000"/>
+                  </a:schemeClr>
+                </a:solidFill>
+              </a:rPr>
+              <a:t> a </a:t>
+            </a:r>
+            <a:r>
+              <a:rPr lang="de-DE" sz="700" dirty="0" err="1" smtClean="0">
+                <a:solidFill>
+                  <a:schemeClr val="tx1">
+                    <a:lumMod val="50000"/>
+                    <a:lumOff val="50000"/>
+                  </a:schemeClr>
+                </a:solidFill>
+              </a:rPr>
+              <a:t>hero</a:t>
+            </a:r>
+            <a:endParaRPr lang="de-CH" sz="700" dirty="0">
+              <a:solidFill>
+                <a:schemeClr val="tx1">
+                  <a:lumMod val="50000"/>
+                  <a:lumOff val="50000"/>
+                </a:schemeClr>
+              </a:solidFill>
+            </a:endParaRPr>
+          </a:p>
+        </p:txBody>
+      </p:sp>
+      <p:sp>
+        <p:nvSpPr>
+          <p:cNvPr id="122" name="Abgerundete rechteckige Legende 121"/>
+          <p:cNvSpPr/>
+          <p:nvPr/>
+        </p:nvSpPr>
+        <p:spPr>
+          <a:xfrm>
+            <a:off x="5276822" y="4709375"/>
+            <a:ext cx="388937" cy="114300"/>
+          </a:xfrm>
+          <a:prstGeom prst="wedgeRoundRectCallout">
+            <a:avLst>
+              <a:gd name="adj1" fmla="val -21123"/>
+              <a:gd name="adj2" fmla="val 95304"/>
+              <a:gd name="adj3" fmla="val 16667"/>
+            </a:avLst>
+          </a:prstGeom>
+          <a:noFill/>
+          <a:ln w="12700">
+            <a:solidFill>
+              <a:schemeClr val="bg1">
+                <a:lumMod val="50000"/>
+              </a:schemeClr>
+            </a:solidFill>
+          </a:ln>
+        </p:spPr>
+        <p:style>
+          <a:lnRef idx="2">
+            <a:schemeClr val="accent1">
+              <a:shade val="50000"/>
+            </a:schemeClr>
+          </a:lnRef>
+          <a:fillRef idx="1">
+            <a:schemeClr val="accent1"/>
+          </a:fillRef>
+          <a:effectRef idx="0">
+            <a:schemeClr val="accent1"/>
+          </a:effectRef>
+          <a:fontRef idx="minor">
+            <a:schemeClr val="lt1"/>
+          </a:fontRef>
+        </p:style>
+        <p:txBody>
+          <a:bodyPr lIns="18000" tIns="0" rIns="0" bIns="0" anchor="ctr"/>
+          <a:lstStyle/>
+          <a:p>
+            <a:pPr>
+              <a:defRPr/>
+            </a:pPr>
+            <a:r>
+              <a:rPr lang="de-DE" sz="700" dirty="0" err="1" smtClean="0">
+                <a:solidFill>
+                  <a:schemeClr val="tx1">
+                    <a:lumMod val="50000"/>
+                    <a:lumOff val="50000"/>
+                  </a:schemeClr>
+                </a:solidFill>
+              </a:rPr>
+              <a:t>acceotes</a:t>
+            </a:r>
+            <a:endParaRPr lang="de-CH" sz="700" dirty="0">
+              <a:solidFill>
+                <a:schemeClr val="tx1">
+                  <a:lumMod val="50000"/>
+                  <a:lumOff val="50000"/>
+                </a:schemeClr>
+              </a:solidFill>
+            </a:endParaRPr>
           </a:p>
         </p:txBody>
       </p:sp>
@@ -11967,6 +13313,13 @@
   <p:clrMapOvr>
     <a:masterClrMapping/>
   </p:clrMapOvr>
+  <p:timing>
+    <p:tnLst>
+      <p:par>
+        <p:cTn id="1" dur="indefinite" restart="never" nodeType="tmRoot"/>
+      </p:par>
+    </p:tnLst>
+  </p:timing>
 </p:sld>
 </file>
 
@@ -13829,6 +15182,13 @@
   <p:clrMapOvr>
     <a:masterClrMapping/>
   </p:clrMapOvr>
+  <p:timing>
+    <p:tnLst>
+      <p:par>
+        <p:cTn id="1" dur="indefinite" restart="never" nodeType="tmRoot"/>
+      </p:par>
+    </p:tnLst>
+  </p:timing>
 </p:sld>
 </file>
 

</xml_diff>

<commit_message>
User is logged in on web client via authToken
</commit_message>
<xml_diff>
--- a/com.supeyou.project/doc/SupeYou.entities.pptx
+++ b/com.supeyou.project/doc/SupeYou.entities.pptx
@@ -330,7 +330,7 @@
               <a:pPr>
                 <a:defRPr/>
               </a:pPr>
-              <a:t>09.07.2015</a:t>
+              <a:t>10.07.2015</a:t>
             </a:fld>
             <a:endParaRPr lang="de-CH"/>
           </a:p>
@@ -527,7 +527,7 @@
               <a:pPr>
                 <a:defRPr/>
               </a:pPr>
-              <a:t>09.07.2015</a:t>
+              <a:t>10.07.2015</a:t>
             </a:fld>
             <a:endParaRPr lang="de-CH"/>
           </a:p>
@@ -734,7 +734,7 @@
               <a:pPr>
                 <a:defRPr/>
               </a:pPr>
-              <a:t>09.07.2015</a:t>
+              <a:t>10.07.2015</a:t>
             </a:fld>
             <a:endParaRPr lang="de-CH"/>
           </a:p>
@@ -931,7 +931,7 @@
               <a:pPr>
                 <a:defRPr/>
               </a:pPr>
-              <a:t>09.07.2015</a:t>
+              <a:t>10.07.2015</a:t>
             </a:fld>
             <a:endParaRPr lang="de-CH"/>
           </a:p>
@@ -1204,7 +1204,7 @@
               <a:pPr>
                 <a:defRPr/>
               </a:pPr>
-              <a:t>09.07.2015</a:t>
+              <a:t>10.07.2015</a:t>
             </a:fld>
             <a:endParaRPr lang="de-CH"/>
           </a:p>
@@ -1519,7 +1519,7 @@
               <a:pPr>
                 <a:defRPr/>
               </a:pPr>
-              <a:t>09.07.2015</a:t>
+              <a:t>10.07.2015</a:t>
             </a:fld>
             <a:endParaRPr lang="de-CH"/>
           </a:p>
@@ -1968,7 +1968,7 @@
               <a:pPr>
                 <a:defRPr/>
               </a:pPr>
-              <a:t>09.07.2015</a:t>
+              <a:t>10.07.2015</a:t>
             </a:fld>
             <a:endParaRPr lang="de-CH"/>
           </a:p>
@@ -2113,7 +2113,7 @@
               <a:pPr>
                 <a:defRPr/>
               </a:pPr>
-              <a:t>09.07.2015</a:t>
+              <a:t>10.07.2015</a:t>
             </a:fld>
             <a:endParaRPr lang="de-CH"/>
           </a:p>
@@ -2235,7 +2235,7 @@
               <a:pPr>
                 <a:defRPr/>
               </a:pPr>
-              <a:t>09.07.2015</a:t>
+              <a:t>10.07.2015</a:t>
             </a:fld>
             <a:endParaRPr lang="de-CH"/>
           </a:p>
@@ -2539,7 +2539,7 @@
               <a:pPr>
                 <a:defRPr/>
               </a:pPr>
-              <a:t>09.07.2015</a:t>
+              <a:t>10.07.2015</a:t>
             </a:fld>
             <a:endParaRPr lang="de-CH"/>
           </a:p>
@@ -2822,7 +2822,7 @@
               <a:pPr>
                 <a:defRPr/>
               </a:pPr>
-              <a:t>09.07.2015</a:t>
+              <a:t>10.07.2015</a:t>
             </a:fld>
             <a:endParaRPr lang="de-CH"/>
           </a:p>
@@ -3120,7 +3120,7 @@
               <a:pPr>
                 <a:defRPr/>
               </a:pPr>
-              <a:t>09.07.2015</a:t>
+              <a:t>10.07.2015</a:t>
             </a:fld>
             <a:endParaRPr lang="de-CH"/>
           </a:p>
@@ -3654,7 +3654,7 @@
         </p:nvSpPr>
         <p:spPr bwMode="auto">
           <a:xfrm>
-            <a:off x="2944117" y="4293096"/>
+            <a:off x="1575965" y="4293096"/>
             <a:ext cx="1676400" cy="795338"/>
           </a:xfrm>
           <a:prstGeom prst="rect">
@@ -3894,7 +3894,7 @@
         </p:nvSpPr>
         <p:spPr bwMode="auto">
           <a:xfrm>
-            <a:off x="2335312" y="1042938"/>
+            <a:off x="967160" y="1042938"/>
             <a:ext cx="3062287" cy="946150"/>
           </a:xfrm>
           <a:prstGeom prst="rect">
@@ -4147,7 +4147,7 @@
         </p:nvSpPr>
         <p:spPr bwMode="auto">
           <a:xfrm>
-            <a:off x="3680718" y="1989088"/>
+            <a:off x="2312566" y="1989088"/>
             <a:ext cx="203200" cy="139700"/>
           </a:xfrm>
           <a:prstGeom prst="rect">
@@ -4353,7 +4353,7 @@
         </p:nvCxnSpPr>
         <p:spPr>
           <a:xfrm rot="16200000" flipH="1">
-            <a:off x="3565793" y="2345313"/>
+            <a:off x="2197641" y="2345313"/>
             <a:ext cx="438706" cy="5656"/>
           </a:xfrm>
           <a:prstGeom prst="bentConnector3">
@@ -4387,7 +4387,7 @@
         </p:nvSpPr>
         <p:spPr bwMode="auto">
           <a:xfrm>
-            <a:off x="2566147" y="2702011"/>
+            <a:off x="1197995" y="2702011"/>
             <a:ext cx="2221877" cy="591079"/>
           </a:xfrm>
           <a:prstGeom prst="rect">
@@ -4584,7 +4584,7 @@
         </p:nvSpPr>
         <p:spPr bwMode="auto">
           <a:xfrm>
-            <a:off x="3652020" y="2567494"/>
+            <a:off x="2283868" y="2567494"/>
             <a:ext cx="271908" cy="138499"/>
           </a:xfrm>
           <a:prstGeom prst="rect">
@@ -4787,7 +4787,7 @@
         </p:nvSpPr>
         <p:spPr>
           <a:xfrm>
-            <a:off x="2123728" y="3780924"/>
+            <a:off x="755576" y="3780924"/>
             <a:ext cx="3456384" cy="2240364"/>
           </a:xfrm>
           <a:prstGeom prst="rect">
@@ -4859,7 +4859,7 @@
         </p:nvSpPr>
         <p:spPr bwMode="auto">
           <a:xfrm>
-            <a:off x="3652020" y="3349601"/>
+            <a:off x="2283868" y="3349601"/>
             <a:ext cx="271908" cy="138499"/>
           </a:xfrm>
           <a:prstGeom prst="rect">
@@ -5064,7 +5064,7 @@
         </p:nvCxnSpPr>
         <p:spPr>
           <a:xfrm rot="16200000" flipH="1">
-            <a:off x="3496253" y="3779821"/>
+            <a:off x="2128101" y="3779821"/>
             <a:ext cx="585649" cy="2206"/>
           </a:xfrm>
           <a:prstGeom prst="bentConnector3">
@@ -5098,7 +5098,7 @@
         </p:nvSpPr>
         <p:spPr bwMode="auto">
           <a:xfrm>
-            <a:off x="3677085" y="4153396"/>
+            <a:off x="2308933" y="4153396"/>
             <a:ext cx="203200" cy="139700"/>
           </a:xfrm>
           <a:prstGeom prst="rect">
@@ -5340,8 +5340,8 @@
         </p:nvSpPr>
         <p:spPr bwMode="auto">
           <a:xfrm>
-            <a:off x="1044499" y="782075"/>
-            <a:ext cx="1676400" cy="454764"/>
+            <a:off x="1044499" y="1700808"/>
+            <a:ext cx="1676400" cy="569246"/>
           </a:xfrm>
           <a:prstGeom prst="rect">
             <a:avLst/>
@@ -5552,8 +5552,8 @@
         </p:nvSpPr>
         <p:spPr bwMode="auto">
           <a:xfrm>
-            <a:off x="6742249" y="723677"/>
-            <a:ext cx="1214127" cy="5501058"/>
+            <a:off x="6742249" y="1815289"/>
+            <a:ext cx="1214127" cy="4409445"/>
           </a:xfrm>
           <a:prstGeom prst="rect">
             <a:avLst/>
@@ -5578,7 +5578,7 @@
           <a:lstStyle/>
           <a:p>
             <a:r>
-              <a:rPr lang="de-DE" altLang="de-DE" sz="1100" dirty="0" err="1" smtClean="0"/>
+              <a:rPr lang="de-DE" altLang="de-DE" sz="1400" dirty="0" err="1" smtClean="0"/>
               <a:t>Supporter</a:t>
             </a:r>
             <a:endParaRPr lang="de-DE" altLang="de-DE" sz="1100" dirty="0"/>
@@ -5634,7 +5634,7 @@
         </p:nvSpPr>
         <p:spPr bwMode="auto">
           <a:xfrm>
-            <a:off x="1044498" y="2676202"/>
+            <a:off x="1044498" y="3709417"/>
             <a:ext cx="1676325" cy="896814"/>
           </a:xfrm>
           <a:prstGeom prst="rect">
@@ -5955,7 +5955,7 @@
         </p:nvSpPr>
         <p:spPr bwMode="auto">
           <a:xfrm>
-            <a:off x="1755744" y="2138373"/>
+            <a:off x="1755744" y="3171588"/>
             <a:ext cx="147637" cy="138499"/>
           </a:xfrm>
           <a:prstGeom prst="rect">
@@ -6155,7 +6155,7 @@
         </p:nvSpPr>
         <p:spPr bwMode="auto">
           <a:xfrm>
-            <a:off x="6551500" y="2998389"/>
+            <a:off x="6551500" y="4031604"/>
             <a:ext cx="204788" cy="138499"/>
           </a:xfrm>
           <a:prstGeom prst="rect">
@@ -6360,7 +6360,7 @@
         </p:nvSpPr>
         <p:spPr bwMode="auto">
           <a:xfrm>
-            <a:off x="5300017" y="3015266"/>
+            <a:off x="5152727" y="4048481"/>
             <a:ext cx="259083" cy="138499"/>
           </a:xfrm>
           <a:prstGeom prst="rect">
@@ -6545,13 +6545,8 @@
             </a:pPr>
             <a:r>
               <a:rPr lang="de-DE" altLang="de-DE" sz="900" dirty="0"/>
-              <a:t> </a:t>
-            </a:r>
-            <a:r>
-              <a:rPr lang="de-DE" altLang="de-DE" sz="900" dirty="0"/>
-              <a:t>1</a:t>
-            </a:r>
-            <a:endParaRPr lang="de-DE" altLang="de-DE" sz="900" dirty="0"/>
+              <a:t> 1</a:t>
+            </a:r>
           </a:p>
         </p:txBody>
       </p:sp>
@@ -6565,7 +6560,7 @@
         </p:nvSpPr>
         <p:spPr bwMode="auto">
           <a:xfrm>
-            <a:off x="1044967" y="4326985"/>
+            <a:off x="1044967" y="4856144"/>
             <a:ext cx="1675932" cy="805104"/>
           </a:xfrm>
           <a:prstGeom prst="rect">
@@ -6813,7 +6808,7 @@
         </p:nvSpPr>
         <p:spPr bwMode="auto">
           <a:xfrm>
-            <a:off x="6601048" y="4503521"/>
+            <a:off x="6601048" y="5032680"/>
             <a:ext cx="203200" cy="138499"/>
           </a:xfrm>
           <a:prstGeom prst="rect">
@@ -7019,8 +7014,8 @@
         </p:nvCxnSpPr>
         <p:spPr>
           <a:xfrm rot="10800000" flipV="1">
-            <a:off x="5559102" y="4572770"/>
-            <a:ext cx="1041946" cy="1201"/>
+            <a:off x="5411812" y="5101929"/>
+            <a:ext cx="1189236" cy="1201"/>
           </a:xfrm>
           <a:prstGeom prst="bentConnector3">
             <a:avLst>
@@ -7051,7 +7046,7 @@
         </p:nvSpPr>
         <p:spPr>
           <a:xfrm>
-            <a:off x="5524025" y="4293096"/>
+            <a:off x="5376735" y="4822255"/>
             <a:ext cx="388937" cy="114300"/>
           </a:xfrm>
           <a:prstGeom prst="wedgeRoundRectCallout">
@@ -7125,7 +7120,7 @@
         </p:nvSpPr>
         <p:spPr bwMode="auto">
           <a:xfrm>
-            <a:off x="1709784" y="2546301"/>
+            <a:off x="1709784" y="3579516"/>
             <a:ext cx="230187" cy="138499"/>
           </a:xfrm>
           <a:prstGeom prst="rect">
@@ -7330,8 +7325,8 @@
         </p:nvSpPr>
         <p:spPr bwMode="auto">
           <a:xfrm>
-            <a:off x="3798712" y="4766856"/>
-            <a:ext cx="1435900" cy="270487"/>
+            <a:off x="3854239" y="5386739"/>
+            <a:ext cx="1221817" cy="182086"/>
           </a:xfrm>
           <a:prstGeom prst="rect">
             <a:avLst/>
@@ -7367,7 +7362,7 @@
           </a:extLst>
         </p:spPr>
         <p:txBody>
-          <a:bodyPr wrap="none"/>
+          <a:bodyPr wrap="none" tIns="18000"/>
           <a:lstStyle>
             <a:lvl1pPr eaLnBrk="0" hangingPunct="0">
               <a:spcBef>
@@ -7508,10 +7503,9 @@
               <a:buNone/>
             </a:pPr>
             <a:r>
-              <a:rPr lang="de-DE" altLang="de-DE" sz="1100" dirty="0" smtClean="0"/>
+              <a:rPr lang="de-DE" altLang="de-DE" sz="1000" dirty="0" smtClean="0"/>
               <a:t>Invitation2Supporter</a:t>
             </a:r>
-            <a:endParaRPr lang="de-DE" altLang="de-DE" sz="1100" dirty="0" smtClean="0"/>
           </a:p>
         </p:txBody>
       </p:sp>
@@ -7525,7 +7519,7 @@
         </p:nvSpPr>
         <p:spPr bwMode="auto">
           <a:xfrm>
-            <a:off x="5276822" y="4879802"/>
+            <a:off x="5129532" y="5408961"/>
             <a:ext cx="213002" cy="138499"/>
           </a:xfrm>
           <a:prstGeom prst="rect">
@@ -7730,7 +7724,7 @@
         </p:nvSpPr>
         <p:spPr bwMode="auto">
           <a:xfrm>
-            <a:off x="6587442" y="4902407"/>
+            <a:off x="6587442" y="5431566"/>
             <a:ext cx="96838" cy="138499"/>
           </a:xfrm>
           <a:prstGeom prst="rect">
@@ -7931,8 +7925,8 @@
         </p:nvCxnSpPr>
         <p:spPr>
           <a:xfrm rot="10800000">
-            <a:off x="5489824" y="4949053"/>
-            <a:ext cx="1097618" cy="22605"/>
+            <a:off x="5342534" y="5478212"/>
+            <a:ext cx="1244908" cy="22605"/>
           </a:xfrm>
           <a:prstGeom prst="bentConnector3">
             <a:avLst>
@@ -7966,8 +7960,8 @@
         </p:nvCxnSpPr>
         <p:spPr>
           <a:xfrm rot="10800000" flipV="1">
-            <a:off x="5559100" y="3067638"/>
-            <a:ext cx="992400" cy="16877"/>
+            <a:off x="5411810" y="4100853"/>
+            <a:ext cx="1139690" cy="16877"/>
           </a:xfrm>
           <a:prstGeom prst="bentConnector3">
             <a:avLst>
@@ -8001,7 +7995,7 @@
         </p:nvCxnSpPr>
         <p:spPr>
           <a:xfrm rot="5400000">
-            <a:off x="1692507" y="2409244"/>
+            <a:off x="1692507" y="3442459"/>
             <a:ext cx="269429" cy="4685"/>
           </a:xfrm>
           <a:prstGeom prst="bentConnector3">
@@ -8033,7 +8027,7 @@
         </p:nvSpPr>
         <p:spPr bwMode="auto">
           <a:xfrm>
-            <a:off x="2739845" y="4879801"/>
+            <a:off x="2739845" y="5408960"/>
             <a:ext cx="103187" cy="138499"/>
           </a:xfrm>
           <a:prstGeom prst="rect">
@@ -8220,7 +8214,6 @@
               <a:rPr lang="de-DE" altLang="de-DE" sz="900" dirty="0" smtClean="0"/>
               <a:t>1</a:t>
             </a:r>
-            <a:endParaRPr lang="de-DE" altLang="de-DE" sz="900" dirty="0" smtClean="0"/>
           </a:p>
         </p:txBody>
       </p:sp>
@@ -8234,7 +8227,7 @@
         </p:nvSpPr>
         <p:spPr bwMode="auto">
           <a:xfrm>
-            <a:off x="3510679" y="4823675"/>
+            <a:off x="3510679" y="5352834"/>
             <a:ext cx="188466" cy="276999"/>
           </a:xfrm>
           <a:prstGeom prst="rect">
@@ -8440,7 +8433,7 @@
         </p:nvCxnSpPr>
         <p:spPr>
           <a:xfrm rot="10800000">
-            <a:off x="2843033" y="4949051"/>
+            <a:off x="2843033" y="5478210"/>
             <a:ext cx="667647" cy="13124"/>
           </a:xfrm>
           <a:prstGeom prst="bentConnector3">
@@ -8679,7 +8672,7 @@
         </p:nvSpPr>
         <p:spPr bwMode="auto">
           <a:xfrm>
-            <a:off x="5285036" y="5881410"/>
+            <a:off x="5137746" y="5881410"/>
             <a:ext cx="204788" cy="138499"/>
           </a:xfrm>
           <a:prstGeom prst="rect">
@@ -9086,8 +9079,8 @@
         </p:nvCxnSpPr>
         <p:spPr>
           <a:xfrm>
-            <a:off x="5489824" y="5950660"/>
-            <a:ext cx="1122448" cy="1765"/>
+            <a:off x="5342534" y="5950660"/>
+            <a:ext cx="1269738" cy="1765"/>
           </a:xfrm>
           <a:prstGeom prst="bentConnector3">
             <a:avLst>
@@ -9120,8 +9113,8 @@
         </p:nvSpPr>
         <p:spPr bwMode="auto">
           <a:xfrm>
-            <a:off x="3798712" y="4326984"/>
-            <a:ext cx="1435900" cy="267050"/>
+            <a:off x="3854239" y="4946866"/>
+            <a:ext cx="1221817" cy="179773"/>
           </a:xfrm>
           <a:prstGeom prst="rect">
             <a:avLst/>
@@ -9142,7 +9135,7 @@
           <a:extLst/>
         </p:spPr>
         <p:txBody>
-          <a:bodyPr wrap="none"/>
+          <a:bodyPr wrap="none" tIns="18000"/>
           <a:lstStyle>
             <a:lvl1pPr eaLnBrk="0" hangingPunct="0">
               <a:spcBef>
@@ -9283,10 +9276,9 @@
               <a:buNone/>
             </a:pPr>
             <a:r>
-              <a:rPr lang="de-DE" altLang="de-DE" sz="1100" dirty="0" smtClean="0"/>
+              <a:rPr lang="de-DE" altLang="de-DE" sz="1000" dirty="0" smtClean="0"/>
               <a:t>Supporter2Invitation</a:t>
             </a:r>
-            <a:endParaRPr lang="de-DE" altLang="de-DE" sz="1100" dirty="0" smtClean="0"/>
           </a:p>
         </p:txBody>
       </p:sp>
@@ -9300,8 +9292,8 @@
         </p:nvSpPr>
         <p:spPr bwMode="auto">
           <a:xfrm>
-            <a:off x="3798711" y="5827066"/>
-            <a:ext cx="1435900" cy="260713"/>
+            <a:off x="3854238" y="5917789"/>
+            <a:ext cx="1221817" cy="175507"/>
           </a:xfrm>
           <a:prstGeom prst="rect">
             <a:avLst/>
@@ -9322,7 +9314,7 @@
           <a:extLst/>
         </p:spPr>
         <p:txBody>
-          <a:bodyPr wrap="none"/>
+          <a:bodyPr wrap="none" tIns="18000"/>
           <a:lstStyle>
             <a:lvl1pPr eaLnBrk="0" hangingPunct="0">
               <a:spcBef>
@@ -9463,7 +9455,7 @@
               <a:buNone/>
             </a:pPr>
             <a:r>
-              <a:rPr lang="de-DE" altLang="de-DE" sz="1100" dirty="0" smtClean="0"/>
+              <a:rPr lang="de-DE" altLang="de-DE" sz="1000" dirty="0" smtClean="0"/>
               <a:t>Supporter2Donations</a:t>
             </a:r>
           </a:p>
@@ -9475,7 +9467,7 @@
               <a:buFontTx/>
               <a:buNone/>
             </a:pPr>
-            <a:endParaRPr lang="de-DE" altLang="de-DE" sz="400" dirty="0"/>
+            <a:endParaRPr lang="de-DE" altLang="de-DE" sz="200" dirty="0"/>
           </a:p>
         </p:txBody>
       </p:sp>
@@ -9929,7 +9921,7 @@
         </p:nvSpPr>
         <p:spPr bwMode="auto">
           <a:xfrm>
-            <a:off x="5287194" y="4504722"/>
+            <a:off x="5139904" y="5033881"/>
             <a:ext cx="271908" cy="138499"/>
           </a:xfrm>
           <a:prstGeom prst="rect">
@@ -10130,7 +10122,7 @@
         </p:nvSpPr>
         <p:spPr bwMode="auto">
           <a:xfrm>
-            <a:off x="2727421" y="4407396"/>
+            <a:off x="2727421" y="4936555"/>
             <a:ext cx="96838" cy="138499"/>
           </a:xfrm>
           <a:prstGeom prst="rect">
@@ -10335,7 +10327,7 @@
         </p:nvSpPr>
         <p:spPr bwMode="auto">
           <a:xfrm>
-            <a:off x="3595808" y="4410823"/>
+            <a:off x="3595808" y="4939982"/>
             <a:ext cx="96838" cy="138499"/>
           </a:xfrm>
           <a:prstGeom prst="rect">
@@ -10536,7 +10528,7 @@
         </p:nvCxnSpPr>
         <p:spPr>
           <a:xfrm rot="10800000">
-            <a:off x="2824260" y="4476647"/>
+            <a:off x="2824260" y="5005806"/>
             <a:ext cx="771549" cy="3427"/>
           </a:xfrm>
           <a:prstGeom prst="bentConnector3">
@@ -10568,7 +10560,7 @@
         </p:nvSpPr>
         <p:spPr>
           <a:xfrm>
-            <a:off x="3245713" y="4709375"/>
+            <a:off x="3245713" y="5238534"/>
             <a:ext cx="388937" cy="114300"/>
           </a:xfrm>
           <a:prstGeom prst="wedgeRoundRectCallout">
@@ -10642,8 +10634,8 @@
         </p:nvSpPr>
         <p:spPr bwMode="auto">
           <a:xfrm>
-            <a:off x="3798712" y="811499"/>
-            <a:ext cx="1435900" cy="260713"/>
+            <a:off x="3854239" y="1935437"/>
+            <a:ext cx="1221817" cy="175507"/>
           </a:xfrm>
           <a:prstGeom prst="rect">
             <a:avLst/>
@@ -10664,7 +10656,7 @@
           <a:extLst/>
         </p:spPr>
         <p:txBody>
-          <a:bodyPr wrap="none"/>
+          <a:bodyPr wrap="none" tIns="18000"/>
           <a:lstStyle>
             <a:lvl1pPr eaLnBrk="0" hangingPunct="0">
               <a:spcBef>
@@ -10805,10 +10797,9 @@
               <a:buNone/>
             </a:pPr>
             <a:r>
-              <a:rPr lang="de-DE" altLang="de-DE" sz="1100" dirty="0" smtClean="0"/>
+              <a:rPr lang="de-DE" altLang="de-DE" sz="1000" dirty="0" smtClean="0"/>
               <a:t>User2Supporter</a:t>
             </a:r>
-            <a:endParaRPr lang="de-DE" altLang="de-DE" sz="1100" dirty="0" smtClean="0"/>
           </a:p>
           <a:p>
             <a:pPr eaLnBrk="1" hangingPunct="1">
@@ -10818,7 +10809,7 @@
               <a:buFontTx/>
               <a:buNone/>
             </a:pPr>
-            <a:endParaRPr lang="de-DE" altLang="de-DE" sz="400" dirty="0"/>
+            <a:endParaRPr lang="de-DE" altLang="de-DE" sz="200" dirty="0"/>
           </a:p>
         </p:txBody>
       </p:sp>
@@ -10832,7 +10823,7 @@
         </p:nvSpPr>
         <p:spPr bwMode="auto">
           <a:xfrm>
-            <a:off x="6612272" y="982294"/>
+            <a:off x="6612272" y="2015509"/>
             <a:ext cx="96838" cy="138499"/>
           </a:xfrm>
           <a:prstGeom prst="rect">
@@ -11037,7 +11028,7 @@
         </p:nvSpPr>
         <p:spPr bwMode="auto">
           <a:xfrm>
-            <a:off x="5287194" y="847745"/>
+            <a:off x="5139904" y="1880960"/>
             <a:ext cx="80114" cy="276999"/>
           </a:xfrm>
           <a:prstGeom prst="rect">
@@ -11243,8 +11234,8 @@
         </p:nvCxnSpPr>
         <p:spPr>
           <a:xfrm>
-            <a:off x="5367308" y="986245"/>
-            <a:ext cx="1244964" cy="65299"/>
+            <a:off x="5220018" y="2019460"/>
+            <a:ext cx="1392254" cy="65299"/>
           </a:xfrm>
           <a:prstGeom prst="bentConnector3">
             <a:avLst>
@@ -11277,7 +11268,7 @@
         </p:nvSpPr>
         <p:spPr bwMode="auto">
           <a:xfrm>
-            <a:off x="2767778" y="864476"/>
+            <a:off x="2767778" y="1897691"/>
             <a:ext cx="204788" cy="138499"/>
           </a:xfrm>
           <a:prstGeom prst="rect">
@@ -11462,13 +11453,8 @@
             </a:pPr>
             <a:r>
               <a:rPr lang="de-DE" altLang="de-DE" sz="900" dirty="0"/>
-              <a:t> </a:t>
-            </a:r>
-            <a:r>
-              <a:rPr lang="de-DE" altLang="de-DE" sz="900" dirty="0"/>
-              <a:t>1</a:t>
-            </a:r>
-            <a:endParaRPr lang="de-DE" altLang="de-DE" sz="900" dirty="0"/>
+              <a:t> 1</a:t>
+            </a:r>
           </a:p>
         </p:txBody>
       </p:sp>
@@ -11482,7 +11468,7 @@
         </p:nvSpPr>
         <p:spPr bwMode="auto">
           <a:xfrm>
-            <a:off x="3510680" y="870958"/>
+            <a:off x="3510680" y="1904173"/>
             <a:ext cx="288031" cy="138499"/>
           </a:xfrm>
           <a:prstGeom prst="rect">
@@ -11688,7 +11674,7 @@
         </p:nvCxnSpPr>
         <p:spPr>
           <a:xfrm>
-            <a:off x="2972566" y="933726"/>
+            <a:off x="2972566" y="1966941"/>
             <a:ext cx="538114" cy="6482"/>
           </a:xfrm>
           <a:prstGeom prst="bentConnector3">
@@ -11720,8 +11706,8 @@
         </p:nvSpPr>
         <p:spPr>
           <a:xfrm>
-            <a:off x="4124695" y="5373796"/>
-            <a:ext cx="968898" cy="215444"/>
+            <a:off x="4180222" y="5464519"/>
+            <a:ext cx="824442" cy="156675"/>
           </a:xfrm>
           <a:prstGeom prst="rect">
             <a:avLst/>
@@ -11729,14 +11715,14 @@
           <a:noFill/>
         </p:spPr>
         <p:txBody>
-          <a:bodyPr wrap="square" rtlCol="0">
+          <a:bodyPr wrap="square" tIns="18000" rtlCol="0">
             <a:spAutoFit/>
           </a:bodyPr>
           <a:lstStyle/>
           <a:p>
             <a:pPr lvl="0"/>
             <a:r>
-              <a:rPr lang="de-DE" altLang="de-DE" sz="800" dirty="0" smtClean="0">
+              <a:rPr lang="de-DE" altLang="de-DE" sz="600" dirty="0" smtClean="0">
                 <a:solidFill>
                   <a:schemeClr val="bg1">
                     <a:lumMod val="75000"/>
@@ -11746,7 +11732,7 @@
               <a:t>(=</a:t>
             </a:r>
             <a:r>
-              <a:rPr lang="de-DE" altLang="de-DE" sz="800" dirty="0" err="1" smtClean="0">
+              <a:rPr lang="de-DE" altLang="de-DE" sz="600" dirty="0" err="1" smtClean="0">
                 <a:solidFill>
                   <a:schemeClr val="bg1">
                     <a:lumMod val="75000"/>
@@ -11756,7 +11742,7 @@
               <a:t>Invitationclicks</a:t>
             </a:r>
             <a:r>
-              <a:rPr lang="de-DE" altLang="de-DE" sz="800" dirty="0" smtClean="0">
+              <a:rPr lang="de-DE" altLang="de-DE" sz="600" dirty="0" smtClean="0">
                 <a:solidFill>
                   <a:schemeClr val="bg1">
                     <a:lumMod val="75000"/>
@@ -11765,7 +11751,7 @@
               </a:rPr>
               <a:t>)</a:t>
             </a:r>
-            <a:endParaRPr lang="de-DE" altLang="de-DE" sz="700" dirty="0">
+            <a:endParaRPr lang="de-DE" altLang="de-DE" sz="500" dirty="0">
               <a:solidFill>
                 <a:schemeClr val="bg1">
                   <a:lumMod val="75000"/>
@@ -11813,8 +11799,8 @@
         </p:nvSpPr>
         <p:spPr bwMode="auto">
           <a:xfrm>
-            <a:off x="3798712" y="2931640"/>
-            <a:ext cx="1435900" cy="250164"/>
+            <a:off x="3854239" y="4055578"/>
+            <a:ext cx="1221817" cy="168405"/>
           </a:xfrm>
           <a:prstGeom prst="rect">
             <a:avLst/>
@@ -11835,7 +11821,7 @@
           <a:extLst/>
         </p:spPr>
         <p:txBody>
-          <a:bodyPr wrap="none"/>
+          <a:bodyPr wrap="none" tIns="18000"/>
           <a:lstStyle>
             <a:lvl1pPr eaLnBrk="0" hangingPunct="0">
               <a:spcBef>
@@ -11976,10 +11962,9 @@
               <a:buNone/>
             </a:pPr>
             <a:r>
-              <a:rPr lang="de-DE" altLang="de-DE" sz="1100" dirty="0" smtClean="0"/>
+              <a:rPr lang="de-DE" altLang="de-DE" sz="1000" dirty="0" smtClean="0"/>
               <a:t>Hero2Supporter</a:t>
             </a:r>
-            <a:endParaRPr lang="de-DE" altLang="de-DE" sz="1100" dirty="0" smtClean="0"/>
           </a:p>
           <a:p>
             <a:pPr eaLnBrk="1" hangingPunct="1">
@@ -11989,7 +11974,7 @@
               <a:buFontTx/>
               <a:buNone/>
             </a:pPr>
-            <a:endParaRPr lang="de-DE" altLang="de-DE" sz="400" dirty="0"/>
+            <a:endParaRPr lang="de-DE" altLang="de-DE" sz="200" dirty="0"/>
           </a:p>
         </p:txBody>
       </p:sp>
@@ -12003,7 +11988,7 @@
         </p:nvSpPr>
         <p:spPr bwMode="auto">
           <a:xfrm>
-            <a:off x="2803360" y="3007672"/>
+            <a:off x="2803360" y="4040887"/>
             <a:ext cx="96838" cy="138499"/>
           </a:xfrm>
           <a:prstGeom prst="rect">
@@ -12208,7 +12193,7 @@
         </p:nvSpPr>
         <p:spPr bwMode="auto">
           <a:xfrm>
-            <a:off x="3510680" y="3011099"/>
+            <a:off x="3510680" y="4044314"/>
             <a:ext cx="257905" cy="138499"/>
           </a:xfrm>
           <a:prstGeom prst="rect">
@@ -12414,7 +12399,7 @@
         </p:nvCxnSpPr>
         <p:spPr>
           <a:xfrm rot="10800000">
-            <a:off x="2900198" y="3076923"/>
+            <a:off x="2900198" y="4110138"/>
             <a:ext cx="610482" cy="3427"/>
           </a:xfrm>
           <a:prstGeom prst="bentConnector3">
@@ -12448,8 +12433,8 @@
         </p:nvSpPr>
         <p:spPr bwMode="auto">
           <a:xfrm>
-            <a:off x="1244374" y="1847654"/>
-            <a:ext cx="1224136" cy="290719"/>
+            <a:off x="1244374" y="2880870"/>
+            <a:ext cx="1041626" cy="167130"/>
           </a:xfrm>
           <a:prstGeom prst="rect">
             <a:avLst/>
@@ -12470,7 +12455,7 @@
           <a:extLst/>
         </p:spPr>
         <p:txBody>
-          <a:bodyPr wrap="none"/>
+          <a:bodyPr wrap="none" tIns="18000"/>
           <a:lstStyle>
             <a:lvl1pPr eaLnBrk="0" hangingPunct="0">
               <a:spcBef>
@@ -12611,10 +12596,9 @@
               <a:buNone/>
             </a:pPr>
             <a:r>
-              <a:rPr lang="de-DE" altLang="de-DE" sz="1100" dirty="0" smtClean="0"/>
+              <a:rPr lang="de-DE" altLang="de-DE" sz="1000" dirty="0" smtClean="0"/>
               <a:t>User2Hero</a:t>
             </a:r>
-            <a:endParaRPr lang="de-DE" altLang="de-DE" sz="1100" dirty="0" smtClean="0"/>
           </a:p>
           <a:p>
             <a:pPr eaLnBrk="1" hangingPunct="1">
@@ -12624,7 +12608,7 @@
               <a:buFontTx/>
               <a:buNone/>
             </a:pPr>
-            <a:endParaRPr lang="de-DE" altLang="de-DE" sz="400" dirty="0"/>
+            <a:endParaRPr lang="de-DE" altLang="de-DE" sz="200" dirty="0"/>
           </a:p>
         </p:txBody>
       </p:sp>
@@ -12638,7 +12622,7 @@
         </p:nvSpPr>
         <p:spPr bwMode="auto">
           <a:xfrm flipH="1">
-            <a:off x="1683737" y="1706325"/>
+            <a:off x="1683737" y="2739540"/>
             <a:ext cx="352725" cy="138499"/>
           </a:xfrm>
           <a:prstGeom prst="rect">
@@ -12827,11 +12811,7 @@
             </a:r>
             <a:r>
               <a:rPr lang="de-DE" altLang="de-DE" sz="900" dirty="0" smtClean="0"/>
-              <a:t>0..</a:t>
-            </a:r>
-            <a:r>
-              <a:rPr lang="de-DE" altLang="de-DE" sz="900" dirty="0" smtClean="0"/>
-              <a:t>1</a:t>
+              <a:t>0..1</a:t>
             </a:r>
             <a:endParaRPr lang="de-DE" altLang="de-DE" sz="900" dirty="0"/>
           </a:p>
@@ -12847,7 +12827,7 @@
         </p:nvSpPr>
         <p:spPr bwMode="auto">
           <a:xfrm>
-            <a:off x="1763981" y="1246577"/>
+            <a:off x="1763981" y="2279792"/>
             <a:ext cx="147637" cy="138499"/>
           </a:xfrm>
           <a:prstGeom prst="rect">
@@ -13048,7 +13028,7 @@
         </p:nvCxnSpPr>
         <p:spPr>
           <a:xfrm rot="16200000" flipH="1">
-            <a:off x="1688325" y="1534550"/>
+            <a:off x="1688325" y="2567765"/>
             <a:ext cx="321249" cy="22299"/>
           </a:xfrm>
           <a:prstGeom prst="bentConnector3">
@@ -13078,7 +13058,7 @@
         </p:nvSpPr>
         <p:spPr>
           <a:xfrm>
-            <a:off x="5524026" y="2817340"/>
+            <a:off x="5376736" y="3850555"/>
             <a:ext cx="388937" cy="114300"/>
           </a:xfrm>
           <a:prstGeom prst="wedgeRoundRectCallout">
@@ -13150,7 +13130,7 @@
         </p:nvSpPr>
         <p:spPr>
           <a:xfrm>
-            <a:off x="1244374" y="1445597"/>
+            <a:off x="1244374" y="2478812"/>
             <a:ext cx="388937" cy="114300"/>
           </a:xfrm>
           <a:prstGeom prst="wedgeRoundRectCallout">
@@ -13244,7 +13224,7 @@
         </p:nvSpPr>
         <p:spPr>
           <a:xfrm>
-            <a:off x="5276822" y="4709375"/>
+            <a:off x="5129532" y="5238534"/>
             <a:ext cx="388937" cy="114300"/>
           </a:xfrm>
           <a:prstGeom prst="wedgeRoundRectCallout">

</xml_diff>

<commit_message>
cleaning up (e.g. authorization routine in client)
</commit_message>
<xml_diff>
--- a/com.supeyou.project/doc/SupeYou.entities.pptx
+++ b/com.supeyou.project/doc/SupeYou.entities.pptx
@@ -7,7 +7,8 @@
   <p:sldIdLst>
     <p:sldId id="365" r:id="rId2"/>
     <p:sldId id="306" r:id="rId3"/>
-    <p:sldId id="364" r:id="rId4"/>
+    <p:sldId id="366" r:id="rId4"/>
+    <p:sldId id="364" r:id="rId5"/>
   </p:sldIdLst>
   <p:sldSz cx="9144000" cy="6858000" type="screen4x3"/>
   <p:notesSz cx="6858000" cy="9144000"/>
@@ -330,7 +331,7 @@
               <a:pPr>
                 <a:defRPr/>
               </a:pPr>
-              <a:t>10.07.2015</a:t>
+              <a:t>13.07.2015</a:t>
             </a:fld>
             <a:endParaRPr lang="de-CH"/>
           </a:p>
@@ -527,7 +528,7 @@
               <a:pPr>
                 <a:defRPr/>
               </a:pPr>
-              <a:t>10.07.2015</a:t>
+              <a:t>13.07.2015</a:t>
             </a:fld>
             <a:endParaRPr lang="de-CH"/>
           </a:p>
@@ -734,7 +735,7 @@
               <a:pPr>
                 <a:defRPr/>
               </a:pPr>
-              <a:t>10.07.2015</a:t>
+              <a:t>13.07.2015</a:t>
             </a:fld>
             <a:endParaRPr lang="de-CH"/>
           </a:p>
@@ -931,7 +932,7 @@
               <a:pPr>
                 <a:defRPr/>
               </a:pPr>
-              <a:t>10.07.2015</a:t>
+              <a:t>13.07.2015</a:t>
             </a:fld>
             <a:endParaRPr lang="de-CH"/>
           </a:p>
@@ -1204,7 +1205,7 @@
               <a:pPr>
                 <a:defRPr/>
               </a:pPr>
-              <a:t>10.07.2015</a:t>
+              <a:t>13.07.2015</a:t>
             </a:fld>
             <a:endParaRPr lang="de-CH"/>
           </a:p>
@@ -1519,7 +1520,7 @@
               <a:pPr>
                 <a:defRPr/>
               </a:pPr>
-              <a:t>10.07.2015</a:t>
+              <a:t>13.07.2015</a:t>
             </a:fld>
             <a:endParaRPr lang="de-CH"/>
           </a:p>
@@ -1968,7 +1969,7 @@
               <a:pPr>
                 <a:defRPr/>
               </a:pPr>
-              <a:t>10.07.2015</a:t>
+              <a:t>13.07.2015</a:t>
             </a:fld>
             <a:endParaRPr lang="de-CH"/>
           </a:p>
@@ -2113,7 +2114,7 @@
               <a:pPr>
                 <a:defRPr/>
               </a:pPr>
-              <a:t>10.07.2015</a:t>
+              <a:t>13.07.2015</a:t>
             </a:fld>
             <a:endParaRPr lang="de-CH"/>
           </a:p>
@@ -2235,7 +2236,7 @@
               <a:pPr>
                 <a:defRPr/>
               </a:pPr>
-              <a:t>10.07.2015</a:t>
+              <a:t>13.07.2015</a:t>
             </a:fld>
             <a:endParaRPr lang="de-CH"/>
           </a:p>
@@ -2539,7 +2540,7 @@
               <a:pPr>
                 <a:defRPr/>
               </a:pPr>
-              <a:t>10.07.2015</a:t>
+              <a:t>13.07.2015</a:t>
             </a:fld>
             <a:endParaRPr lang="de-CH"/>
           </a:p>
@@ -2822,7 +2823,7 @@
               <a:pPr>
                 <a:defRPr/>
               </a:pPr>
-              <a:t>10.07.2015</a:t>
+              <a:t>13.07.2015</a:t>
             </a:fld>
             <a:endParaRPr lang="de-CH"/>
           </a:p>
@@ -3120,7 +3121,7 @@
               <a:pPr>
                 <a:defRPr/>
               </a:pPr>
-              <a:t>10.07.2015</a:t>
+              <a:t>13.07.2015</a:t>
             </a:fld>
             <a:endParaRPr lang="de-CH"/>
           </a:p>
@@ -13320,6 +13321,3083 @@
           <a:chExt cx="0" cy="0"/>
         </a:xfrm>
       </p:grpSpPr>
+      <p:grpSp>
+        <p:nvGrpSpPr>
+          <p:cNvPr id="4" name="Gruppieren 3"/>
+          <p:cNvGrpSpPr/>
+          <p:nvPr/>
+        </p:nvGrpSpPr>
+        <p:grpSpPr>
+          <a:xfrm>
+            <a:off x="3923550" y="620688"/>
+            <a:ext cx="650882" cy="246221"/>
+            <a:chOff x="2653308" y="1412776"/>
+            <a:chExt cx="650882" cy="246221"/>
+          </a:xfrm>
+        </p:grpSpPr>
+        <p:sp>
+          <p:nvSpPr>
+            <p:cNvPr id="3" name="Textfeld 2"/>
+            <p:cNvSpPr txBox="1"/>
+            <p:nvPr/>
+          </p:nvSpPr>
+          <p:spPr>
+            <a:xfrm>
+              <a:off x="2843808" y="1412776"/>
+              <a:ext cx="460382" cy="246221"/>
+            </a:xfrm>
+            <a:prstGeom prst="rect">
+              <a:avLst/>
+            </a:prstGeom>
+            <a:noFill/>
+          </p:spPr>
+          <p:txBody>
+            <a:bodyPr wrap="none" rtlCol="0">
+              <a:spAutoFit/>
+            </a:bodyPr>
+            <a:lstStyle/>
+            <a:p>
+              <a:r>
+                <a:rPr lang="de-DE" sz="1000" dirty="0" smtClean="0"/>
+                <a:t>Hugo</a:t>
+              </a:r>
+              <a:endParaRPr lang="en-US" sz="1000" dirty="0"/>
+            </a:p>
+          </p:txBody>
+        </p:sp>
+        <p:pic>
+          <p:nvPicPr>
+            <p:cNvPr id="1027" name="Picture 3" descr="C:\Users\MoritzTheile\eclipse_SupeYou\com.supeyou.app\src\main\webapp\heroPics\skype_smile.png"/>
+            <p:cNvPicPr>
+              <a:picLocks noChangeAspect="1" noChangeArrowheads="1"/>
+            </p:cNvPicPr>
+            <p:nvPr/>
+          </p:nvPicPr>
+          <p:blipFill>
+            <a:blip r:embed="rId2">
+              <a:extLst>
+                <a:ext uri="{28A0092B-C50C-407E-A947-70E740481C1C}">
+                  <a14:useLocalDpi xmlns:a14="http://schemas.microsoft.com/office/drawing/2010/main" val="0"/>
+                </a:ext>
+              </a:extLst>
+            </a:blip>
+            <a:srcRect/>
+            <a:stretch>
+              <a:fillRect/>
+            </a:stretch>
+          </p:blipFill>
+          <p:spPr bwMode="auto">
+            <a:xfrm>
+              <a:off x="2653308" y="1440636"/>
+              <a:ext cx="190500" cy="190500"/>
+            </a:xfrm>
+            <a:prstGeom prst="rect">
+              <a:avLst/>
+            </a:prstGeom>
+            <a:noFill/>
+            <a:extLst>
+              <a:ext uri="{909E8E84-426E-40DD-AFC4-6F175D3DCCD1}">
+                <a14:hiddenFill xmlns:a14="http://schemas.microsoft.com/office/drawing/2010/main">
+                  <a:solidFill>
+                    <a:srgbClr val="FFFFFF"/>
+                  </a:solidFill>
+                </a14:hiddenFill>
+              </a:ext>
+            </a:extLst>
+          </p:spPr>
+        </p:pic>
+      </p:grpSp>
+      <p:grpSp>
+        <p:nvGrpSpPr>
+          <p:cNvPr id="7" name="Gruppieren 6"/>
+          <p:cNvGrpSpPr/>
+          <p:nvPr/>
+        </p:nvGrpSpPr>
+        <p:grpSpPr>
+          <a:xfrm>
+            <a:off x="2395217" y="1772816"/>
+            <a:ext cx="753475" cy="246221"/>
+            <a:chOff x="2653308" y="1412776"/>
+            <a:chExt cx="753475" cy="246221"/>
+          </a:xfrm>
+        </p:grpSpPr>
+        <p:sp>
+          <p:nvSpPr>
+            <p:cNvPr id="8" name="Textfeld 7"/>
+            <p:cNvSpPr txBox="1"/>
+            <p:nvPr/>
+          </p:nvSpPr>
+          <p:spPr>
+            <a:xfrm>
+              <a:off x="2843808" y="1412776"/>
+              <a:ext cx="562975" cy="246221"/>
+            </a:xfrm>
+            <a:prstGeom prst="rect">
+              <a:avLst/>
+            </a:prstGeom>
+            <a:noFill/>
+          </p:spPr>
+          <p:txBody>
+            <a:bodyPr wrap="none" rtlCol="0">
+              <a:spAutoFit/>
+            </a:bodyPr>
+            <a:lstStyle/>
+            <a:p>
+              <a:r>
+                <a:rPr lang="de-DE" sz="1000" dirty="0" smtClean="0"/>
+                <a:t>Andrea</a:t>
+              </a:r>
+              <a:endParaRPr lang="en-US" sz="1000" dirty="0"/>
+            </a:p>
+          </p:txBody>
+        </p:sp>
+        <p:pic>
+          <p:nvPicPr>
+            <p:cNvPr id="9" name="Picture 3" descr="C:\Users\MoritzTheile\eclipse_SupeYou\com.supeyou.app\src\main\webapp\heroPics\skype_smile.png"/>
+            <p:cNvPicPr>
+              <a:picLocks noChangeAspect="1" noChangeArrowheads="1"/>
+            </p:cNvPicPr>
+            <p:nvPr/>
+          </p:nvPicPr>
+          <p:blipFill>
+            <a:blip r:embed="rId2">
+              <a:extLst>
+                <a:ext uri="{28A0092B-C50C-407E-A947-70E740481C1C}">
+                  <a14:useLocalDpi xmlns:a14="http://schemas.microsoft.com/office/drawing/2010/main" val="0"/>
+                </a:ext>
+              </a:extLst>
+            </a:blip>
+            <a:srcRect/>
+            <a:stretch>
+              <a:fillRect/>
+            </a:stretch>
+          </p:blipFill>
+          <p:spPr bwMode="auto">
+            <a:xfrm>
+              <a:off x="2653308" y="1440636"/>
+              <a:ext cx="190500" cy="190500"/>
+            </a:xfrm>
+            <a:prstGeom prst="rect">
+              <a:avLst/>
+            </a:prstGeom>
+            <a:noFill/>
+            <a:extLst>
+              <a:ext uri="{909E8E84-426E-40DD-AFC4-6F175D3DCCD1}">
+                <a14:hiddenFill xmlns:a14="http://schemas.microsoft.com/office/drawing/2010/main">
+                  <a:solidFill>
+                    <a:srgbClr val="FFFFFF"/>
+                  </a:solidFill>
+                </a14:hiddenFill>
+              </a:ext>
+            </a:extLst>
+          </p:spPr>
+        </p:pic>
+      </p:grpSp>
+      <p:grpSp>
+        <p:nvGrpSpPr>
+          <p:cNvPr id="10" name="Gruppieren 9"/>
+          <p:cNvGrpSpPr/>
+          <p:nvPr/>
+        </p:nvGrpSpPr>
+        <p:grpSpPr>
+          <a:xfrm>
+            <a:off x="3826018" y="1772816"/>
+            <a:ext cx="827213" cy="246221"/>
+            <a:chOff x="2653308" y="1412776"/>
+            <a:chExt cx="827213" cy="246221"/>
+          </a:xfrm>
+        </p:grpSpPr>
+        <p:sp>
+          <p:nvSpPr>
+            <p:cNvPr id="11" name="Textfeld 10"/>
+            <p:cNvSpPr txBox="1"/>
+            <p:nvPr/>
+          </p:nvSpPr>
+          <p:spPr>
+            <a:xfrm>
+              <a:off x="2843808" y="1412776"/>
+              <a:ext cx="636713" cy="246221"/>
+            </a:xfrm>
+            <a:prstGeom prst="rect">
+              <a:avLst/>
+            </a:prstGeom>
+            <a:noFill/>
+          </p:spPr>
+          <p:txBody>
+            <a:bodyPr wrap="none" rtlCol="0">
+              <a:spAutoFit/>
+            </a:bodyPr>
+            <a:lstStyle/>
+            <a:p>
+              <a:r>
+                <a:rPr lang="de-DE" sz="1000" dirty="0" smtClean="0"/>
+                <a:t>Manfred</a:t>
+              </a:r>
+              <a:endParaRPr lang="en-US" sz="1000" dirty="0"/>
+            </a:p>
+          </p:txBody>
+        </p:sp>
+        <p:pic>
+          <p:nvPicPr>
+            <p:cNvPr id="12" name="Picture 3" descr="C:\Users\MoritzTheile\eclipse_SupeYou\com.supeyou.app\src\main\webapp\heroPics\skype_smile.png"/>
+            <p:cNvPicPr>
+              <a:picLocks noChangeAspect="1" noChangeArrowheads="1"/>
+            </p:cNvPicPr>
+            <p:nvPr/>
+          </p:nvPicPr>
+          <p:blipFill>
+            <a:blip r:embed="rId2">
+              <a:extLst>
+                <a:ext uri="{28A0092B-C50C-407E-A947-70E740481C1C}">
+                  <a14:useLocalDpi xmlns:a14="http://schemas.microsoft.com/office/drawing/2010/main" val="0"/>
+                </a:ext>
+              </a:extLst>
+            </a:blip>
+            <a:srcRect/>
+            <a:stretch>
+              <a:fillRect/>
+            </a:stretch>
+          </p:blipFill>
+          <p:spPr bwMode="auto">
+            <a:xfrm>
+              <a:off x="2653308" y="1440636"/>
+              <a:ext cx="190500" cy="190500"/>
+            </a:xfrm>
+            <a:prstGeom prst="rect">
+              <a:avLst/>
+            </a:prstGeom>
+            <a:noFill/>
+            <a:extLst>
+              <a:ext uri="{909E8E84-426E-40DD-AFC4-6F175D3DCCD1}">
+                <a14:hiddenFill xmlns:a14="http://schemas.microsoft.com/office/drawing/2010/main">
+                  <a:solidFill>
+                    <a:srgbClr val="FFFFFF"/>
+                  </a:solidFill>
+                </a14:hiddenFill>
+              </a:ext>
+            </a:extLst>
+          </p:spPr>
+        </p:pic>
+      </p:grpSp>
+      <p:cxnSp>
+        <p:nvCxnSpPr>
+          <p:cNvPr id="19" name="Gekrümmte Verbindung 18"/>
+          <p:cNvCxnSpPr>
+            <a:stCxn id="2" idx="2"/>
+            <a:endCxn id="9" idx="0"/>
+          </p:cNvCxnSpPr>
+          <p:nvPr/>
+        </p:nvCxnSpPr>
+        <p:spPr>
+          <a:xfrm rot="5400000">
+            <a:off x="2732895" y="1170349"/>
+            <a:ext cx="387900" cy="872755"/>
+          </a:xfrm>
+          <a:prstGeom prst="curvedConnector3">
+            <a:avLst/>
+          </a:prstGeom>
+        </p:spPr>
+        <p:style>
+          <a:lnRef idx="1">
+            <a:schemeClr val="accent1"/>
+          </a:lnRef>
+          <a:fillRef idx="0">
+            <a:schemeClr val="accent1"/>
+          </a:fillRef>
+          <a:effectRef idx="0">
+            <a:schemeClr val="accent1"/>
+          </a:effectRef>
+          <a:fontRef idx="minor">
+            <a:schemeClr val="tx1"/>
+          </a:fontRef>
+        </p:style>
+      </p:cxnSp>
+      <p:cxnSp>
+        <p:nvCxnSpPr>
+          <p:cNvPr id="23" name="Gekrümmte Verbindung 22"/>
+          <p:cNvCxnSpPr>
+            <a:stCxn id="2" idx="2"/>
+            <a:endCxn id="12" idx="0"/>
+          </p:cNvCxnSpPr>
+          <p:nvPr/>
+        </p:nvCxnSpPr>
+        <p:spPr>
+          <a:xfrm rot="16200000" flipH="1">
+            <a:off x="3448295" y="1327703"/>
+            <a:ext cx="387900" cy="558046"/>
+          </a:xfrm>
+          <a:prstGeom prst="curvedConnector3">
+            <a:avLst>
+              <a:gd name="adj1" fmla="val 50000"/>
+            </a:avLst>
+          </a:prstGeom>
+        </p:spPr>
+        <p:style>
+          <a:lnRef idx="1">
+            <a:schemeClr val="accent1"/>
+          </a:lnRef>
+          <a:fillRef idx="0">
+            <a:schemeClr val="accent1"/>
+          </a:fillRef>
+          <a:effectRef idx="0">
+            <a:schemeClr val="accent1"/>
+          </a:effectRef>
+          <a:fontRef idx="minor">
+            <a:schemeClr val="tx1"/>
+          </a:fontRef>
+        </p:style>
+      </p:cxnSp>
+      <p:grpSp>
+        <p:nvGrpSpPr>
+          <p:cNvPr id="26" name="Gruppieren 25"/>
+          <p:cNvGrpSpPr/>
+          <p:nvPr/>
+        </p:nvGrpSpPr>
+        <p:grpSpPr>
+          <a:xfrm>
+            <a:off x="5470154" y="1782340"/>
+            <a:ext cx="614014" cy="246221"/>
+            <a:chOff x="2653308" y="1412776"/>
+            <a:chExt cx="614014" cy="246221"/>
+          </a:xfrm>
+        </p:grpSpPr>
+        <p:sp>
+          <p:nvSpPr>
+            <p:cNvPr id="27" name="Textfeld 26"/>
+            <p:cNvSpPr txBox="1"/>
+            <p:nvPr/>
+          </p:nvSpPr>
+          <p:spPr>
+            <a:xfrm>
+              <a:off x="2843808" y="1412776"/>
+              <a:ext cx="423514" cy="246221"/>
+            </a:xfrm>
+            <a:prstGeom prst="rect">
+              <a:avLst/>
+            </a:prstGeom>
+            <a:noFill/>
+          </p:spPr>
+          <p:txBody>
+            <a:bodyPr wrap="none" rtlCol="0">
+              <a:spAutoFit/>
+            </a:bodyPr>
+            <a:lstStyle/>
+            <a:p>
+              <a:r>
+                <a:rPr lang="de-DE" sz="1000" dirty="0" smtClean="0"/>
+                <a:t>Otto</a:t>
+              </a:r>
+              <a:endParaRPr lang="en-US" sz="1000" dirty="0"/>
+            </a:p>
+          </p:txBody>
+        </p:sp>
+        <p:pic>
+          <p:nvPicPr>
+            <p:cNvPr id="28" name="Picture 3" descr="C:\Users\MoritzTheile\eclipse_SupeYou\com.supeyou.app\src\main\webapp\heroPics\skype_smile.png"/>
+            <p:cNvPicPr>
+              <a:picLocks noChangeAspect="1" noChangeArrowheads="1"/>
+            </p:cNvPicPr>
+            <p:nvPr/>
+          </p:nvPicPr>
+          <p:blipFill>
+            <a:blip r:embed="rId2">
+              <a:extLst>
+                <a:ext uri="{28A0092B-C50C-407E-A947-70E740481C1C}">
+                  <a14:useLocalDpi xmlns:a14="http://schemas.microsoft.com/office/drawing/2010/main" val="0"/>
+                </a:ext>
+              </a:extLst>
+            </a:blip>
+            <a:srcRect/>
+            <a:stretch>
+              <a:fillRect/>
+            </a:stretch>
+          </p:blipFill>
+          <p:spPr bwMode="auto">
+            <a:xfrm>
+              <a:off x="2653308" y="1440636"/>
+              <a:ext cx="190500" cy="190500"/>
+            </a:xfrm>
+            <a:prstGeom prst="rect">
+              <a:avLst/>
+            </a:prstGeom>
+            <a:noFill/>
+            <a:extLst>
+              <a:ext uri="{909E8E84-426E-40DD-AFC4-6F175D3DCCD1}">
+                <a14:hiddenFill xmlns:a14="http://schemas.microsoft.com/office/drawing/2010/main">
+                  <a:solidFill>
+                    <a:srgbClr val="FFFFFF"/>
+                  </a:solidFill>
+                </a14:hiddenFill>
+              </a:ext>
+            </a:extLst>
+          </p:spPr>
+        </p:pic>
+      </p:grpSp>
+      <p:cxnSp>
+        <p:nvCxnSpPr>
+          <p:cNvPr id="29" name="Gekrümmte Verbindung 28"/>
+          <p:cNvCxnSpPr>
+            <a:stCxn id="1027" idx="2"/>
+            <a:endCxn id="64" idx="0"/>
+          </p:cNvCxnSpPr>
+          <p:nvPr/>
+        </p:nvCxnSpPr>
+        <p:spPr>
+          <a:xfrm rot="16200000" flipH="1">
+            <a:off x="4414432" y="443416"/>
+            <a:ext cx="213688" cy="1004952"/>
+          </a:xfrm>
+          <a:prstGeom prst="curvedConnector3">
+            <a:avLst>
+              <a:gd name="adj1" fmla="val 50000"/>
+            </a:avLst>
+          </a:prstGeom>
+        </p:spPr>
+        <p:style>
+          <a:lnRef idx="1">
+            <a:schemeClr val="accent1"/>
+          </a:lnRef>
+          <a:fillRef idx="0">
+            <a:schemeClr val="accent1"/>
+          </a:fillRef>
+          <a:effectRef idx="0">
+            <a:schemeClr val="accent1"/>
+          </a:effectRef>
+          <a:fontRef idx="minor">
+            <a:schemeClr val="tx1"/>
+          </a:fontRef>
+        </p:style>
+      </p:cxnSp>
+      <p:grpSp>
+        <p:nvGrpSpPr>
+          <p:cNvPr id="32" name="Gruppieren 31"/>
+          <p:cNvGrpSpPr/>
+          <p:nvPr/>
+        </p:nvGrpSpPr>
+        <p:grpSpPr>
+          <a:xfrm>
+            <a:off x="4906138" y="3278039"/>
+            <a:ext cx="763093" cy="246221"/>
+            <a:chOff x="2653308" y="1412776"/>
+            <a:chExt cx="763093" cy="246221"/>
+          </a:xfrm>
+        </p:grpSpPr>
+        <p:sp>
+          <p:nvSpPr>
+            <p:cNvPr id="33" name="Textfeld 32"/>
+            <p:cNvSpPr txBox="1"/>
+            <p:nvPr/>
+          </p:nvSpPr>
+          <p:spPr>
+            <a:xfrm>
+              <a:off x="2843808" y="1412776"/>
+              <a:ext cx="572593" cy="246221"/>
+            </a:xfrm>
+            <a:prstGeom prst="rect">
+              <a:avLst/>
+            </a:prstGeom>
+            <a:noFill/>
+          </p:spPr>
+          <p:txBody>
+            <a:bodyPr wrap="none" rtlCol="0">
+              <a:spAutoFit/>
+            </a:bodyPr>
+            <a:lstStyle/>
+            <a:p>
+              <a:r>
+                <a:rPr lang="de-DE" sz="1000" dirty="0" smtClean="0"/>
+                <a:t>Gunnar</a:t>
+              </a:r>
+              <a:endParaRPr lang="en-US" sz="1000" dirty="0"/>
+            </a:p>
+          </p:txBody>
+        </p:sp>
+        <p:pic>
+          <p:nvPicPr>
+            <p:cNvPr id="34" name="Picture 3" descr="C:\Users\MoritzTheile\eclipse_SupeYou\com.supeyou.app\src\main\webapp\heroPics\skype_smile.png"/>
+            <p:cNvPicPr>
+              <a:picLocks noChangeAspect="1" noChangeArrowheads="1"/>
+            </p:cNvPicPr>
+            <p:nvPr/>
+          </p:nvPicPr>
+          <p:blipFill>
+            <a:blip r:embed="rId2">
+              <a:extLst>
+                <a:ext uri="{28A0092B-C50C-407E-A947-70E740481C1C}">
+                  <a14:useLocalDpi xmlns:a14="http://schemas.microsoft.com/office/drawing/2010/main" val="0"/>
+                </a:ext>
+              </a:extLst>
+            </a:blip>
+            <a:srcRect/>
+            <a:stretch>
+              <a:fillRect/>
+            </a:stretch>
+          </p:blipFill>
+          <p:spPr bwMode="auto">
+            <a:xfrm>
+              <a:off x="2653308" y="1440636"/>
+              <a:ext cx="190500" cy="190500"/>
+            </a:xfrm>
+            <a:prstGeom prst="rect">
+              <a:avLst/>
+            </a:prstGeom>
+            <a:noFill/>
+            <a:extLst>
+              <a:ext uri="{909E8E84-426E-40DD-AFC4-6F175D3DCCD1}">
+                <a14:hiddenFill xmlns:a14="http://schemas.microsoft.com/office/drawing/2010/main">
+                  <a:solidFill>
+                    <a:srgbClr val="FFFFFF"/>
+                  </a:solidFill>
+                </a14:hiddenFill>
+              </a:ext>
+            </a:extLst>
+          </p:spPr>
+        </p:pic>
+      </p:grpSp>
+      <p:cxnSp>
+        <p:nvCxnSpPr>
+          <p:cNvPr id="35" name="Gekrümmte Verbindung 34"/>
+          <p:cNvCxnSpPr>
+            <a:stCxn id="109" idx="2"/>
+            <a:endCxn id="34" idx="0"/>
+          </p:cNvCxnSpPr>
+          <p:nvPr/>
+        </p:nvCxnSpPr>
+        <p:spPr>
+          <a:xfrm rot="5400000">
+            <a:off x="5048150" y="2726509"/>
+            <a:ext cx="532629" cy="626151"/>
+          </a:xfrm>
+          <a:prstGeom prst="curvedConnector3">
+            <a:avLst>
+              <a:gd name="adj1" fmla="val 50000"/>
+            </a:avLst>
+          </a:prstGeom>
+        </p:spPr>
+        <p:style>
+          <a:lnRef idx="1">
+            <a:schemeClr val="accent1"/>
+          </a:lnRef>
+          <a:fillRef idx="0">
+            <a:schemeClr val="accent1"/>
+          </a:fillRef>
+          <a:effectRef idx="0">
+            <a:schemeClr val="accent1"/>
+          </a:effectRef>
+          <a:fontRef idx="minor">
+            <a:schemeClr val="tx1"/>
+          </a:fontRef>
+        </p:style>
+      </p:cxnSp>
+      <p:grpSp>
+        <p:nvGrpSpPr>
+          <p:cNvPr id="36" name="Gruppieren 35"/>
+          <p:cNvGrpSpPr/>
+          <p:nvPr/>
+        </p:nvGrpSpPr>
+        <p:grpSpPr>
+          <a:xfrm>
+            <a:off x="5842242" y="3287563"/>
+            <a:ext cx="835228" cy="246221"/>
+            <a:chOff x="2653308" y="1412776"/>
+            <a:chExt cx="835228" cy="246221"/>
+          </a:xfrm>
+        </p:grpSpPr>
+        <p:sp>
+          <p:nvSpPr>
+            <p:cNvPr id="37" name="Textfeld 36"/>
+            <p:cNvSpPr txBox="1"/>
+            <p:nvPr/>
+          </p:nvSpPr>
+          <p:spPr>
+            <a:xfrm>
+              <a:off x="2843808" y="1412776"/>
+              <a:ext cx="644728" cy="246221"/>
+            </a:xfrm>
+            <a:prstGeom prst="rect">
+              <a:avLst/>
+            </a:prstGeom>
+            <a:noFill/>
+          </p:spPr>
+          <p:txBody>
+            <a:bodyPr wrap="none" rtlCol="0">
+              <a:spAutoFit/>
+            </a:bodyPr>
+            <a:lstStyle/>
+            <a:p>
+              <a:r>
+                <a:rPr lang="de-DE" sz="1000" dirty="0" smtClean="0"/>
+                <a:t>Christian</a:t>
+              </a:r>
+              <a:endParaRPr lang="en-US" sz="1000" dirty="0"/>
+            </a:p>
+          </p:txBody>
+        </p:sp>
+        <p:pic>
+          <p:nvPicPr>
+            <p:cNvPr id="38" name="Picture 3" descr="C:\Users\MoritzTheile\eclipse_SupeYou\com.supeyou.app\src\main\webapp\heroPics\skype_smile.png"/>
+            <p:cNvPicPr>
+              <a:picLocks noChangeAspect="1" noChangeArrowheads="1"/>
+            </p:cNvPicPr>
+            <p:nvPr/>
+          </p:nvPicPr>
+          <p:blipFill>
+            <a:blip r:embed="rId2">
+              <a:extLst>
+                <a:ext uri="{28A0092B-C50C-407E-A947-70E740481C1C}">
+                  <a14:useLocalDpi xmlns:a14="http://schemas.microsoft.com/office/drawing/2010/main" val="0"/>
+                </a:ext>
+              </a:extLst>
+            </a:blip>
+            <a:srcRect/>
+            <a:stretch>
+              <a:fillRect/>
+            </a:stretch>
+          </p:blipFill>
+          <p:spPr bwMode="auto">
+            <a:xfrm>
+              <a:off x="2653308" y="1440636"/>
+              <a:ext cx="190500" cy="190500"/>
+            </a:xfrm>
+            <a:prstGeom prst="rect">
+              <a:avLst/>
+            </a:prstGeom>
+            <a:noFill/>
+            <a:extLst>
+              <a:ext uri="{909E8E84-426E-40DD-AFC4-6F175D3DCCD1}">
+                <a14:hiddenFill xmlns:a14="http://schemas.microsoft.com/office/drawing/2010/main">
+                  <a:solidFill>
+                    <a:srgbClr val="FFFFFF"/>
+                  </a:solidFill>
+                </a14:hiddenFill>
+              </a:ext>
+            </a:extLst>
+          </p:spPr>
+        </p:pic>
+      </p:grpSp>
+      <p:cxnSp>
+        <p:nvCxnSpPr>
+          <p:cNvPr id="39" name="Gekrümmte Verbindung 38"/>
+          <p:cNvCxnSpPr>
+            <a:stCxn id="109" idx="2"/>
+            <a:endCxn id="38" idx="0"/>
+          </p:cNvCxnSpPr>
+          <p:nvPr/>
+        </p:nvCxnSpPr>
+        <p:spPr>
+          <a:xfrm rot="16200000" flipH="1">
+            <a:off x="5511439" y="2889369"/>
+            <a:ext cx="542153" cy="309953"/>
+          </a:xfrm>
+          <a:prstGeom prst="curvedConnector3">
+            <a:avLst>
+              <a:gd name="adj1" fmla="val 50000"/>
+            </a:avLst>
+          </a:prstGeom>
+        </p:spPr>
+        <p:style>
+          <a:lnRef idx="1">
+            <a:schemeClr val="accent1"/>
+          </a:lnRef>
+          <a:fillRef idx="0">
+            <a:schemeClr val="accent1"/>
+          </a:fillRef>
+          <a:effectRef idx="0">
+            <a:schemeClr val="accent1"/>
+          </a:effectRef>
+          <a:fontRef idx="minor">
+            <a:schemeClr val="tx1"/>
+          </a:fontRef>
+        </p:style>
+      </p:cxnSp>
+      <p:grpSp>
+        <p:nvGrpSpPr>
+          <p:cNvPr id="42" name="Gruppieren 41"/>
+          <p:cNvGrpSpPr/>
+          <p:nvPr/>
+        </p:nvGrpSpPr>
+        <p:grpSpPr>
+          <a:xfrm>
+            <a:off x="3970034" y="3281995"/>
+            <a:ext cx="682943" cy="246221"/>
+            <a:chOff x="2653308" y="1412776"/>
+            <a:chExt cx="682943" cy="246221"/>
+          </a:xfrm>
+        </p:grpSpPr>
+        <p:sp>
+          <p:nvSpPr>
+            <p:cNvPr id="43" name="Textfeld 42"/>
+            <p:cNvSpPr txBox="1"/>
+            <p:nvPr/>
+          </p:nvSpPr>
+          <p:spPr>
+            <a:xfrm>
+              <a:off x="2843808" y="1412776"/>
+              <a:ext cx="492443" cy="246221"/>
+            </a:xfrm>
+            <a:prstGeom prst="rect">
+              <a:avLst/>
+            </a:prstGeom>
+            <a:noFill/>
+          </p:spPr>
+          <p:txBody>
+            <a:bodyPr wrap="none" rtlCol="0">
+              <a:spAutoFit/>
+            </a:bodyPr>
+            <a:lstStyle/>
+            <a:p>
+              <a:r>
+                <a:rPr lang="de-DE" sz="1000" dirty="0" smtClean="0"/>
+                <a:t>Marie</a:t>
+              </a:r>
+              <a:endParaRPr lang="en-US" sz="1000" dirty="0"/>
+            </a:p>
+          </p:txBody>
+        </p:sp>
+        <p:pic>
+          <p:nvPicPr>
+            <p:cNvPr id="44" name="Picture 3" descr="C:\Users\MoritzTheile\eclipse_SupeYou\com.supeyou.app\src\main\webapp\heroPics\skype_smile.png"/>
+            <p:cNvPicPr>
+              <a:picLocks noChangeAspect="1" noChangeArrowheads="1"/>
+            </p:cNvPicPr>
+            <p:nvPr/>
+          </p:nvPicPr>
+          <p:blipFill>
+            <a:blip r:embed="rId2">
+              <a:extLst>
+                <a:ext uri="{28A0092B-C50C-407E-A947-70E740481C1C}">
+                  <a14:useLocalDpi xmlns:a14="http://schemas.microsoft.com/office/drawing/2010/main" val="0"/>
+                </a:ext>
+              </a:extLst>
+            </a:blip>
+            <a:srcRect/>
+            <a:stretch>
+              <a:fillRect/>
+            </a:stretch>
+          </p:blipFill>
+          <p:spPr bwMode="auto">
+            <a:xfrm>
+              <a:off x="2653308" y="1440636"/>
+              <a:ext cx="190500" cy="190500"/>
+            </a:xfrm>
+            <a:prstGeom prst="rect">
+              <a:avLst/>
+            </a:prstGeom>
+            <a:noFill/>
+            <a:extLst>
+              <a:ext uri="{909E8E84-426E-40DD-AFC4-6F175D3DCCD1}">
+                <a14:hiddenFill xmlns:a14="http://schemas.microsoft.com/office/drawing/2010/main">
+                  <a:solidFill>
+                    <a:srgbClr val="FFFFFF"/>
+                  </a:solidFill>
+                </a14:hiddenFill>
+              </a:ext>
+            </a:extLst>
+          </p:spPr>
+        </p:pic>
+      </p:grpSp>
+      <p:cxnSp>
+        <p:nvCxnSpPr>
+          <p:cNvPr id="45" name="Gekrümmte Verbindung 44"/>
+          <p:cNvCxnSpPr>
+            <a:stCxn id="108" idx="2"/>
+            <a:endCxn id="44" idx="0"/>
+          </p:cNvCxnSpPr>
+          <p:nvPr/>
+        </p:nvCxnSpPr>
+        <p:spPr>
+          <a:xfrm rot="5400000">
+            <a:off x="4206657" y="2631898"/>
+            <a:ext cx="536585" cy="819329"/>
+          </a:xfrm>
+          <a:prstGeom prst="curvedConnector3">
+            <a:avLst>
+              <a:gd name="adj1" fmla="val 50000"/>
+            </a:avLst>
+          </a:prstGeom>
+        </p:spPr>
+        <p:style>
+          <a:lnRef idx="1">
+            <a:schemeClr val="accent1"/>
+          </a:lnRef>
+          <a:fillRef idx="0">
+            <a:schemeClr val="accent1"/>
+          </a:fillRef>
+          <a:effectRef idx="0">
+            <a:schemeClr val="accent1"/>
+          </a:effectRef>
+          <a:fontRef idx="minor">
+            <a:schemeClr val="tx1"/>
+          </a:fontRef>
+        </p:style>
+      </p:cxnSp>
+      <p:grpSp>
+        <p:nvGrpSpPr>
+          <p:cNvPr id="48" name="Gruppieren 47"/>
+          <p:cNvGrpSpPr/>
+          <p:nvPr/>
+        </p:nvGrpSpPr>
+        <p:grpSpPr>
+          <a:xfrm>
+            <a:off x="6740396" y="3299423"/>
+            <a:ext cx="783932" cy="246221"/>
+            <a:chOff x="2653308" y="1412776"/>
+            <a:chExt cx="783932" cy="246221"/>
+          </a:xfrm>
+        </p:grpSpPr>
+        <p:sp>
+          <p:nvSpPr>
+            <p:cNvPr id="49" name="Textfeld 48"/>
+            <p:cNvSpPr txBox="1"/>
+            <p:nvPr/>
+          </p:nvSpPr>
+          <p:spPr>
+            <a:xfrm>
+              <a:off x="2843808" y="1412776"/>
+              <a:ext cx="593432" cy="246221"/>
+            </a:xfrm>
+            <a:prstGeom prst="rect">
+              <a:avLst/>
+            </a:prstGeom>
+            <a:noFill/>
+          </p:spPr>
+          <p:txBody>
+            <a:bodyPr wrap="none" rtlCol="0">
+              <a:spAutoFit/>
+            </a:bodyPr>
+            <a:lstStyle/>
+            <a:p>
+              <a:r>
+                <a:rPr lang="de-DE" sz="1000" dirty="0" smtClean="0"/>
+                <a:t>Herbert</a:t>
+              </a:r>
+              <a:endParaRPr lang="en-US" sz="1000" dirty="0"/>
+            </a:p>
+          </p:txBody>
+        </p:sp>
+        <p:pic>
+          <p:nvPicPr>
+            <p:cNvPr id="50" name="Picture 3" descr="C:\Users\MoritzTheile\eclipse_SupeYou\com.supeyou.app\src\main\webapp\heroPics\skype_smile.png"/>
+            <p:cNvPicPr>
+              <a:picLocks noChangeAspect="1" noChangeArrowheads="1"/>
+            </p:cNvPicPr>
+            <p:nvPr/>
+          </p:nvPicPr>
+          <p:blipFill>
+            <a:blip r:embed="rId2">
+              <a:extLst>
+                <a:ext uri="{28A0092B-C50C-407E-A947-70E740481C1C}">
+                  <a14:useLocalDpi xmlns:a14="http://schemas.microsoft.com/office/drawing/2010/main" val="0"/>
+                </a:ext>
+              </a:extLst>
+            </a:blip>
+            <a:srcRect/>
+            <a:stretch>
+              <a:fillRect/>
+            </a:stretch>
+          </p:blipFill>
+          <p:spPr bwMode="auto">
+            <a:xfrm>
+              <a:off x="2653308" y="1440636"/>
+              <a:ext cx="190500" cy="190500"/>
+            </a:xfrm>
+            <a:prstGeom prst="rect">
+              <a:avLst/>
+            </a:prstGeom>
+            <a:noFill/>
+            <a:extLst>
+              <a:ext uri="{909E8E84-426E-40DD-AFC4-6F175D3DCCD1}">
+                <a14:hiddenFill xmlns:a14="http://schemas.microsoft.com/office/drawing/2010/main">
+                  <a:solidFill>
+                    <a:srgbClr val="FFFFFF"/>
+                  </a:solidFill>
+                </a14:hiddenFill>
+              </a:ext>
+            </a:extLst>
+          </p:spPr>
+        </p:pic>
+      </p:grpSp>
+      <p:cxnSp>
+        <p:nvCxnSpPr>
+          <p:cNvPr id="51" name="Gekrümmte Verbindung 50"/>
+          <p:cNvCxnSpPr>
+            <a:stCxn id="109" idx="2"/>
+            <a:endCxn id="50" idx="0"/>
+          </p:cNvCxnSpPr>
+          <p:nvPr/>
+        </p:nvCxnSpPr>
+        <p:spPr>
+          <a:xfrm rot="16200000" flipH="1">
+            <a:off x="5954586" y="2446222"/>
+            <a:ext cx="554013" cy="1208107"/>
+          </a:xfrm>
+          <a:prstGeom prst="curvedConnector3">
+            <a:avLst>
+              <a:gd name="adj1" fmla="val 50000"/>
+            </a:avLst>
+          </a:prstGeom>
+        </p:spPr>
+        <p:style>
+          <a:lnRef idx="1">
+            <a:schemeClr val="accent1"/>
+          </a:lnRef>
+          <a:fillRef idx="0">
+            <a:schemeClr val="accent1"/>
+          </a:fillRef>
+          <a:effectRef idx="0">
+            <a:schemeClr val="accent1"/>
+          </a:effectRef>
+          <a:fontRef idx="minor">
+            <a:schemeClr val="tx1"/>
+          </a:fontRef>
+        </p:style>
+      </p:cxnSp>
+      <p:grpSp>
+        <p:nvGrpSpPr>
+          <p:cNvPr id="55" name="Gruppieren 54"/>
+          <p:cNvGrpSpPr/>
+          <p:nvPr/>
+        </p:nvGrpSpPr>
+        <p:grpSpPr>
+          <a:xfrm>
+            <a:off x="2817906" y="3277326"/>
+            <a:ext cx="862479" cy="246221"/>
+            <a:chOff x="2653308" y="1412776"/>
+            <a:chExt cx="862479" cy="246221"/>
+          </a:xfrm>
+        </p:grpSpPr>
+        <p:sp>
+          <p:nvSpPr>
+            <p:cNvPr id="56" name="Textfeld 55"/>
+            <p:cNvSpPr txBox="1"/>
+            <p:nvPr/>
+          </p:nvSpPr>
+          <p:spPr>
+            <a:xfrm>
+              <a:off x="2843808" y="1412776"/>
+              <a:ext cx="671979" cy="246221"/>
+            </a:xfrm>
+            <a:prstGeom prst="rect">
+              <a:avLst/>
+            </a:prstGeom>
+            <a:noFill/>
+          </p:spPr>
+          <p:txBody>
+            <a:bodyPr wrap="none" rtlCol="0">
+              <a:spAutoFit/>
+            </a:bodyPr>
+            <a:lstStyle/>
+            <a:p>
+              <a:r>
+                <a:rPr lang="de-DE" sz="1000" dirty="0" smtClean="0"/>
+                <a:t>Hermann</a:t>
+              </a:r>
+              <a:endParaRPr lang="en-US" sz="1000" dirty="0"/>
+            </a:p>
+          </p:txBody>
+        </p:sp>
+        <p:pic>
+          <p:nvPicPr>
+            <p:cNvPr id="57" name="Picture 3" descr="C:\Users\MoritzTheile\eclipse_SupeYou\com.supeyou.app\src\main\webapp\heroPics\skype_smile.png"/>
+            <p:cNvPicPr>
+              <a:picLocks noChangeAspect="1" noChangeArrowheads="1"/>
+            </p:cNvPicPr>
+            <p:nvPr/>
+          </p:nvPicPr>
+          <p:blipFill>
+            <a:blip r:embed="rId2">
+              <a:extLst>
+                <a:ext uri="{28A0092B-C50C-407E-A947-70E740481C1C}">
+                  <a14:useLocalDpi xmlns:a14="http://schemas.microsoft.com/office/drawing/2010/main" val="0"/>
+                </a:ext>
+              </a:extLst>
+            </a:blip>
+            <a:srcRect/>
+            <a:stretch>
+              <a:fillRect/>
+            </a:stretch>
+          </p:blipFill>
+          <p:spPr bwMode="auto">
+            <a:xfrm>
+              <a:off x="2653308" y="1440636"/>
+              <a:ext cx="190500" cy="190500"/>
+            </a:xfrm>
+            <a:prstGeom prst="rect">
+              <a:avLst/>
+            </a:prstGeom>
+            <a:noFill/>
+            <a:extLst>
+              <a:ext uri="{909E8E84-426E-40DD-AFC4-6F175D3DCCD1}">
+                <a14:hiddenFill xmlns:a14="http://schemas.microsoft.com/office/drawing/2010/main">
+                  <a:solidFill>
+                    <a:srgbClr val="FFFFFF"/>
+                  </a:solidFill>
+                </a14:hiddenFill>
+              </a:ext>
+            </a:extLst>
+          </p:spPr>
+        </p:pic>
+      </p:grpSp>
+      <p:cxnSp>
+        <p:nvCxnSpPr>
+          <p:cNvPr id="58" name="Gekrümmte Verbindung 57"/>
+          <p:cNvCxnSpPr>
+            <a:stCxn id="98" idx="2"/>
+            <a:endCxn id="57" idx="0"/>
+          </p:cNvCxnSpPr>
+          <p:nvPr/>
+        </p:nvCxnSpPr>
+        <p:spPr>
+          <a:xfrm rot="16200000" flipH="1">
+            <a:off x="2639823" y="3031853"/>
+            <a:ext cx="531916" cy="14750"/>
+          </a:xfrm>
+          <a:prstGeom prst="curvedConnector3">
+            <a:avLst>
+              <a:gd name="adj1" fmla="val 50000"/>
+            </a:avLst>
+          </a:prstGeom>
+        </p:spPr>
+        <p:style>
+          <a:lnRef idx="1">
+            <a:schemeClr val="accent1"/>
+          </a:lnRef>
+          <a:fillRef idx="0">
+            <a:schemeClr val="accent1"/>
+          </a:fillRef>
+          <a:effectRef idx="0">
+            <a:schemeClr val="accent1"/>
+          </a:effectRef>
+          <a:fontRef idx="minor">
+            <a:schemeClr val="tx1"/>
+          </a:fontRef>
+        </p:style>
+      </p:cxnSp>
+      <p:grpSp>
+        <p:nvGrpSpPr>
+          <p:cNvPr id="59" name="Gruppieren 58"/>
+          <p:cNvGrpSpPr/>
+          <p:nvPr/>
+        </p:nvGrpSpPr>
+        <p:grpSpPr>
+          <a:xfrm>
+            <a:off x="1809794" y="3281282"/>
+            <a:ext cx="703782" cy="246221"/>
+            <a:chOff x="2653308" y="1412776"/>
+            <a:chExt cx="703782" cy="246221"/>
+          </a:xfrm>
+        </p:grpSpPr>
+        <p:sp>
+          <p:nvSpPr>
+            <p:cNvPr id="60" name="Textfeld 59"/>
+            <p:cNvSpPr txBox="1"/>
+            <p:nvPr/>
+          </p:nvSpPr>
+          <p:spPr>
+            <a:xfrm>
+              <a:off x="2843808" y="1412776"/>
+              <a:ext cx="513282" cy="246221"/>
+            </a:xfrm>
+            <a:prstGeom prst="rect">
+              <a:avLst/>
+            </a:prstGeom>
+            <a:noFill/>
+          </p:spPr>
+          <p:txBody>
+            <a:bodyPr wrap="none" rtlCol="0">
+              <a:spAutoFit/>
+            </a:bodyPr>
+            <a:lstStyle/>
+            <a:p>
+              <a:r>
+                <a:rPr lang="de-DE" sz="1000" dirty="0" smtClean="0"/>
+                <a:t>Emma</a:t>
+              </a:r>
+              <a:endParaRPr lang="en-US" sz="1000" dirty="0"/>
+            </a:p>
+          </p:txBody>
+        </p:sp>
+        <p:pic>
+          <p:nvPicPr>
+            <p:cNvPr id="61" name="Picture 3" descr="C:\Users\MoritzTheile\eclipse_SupeYou\com.supeyou.app\src\main\webapp\heroPics\skype_smile.png"/>
+            <p:cNvPicPr>
+              <a:picLocks noChangeAspect="1" noChangeArrowheads="1"/>
+            </p:cNvPicPr>
+            <p:nvPr/>
+          </p:nvPicPr>
+          <p:blipFill>
+            <a:blip r:embed="rId2">
+              <a:extLst>
+                <a:ext uri="{28A0092B-C50C-407E-A947-70E740481C1C}">
+                  <a14:useLocalDpi xmlns:a14="http://schemas.microsoft.com/office/drawing/2010/main" val="0"/>
+                </a:ext>
+              </a:extLst>
+            </a:blip>
+            <a:srcRect/>
+            <a:stretch>
+              <a:fillRect/>
+            </a:stretch>
+          </p:blipFill>
+          <p:spPr bwMode="auto">
+            <a:xfrm>
+              <a:off x="2653308" y="1440636"/>
+              <a:ext cx="190500" cy="190500"/>
+            </a:xfrm>
+            <a:prstGeom prst="rect">
+              <a:avLst/>
+            </a:prstGeom>
+            <a:noFill/>
+            <a:extLst>
+              <a:ext uri="{909E8E84-426E-40DD-AFC4-6F175D3DCCD1}">
+                <a14:hiddenFill xmlns:a14="http://schemas.microsoft.com/office/drawing/2010/main">
+                  <a:solidFill>
+                    <a:srgbClr val="FFFFFF"/>
+                  </a:solidFill>
+                </a14:hiddenFill>
+              </a:ext>
+            </a:extLst>
+          </p:spPr>
+        </p:pic>
+      </p:grpSp>
+      <p:cxnSp>
+        <p:nvCxnSpPr>
+          <p:cNvPr id="62" name="Gekrümmte Verbindung 61"/>
+          <p:cNvCxnSpPr>
+            <a:stCxn id="97" idx="2"/>
+            <a:endCxn id="61" idx="0"/>
+          </p:cNvCxnSpPr>
+          <p:nvPr/>
+        </p:nvCxnSpPr>
+        <p:spPr>
+          <a:xfrm rot="5400000">
+            <a:off x="1662152" y="3016163"/>
+            <a:ext cx="535872" cy="50087"/>
+          </a:xfrm>
+          <a:prstGeom prst="curvedConnector3">
+            <a:avLst>
+              <a:gd name="adj1" fmla="val 50000"/>
+            </a:avLst>
+          </a:prstGeom>
+        </p:spPr>
+        <p:style>
+          <a:lnRef idx="1">
+            <a:schemeClr val="accent1"/>
+          </a:lnRef>
+          <a:fillRef idx="0">
+            <a:schemeClr val="accent1"/>
+          </a:fillRef>
+          <a:effectRef idx="0">
+            <a:schemeClr val="accent1"/>
+          </a:effectRef>
+          <a:fontRef idx="minor">
+            <a:schemeClr val="tx1"/>
+          </a:fontRef>
+        </p:style>
+      </p:cxnSp>
+      <p:grpSp>
+        <p:nvGrpSpPr>
+          <p:cNvPr id="65" name="Gruppieren 64"/>
+          <p:cNvGrpSpPr/>
+          <p:nvPr/>
+        </p:nvGrpSpPr>
+        <p:grpSpPr>
+          <a:xfrm>
+            <a:off x="2652371" y="4502173"/>
+            <a:ext cx="697370" cy="246221"/>
+            <a:chOff x="2653308" y="1412776"/>
+            <a:chExt cx="697370" cy="246221"/>
+          </a:xfrm>
+        </p:grpSpPr>
+        <p:sp>
+          <p:nvSpPr>
+            <p:cNvPr id="66" name="Textfeld 65"/>
+            <p:cNvSpPr txBox="1"/>
+            <p:nvPr/>
+          </p:nvSpPr>
+          <p:spPr>
+            <a:xfrm>
+              <a:off x="2843808" y="1412776"/>
+              <a:ext cx="506870" cy="246221"/>
+            </a:xfrm>
+            <a:prstGeom prst="rect">
+              <a:avLst/>
+            </a:prstGeom>
+            <a:noFill/>
+          </p:spPr>
+          <p:txBody>
+            <a:bodyPr wrap="none" rtlCol="0">
+              <a:spAutoFit/>
+            </a:bodyPr>
+            <a:lstStyle/>
+            <a:p>
+              <a:r>
+                <a:rPr lang="de-DE" sz="1000" dirty="0" smtClean="0"/>
+                <a:t>Eugen</a:t>
+              </a:r>
+              <a:endParaRPr lang="en-US" sz="1000" dirty="0"/>
+            </a:p>
+          </p:txBody>
+        </p:sp>
+        <p:pic>
+          <p:nvPicPr>
+            <p:cNvPr id="67" name="Picture 3" descr="C:\Users\MoritzTheile\eclipse_SupeYou\com.supeyou.app\src\main\webapp\heroPics\skype_smile.png"/>
+            <p:cNvPicPr>
+              <a:picLocks noChangeAspect="1" noChangeArrowheads="1"/>
+            </p:cNvPicPr>
+            <p:nvPr/>
+          </p:nvPicPr>
+          <p:blipFill>
+            <a:blip r:embed="rId2">
+              <a:extLst>
+                <a:ext uri="{28A0092B-C50C-407E-A947-70E740481C1C}">
+                  <a14:useLocalDpi xmlns:a14="http://schemas.microsoft.com/office/drawing/2010/main" val="0"/>
+                </a:ext>
+              </a:extLst>
+            </a:blip>
+            <a:srcRect/>
+            <a:stretch>
+              <a:fillRect/>
+            </a:stretch>
+          </p:blipFill>
+          <p:spPr bwMode="auto">
+            <a:xfrm>
+              <a:off x="2653308" y="1440636"/>
+              <a:ext cx="190500" cy="190500"/>
+            </a:xfrm>
+            <a:prstGeom prst="rect">
+              <a:avLst/>
+            </a:prstGeom>
+            <a:noFill/>
+            <a:extLst>
+              <a:ext uri="{909E8E84-426E-40DD-AFC4-6F175D3DCCD1}">
+                <a14:hiddenFill xmlns:a14="http://schemas.microsoft.com/office/drawing/2010/main">
+                  <a:solidFill>
+                    <a:srgbClr val="FFFFFF"/>
+                  </a:solidFill>
+                </a14:hiddenFill>
+              </a:ext>
+            </a:extLst>
+          </p:spPr>
+        </p:pic>
+      </p:grpSp>
+      <p:cxnSp>
+        <p:nvCxnSpPr>
+          <p:cNvPr id="68" name="Gekrümmte Verbindung 67"/>
+          <p:cNvCxnSpPr>
+            <a:endCxn id="67" idx="0"/>
+          </p:cNvCxnSpPr>
+          <p:nvPr/>
+        </p:nvCxnSpPr>
+        <p:spPr>
+          <a:xfrm rot="5400000">
+            <a:off x="2636084" y="4252960"/>
+            <a:ext cx="388611" cy="165535"/>
+          </a:xfrm>
+          <a:prstGeom prst="curvedConnector3">
+            <a:avLst>
+              <a:gd name="adj1" fmla="val 50000"/>
+            </a:avLst>
+          </a:prstGeom>
+        </p:spPr>
+        <p:style>
+          <a:lnRef idx="1">
+            <a:schemeClr val="accent1"/>
+          </a:lnRef>
+          <a:fillRef idx="0">
+            <a:schemeClr val="accent1"/>
+          </a:fillRef>
+          <a:effectRef idx="0">
+            <a:schemeClr val="accent1"/>
+          </a:effectRef>
+          <a:fontRef idx="minor">
+            <a:schemeClr val="tx1"/>
+          </a:fontRef>
+        </p:style>
+      </p:cxnSp>
+      <p:sp>
+        <p:nvSpPr>
+          <p:cNvPr id="2" name="Rechteck 1"/>
+          <p:cNvSpPr/>
+          <p:nvPr/>
+        </p:nvSpPr>
+        <p:spPr>
+          <a:xfrm>
+            <a:off x="3171779" y="1052736"/>
+            <a:ext cx="382886" cy="360040"/>
+          </a:xfrm>
+          <a:prstGeom prst="rect">
+            <a:avLst/>
+          </a:prstGeom>
+          <a:noFill/>
+          <a:ln w="12700">
+            <a:solidFill>
+              <a:schemeClr val="bg1">
+                <a:lumMod val="50000"/>
+              </a:schemeClr>
+            </a:solidFill>
+          </a:ln>
+        </p:spPr>
+        <p:style>
+          <a:lnRef idx="2">
+            <a:schemeClr val="accent1">
+              <a:shade val="50000"/>
+            </a:schemeClr>
+          </a:lnRef>
+          <a:fillRef idx="1">
+            <a:schemeClr val="accent1"/>
+          </a:fillRef>
+          <a:effectRef idx="0">
+            <a:schemeClr val="accent1"/>
+          </a:effectRef>
+          <a:fontRef idx="minor">
+            <a:schemeClr val="lt1"/>
+          </a:fontRef>
+        </p:style>
+        <p:txBody>
+          <a:bodyPr lIns="0" tIns="0" rIns="0" bIns="0" rtlCol="0" anchor="ctr"/>
+          <a:lstStyle/>
+          <a:p>
+            <a:pPr algn="ctr"/>
+            <a:r>
+              <a:rPr lang="de-DE" sz="900" dirty="0" smtClean="0">
+                <a:solidFill>
+                  <a:schemeClr val="tx1">
+                    <a:lumMod val="50000"/>
+                    <a:lumOff val="50000"/>
+                  </a:schemeClr>
+                </a:solidFill>
+              </a:rPr>
+              <a:t>01.05. </a:t>
+            </a:r>
+          </a:p>
+          <a:p>
+            <a:pPr algn="ctr"/>
+            <a:r>
+              <a:rPr lang="de-DE" sz="900" dirty="0" smtClean="0">
+                <a:solidFill>
+                  <a:schemeClr val="tx1">
+                    <a:lumMod val="50000"/>
+                    <a:lumOff val="50000"/>
+                  </a:schemeClr>
+                </a:solidFill>
+              </a:rPr>
+              <a:t>19:45</a:t>
+            </a:r>
+            <a:endParaRPr lang="en-US" sz="900" dirty="0">
+              <a:solidFill>
+                <a:schemeClr val="tx1">
+                  <a:lumMod val="50000"/>
+                  <a:lumOff val="50000"/>
+                </a:schemeClr>
+              </a:solidFill>
+            </a:endParaRPr>
+          </a:p>
+        </p:txBody>
+      </p:sp>
+      <p:cxnSp>
+        <p:nvCxnSpPr>
+          <p:cNvPr id="63" name="Gekrümmte Verbindung 62"/>
+          <p:cNvCxnSpPr>
+            <a:stCxn id="1027" idx="2"/>
+            <a:endCxn id="2" idx="0"/>
+          </p:cNvCxnSpPr>
+          <p:nvPr/>
+        </p:nvCxnSpPr>
+        <p:spPr>
+          <a:xfrm rot="5400000">
+            <a:off x="3584167" y="618103"/>
+            <a:ext cx="213688" cy="655578"/>
+          </a:xfrm>
+          <a:prstGeom prst="curvedConnector3">
+            <a:avLst>
+              <a:gd name="adj1" fmla="val 50000"/>
+            </a:avLst>
+          </a:prstGeom>
+        </p:spPr>
+        <p:style>
+          <a:lnRef idx="1">
+            <a:schemeClr val="accent1"/>
+          </a:lnRef>
+          <a:fillRef idx="0">
+            <a:schemeClr val="accent1"/>
+          </a:fillRef>
+          <a:effectRef idx="0">
+            <a:schemeClr val="accent1"/>
+          </a:effectRef>
+          <a:fontRef idx="minor">
+            <a:schemeClr val="tx1"/>
+          </a:fontRef>
+        </p:style>
+      </p:cxnSp>
+      <p:sp>
+        <p:nvSpPr>
+          <p:cNvPr id="64" name="Rechteck 63"/>
+          <p:cNvSpPr/>
+          <p:nvPr/>
+        </p:nvSpPr>
+        <p:spPr>
+          <a:xfrm>
+            <a:off x="4832309" y="1052736"/>
+            <a:ext cx="382886" cy="360040"/>
+          </a:xfrm>
+          <a:prstGeom prst="rect">
+            <a:avLst/>
+          </a:prstGeom>
+          <a:noFill/>
+          <a:ln w="12700">
+            <a:solidFill>
+              <a:schemeClr val="bg1">
+                <a:lumMod val="50000"/>
+              </a:schemeClr>
+            </a:solidFill>
+          </a:ln>
+        </p:spPr>
+        <p:style>
+          <a:lnRef idx="2">
+            <a:schemeClr val="accent1">
+              <a:shade val="50000"/>
+            </a:schemeClr>
+          </a:lnRef>
+          <a:fillRef idx="1">
+            <a:schemeClr val="accent1"/>
+          </a:fillRef>
+          <a:effectRef idx="0">
+            <a:schemeClr val="accent1"/>
+          </a:effectRef>
+          <a:fontRef idx="minor">
+            <a:schemeClr val="lt1"/>
+          </a:fontRef>
+        </p:style>
+        <p:txBody>
+          <a:bodyPr lIns="0" tIns="0" rIns="0" bIns="0" rtlCol="0" anchor="ctr"/>
+          <a:lstStyle/>
+          <a:p>
+            <a:pPr algn="ctr"/>
+            <a:r>
+              <a:rPr lang="de-DE" sz="900" dirty="0" smtClean="0">
+                <a:solidFill>
+                  <a:schemeClr val="tx1">
+                    <a:lumMod val="50000"/>
+                    <a:lumOff val="50000"/>
+                  </a:schemeClr>
+                </a:solidFill>
+              </a:rPr>
+              <a:t>01.05. </a:t>
+            </a:r>
+          </a:p>
+          <a:p>
+            <a:pPr algn="ctr"/>
+            <a:r>
+              <a:rPr lang="de-DE" sz="900" dirty="0" smtClean="0">
+                <a:solidFill>
+                  <a:schemeClr val="tx1">
+                    <a:lumMod val="50000"/>
+                    <a:lumOff val="50000"/>
+                  </a:schemeClr>
+                </a:solidFill>
+              </a:rPr>
+              <a:t>19:48</a:t>
+            </a:r>
+            <a:endParaRPr lang="en-US" sz="900" dirty="0">
+              <a:solidFill>
+                <a:schemeClr val="tx1">
+                  <a:lumMod val="50000"/>
+                  <a:lumOff val="50000"/>
+                </a:schemeClr>
+              </a:solidFill>
+            </a:endParaRPr>
+          </a:p>
+        </p:txBody>
+      </p:sp>
+      <p:cxnSp>
+        <p:nvCxnSpPr>
+          <p:cNvPr id="69" name="Gekrümmte Verbindung 68"/>
+          <p:cNvCxnSpPr>
+            <a:stCxn id="64" idx="2"/>
+            <a:endCxn id="28" idx="0"/>
+          </p:cNvCxnSpPr>
+          <p:nvPr/>
+        </p:nvCxnSpPr>
+        <p:spPr>
+          <a:xfrm rot="16200000" flipH="1">
+            <a:off x="5095866" y="1340662"/>
+            <a:ext cx="397424" cy="541652"/>
+          </a:xfrm>
+          <a:prstGeom prst="curvedConnector3">
+            <a:avLst>
+              <a:gd name="adj1" fmla="val 50000"/>
+            </a:avLst>
+          </a:prstGeom>
+        </p:spPr>
+        <p:style>
+          <a:lnRef idx="1">
+            <a:schemeClr val="accent1"/>
+          </a:lnRef>
+          <a:fillRef idx="0">
+            <a:schemeClr val="accent1"/>
+          </a:fillRef>
+          <a:effectRef idx="0">
+            <a:schemeClr val="accent1"/>
+          </a:effectRef>
+          <a:fontRef idx="minor">
+            <a:schemeClr val="tx1"/>
+          </a:fontRef>
+        </p:style>
+      </p:cxnSp>
+      <p:sp>
+        <p:nvSpPr>
+          <p:cNvPr id="97" name="Rechteck 96"/>
+          <p:cNvSpPr/>
+          <p:nvPr/>
+        </p:nvSpPr>
+        <p:spPr>
+          <a:xfrm>
+            <a:off x="1763688" y="2413230"/>
+            <a:ext cx="382886" cy="360040"/>
+          </a:xfrm>
+          <a:prstGeom prst="rect">
+            <a:avLst/>
+          </a:prstGeom>
+          <a:noFill/>
+          <a:ln w="12700">
+            <a:solidFill>
+              <a:schemeClr val="bg1">
+                <a:lumMod val="50000"/>
+              </a:schemeClr>
+            </a:solidFill>
+          </a:ln>
+        </p:spPr>
+        <p:style>
+          <a:lnRef idx="2">
+            <a:schemeClr val="accent1">
+              <a:shade val="50000"/>
+            </a:schemeClr>
+          </a:lnRef>
+          <a:fillRef idx="1">
+            <a:schemeClr val="accent1"/>
+          </a:fillRef>
+          <a:effectRef idx="0">
+            <a:schemeClr val="accent1"/>
+          </a:effectRef>
+          <a:fontRef idx="minor">
+            <a:schemeClr val="lt1"/>
+          </a:fontRef>
+        </p:style>
+        <p:txBody>
+          <a:bodyPr lIns="0" tIns="0" rIns="0" bIns="0" rtlCol="0" anchor="ctr"/>
+          <a:lstStyle/>
+          <a:p>
+            <a:pPr algn="ctr"/>
+            <a:r>
+              <a:rPr lang="de-DE" sz="900" dirty="0" smtClean="0">
+                <a:solidFill>
+                  <a:schemeClr val="tx1">
+                    <a:lumMod val="50000"/>
+                    <a:lumOff val="50000"/>
+                  </a:schemeClr>
+                </a:solidFill>
+              </a:rPr>
+              <a:t>01.05. </a:t>
+            </a:r>
+          </a:p>
+          <a:p>
+            <a:pPr algn="ctr"/>
+            <a:r>
+              <a:rPr lang="de-DE" sz="900" dirty="0" smtClean="0">
+                <a:solidFill>
+                  <a:schemeClr val="tx1">
+                    <a:lumMod val="50000"/>
+                    <a:lumOff val="50000"/>
+                  </a:schemeClr>
+                </a:solidFill>
+              </a:rPr>
+              <a:t>22:25</a:t>
+            </a:r>
+            <a:endParaRPr lang="en-US" sz="900" dirty="0">
+              <a:solidFill>
+                <a:schemeClr val="tx1">
+                  <a:lumMod val="50000"/>
+                  <a:lumOff val="50000"/>
+                </a:schemeClr>
+              </a:solidFill>
+            </a:endParaRPr>
+          </a:p>
+        </p:txBody>
+      </p:sp>
+      <p:sp>
+        <p:nvSpPr>
+          <p:cNvPr id="98" name="Rechteck 97"/>
+          <p:cNvSpPr/>
+          <p:nvPr/>
+        </p:nvSpPr>
+        <p:spPr>
+          <a:xfrm>
+            <a:off x="2706963" y="2413230"/>
+            <a:ext cx="382886" cy="360040"/>
+          </a:xfrm>
+          <a:prstGeom prst="rect">
+            <a:avLst/>
+          </a:prstGeom>
+          <a:noFill/>
+          <a:ln w="12700">
+            <a:solidFill>
+              <a:schemeClr val="bg1">
+                <a:lumMod val="50000"/>
+              </a:schemeClr>
+            </a:solidFill>
+          </a:ln>
+        </p:spPr>
+        <p:style>
+          <a:lnRef idx="2">
+            <a:schemeClr val="accent1">
+              <a:shade val="50000"/>
+            </a:schemeClr>
+          </a:lnRef>
+          <a:fillRef idx="1">
+            <a:schemeClr val="accent1"/>
+          </a:fillRef>
+          <a:effectRef idx="0">
+            <a:schemeClr val="accent1"/>
+          </a:effectRef>
+          <a:fontRef idx="minor">
+            <a:schemeClr val="lt1"/>
+          </a:fontRef>
+        </p:style>
+        <p:txBody>
+          <a:bodyPr lIns="0" tIns="0" rIns="0" bIns="0" rtlCol="0" anchor="ctr"/>
+          <a:lstStyle/>
+          <a:p>
+            <a:pPr algn="ctr"/>
+            <a:r>
+              <a:rPr lang="de-DE" sz="900" dirty="0" smtClean="0">
+                <a:solidFill>
+                  <a:schemeClr val="tx1">
+                    <a:lumMod val="50000"/>
+                    <a:lumOff val="50000"/>
+                  </a:schemeClr>
+                </a:solidFill>
+              </a:rPr>
+              <a:t>01.05. </a:t>
+            </a:r>
+          </a:p>
+          <a:p>
+            <a:pPr algn="ctr"/>
+            <a:r>
+              <a:rPr lang="de-DE" sz="900" dirty="0" smtClean="0">
+                <a:solidFill>
+                  <a:schemeClr val="tx1">
+                    <a:lumMod val="50000"/>
+                    <a:lumOff val="50000"/>
+                  </a:schemeClr>
+                </a:solidFill>
+              </a:rPr>
+              <a:t>22:32</a:t>
+            </a:r>
+            <a:endParaRPr lang="en-US" sz="900" dirty="0">
+              <a:solidFill>
+                <a:schemeClr val="tx1">
+                  <a:lumMod val="50000"/>
+                  <a:lumOff val="50000"/>
+                </a:schemeClr>
+              </a:solidFill>
+            </a:endParaRPr>
+          </a:p>
+        </p:txBody>
+      </p:sp>
+      <p:cxnSp>
+        <p:nvCxnSpPr>
+          <p:cNvPr id="101" name="Gekrümmte Verbindung 100"/>
+          <p:cNvCxnSpPr>
+            <a:stCxn id="9" idx="2"/>
+            <a:endCxn id="97" idx="0"/>
+          </p:cNvCxnSpPr>
+          <p:nvPr/>
+        </p:nvCxnSpPr>
+        <p:spPr>
+          <a:xfrm rot="5400000">
+            <a:off x="2011772" y="1934535"/>
+            <a:ext cx="422054" cy="535336"/>
+          </a:xfrm>
+          <a:prstGeom prst="curvedConnector3">
+            <a:avLst>
+              <a:gd name="adj1" fmla="val 50000"/>
+            </a:avLst>
+          </a:prstGeom>
+        </p:spPr>
+        <p:style>
+          <a:lnRef idx="1">
+            <a:schemeClr val="accent1"/>
+          </a:lnRef>
+          <a:fillRef idx="0">
+            <a:schemeClr val="accent1"/>
+          </a:fillRef>
+          <a:effectRef idx="0">
+            <a:schemeClr val="accent1"/>
+          </a:effectRef>
+          <a:fontRef idx="minor">
+            <a:schemeClr val="tx1"/>
+          </a:fontRef>
+        </p:style>
+      </p:cxnSp>
+      <p:cxnSp>
+        <p:nvCxnSpPr>
+          <p:cNvPr id="104" name="Gekrümmte Verbindung 103"/>
+          <p:cNvCxnSpPr>
+            <a:stCxn id="9" idx="2"/>
+            <a:endCxn id="98" idx="0"/>
+          </p:cNvCxnSpPr>
+          <p:nvPr/>
+        </p:nvCxnSpPr>
+        <p:spPr>
+          <a:xfrm rot="16200000" flipH="1">
+            <a:off x="2483409" y="1998233"/>
+            <a:ext cx="422054" cy="407939"/>
+          </a:xfrm>
+          <a:prstGeom prst="curvedConnector3">
+            <a:avLst>
+              <a:gd name="adj1" fmla="val 50000"/>
+            </a:avLst>
+          </a:prstGeom>
+        </p:spPr>
+        <p:style>
+          <a:lnRef idx="1">
+            <a:schemeClr val="accent1"/>
+          </a:lnRef>
+          <a:fillRef idx="0">
+            <a:schemeClr val="accent1"/>
+          </a:fillRef>
+          <a:effectRef idx="0">
+            <a:schemeClr val="accent1"/>
+          </a:effectRef>
+          <a:fontRef idx="minor">
+            <a:schemeClr val="tx1"/>
+          </a:fontRef>
+        </p:style>
+      </p:cxnSp>
+      <p:sp>
+        <p:nvSpPr>
+          <p:cNvPr id="107" name="Rechteck 106"/>
+          <p:cNvSpPr/>
+          <p:nvPr/>
+        </p:nvSpPr>
+        <p:spPr>
+          <a:xfrm>
+            <a:off x="3749895" y="2413230"/>
+            <a:ext cx="382886" cy="360040"/>
+          </a:xfrm>
+          <a:prstGeom prst="rect">
+            <a:avLst/>
+          </a:prstGeom>
+          <a:noFill/>
+          <a:ln w="12700">
+            <a:solidFill>
+              <a:schemeClr val="bg1">
+                <a:lumMod val="50000"/>
+              </a:schemeClr>
+            </a:solidFill>
+          </a:ln>
+        </p:spPr>
+        <p:style>
+          <a:lnRef idx="2">
+            <a:schemeClr val="accent1">
+              <a:shade val="50000"/>
+            </a:schemeClr>
+          </a:lnRef>
+          <a:fillRef idx="1">
+            <a:schemeClr val="accent1"/>
+          </a:fillRef>
+          <a:effectRef idx="0">
+            <a:schemeClr val="accent1"/>
+          </a:effectRef>
+          <a:fontRef idx="minor">
+            <a:schemeClr val="lt1"/>
+          </a:fontRef>
+        </p:style>
+        <p:txBody>
+          <a:bodyPr lIns="0" tIns="0" rIns="0" bIns="0" rtlCol="0" anchor="ctr"/>
+          <a:lstStyle/>
+          <a:p>
+            <a:pPr algn="ctr"/>
+            <a:r>
+              <a:rPr lang="de-DE" sz="900" dirty="0" smtClean="0">
+                <a:solidFill>
+                  <a:schemeClr val="tx1">
+                    <a:lumMod val="50000"/>
+                    <a:lumOff val="50000"/>
+                  </a:schemeClr>
+                </a:solidFill>
+              </a:rPr>
+              <a:t>02.05. </a:t>
+            </a:r>
+          </a:p>
+          <a:p>
+            <a:pPr algn="ctr"/>
+            <a:r>
+              <a:rPr lang="de-DE" sz="900" dirty="0" smtClean="0">
+                <a:solidFill>
+                  <a:schemeClr val="tx1">
+                    <a:lumMod val="50000"/>
+                    <a:lumOff val="50000"/>
+                  </a:schemeClr>
+                </a:solidFill>
+              </a:rPr>
+              <a:t>10:45</a:t>
+            </a:r>
+            <a:endParaRPr lang="en-US" sz="900" dirty="0">
+              <a:solidFill>
+                <a:schemeClr val="tx1">
+                  <a:lumMod val="50000"/>
+                  <a:lumOff val="50000"/>
+                </a:schemeClr>
+              </a:solidFill>
+            </a:endParaRPr>
+          </a:p>
+        </p:txBody>
+      </p:sp>
+      <p:sp>
+        <p:nvSpPr>
+          <p:cNvPr id="108" name="Rechteck 107"/>
+          <p:cNvSpPr/>
+          <p:nvPr/>
+        </p:nvSpPr>
+        <p:spPr>
+          <a:xfrm>
+            <a:off x="4693170" y="2413230"/>
+            <a:ext cx="382886" cy="360040"/>
+          </a:xfrm>
+          <a:prstGeom prst="rect">
+            <a:avLst/>
+          </a:prstGeom>
+          <a:noFill/>
+          <a:ln w="12700">
+            <a:solidFill>
+              <a:schemeClr val="bg1">
+                <a:lumMod val="50000"/>
+              </a:schemeClr>
+            </a:solidFill>
+          </a:ln>
+        </p:spPr>
+        <p:style>
+          <a:lnRef idx="2">
+            <a:schemeClr val="accent1">
+              <a:shade val="50000"/>
+            </a:schemeClr>
+          </a:lnRef>
+          <a:fillRef idx="1">
+            <a:schemeClr val="accent1"/>
+          </a:fillRef>
+          <a:effectRef idx="0">
+            <a:schemeClr val="accent1"/>
+          </a:effectRef>
+          <a:fontRef idx="minor">
+            <a:schemeClr val="lt1"/>
+          </a:fontRef>
+        </p:style>
+        <p:txBody>
+          <a:bodyPr lIns="0" tIns="0" rIns="0" bIns="0" rtlCol="0" anchor="ctr"/>
+          <a:lstStyle/>
+          <a:p>
+            <a:pPr algn="ctr"/>
+            <a:r>
+              <a:rPr lang="de-DE" sz="900" dirty="0" smtClean="0">
+                <a:solidFill>
+                  <a:schemeClr val="tx1">
+                    <a:lumMod val="50000"/>
+                    <a:lumOff val="50000"/>
+                  </a:schemeClr>
+                </a:solidFill>
+              </a:rPr>
+              <a:t>02.05. </a:t>
+            </a:r>
+          </a:p>
+          <a:p>
+            <a:pPr algn="ctr"/>
+            <a:r>
+              <a:rPr lang="de-DE" sz="900" dirty="0" smtClean="0">
+                <a:solidFill>
+                  <a:schemeClr val="tx1">
+                    <a:lumMod val="50000"/>
+                    <a:lumOff val="50000"/>
+                  </a:schemeClr>
+                </a:solidFill>
+              </a:rPr>
+              <a:t>12:43</a:t>
+            </a:r>
+            <a:endParaRPr lang="en-US" sz="900" dirty="0">
+              <a:solidFill>
+                <a:schemeClr val="tx1">
+                  <a:lumMod val="50000"/>
+                  <a:lumOff val="50000"/>
+                </a:schemeClr>
+              </a:solidFill>
+            </a:endParaRPr>
+          </a:p>
+        </p:txBody>
+      </p:sp>
+      <p:sp>
+        <p:nvSpPr>
+          <p:cNvPr id="109" name="Rechteck 108"/>
+          <p:cNvSpPr/>
+          <p:nvPr/>
+        </p:nvSpPr>
+        <p:spPr>
+          <a:xfrm>
+            <a:off x="5436096" y="2413230"/>
+            <a:ext cx="382886" cy="360040"/>
+          </a:xfrm>
+          <a:prstGeom prst="rect">
+            <a:avLst/>
+          </a:prstGeom>
+          <a:noFill/>
+          <a:ln w="12700">
+            <a:solidFill>
+              <a:schemeClr val="bg1">
+                <a:lumMod val="50000"/>
+              </a:schemeClr>
+            </a:solidFill>
+          </a:ln>
+        </p:spPr>
+        <p:style>
+          <a:lnRef idx="2">
+            <a:schemeClr val="accent1">
+              <a:shade val="50000"/>
+            </a:schemeClr>
+          </a:lnRef>
+          <a:fillRef idx="1">
+            <a:schemeClr val="accent1"/>
+          </a:fillRef>
+          <a:effectRef idx="0">
+            <a:schemeClr val="accent1"/>
+          </a:effectRef>
+          <a:fontRef idx="minor">
+            <a:schemeClr val="lt1"/>
+          </a:fontRef>
+        </p:style>
+        <p:txBody>
+          <a:bodyPr lIns="0" tIns="0" rIns="0" bIns="0" rtlCol="0" anchor="ctr"/>
+          <a:lstStyle/>
+          <a:p>
+            <a:pPr algn="ctr"/>
+            <a:r>
+              <a:rPr lang="de-DE" sz="900" dirty="0" smtClean="0">
+                <a:solidFill>
+                  <a:schemeClr val="tx1">
+                    <a:lumMod val="50000"/>
+                    <a:lumOff val="50000"/>
+                  </a:schemeClr>
+                </a:solidFill>
+              </a:rPr>
+              <a:t>02.05. </a:t>
+            </a:r>
+          </a:p>
+          <a:p>
+            <a:pPr algn="ctr"/>
+            <a:r>
+              <a:rPr lang="de-DE" sz="900" dirty="0" smtClean="0">
+                <a:solidFill>
+                  <a:schemeClr val="tx1">
+                    <a:lumMod val="50000"/>
+                    <a:lumOff val="50000"/>
+                  </a:schemeClr>
+                </a:solidFill>
+              </a:rPr>
+              <a:t>12:45</a:t>
+            </a:r>
+            <a:endParaRPr lang="en-US" sz="900" dirty="0">
+              <a:solidFill>
+                <a:schemeClr val="tx1">
+                  <a:lumMod val="50000"/>
+                  <a:lumOff val="50000"/>
+                </a:schemeClr>
+              </a:solidFill>
+            </a:endParaRPr>
+          </a:p>
+        </p:txBody>
+      </p:sp>
+      <p:sp>
+        <p:nvSpPr>
+          <p:cNvPr id="110" name="Rechteck 109"/>
+          <p:cNvSpPr/>
+          <p:nvPr/>
+        </p:nvSpPr>
+        <p:spPr>
+          <a:xfrm>
+            <a:off x="6084168" y="2413230"/>
+            <a:ext cx="382886" cy="360040"/>
+          </a:xfrm>
+          <a:prstGeom prst="rect">
+            <a:avLst/>
+          </a:prstGeom>
+          <a:noFill/>
+          <a:ln w="12700">
+            <a:solidFill>
+              <a:schemeClr val="bg1">
+                <a:lumMod val="50000"/>
+              </a:schemeClr>
+            </a:solidFill>
+          </a:ln>
+        </p:spPr>
+        <p:style>
+          <a:lnRef idx="2">
+            <a:schemeClr val="accent1">
+              <a:shade val="50000"/>
+            </a:schemeClr>
+          </a:lnRef>
+          <a:fillRef idx="1">
+            <a:schemeClr val="accent1"/>
+          </a:fillRef>
+          <a:effectRef idx="0">
+            <a:schemeClr val="accent1"/>
+          </a:effectRef>
+          <a:fontRef idx="minor">
+            <a:schemeClr val="lt1"/>
+          </a:fontRef>
+        </p:style>
+        <p:txBody>
+          <a:bodyPr lIns="0" tIns="0" rIns="0" bIns="0" rtlCol="0" anchor="ctr"/>
+          <a:lstStyle/>
+          <a:p>
+            <a:pPr algn="ctr"/>
+            <a:r>
+              <a:rPr lang="de-DE" sz="900" dirty="0" smtClean="0">
+                <a:solidFill>
+                  <a:schemeClr val="tx1">
+                    <a:lumMod val="50000"/>
+                    <a:lumOff val="50000"/>
+                  </a:schemeClr>
+                </a:solidFill>
+              </a:rPr>
+              <a:t>02.05. </a:t>
+            </a:r>
+          </a:p>
+          <a:p>
+            <a:pPr algn="ctr"/>
+            <a:r>
+              <a:rPr lang="de-DE" sz="900" dirty="0" smtClean="0">
+                <a:solidFill>
+                  <a:schemeClr val="tx1">
+                    <a:lumMod val="50000"/>
+                    <a:lumOff val="50000"/>
+                  </a:schemeClr>
+                </a:solidFill>
+              </a:rPr>
+              <a:t>12:48</a:t>
+            </a:r>
+            <a:endParaRPr lang="en-US" sz="900" dirty="0">
+              <a:solidFill>
+                <a:schemeClr val="tx1">
+                  <a:lumMod val="50000"/>
+                  <a:lumOff val="50000"/>
+                </a:schemeClr>
+              </a:solidFill>
+            </a:endParaRPr>
+          </a:p>
+        </p:txBody>
+      </p:sp>
+      <p:cxnSp>
+        <p:nvCxnSpPr>
+          <p:cNvPr id="111" name="Gekrümmte Verbindung 110"/>
+          <p:cNvCxnSpPr>
+            <a:stCxn id="12" idx="2"/>
+            <a:endCxn id="107" idx="0"/>
+          </p:cNvCxnSpPr>
+          <p:nvPr/>
+        </p:nvCxnSpPr>
+        <p:spPr>
+          <a:xfrm rot="16200000" flipH="1">
+            <a:off x="3720276" y="2192168"/>
+            <a:ext cx="422054" cy="20070"/>
+          </a:xfrm>
+          <a:prstGeom prst="curvedConnector3">
+            <a:avLst>
+              <a:gd name="adj1" fmla="val 50000"/>
+            </a:avLst>
+          </a:prstGeom>
+        </p:spPr>
+        <p:style>
+          <a:lnRef idx="1">
+            <a:schemeClr val="accent1"/>
+          </a:lnRef>
+          <a:fillRef idx="0">
+            <a:schemeClr val="accent1"/>
+          </a:fillRef>
+          <a:effectRef idx="0">
+            <a:schemeClr val="accent1"/>
+          </a:effectRef>
+          <a:fontRef idx="minor">
+            <a:schemeClr val="tx1"/>
+          </a:fontRef>
+        </p:style>
+      </p:cxnSp>
+      <p:cxnSp>
+        <p:nvCxnSpPr>
+          <p:cNvPr id="114" name="Gekrümmte Verbindung 113"/>
+          <p:cNvCxnSpPr>
+            <a:stCxn id="28" idx="2"/>
+            <a:endCxn id="108" idx="0"/>
+          </p:cNvCxnSpPr>
+          <p:nvPr/>
+        </p:nvCxnSpPr>
+        <p:spPr>
+          <a:xfrm rot="5400000">
+            <a:off x="5018744" y="1866570"/>
+            <a:ext cx="412530" cy="680791"/>
+          </a:xfrm>
+          <a:prstGeom prst="curvedConnector3">
+            <a:avLst>
+              <a:gd name="adj1" fmla="val 50000"/>
+            </a:avLst>
+          </a:prstGeom>
+        </p:spPr>
+        <p:style>
+          <a:lnRef idx="1">
+            <a:schemeClr val="accent1"/>
+          </a:lnRef>
+          <a:fillRef idx="0">
+            <a:schemeClr val="accent1"/>
+          </a:fillRef>
+          <a:effectRef idx="0">
+            <a:schemeClr val="accent1"/>
+          </a:effectRef>
+          <a:fontRef idx="minor">
+            <a:schemeClr val="tx1"/>
+          </a:fontRef>
+        </p:style>
+      </p:cxnSp>
+      <p:cxnSp>
+        <p:nvCxnSpPr>
+          <p:cNvPr id="117" name="Gekrümmte Verbindung 116"/>
+          <p:cNvCxnSpPr>
+            <a:stCxn id="28" idx="2"/>
+            <a:endCxn id="109" idx="0"/>
+          </p:cNvCxnSpPr>
+          <p:nvPr/>
+        </p:nvCxnSpPr>
+        <p:spPr>
+          <a:xfrm rot="16200000" flipH="1">
+            <a:off x="5390206" y="2175897"/>
+            <a:ext cx="412530" cy="62135"/>
+          </a:xfrm>
+          <a:prstGeom prst="curvedConnector3">
+            <a:avLst>
+              <a:gd name="adj1" fmla="val 50000"/>
+            </a:avLst>
+          </a:prstGeom>
+        </p:spPr>
+        <p:style>
+          <a:lnRef idx="1">
+            <a:schemeClr val="accent1"/>
+          </a:lnRef>
+          <a:fillRef idx="0">
+            <a:schemeClr val="accent1"/>
+          </a:fillRef>
+          <a:effectRef idx="0">
+            <a:schemeClr val="accent1"/>
+          </a:effectRef>
+          <a:fontRef idx="minor">
+            <a:schemeClr val="tx1"/>
+          </a:fontRef>
+        </p:style>
+      </p:cxnSp>
+      <p:cxnSp>
+        <p:nvCxnSpPr>
+          <p:cNvPr id="120" name="Gekrümmte Verbindung 119"/>
+          <p:cNvCxnSpPr>
+            <a:stCxn id="28" idx="2"/>
+            <a:endCxn id="110" idx="0"/>
+          </p:cNvCxnSpPr>
+          <p:nvPr/>
+        </p:nvCxnSpPr>
+        <p:spPr>
+          <a:xfrm rot="16200000" flipH="1">
+            <a:off x="5714242" y="1851861"/>
+            <a:ext cx="412530" cy="710207"/>
+          </a:xfrm>
+          <a:prstGeom prst="curvedConnector3">
+            <a:avLst>
+              <a:gd name="adj1" fmla="val 50000"/>
+            </a:avLst>
+          </a:prstGeom>
+        </p:spPr>
+        <p:style>
+          <a:lnRef idx="1">
+            <a:schemeClr val="accent1"/>
+          </a:lnRef>
+          <a:fillRef idx="0">
+            <a:schemeClr val="accent1"/>
+          </a:fillRef>
+          <a:effectRef idx="0">
+            <a:schemeClr val="accent1"/>
+          </a:effectRef>
+          <a:fontRef idx="minor">
+            <a:schemeClr val="tx1"/>
+          </a:fontRef>
+        </p:style>
+      </p:cxnSp>
+      <p:sp>
+        <p:nvSpPr>
+          <p:cNvPr id="127" name="Rechteck 126"/>
+          <p:cNvSpPr/>
+          <p:nvPr/>
+        </p:nvSpPr>
+        <p:spPr>
+          <a:xfrm>
+            <a:off x="2774835" y="3781382"/>
+            <a:ext cx="382886" cy="360040"/>
+          </a:xfrm>
+          <a:prstGeom prst="rect">
+            <a:avLst/>
+          </a:prstGeom>
+          <a:noFill/>
+          <a:ln w="12700">
+            <a:solidFill>
+              <a:schemeClr val="bg1">
+                <a:lumMod val="50000"/>
+              </a:schemeClr>
+            </a:solidFill>
+          </a:ln>
+        </p:spPr>
+        <p:style>
+          <a:lnRef idx="2">
+            <a:schemeClr val="accent1">
+              <a:shade val="50000"/>
+            </a:schemeClr>
+          </a:lnRef>
+          <a:fillRef idx="1">
+            <a:schemeClr val="accent1"/>
+          </a:fillRef>
+          <a:effectRef idx="0">
+            <a:schemeClr val="accent1"/>
+          </a:effectRef>
+          <a:fontRef idx="minor">
+            <a:schemeClr val="lt1"/>
+          </a:fontRef>
+        </p:style>
+        <p:txBody>
+          <a:bodyPr lIns="0" tIns="0" rIns="0" bIns="0" rtlCol="0" anchor="ctr"/>
+          <a:lstStyle/>
+          <a:p>
+            <a:pPr algn="ctr"/>
+            <a:r>
+              <a:rPr lang="de-DE" sz="900" dirty="0" smtClean="0">
+                <a:solidFill>
+                  <a:schemeClr val="tx1">
+                    <a:lumMod val="50000"/>
+                    <a:lumOff val="50000"/>
+                  </a:schemeClr>
+                </a:solidFill>
+              </a:rPr>
+              <a:t>01.05. </a:t>
+            </a:r>
+          </a:p>
+          <a:p>
+            <a:pPr algn="ctr"/>
+            <a:r>
+              <a:rPr lang="de-DE" sz="900" dirty="0" smtClean="0">
+                <a:solidFill>
+                  <a:schemeClr val="tx1">
+                    <a:lumMod val="50000"/>
+                    <a:lumOff val="50000"/>
+                  </a:schemeClr>
+                </a:solidFill>
+              </a:rPr>
+              <a:t>23:22</a:t>
+            </a:r>
+            <a:endParaRPr lang="en-US" sz="900" dirty="0">
+              <a:solidFill>
+                <a:schemeClr val="tx1">
+                  <a:lumMod val="50000"/>
+                  <a:lumOff val="50000"/>
+                </a:schemeClr>
+              </a:solidFill>
+            </a:endParaRPr>
+          </a:p>
+        </p:txBody>
+      </p:sp>
+      <p:cxnSp>
+        <p:nvCxnSpPr>
+          <p:cNvPr id="128" name="Gekrümmte Verbindung 127"/>
+          <p:cNvCxnSpPr>
+            <a:stCxn id="57" idx="2"/>
+            <a:endCxn id="127" idx="0"/>
+          </p:cNvCxnSpPr>
+          <p:nvPr/>
+        </p:nvCxnSpPr>
+        <p:spPr>
+          <a:xfrm rot="16200000" flipH="1">
+            <a:off x="2796869" y="3611973"/>
+            <a:ext cx="285696" cy="53122"/>
+          </a:xfrm>
+          <a:prstGeom prst="curvedConnector3">
+            <a:avLst>
+              <a:gd name="adj1" fmla="val 50000"/>
+            </a:avLst>
+          </a:prstGeom>
+        </p:spPr>
+        <p:style>
+          <a:lnRef idx="1">
+            <a:schemeClr val="accent1"/>
+          </a:lnRef>
+          <a:fillRef idx="0">
+            <a:schemeClr val="accent1"/>
+          </a:fillRef>
+          <a:effectRef idx="0">
+            <a:schemeClr val="accent1"/>
+          </a:effectRef>
+          <a:fontRef idx="minor">
+            <a:schemeClr val="tx1"/>
+          </a:fontRef>
+        </p:style>
+      </p:cxnSp>
+      <p:grpSp>
+        <p:nvGrpSpPr>
+          <p:cNvPr id="130" name="Gruppieren 129"/>
+          <p:cNvGrpSpPr/>
+          <p:nvPr/>
+        </p:nvGrpSpPr>
+        <p:grpSpPr>
+          <a:xfrm>
+            <a:off x="2915816" y="5915127"/>
+            <a:ext cx="753475" cy="246221"/>
+            <a:chOff x="2653308" y="1412776"/>
+            <a:chExt cx="753475" cy="246221"/>
+          </a:xfrm>
+        </p:grpSpPr>
+        <p:sp>
+          <p:nvSpPr>
+            <p:cNvPr id="131" name="Textfeld 130"/>
+            <p:cNvSpPr txBox="1"/>
+            <p:nvPr/>
+          </p:nvSpPr>
+          <p:spPr>
+            <a:xfrm>
+              <a:off x="2843808" y="1412776"/>
+              <a:ext cx="562975" cy="246221"/>
+            </a:xfrm>
+            <a:prstGeom prst="rect">
+              <a:avLst/>
+            </a:prstGeom>
+            <a:noFill/>
+          </p:spPr>
+          <p:txBody>
+            <a:bodyPr wrap="none" rtlCol="0">
+              <a:spAutoFit/>
+            </a:bodyPr>
+            <a:lstStyle/>
+            <a:p>
+              <a:r>
+                <a:rPr lang="de-DE" sz="1000" dirty="0" smtClean="0"/>
+                <a:t>Marion</a:t>
+              </a:r>
+              <a:endParaRPr lang="en-US" sz="1000" dirty="0"/>
+            </a:p>
+          </p:txBody>
+        </p:sp>
+        <p:pic>
+          <p:nvPicPr>
+            <p:cNvPr id="132" name="Picture 3" descr="C:\Users\MoritzTheile\eclipse_SupeYou\com.supeyou.app\src\main\webapp\heroPics\skype_smile.png"/>
+            <p:cNvPicPr>
+              <a:picLocks noChangeAspect="1" noChangeArrowheads="1"/>
+            </p:cNvPicPr>
+            <p:nvPr/>
+          </p:nvPicPr>
+          <p:blipFill>
+            <a:blip r:embed="rId2">
+              <a:extLst>
+                <a:ext uri="{28A0092B-C50C-407E-A947-70E740481C1C}">
+                  <a14:useLocalDpi xmlns:a14="http://schemas.microsoft.com/office/drawing/2010/main" val="0"/>
+                </a:ext>
+              </a:extLst>
+            </a:blip>
+            <a:srcRect/>
+            <a:stretch>
+              <a:fillRect/>
+            </a:stretch>
+          </p:blipFill>
+          <p:spPr bwMode="auto">
+            <a:xfrm>
+              <a:off x="2653308" y="1440636"/>
+              <a:ext cx="190500" cy="190500"/>
+            </a:xfrm>
+            <a:prstGeom prst="rect">
+              <a:avLst/>
+            </a:prstGeom>
+            <a:noFill/>
+            <a:extLst>
+              <a:ext uri="{909E8E84-426E-40DD-AFC4-6F175D3DCCD1}">
+                <a14:hiddenFill xmlns:a14="http://schemas.microsoft.com/office/drawing/2010/main">
+                  <a:solidFill>
+                    <a:srgbClr val="FFFFFF"/>
+                  </a:solidFill>
+                </a14:hiddenFill>
+              </a:ext>
+            </a:extLst>
+          </p:spPr>
+        </p:pic>
+      </p:grpSp>
+      <p:cxnSp>
+        <p:nvCxnSpPr>
+          <p:cNvPr id="133" name="Gekrümmte Verbindung 132"/>
+          <p:cNvCxnSpPr>
+            <a:stCxn id="138" idx="2"/>
+            <a:endCxn id="132" idx="0"/>
+          </p:cNvCxnSpPr>
+          <p:nvPr/>
+        </p:nvCxnSpPr>
+        <p:spPr>
+          <a:xfrm rot="16200000" flipH="1">
+            <a:off x="2594441" y="5526361"/>
+            <a:ext cx="487769" cy="345482"/>
+          </a:xfrm>
+          <a:prstGeom prst="curvedConnector3">
+            <a:avLst>
+              <a:gd name="adj1" fmla="val 50000"/>
+            </a:avLst>
+          </a:prstGeom>
+        </p:spPr>
+        <p:style>
+          <a:lnRef idx="1">
+            <a:schemeClr val="accent1"/>
+          </a:lnRef>
+          <a:fillRef idx="0">
+            <a:schemeClr val="accent1"/>
+          </a:fillRef>
+          <a:effectRef idx="0">
+            <a:schemeClr val="accent1"/>
+          </a:effectRef>
+          <a:fontRef idx="minor">
+            <a:schemeClr val="tx1"/>
+          </a:fontRef>
+        </p:style>
+      </p:cxnSp>
+      <p:grpSp>
+        <p:nvGrpSpPr>
+          <p:cNvPr id="134" name="Gruppieren 133"/>
+          <p:cNvGrpSpPr/>
+          <p:nvPr/>
+        </p:nvGrpSpPr>
+        <p:grpSpPr>
+          <a:xfrm>
+            <a:off x="1979712" y="5919083"/>
+            <a:ext cx="798359" cy="246221"/>
+            <a:chOff x="2653308" y="1412776"/>
+            <a:chExt cx="798359" cy="246221"/>
+          </a:xfrm>
+        </p:grpSpPr>
+        <p:sp>
+          <p:nvSpPr>
+            <p:cNvPr id="135" name="Textfeld 134"/>
+            <p:cNvSpPr txBox="1"/>
+            <p:nvPr/>
+          </p:nvSpPr>
+          <p:spPr>
+            <a:xfrm>
+              <a:off x="2843808" y="1412776"/>
+              <a:ext cx="607859" cy="246221"/>
+            </a:xfrm>
+            <a:prstGeom prst="rect">
+              <a:avLst/>
+            </a:prstGeom>
+            <a:noFill/>
+          </p:spPr>
+          <p:txBody>
+            <a:bodyPr wrap="none" rtlCol="0">
+              <a:spAutoFit/>
+            </a:bodyPr>
+            <a:lstStyle/>
+            <a:p>
+              <a:r>
+                <a:rPr lang="de-DE" sz="1000" dirty="0" smtClean="0"/>
+                <a:t>Melanie</a:t>
+              </a:r>
+              <a:endParaRPr lang="en-US" sz="1000" dirty="0"/>
+            </a:p>
+          </p:txBody>
+        </p:sp>
+        <p:pic>
+          <p:nvPicPr>
+            <p:cNvPr id="136" name="Picture 3" descr="C:\Users\MoritzTheile\eclipse_SupeYou\com.supeyou.app\src\main\webapp\heroPics\skype_smile.png"/>
+            <p:cNvPicPr>
+              <a:picLocks noChangeAspect="1" noChangeArrowheads="1"/>
+            </p:cNvPicPr>
+            <p:nvPr/>
+          </p:nvPicPr>
+          <p:blipFill>
+            <a:blip r:embed="rId2">
+              <a:extLst>
+                <a:ext uri="{28A0092B-C50C-407E-A947-70E740481C1C}">
+                  <a14:useLocalDpi xmlns:a14="http://schemas.microsoft.com/office/drawing/2010/main" val="0"/>
+                </a:ext>
+              </a:extLst>
+            </a:blip>
+            <a:srcRect/>
+            <a:stretch>
+              <a:fillRect/>
+            </a:stretch>
+          </p:blipFill>
+          <p:spPr bwMode="auto">
+            <a:xfrm>
+              <a:off x="2653308" y="1440636"/>
+              <a:ext cx="190500" cy="190500"/>
+            </a:xfrm>
+            <a:prstGeom prst="rect">
+              <a:avLst/>
+            </a:prstGeom>
+            <a:noFill/>
+            <a:extLst>
+              <a:ext uri="{909E8E84-426E-40DD-AFC4-6F175D3DCCD1}">
+                <a14:hiddenFill xmlns:a14="http://schemas.microsoft.com/office/drawing/2010/main">
+                  <a:solidFill>
+                    <a:srgbClr val="FFFFFF"/>
+                  </a:solidFill>
+                </a14:hiddenFill>
+              </a:ext>
+            </a:extLst>
+          </p:spPr>
+        </p:pic>
+      </p:grpSp>
+      <p:cxnSp>
+        <p:nvCxnSpPr>
+          <p:cNvPr id="137" name="Gekrümmte Verbindung 136"/>
+          <p:cNvCxnSpPr>
+            <a:stCxn id="138" idx="2"/>
+            <a:endCxn id="136" idx="0"/>
+          </p:cNvCxnSpPr>
+          <p:nvPr/>
+        </p:nvCxnSpPr>
+        <p:spPr>
+          <a:xfrm rot="5400000">
+            <a:off x="2124411" y="5405769"/>
+            <a:ext cx="491725" cy="590622"/>
+          </a:xfrm>
+          <a:prstGeom prst="curvedConnector3">
+            <a:avLst>
+              <a:gd name="adj1" fmla="val 50000"/>
+            </a:avLst>
+          </a:prstGeom>
+        </p:spPr>
+        <p:style>
+          <a:lnRef idx="1">
+            <a:schemeClr val="accent1"/>
+          </a:lnRef>
+          <a:fillRef idx="0">
+            <a:schemeClr val="accent1"/>
+          </a:fillRef>
+          <a:effectRef idx="0">
+            <a:schemeClr val="accent1"/>
+          </a:effectRef>
+          <a:fontRef idx="minor">
+            <a:schemeClr val="tx1"/>
+          </a:fontRef>
+        </p:style>
+      </p:cxnSp>
+      <p:sp>
+        <p:nvSpPr>
+          <p:cNvPr id="138" name="Rechteck 137"/>
+          <p:cNvSpPr/>
+          <p:nvPr/>
+        </p:nvSpPr>
+        <p:spPr>
+          <a:xfrm>
+            <a:off x="2474141" y="5095178"/>
+            <a:ext cx="382886" cy="360040"/>
+          </a:xfrm>
+          <a:prstGeom prst="rect">
+            <a:avLst/>
+          </a:prstGeom>
+          <a:noFill/>
+          <a:ln w="12700">
+            <a:solidFill>
+              <a:schemeClr val="bg1">
+                <a:lumMod val="50000"/>
+              </a:schemeClr>
+            </a:solidFill>
+          </a:ln>
+        </p:spPr>
+        <p:style>
+          <a:lnRef idx="2">
+            <a:schemeClr val="accent1">
+              <a:shade val="50000"/>
+            </a:schemeClr>
+          </a:lnRef>
+          <a:fillRef idx="1">
+            <a:schemeClr val="accent1"/>
+          </a:fillRef>
+          <a:effectRef idx="0">
+            <a:schemeClr val="accent1"/>
+          </a:effectRef>
+          <a:fontRef idx="minor">
+            <a:schemeClr val="lt1"/>
+          </a:fontRef>
+        </p:style>
+        <p:txBody>
+          <a:bodyPr lIns="0" tIns="0" rIns="0" bIns="0" rtlCol="0" anchor="ctr"/>
+          <a:lstStyle/>
+          <a:p>
+            <a:pPr algn="ctr"/>
+            <a:r>
+              <a:rPr lang="de-DE" sz="900" dirty="0" smtClean="0">
+                <a:solidFill>
+                  <a:schemeClr val="tx1">
+                    <a:lumMod val="50000"/>
+                    <a:lumOff val="50000"/>
+                  </a:schemeClr>
+                </a:solidFill>
+              </a:rPr>
+              <a:t>02.05. </a:t>
+            </a:r>
+          </a:p>
+          <a:p>
+            <a:pPr algn="ctr"/>
+            <a:r>
+              <a:rPr lang="de-DE" sz="900" dirty="0" smtClean="0">
+                <a:solidFill>
+                  <a:schemeClr val="tx1">
+                    <a:lumMod val="50000"/>
+                    <a:lumOff val="50000"/>
+                  </a:schemeClr>
+                </a:solidFill>
+              </a:rPr>
+              <a:t>07:34</a:t>
+            </a:r>
+            <a:endParaRPr lang="en-US" sz="900" dirty="0">
+              <a:solidFill>
+                <a:schemeClr val="tx1">
+                  <a:lumMod val="50000"/>
+                  <a:lumOff val="50000"/>
+                </a:schemeClr>
+              </a:solidFill>
+            </a:endParaRPr>
+          </a:p>
+        </p:txBody>
+      </p:sp>
+      <p:cxnSp>
+        <p:nvCxnSpPr>
+          <p:cNvPr id="139" name="Gekrümmte Verbindung 138"/>
+          <p:cNvCxnSpPr>
+            <a:stCxn id="67" idx="2"/>
+            <a:endCxn id="138" idx="0"/>
+          </p:cNvCxnSpPr>
+          <p:nvPr/>
+        </p:nvCxnSpPr>
+        <p:spPr>
+          <a:xfrm rot="5400000">
+            <a:off x="2519281" y="4866837"/>
+            <a:ext cx="374645" cy="82037"/>
+          </a:xfrm>
+          <a:prstGeom prst="curvedConnector3">
+            <a:avLst>
+              <a:gd name="adj1" fmla="val 50000"/>
+            </a:avLst>
+          </a:prstGeom>
+        </p:spPr>
+        <p:style>
+          <a:lnRef idx="1">
+            <a:schemeClr val="accent1"/>
+          </a:lnRef>
+          <a:fillRef idx="0">
+            <a:schemeClr val="accent1"/>
+          </a:fillRef>
+          <a:effectRef idx="0">
+            <a:schemeClr val="accent1"/>
+          </a:effectRef>
+          <a:fontRef idx="minor">
+            <a:schemeClr val="tx1"/>
+          </a:fontRef>
+        </p:style>
+      </p:cxnSp>
+      <p:sp>
+        <p:nvSpPr>
+          <p:cNvPr id="143" name="Rechteck 142"/>
+          <p:cNvSpPr/>
+          <p:nvPr/>
+        </p:nvSpPr>
+        <p:spPr>
+          <a:xfrm>
+            <a:off x="4572000" y="3789040"/>
+            <a:ext cx="382886" cy="360040"/>
+          </a:xfrm>
+          <a:prstGeom prst="rect">
+            <a:avLst/>
+          </a:prstGeom>
+          <a:noFill/>
+          <a:ln w="12700">
+            <a:solidFill>
+              <a:schemeClr val="bg1">
+                <a:lumMod val="50000"/>
+              </a:schemeClr>
+            </a:solidFill>
+          </a:ln>
+        </p:spPr>
+        <p:style>
+          <a:lnRef idx="2">
+            <a:schemeClr val="accent1">
+              <a:shade val="50000"/>
+            </a:schemeClr>
+          </a:lnRef>
+          <a:fillRef idx="1">
+            <a:schemeClr val="accent1"/>
+          </a:fillRef>
+          <a:effectRef idx="0">
+            <a:schemeClr val="accent1"/>
+          </a:effectRef>
+          <a:fontRef idx="minor">
+            <a:schemeClr val="lt1"/>
+          </a:fontRef>
+        </p:style>
+        <p:txBody>
+          <a:bodyPr lIns="0" tIns="0" rIns="0" bIns="0" rtlCol="0" anchor="ctr"/>
+          <a:lstStyle/>
+          <a:p>
+            <a:pPr algn="ctr"/>
+            <a:r>
+              <a:rPr lang="de-DE" sz="900" dirty="0" smtClean="0">
+                <a:solidFill>
+                  <a:schemeClr val="tx1">
+                    <a:lumMod val="50000"/>
+                    <a:lumOff val="50000"/>
+                  </a:schemeClr>
+                </a:solidFill>
+              </a:rPr>
+              <a:t>03.05. </a:t>
+            </a:r>
+          </a:p>
+          <a:p>
+            <a:pPr algn="ctr"/>
+            <a:r>
+              <a:rPr lang="de-DE" sz="900" dirty="0" smtClean="0">
+                <a:solidFill>
+                  <a:schemeClr val="tx1">
+                    <a:lumMod val="50000"/>
+                    <a:lumOff val="50000"/>
+                  </a:schemeClr>
+                </a:solidFill>
+              </a:rPr>
+              <a:t>19:48</a:t>
+            </a:r>
+            <a:endParaRPr lang="en-US" sz="900" dirty="0">
+              <a:solidFill>
+                <a:schemeClr val="tx1">
+                  <a:lumMod val="50000"/>
+                  <a:lumOff val="50000"/>
+                </a:schemeClr>
+              </a:solidFill>
+            </a:endParaRPr>
+          </a:p>
+        </p:txBody>
+      </p:sp>
+      <p:sp>
+        <p:nvSpPr>
+          <p:cNvPr id="144" name="Rechteck 143"/>
+          <p:cNvSpPr/>
+          <p:nvPr/>
+        </p:nvSpPr>
+        <p:spPr>
+          <a:xfrm>
+            <a:off x="5314926" y="3789040"/>
+            <a:ext cx="382886" cy="360040"/>
+          </a:xfrm>
+          <a:prstGeom prst="rect">
+            <a:avLst/>
+          </a:prstGeom>
+          <a:noFill/>
+          <a:ln w="12700">
+            <a:solidFill>
+              <a:schemeClr val="bg1">
+                <a:lumMod val="50000"/>
+              </a:schemeClr>
+            </a:solidFill>
+          </a:ln>
+        </p:spPr>
+        <p:style>
+          <a:lnRef idx="2">
+            <a:schemeClr val="accent1">
+              <a:shade val="50000"/>
+            </a:schemeClr>
+          </a:lnRef>
+          <a:fillRef idx="1">
+            <a:schemeClr val="accent1"/>
+          </a:fillRef>
+          <a:effectRef idx="0">
+            <a:schemeClr val="accent1"/>
+          </a:effectRef>
+          <a:fontRef idx="minor">
+            <a:schemeClr val="lt1"/>
+          </a:fontRef>
+        </p:style>
+        <p:txBody>
+          <a:bodyPr lIns="0" tIns="0" rIns="0" bIns="0" rtlCol="0" anchor="ctr"/>
+          <a:lstStyle/>
+          <a:p>
+            <a:pPr algn="ctr"/>
+            <a:r>
+              <a:rPr lang="de-DE" sz="900" dirty="0" smtClean="0">
+                <a:solidFill>
+                  <a:schemeClr val="tx1">
+                    <a:lumMod val="50000"/>
+                    <a:lumOff val="50000"/>
+                  </a:schemeClr>
+                </a:solidFill>
+              </a:rPr>
+              <a:t>04.05. </a:t>
+            </a:r>
+          </a:p>
+          <a:p>
+            <a:pPr algn="ctr"/>
+            <a:r>
+              <a:rPr lang="de-DE" sz="900" dirty="0">
+                <a:solidFill>
+                  <a:schemeClr val="tx1">
+                    <a:lumMod val="50000"/>
+                    <a:lumOff val="50000"/>
+                  </a:schemeClr>
+                </a:solidFill>
+              </a:rPr>
+              <a:t>0</a:t>
+            </a:r>
+            <a:r>
+              <a:rPr lang="de-DE" sz="900" dirty="0" smtClean="0">
+                <a:solidFill>
+                  <a:schemeClr val="tx1">
+                    <a:lumMod val="50000"/>
+                    <a:lumOff val="50000"/>
+                  </a:schemeClr>
+                </a:solidFill>
+              </a:rPr>
+              <a:t>9:45</a:t>
+            </a:r>
+            <a:endParaRPr lang="en-US" sz="900" dirty="0">
+              <a:solidFill>
+                <a:schemeClr val="tx1">
+                  <a:lumMod val="50000"/>
+                  <a:lumOff val="50000"/>
+                </a:schemeClr>
+              </a:solidFill>
+            </a:endParaRPr>
+          </a:p>
+        </p:txBody>
+      </p:sp>
+      <p:cxnSp>
+        <p:nvCxnSpPr>
+          <p:cNvPr id="145" name="Gekrümmte Verbindung 144"/>
+          <p:cNvCxnSpPr>
+            <a:stCxn id="34" idx="2"/>
+            <a:endCxn id="143" idx="0"/>
+          </p:cNvCxnSpPr>
+          <p:nvPr/>
+        </p:nvCxnSpPr>
+        <p:spPr>
+          <a:xfrm rot="5400000">
+            <a:off x="4736096" y="3523747"/>
+            <a:ext cx="292641" cy="237945"/>
+          </a:xfrm>
+          <a:prstGeom prst="curvedConnector3">
+            <a:avLst>
+              <a:gd name="adj1" fmla="val 50000"/>
+            </a:avLst>
+          </a:prstGeom>
+        </p:spPr>
+        <p:style>
+          <a:lnRef idx="1">
+            <a:schemeClr val="accent1"/>
+          </a:lnRef>
+          <a:fillRef idx="0">
+            <a:schemeClr val="accent1"/>
+          </a:fillRef>
+          <a:effectRef idx="0">
+            <a:schemeClr val="accent1"/>
+          </a:effectRef>
+          <a:fontRef idx="minor">
+            <a:schemeClr val="tx1"/>
+          </a:fontRef>
+        </p:style>
+      </p:cxnSp>
+      <p:cxnSp>
+        <p:nvCxnSpPr>
+          <p:cNvPr id="146" name="Gekrümmte Verbindung 145"/>
+          <p:cNvCxnSpPr>
+            <a:stCxn id="34" idx="2"/>
+            <a:endCxn id="144" idx="0"/>
+          </p:cNvCxnSpPr>
+          <p:nvPr/>
+        </p:nvCxnSpPr>
+        <p:spPr>
+          <a:xfrm rot="16200000" flipH="1">
+            <a:off x="5107558" y="3390228"/>
+            <a:ext cx="292641" cy="504981"/>
+          </a:xfrm>
+          <a:prstGeom prst="curvedConnector3">
+            <a:avLst>
+              <a:gd name="adj1" fmla="val 50000"/>
+            </a:avLst>
+          </a:prstGeom>
+        </p:spPr>
+        <p:style>
+          <a:lnRef idx="1">
+            <a:schemeClr val="accent1"/>
+          </a:lnRef>
+          <a:fillRef idx="0">
+            <a:schemeClr val="accent1"/>
+          </a:fillRef>
+          <a:effectRef idx="0">
+            <a:schemeClr val="accent1"/>
+          </a:effectRef>
+          <a:fontRef idx="minor">
+            <a:schemeClr val="tx1"/>
+          </a:fontRef>
+        </p:style>
+      </p:cxnSp>
+      <p:grpSp>
+        <p:nvGrpSpPr>
+          <p:cNvPr id="149" name="Gruppieren 148"/>
+          <p:cNvGrpSpPr/>
+          <p:nvPr/>
+        </p:nvGrpSpPr>
+        <p:grpSpPr>
+          <a:xfrm>
+            <a:off x="4716016" y="4509120"/>
+            <a:ext cx="785535" cy="246221"/>
+            <a:chOff x="2653308" y="1412776"/>
+            <a:chExt cx="785535" cy="246221"/>
+          </a:xfrm>
+        </p:grpSpPr>
+        <p:sp>
+          <p:nvSpPr>
+            <p:cNvPr id="150" name="Textfeld 149"/>
+            <p:cNvSpPr txBox="1"/>
+            <p:nvPr/>
+          </p:nvSpPr>
+          <p:spPr>
+            <a:xfrm>
+              <a:off x="2843808" y="1412776"/>
+              <a:ext cx="595035" cy="246221"/>
+            </a:xfrm>
+            <a:prstGeom prst="rect">
+              <a:avLst/>
+            </a:prstGeom>
+            <a:noFill/>
+          </p:spPr>
+          <p:txBody>
+            <a:bodyPr wrap="none" rtlCol="0">
+              <a:spAutoFit/>
+            </a:bodyPr>
+            <a:lstStyle/>
+            <a:p>
+              <a:r>
+                <a:rPr lang="de-DE" sz="1000" dirty="0" smtClean="0"/>
+                <a:t>Thomas</a:t>
+              </a:r>
+              <a:endParaRPr lang="en-US" sz="1000" dirty="0"/>
+            </a:p>
+          </p:txBody>
+        </p:sp>
+        <p:pic>
+          <p:nvPicPr>
+            <p:cNvPr id="151" name="Picture 3" descr="C:\Users\MoritzTheile\eclipse_SupeYou\com.supeyou.app\src\main\webapp\heroPics\skype_smile.png"/>
+            <p:cNvPicPr>
+              <a:picLocks noChangeAspect="1" noChangeArrowheads="1"/>
+            </p:cNvPicPr>
+            <p:nvPr/>
+          </p:nvPicPr>
+          <p:blipFill>
+            <a:blip r:embed="rId2">
+              <a:extLst>
+                <a:ext uri="{28A0092B-C50C-407E-A947-70E740481C1C}">
+                  <a14:useLocalDpi xmlns:a14="http://schemas.microsoft.com/office/drawing/2010/main" val="0"/>
+                </a:ext>
+              </a:extLst>
+            </a:blip>
+            <a:srcRect/>
+            <a:stretch>
+              <a:fillRect/>
+            </a:stretch>
+          </p:blipFill>
+          <p:spPr bwMode="auto">
+            <a:xfrm>
+              <a:off x="2653308" y="1440636"/>
+              <a:ext cx="190500" cy="190500"/>
+            </a:xfrm>
+            <a:prstGeom prst="rect">
+              <a:avLst/>
+            </a:prstGeom>
+            <a:noFill/>
+            <a:extLst>
+              <a:ext uri="{909E8E84-426E-40DD-AFC4-6F175D3DCCD1}">
+                <a14:hiddenFill xmlns:a14="http://schemas.microsoft.com/office/drawing/2010/main">
+                  <a:solidFill>
+                    <a:srgbClr val="FFFFFF"/>
+                  </a:solidFill>
+                </a14:hiddenFill>
+              </a:ext>
+            </a:extLst>
+          </p:spPr>
+        </p:pic>
+      </p:grpSp>
+      <p:cxnSp>
+        <p:nvCxnSpPr>
+          <p:cNvPr id="152" name="Gekrümmte Verbindung 151"/>
+          <p:cNvCxnSpPr>
+            <a:stCxn id="143" idx="2"/>
+            <a:endCxn id="151" idx="0"/>
+          </p:cNvCxnSpPr>
+          <p:nvPr/>
+        </p:nvCxnSpPr>
+        <p:spPr>
+          <a:xfrm rot="16200000" flipH="1">
+            <a:off x="4593404" y="4319118"/>
+            <a:ext cx="387900" cy="47823"/>
+          </a:xfrm>
+          <a:prstGeom prst="curvedConnector3">
+            <a:avLst>
+              <a:gd name="adj1" fmla="val 50000"/>
+            </a:avLst>
+          </a:prstGeom>
+        </p:spPr>
+        <p:style>
+          <a:lnRef idx="1">
+            <a:schemeClr val="accent1"/>
+          </a:lnRef>
+          <a:fillRef idx="0">
+            <a:schemeClr val="accent1"/>
+          </a:fillRef>
+          <a:effectRef idx="0">
+            <a:schemeClr val="accent1"/>
+          </a:effectRef>
+          <a:fontRef idx="minor">
+            <a:schemeClr val="tx1"/>
+          </a:fontRef>
+        </p:style>
+      </p:cxnSp>
+    </p:spTree>
+    <p:extLst>
+      <p:ext uri="{BB962C8B-B14F-4D97-AF65-F5344CB8AC3E}">
+        <p14:creationId xmlns:p14="http://schemas.microsoft.com/office/powerpoint/2010/main" val="244877346"/>
+      </p:ext>
+    </p:extLst>
+  </p:cSld>
+  <p:clrMapOvr>
+    <a:masterClrMapping/>
+  </p:clrMapOvr>
+</p:sld>
+</file>
+
+<file path=ppt/slides/slide4.xml><?xml version="1.0" encoding="utf-8"?>
+<p:sld xmlns:a="http://schemas.openxmlformats.org/drawingml/2006/main" xmlns:r="http://schemas.openxmlformats.org/officeDocument/2006/relationships" xmlns:p="http://schemas.openxmlformats.org/presentationml/2006/main">
+  <p:cSld>
+    <p:spTree>
+      <p:nvGrpSpPr>
+        <p:cNvPr id="1" name=""/>
+        <p:cNvGrpSpPr/>
+        <p:nvPr/>
+      </p:nvGrpSpPr>
+      <p:grpSpPr>
+        <a:xfrm>
+          <a:off x="0" y="0"/>
+          <a:ext cx="0" cy="0"/>
+          <a:chOff x="0" y="0"/>
+          <a:chExt cx="0" cy="0"/>
+        </a:xfrm>
+      </p:grpSpPr>
       <p:sp>
         <p:nvSpPr>
           <p:cNvPr id="2" name="Rechteck 1"/>

</xml_diff>

<commit_message>
updating powerpoint with testdata
</commit_message>
<xml_diff>
--- a/com.supeyou.project/doc/SupeYou.entities.pptx
+++ b/com.supeyou.project/doc/SupeYou.entities.pptx
@@ -8,7 +8,8 @@
     <p:sldId id="365" r:id="rId2"/>
     <p:sldId id="306" r:id="rId3"/>
     <p:sldId id="366" r:id="rId4"/>
-    <p:sldId id="364" r:id="rId5"/>
+    <p:sldId id="367" r:id="rId5"/>
+    <p:sldId id="364" r:id="rId6"/>
   </p:sldIdLst>
   <p:sldSz cx="9144000" cy="6858000" type="screen4x3"/>
   <p:notesSz cx="6858000" cy="9144000"/>
@@ -331,7 +332,7 @@
               <a:pPr>
                 <a:defRPr/>
               </a:pPr>
-              <a:t>13.07.2015</a:t>
+              <a:t>22.07.2015</a:t>
             </a:fld>
             <a:endParaRPr lang="de-CH"/>
           </a:p>
@@ -528,7 +529,7 @@
               <a:pPr>
                 <a:defRPr/>
               </a:pPr>
-              <a:t>13.07.2015</a:t>
+              <a:t>22.07.2015</a:t>
             </a:fld>
             <a:endParaRPr lang="de-CH"/>
           </a:p>
@@ -735,7 +736,7 @@
               <a:pPr>
                 <a:defRPr/>
               </a:pPr>
-              <a:t>13.07.2015</a:t>
+              <a:t>22.07.2015</a:t>
             </a:fld>
             <a:endParaRPr lang="de-CH"/>
           </a:p>
@@ -932,7 +933,7 @@
               <a:pPr>
                 <a:defRPr/>
               </a:pPr>
-              <a:t>13.07.2015</a:t>
+              <a:t>22.07.2015</a:t>
             </a:fld>
             <a:endParaRPr lang="de-CH"/>
           </a:p>
@@ -1205,7 +1206,7 @@
               <a:pPr>
                 <a:defRPr/>
               </a:pPr>
-              <a:t>13.07.2015</a:t>
+              <a:t>22.07.2015</a:t>
             </a:fld>
             <a:endParaRPr lang="de-CH"/>
           </a:p>
@@ -1520,7 +1521,7 @@
               <a:pPr>
                 <a:defRPr/>
               </a:pPr>
-              <a:t>13.07.2015</a:t>
+              <a:t>22.07.2015</a:t>
             </a:fld>
             <a:endParaRPr lang="de-CH"/>
           </a:p>
@@ -1969,7 +1970,7 @@
               <a:pPr>
                 <a:defRPr/>
               </a:pPr>
-              <a:t>13.07.2015</a:t>
+              <a:t>22.07.2015</a:t>
             </a:fld>
             <a:endParaRPr lang="de-CH"/>
           </a:p>
@@ -2114,7 +2115,7 @@
               <a:pPr>
                 <a:defRPr/>
               </a:pPr>
-              <a:t>13.07.2015</a:t>
+              <a:t>22.07.2015</a:t>
             </a:fld>
             <a:endParaRPr lang="de-CH"/>
           </a:p>
@@ -2236,7 +2237,7 @@
               <a:pPr>
                 <a:defRPr/>
               </a:pPr>
-              <a:t>13.07.2015</a:t>
+              <a:t>22.07.2015</a:t>
             </a:fld>
             <a:endParaRPr lang="de-CH"/>
           </a:p>
@@ -2540,7 +2541,7 @@
               <a:pPr>
                 <a:defRPr/>
               </a:pPr>
-              <a:t>13.07.2015</a:t>
+              <a:t>22.07.2015</a:t>
             </a:fld>
             <a:endParaRPr lang="de-CH"/>
           </a:p>
@@ -2823,7 +2824,7 @@
               <a:pPr>
                 <a:defRPr/>
               </a:pPr>
-              <a:t>13.07.2015</a:t>
+              <a:t>22.07.2015</a:t>
             </a:fld>
             <a:endParaRPr lang="de-CH"/>
           </a:p>
@@ -3121,7 +3122,7 @@
               <a:pPr>
                 <a:defRPr/>
               </a:pPr>
-              <a:t>13.07.2015</a:t>
+              <a:t>22.07.2015</a:t>
             </a:fld>
             <a:endParaRPr lang="de-CH"/>
           </a:p>
@@ -10635,7 +10636,7 @@
         </p:nvSpPr>
         <p:spPr bwMode="auto">
           <a:xfrm>
-            <a:off x="3854239" y="1935437"/>
+            <a:off x="3854239" y="1910334"/>
             <a:ext cx="1221817" cy="175507"/>
           </a:xfrm>
           <a:prstGeom prst="rect">
@@ -10801,7 +10802,6 @@
               <a:rPr lang="de-DE" altLang="de-DE" sz="1000" dirty="0" smtClean="0"/>
               <a:t>User2Supporter</a:t>
             </a:r>
-            <a:endParaRPr lang="de-DE" altLang="de-DE" sz="1000" dirty="0" smtClean="0"/>
           </a:p>
           <a:p>
             <a:pPr eaLnBrk="1" hangingPunct="1">
@@ -11030,7 +11030,7 @@
         </p:nvSpPr>
         <p:spPr bwMode="auto">
           <a:xfrm>
-            <a:off x="5139904" y="1880960"/>
+            <a:off x="5139904" y="1855857"/>
             <a:ext cx="80114" cy="276999"/>
           </a:xfrm>
           <a:prstGeom prst="rect">
@@ -11236,8 +11236,8 @@
         </p:nvCxnSpPr>
         <p:spPr>
           <a:xfrm>
-            <a:off x="5220018" y="2019460"/>
-            <a:ext cx="1392254" cy="65299"/>
+            <a:off x="5220018" y="1994357"/>
+            <a:ext cx="1392254" cy="90402"/>
           </a:xfrm>
           <a:prstGeom prst="bentConnector3">
             <a:avLst>
@@ -11470,7 +11470,7 @@
         </p:nvSpPr>
         <p:spPr bwMode="auto">
           <a:xfrm>
-            <a:off x="3510680" y="1904173"/>
+            <a:off x="3510680" y="1879070"/>
             <a:ext cx="288031" cy="138499"/>
           </a:xfrm>
           <a:prstGeom prst="rect">
@@ -11675,9 +11675,9 @@
           <p:nvPr/>
         </p:nvCxnSpPr>
         <p:spPr>
-          <a:xfrm>
-            <a:off x="2972566" y="1966941"/>
-            <a:ext cx="538114" cy="6482"/>
+          <a:xfrm flipV="1">
+            <a:off x="2972566" y="1948320"/>
+            <a:ext cx="538114" cy="18621"/>
           </a:xfrm>
           <a:prstGeom prst="bentConnector3">
             <a:avLst>
@@ -13306,6 +13306,2195 @@
 </file>
 
 <file path=ppt/slides/slide3.xml><?xml version="1.0" encoding="utf-8"?>
+<p:sld xmlns:a="http://schemas.openxmlformats.org/drawingml/2006/main" xmlns:r="http://schemas.openxmlformats.org/officeDocument/2006/relationships" xmlns:p="http://schemas.openxmlformats.org/presentationml/2006/main">
+  <p:cSld>
+    <p:spTree>
+      <p:nvGrpSpPr>
+        <p:cNvPr id="1" name=""/>
+        <p:cNvGrpSpPr/>
+        <p:nvPr/>
+      </p:nvGrpSpPr>
+      <p:grpSpPr>
+        <a:xfrm>
+          <a:off x="0" y="0"/>
+          <a:ext cx="0" cy="0"/>
+          <a:chOff x="0" y="0"/>
+          <a:chExt cx="0" cy="0"/>
+        </a:xfrm>
+      </p:grpSpPr>
+      <p:grpSp>
+        <p:nvGrpSpPr>
+          <p:cNvPr id="4" name="Gruppieren 3"/>
+          <p:cNvGrpSpPr/>
+          <p:nvPr/>
+        </p:nvGrpSpPr>
+        <p:grpSpPr>
+          <a:xfrm>
+            <a:off x="3923550" y="620688"/>
+            <a:ext cx="650882" cy="246221"/>
+            <a:chOff x="2653308" y="1412776"/>
+            <a:chExt cx="650882" cy="246221"/>
+          </a:xfrm>
+        </p:grpSpPr>
+        <p:sp>
+          <p:nvSpPr>
+            <p:cNvPr id="3" name="Textfeld 2"/>
+            <p:cNvSpPr txBox="1"/>
+            <p:nvPr/>
+          </p:nvSpPr>
+          <p:spPr>
+            <a:xfrm>
+              <a:off x="2843808" y="1412776"/>
+              <a:ext cx="460382" cy="246221"/>
+            </a:xfrm>
+            <a:prstGeom prst="rect">
+              <a:avLst/>
+            </a:prstGeom>
+            <a:noFill/>
+          </p:spPr>
+          <p:txBody>
+            <a:bodyPr wrap="none" rtlCol="0">
+              <a:spAutoFit/>
+            </a:bodyPr>
+            <a:lstStyle/>
+            <a:p>
+              <a:r>
+                <a:rPr lang="de-DE" sz="1000" dirty="0" smtClean="0"/>
+                <a:t>Hugo</a:t>
+              </a:r>
+              <a:endParaRPr lang="en-US" sz="1000" dirty="0"/>
+            </a:p>
+          </p:txBody>
+        </p:sp>
+        <p:pic>
+          <p:nvPicPr>
+            <p:cNvPr id="1027" name="Picture 3" descr="C:\Users\MoritzTheile\eclipse_SupeYou\com.supeyou.app\src\main\webapp\heroPics\skype_smile.png"/>
+            <p:cNvPicPr>
+              <a:picLocks noChangeAspect="1" noChangeArrowheads="1"/>
+            </p:cNvPicPr>
+            <p:nvPr/>
+          </p:nvPicPr>
+          <p:blipFill>
+            <a:blip r:embed="rId2">
+              <a:extLst>
+                <a:ext uri="{28A0092B-C50C-407E-A947-70E740481C1C}">
+                  <a14:useLocalDpi xmlns:a14="http://schemas.microsoft.com/office/drawing/2010/main" val="0"/>
+                </a:ext>
+              </a:extLst>
+            </a:blip>
+            <a:srcRect/>
+            <a:stretch>
+              <a:fillRect/>
+            </a:stretch>
+          </p:blipFill>
+          <p:spPr bwMode="auto">
+            <a:xfrm>
+              <a:off x="2653308" y="1440636"/>
+              <a:ext cx="190500" cy="190500"/>
+            </a:xfrm>
+            <a:prstGeom prst="rect">
+              <a:avLst/>
+            </a:prstGeom>
+            <a:noFill/>
+            <a:extLst>
+              <a:ext uri="{909E8E84-426E-40DD-AFC4-6F175D3DCCD1}">
+                <a14:hiddenFill xmlns:a14="http://schemas.microsoft.com/office/drawing/2010/main">
+                  <a:solidFill>
+                    <a:srgbClr val="FFFFFF"/>
+                  </a:solidFill>
+                </a14:hiddenFill>
+              </a:ext>
+            </a:extLst>
+          </p:spPr>
+        </p:pic>
+      </p:grpSp>
+      <p:grpSp>
+        <p:nvGrpSpPr>
+          <p:cNvPr id="7" name="Gruppieren 6"/>
+          <p:cNvGrpSpPr/>
+          <p:nvPr/>
+        </p:nvGrpSpPr>
+        <p:grpSpPr>
+          <a:xfrm>
+            <a:off x="2395217" y="1772816"/>
+            <a:ext cx="753475" cy="246221"/>
+            <a:chOff x="2653308" y="1412776"/>
+            <a:chExt cx="753475" cy="246221"/>
+          </a:xfrm>
+        </p:grpSpPr>
+        <p:sp>
+          <p:nvSpPr>
+            <p:cNvPr id="8" name="Textfeld 7"/>
+            <p:cNvSpPr txBox="1"/>
+            <p:nvPr/>
+          </p:nvSpPr>
+          <p:spPr>
+            <a:xfrm>
+              <a:off x="2843808" y="1412776"/>
+              <a:ext cx="562975" cy="246221"/>
+            </a:xfrm>
+            <a:prstGeom prst="rect">
+              <a:avLst/>
+            </a:prstGeom>
+            <a:noFill/>
+          </p:spPr>
+          <p:txBody>
+            <a:bodyPr wrap="none" rtlCol="0">
+              <a:spAutoFit/>
+            </a:bodyPr>
+            <a:lstStyle/>
+            <a:p>
+              <a:r>
+                <a:rPr lang="de-DE" sz="1000" dirty="0" smtClean="0"/>
+                <a:t>Andrea</a:t>
+              </a:r>
+              <a:endParaRPr lang="en-US" sz="1000" dirty="0"/>
+            </a:p>
+          </p:txBody>
+        </p:sp>
+        <p:pic>
+          <p:nvPicPr>
+            <p:cNvPr id="9" name="Picture 3" descr="C:\Users\MoritzTheile\eclipse_SupeYou\com.supeyou.app\src\main\webapp\heroPics\skype_smile.png"/>
+            <p:cNvPicPr>
+              <a:picLocks noChangeAspect="1" noChangeArrowheads="1"/>
+            </p:cNvPicPr>
+            <p:nvPr/>
+          </p:nvPicPr>
+          <p:blipFill>
+            <a:blip r:embed="rId2">
+              <a:extLst>
+                <a:ext uri="{28A0092B-C50C-407E-A947-70E740481C1C}">
+                  <a14:useLocalDpi xmlns:a14="http://schemas.microsoft.com/office/drawing/2010/main" val="0"/>
+                </a:ext>
+              </a:extLst>
+            </a:blip>
+            <a:srcRect/>
+            <a:stretch>
+              <a:fillRect/>
+            </a:stretch>
+          </p:blipFill>
+          <p:spPr bwMode="auto">
+            <a:xfrm>
+              <a:off x="2653308" y="1440636"/>
+              <a:ext cx="190500" cy="190500"/>
+            </a:xfrm>
+            <a:prstGeom prst="rect">
+              <a:avLst/>
+            </a:prstGeom>
+            <a:noFill/>
+            <a:extLst>
+              <a:ext uri="{909E8E84-426E-40DD-AFC4-6F175D3DCCD1}">
+                <a14:hiddenFill xmlns:a14="http://schemas.microsoft.com/office/drawing/2010/main">
+                  <a:solidFill>
+                    <a:srgbClr val="FFFFFF"/>
+                  </a:solidFill>
+                </a14:hiddenFill>
+              </a:ext>
+            </a:extLst>
+          </p:spPr>
+        </p:pic>
+      </p:grpSp>
+      <p:grpSp>
+        <p:nvGrpSpPr>
+          <p:cNvPr id="10" name="Gruppieren 9"/>
+          <p:cNvGrpSpPr/>
+          <p:nvPr/>
+        </p:nvGrpSpPr>
+        <p:grpSpPr>
+          <a:xfrm>
+            <a:off x="3826018" y="1772816"/>
+            <a:ext cx="827213" cy="246221"/>
+            <a:chOff x="2653308" y="1412776"/>
+            <a:chExt cx="827213" cy="246221"/>
+          </a:xfrm>
+        </p:grpSpPr>
+        <p:sp>
+          <p:nvSpPr>
+            <p:cNvPr id="11" name="Textfeld 10"/>
+            <p:cNvSpPr txBox="1"/>
+            <p:nvPr/>
+          </p:nvSpPr>
+          <p:spPr>
+            <a:xfrm>
+              <a:off x="2843808" y="1412776"/>
+              <a:ext cx="636713" cy="246221"/>
+            </a:xfrm>
+            <a:prstGeom prst="rect">
+              <a:avLst/>
+            </a:prstGeom>
+            <a:noFill/>
+          </p:spPr>
+          <p:txBody>
+            <a:bodyPr wrap="none" rtlCol="0">
+              <a:spAutoFit/>
+            </a:bodyPr>
+            <a:lstStyle/>
+            <a:p>
+              <a:r>
+                <a:rPr lang="de-DE" sz="1000" dirty="0" smtClean="0"/>
+                <a:t>Manfred</a:t>
+              </a:r>
+              <a:endParaRPr lang="en-US" sz="1000" dirty="0"/>
+            </a:p>
+          </p:txBody>
+        </p:sp>
+        <p:pic>
+          <p:nvPicPr>
+            <p:cNvPr id="12" name="Picture 3" descr="C:\Users\MoritzTheile\eclipse_SupeYou\com.supeyou.app\src\main\webapp\heroPics\skype_smile.png"/>
+            <p:cNvPicPr>
+              <a:picLocks noChangeAspect="1" noChangeArrowheads="1"/>
+            </p:cNvPicPr>
+            <p:nvPr/>
+          </p:nvPicPr>
+          <p:blipFill>
+            <a:blip r:embed="rId2">
+              <a:extLst>
+                <a:ext uri="{28A0092B-C50C-407E-A947-70E740481C1C}">
+                  <a14:useLocalDpi xmlns:a14="http://schemas.microsoft.com/office/drawing/2010/main" val="0"/>
+                </a:ext>
+              </a:extLst>
+            </a:blip>
+            <a:srcRect/>
+            <a:stretch>
+              <a:fillRect/>
+            </a:stretch>
+          </p:blipFill>
+          <p:spPr bwMode="auto">
+            <a:xfrm>
+              <a:off x="2653308" y="1440636"/>
+              <a:ext cx="190500" cy="190500"/>
+            </a:xfrm>
+            <a:prstGeom prst="rect">
+              <a:avLst/>
+            </a:prstGeom>
+            <a:noFill/>
+            <a:extLst>
+              <a:ext uri="{909E8E84-426E-40DD-AFC4-6F175D3DCCD1}">
+                <a14:hiddenFill xmlns:a14="http://schemas.microsoft.com/office/drawing/2010/main">
+                  <a:solidFill>
+                    <a:srgbClr val="FFFFFF"/>
+                  </a:solidFill>
+                </a14:hiddenFill>
+              </a:ext>
+            </a:extLst>
+          </p:spPr>
+        </p:pic>
+      </p:grpSp>
+      <p:cxnSp>
+        <p:nvCxnSpPr>
+          <p:cNvPr id="19" name="Gekrümmte Verbindung 18"/>
+          <p:cNvCxnSpPr>
+            <a:stCxn id="1027" idx="2"/>
+            <a:endCxn id="9" idx="0"/>
+          </p:cNvCxnSpPr>
+          <p:nvPr/>
+        </p:nvCxnSpPr>
+        <p:spPr>
+          <a:xfrm rot="5400000">
+            <a:off x="2773820" y="555696"/>
+            <a:ext cx="961628" cy="1528333"/>
+          </a:xfrm>
+          <a:prstGeom prst="curvedConnector3">
+            <a:avLst/>
+          </a:prstGeom>
+        </p:spPr>
+        <p:style>
+          <a:lnRef idx="1">
+            <a:schemeClr val="accent1"/>
+          </a:lnRef>
+          <a:fillRef idx="0">
+            <a:schemeClr val="accent1"/>
+          </a:fillRef>
+          <a:effectRef idx="0">
+            <a:schemeClr val="accent1"/>
+          </a:effectRef>
+          <a:fontRef idx="minor">
+            <a:schemeClr val="tx1"/>
+          </a:fontRef>
+        </p:style>
+      </p:cxnSp>
+      <p:cxnSp>
+        <p:nvCxnSpPr>
+          <p:cNvPr id="23" name="Gekrümmte Verbindung 22"/>
+          <p:cNvCxnSpPr>
+            <a:stCxn id="1027" idx="2"/>
+            <a:endCxn id="12" idx="0"/>
+          </p:cNvCxnSpPr>
+          <p:nvPr/>
+        </p:nvCxnSpPr>
+        <p:spPr>
+          <a:xfrm rot="5400000">
+            <a:off x="3489220" y="1271096"/>
+            <a:ext cx="961628" cy="97532"/>
+          </a:xfrm>
+          <a:prstGeom prst="curvedConnector3">
+            <a:avLst>
+              <a:gd name="adj1" fmla="val 50000"/>
+            </a:avLst>
+          </a:prstGeom>
+        </p:spPr>
+        <p:style>
+          <a:lnRef idx="1">
+            <a:schemeClr val="accent1"/>
+          </a:lnRef>
+          <a:fillRef idx="0">
+            <a:schemeClr val="accent1"/>
+          </a:fillRef>
+          <a:effectRef idx="0">
+            <a:schemeClr val="accent1"/>
+          </a:effectRef>
+          <a:fontRef idx="minor">
+            <a:schemeClr val="tx1"/>
+          </a:fontRef>
+        </p:style>
+      </p:cxnSp>
+      <p:grpSp>
+        <p:nvGrpSpPr>
+          <p:cNvPr id="26" name="Gruppieren 25"/>
+          <p:cNvGrpSpPr/>
+          <p:nvPr/>
+        </p:nvGrpSpPr>
+        <p:grpSpPr>
+          <a:xfrm>
+            <a:off x="5470154" y="1782340"/>
+            <a:ext cx="614014" cy="246221"/>
+            <a:chOff x="2653308" y="1412776"/>
+            <a:chExt cx="614014" cy="246221"/>
+          </a:xfrm>
+        </p:grpSpPr>
+        <p:sp>
+          <p:nvSpPr>
+            <p:cNvPr id="27" name="Textfeld 26"/>
+            <p:cNvSpPr txBox="1"/>
+            <p:nvPr/>
+          </p:nvSpPr>
+          <p:spPr>
+            <a:xfrm>
+              <a:off x="2843808" y="1412776"/>
+              <a:ext cx="423514" cy="246221"/>
+            </a:xfrm>
+            <a:prstGeom prst="rect">
+              <a:avLst/>
+            </a:prstGeom>
+            <a:noFill/>
+          </p:spPr>
+          <p:txBody>
+            <a:bodyPr wrap="none" rtlCol="0">
+              <a:spAutoFit/>
+            </a:bodyPr>
+            <a:lstStyle/>
+            <a:p>
+              <a:r>
+                <a:rPr lang="de-DE" sz="1000" dirty="0" smtClean="0"/>
+                <a:t>Otto</a:t>
+              </a:r>
+              <a:endParaRPr lang="en-US" sz="1000" dirty="0"/>
+            </a:p>
+          </p:txBody>
+        </p:sp>
+        <p:pic>
+          <p:nvPicPr>
+            <p:cNvPr id="28" name="Picture 3" descr="C:\Users\MoritzTheile\eclipse_SupeYou\com.supeyou.app\src\main\webapp\heroPics\skype_smile.png"/>
+            <p:cNvPicPr>
+              <a:picLocks noChangeAspect="1" noChangeArrowheads="1"/>
+            </p:cNvPicPr>
+            <p:nvPr/>
+          </p:nvPicPr>
+          <p:blipFill>
+            <a:blip r:embed="rId2">
+              <a:extLst>
+                <a:ext uri="{28A0092B-C50C-407E-A947-70E740481C1C}">
+                  <a14:useLocalDpi xmlns:a14="http://schemas.microsoft.com/office/drawing/2010/main" val="0"/>
+                </a:ext>
+              </a:extLst>
+            </a:blip>
+            <a:srcRect/>
+            <a:stretch>
+              <a:fillRect/>
+            </a:stretch>
+          </p:blipFill>
+          <p:spPr bwMode="auto">
+            <a:xfrm>
+              <a:off x="2653308" y="1440636"/>
+              <a:ext cx="190500" cy="190500"/>
+            </a:xfrm>
+            <a:prstGeom prst="rect">
+              <a:avLst/>
+            </a:prstGeom>
+            <a:noFill/>
+            <a:extLst>
+              <a:ext uri="{909E8E84-426E-40DD-AFC4-6F175D3DCCD1}">
+                <a14:hiddenFill xmlns:a14="http://schemas.microsoft.com/office/drawing/2010/main">
+                  <a:solidFill>
+                    <a:srgbClr val="FFFFFF"/>
+                  </a:solidFill>
+                </a14:hiddenFill>
+              </a:ext>
+            </a:extLst>
+          </p:spPr>
+        </p:pic>
+      </p:grpSp>
+      <p:grpSp>
+        <p:nvGrpSpPr>
+          <p:cNvPr id="32" name="Gruppieren 31"/>
+          <p:cNvGrpSpPr/>
+          <p:nvPr/>
+        </p:nvGrpSpPr>
+        <p:grpSpPr>
+          <a:xfrm>
+            <a:off x="4906138" y="3278039"/>
+            <a:ext cx="763093" cy="246221"/>
+            <a:chOff x="2653308" y="1412776"/>
+            <a:chExt cx="763093" cy="246221"/>
+          </a:xfrm>
+        </p:grpSpPr>
+        <p:sp>
+          <p:nvSpPr>
+            <p:cNvPr id="33" name="Textfeld 32"/>
+            <p:cNvSpPr txBox="1"/>
+            <p:nvPr/>
+          </p:nvSpPr>
+          <p:spPr>
+            <a:xfrm>
+              <a:off x="2843808" y="1412776"/>
+              <a:ext cx="572593" cy="246221"/>
+            </a:xfrm>
+            <a:prstGeom prst="rect">
+              <a:avLst/>
+            </a:prstGeom>
+            <a:noFill/>
+          </p:spPr>
+          <p:txBody>
+            <a:bodyPr wrap="none" rtlCol="0">
+              <a:spAutoFit/>
+            </a:bodyPr>
+            <a:lstStyle/>
+            <a:p>
+              <a:r>
+                <a:rPr lang="de-DE" sz="1000" dirty="0" smtClean="0"/>
+                <a:t>Gunnar</a:t>
+              </a:r>
+              <a:endParaRPr lang="en-US" sz="1000" dirty="0"/>
+            </a:p>
+          </p:txBody>
+        </p:sp>
+        <p:pic>
+          <p:nvPicPr>
+            <p:cNvPr id="34" name="Picture 3" descr="C:\Users\MoritzTheile\eclipse_SupeYou\com.supeyou.app\src\main\webapp\heroPics\skype_smile.png"/>
+            <p:cNvPicPr>
+              <a:picLocks noChangeAspect="1" noChangeArrowheads="1"/>
+            </p:cNvPicPr>
+            <p:nvPr/>
+          </p:nvPicPr>
+          <p:blipFill>
+            <a:blip r:embed="rId2">
+              <a:extLst>
+                <a:ext uri="{28A0092B-C50C-407E-A947-70E740481C1C}">
+                  <a14:useLocalDpi xmlns:a14="http://schemas.microsoft.com/office/drawing/2010/main" val="0"/>
+                </a:ext>
+              </a:extLst>
+            </a:blip>
+            <a:srcRect/>
+            <a:stretch>
+              <a:fillRect/>
+            </a:stretch>
+          </p:blipFill>
+          <p:spPr bwMode="auto">
+            <a:xfrm>
+              <a:off x="2653308" y="1440636"/>
+              <a:ext cx="190500" cy="190500"/>
+            </a:xfrm>
+            <a:prstGeom prst="rect">
+              <a:avLst/>
+            </a:prstGeom>
+            <a:noFill/>
+            <a:extLst>
+              <a:ext uri="{909E8E84-426E-40DD-AFC4-6F175D3DCCD1}">
+                <a14:hiddenFill xmlns:a14="http://schemas.microsoft.com/office/drawing/2010/main">
+                  <a:solidFill>
+                    <a:srgbClr val="FFFFFF"/>
+                  </a:solidFill>
+                </a14:hiddenFill>
+              </a:ext>
+            </a:extLst>
+          </p:spPr>
+        </p:pic>
+      </p:grpSp>
+      <p:cxnSp>
+        <p:nvCxnSpPr>
+          <p:cNvPr id="35" name="Gekrümmte Verbindung 34"/>
+          <p:cNvCxnSpPr>
+            <a:stCxn id="28" idx="2"/>
+            <a:endCxn id="34" idx="0"/>
+          </p:cNvCxnSpPr>
+          <p:nvPr/>
+        </p:nvCxnSpPr>
+        <p:spPr>
+          <a:xfrm rot="5400000">
+            <a:off x="4630797" y="2371291"/>
+            <a:ext cx="1305199" cy="564016"/>
+          </a:xfrm>
+          <a:prstGeom prst="curvedConnector3">
+            <a:avLst>
+              <a:gd name="adj1" fmla="val 50000"/>
+            </a:avLst>
+          </a:prstGeom>
+        </p:spPr>
+        <p:style>
+          <a:lnRef idx="1">
+            <a:schemeClr val="accent1"/>
+          </a:lnRef>
+          <a:fillRef idx="0">
+            <a:schemeClr val="accent1"/>
+          </a:fillRef>
+          <a:effectRef idx="0">
+            <a:schemeClr val="accent1"/>
+          </a:effectRef>
+          <a:fontRef idx="minor">
+            <a:schemeClr val="tx1"/>
+          </a:fontRef>
+        </p:style>
+      </p:cxnSp>
+      <p:grpSp>
+        <p:nvGrpSpPr>
+          <p:cNvPr id="36" name="Gruppieren 35"/>
+          <p:cNvGrpSpPr/>
+          <p:nvPr/>
+        </p:nvGrpSpPr>
+        <p:grpSpPr>
+          <a:xfrm>
+            <a:off x="5842242" y="3287563"/>
+            <a:ext cx="835228" cy="246221"/>
+            <a:chOff x="2653308" y="1412776"/>
+            <a:chExt cx="835228" cy="246221"/>
+          </a:xfrm>
+        </p:grpSpPr>
+        <p:sp>
+          <p:nvSpPr>
+            <p:cNvPr id="37" name="Textfeld 36"/>
+            <p:cNvSpPr txBox="1"/>
+            <p:nvPr/>
+          </p:nvSpPr>
+          <p:spPr>
+            <a:xfrm>
+              <a:off x="2843808" y="1412776"/>
+              <a:ext cx="644728" cy="246221"/>
+            </a:xfrm>
+            <a:prstGeom prst="rect">
+              <a:avLst/>
+            </a:prstGeom>
+            <a:noFill/>
+          </p:spPr>
+          <p:txBody>
+            <a:bodyPr wrap="none" rtlCol="0">
+              <a:spAutoFit/>
+            </a:bodyPr>
+            <a:lstStyle/>
+            <a:p>
+              <a:r>
+                <a:rPr lang="de-DE" sz="1000" dirty="0" smtClean="0"/>
+                <a:t>Christian</a:t>
+              </a:r>
+              <a:endParaRPr lang="en-US" sz="1000" dirty="0"/>
+            </a:p>
+          </p:txBody>
+        </p:sp>
+        <p:pic>
+          <p:nvPicPr>
+            <p:cNvPr id="38" name="Picture 3" descr="C:\Users\MoritzTheile\eclipse_SupeYou\com.supeyou.app\src\main\webapp\heroPics\skype_smile.png"/>
+            <p:cNvPicPr>
+              <a:picLocks noChangeAspect="1" noChangeArrowheads="1"/>
+            </p:cNvPicPr>
+            <p:nvPr/>
+          </p:nvPicPr>
+          <p:blipFill>
+            <a:blip r:embed="rId2">
+              <a:extLst>
+                <a:ext uri="{28A0092B-C50C-407E-A947-70E740481C1C}">
+                  <a14:useLocalDpi xmlns:a14="http://schemas.microsoft.com/office/drawing/2010/main" val="0"/>
+                </a:ext>
+              </a:extLst>
+            </a:blip>
+            <a:srcRect/>
+            <a:stretch>
+              <a:fillRect/>
+            </a:stretch>
+          </p:blipFill>
+          <p:spPr bwMode="auto">
+            <a:xfrm>
+              <a:off x="2653308" y="1440636"/>
+              <a:ext cx="190500" cy="190500"/>
+            </a:xfrm>
+            <a:prstGeom prst="rect">
+              <a:avLst/>
+            </a:prstGeom>
+            <a:noFill/>
+            <a:extLst>
+              <a:ext uri="{909E8E84-426E-40DD-AFC4-6F175D3DCCD1}">
+                <a14:hiddenFill xmlns:a14="http://schemas.microsoft.com/office/drawing/2010/main">
+                  <a:solidFill>
+                    <a:srgbClr val="FFFFFF"/>
+                  </a:solidFill>
+                </a14:hiddenFill>
+              </a:ext>
+            </a:extLst>
+          </p:spPr>
+        </p:pic>
+      </p:grpSp>
+      <p:cxnSp>
+        <p:nvCxnSpPr>
+          <p:cNvPr id="39" name="Gekrümmte Verbindung 38"/>
+          <p:cNvCxnSpPr>
+            <a:stCxn id="28" idx="2"/>
+            <a:endCxn id="38" idx="0"/>
+          </p:cNvCxnSpPr>
+          <p:nvPr/>
+        </p:nvCxnSpPr>
+        <p:spPr>
+          <a:xfrm rot="16200000" flipH="1">
+            <a:off x="5094087" y="2472017"/>
+            <a:ext cx="1314723" cy="372088"/>
+          </a:xfrm>
+          <a:prstGeom prst="curvedConnector3">
+            <a:avLst>
+              <a:gd name="adj1" fmla="val 50000"/>
+            </a:avLst>
+          </a:prstGeom>
+        </p:spPr>
+        <p:style>
+          <a:lnRef idx="1">
+            <a:schemeClr val="accent1"/>
+          </a:lnRef>
+          <a:fillRef idx="0">
+            <a:schemeClr val="accent1"/>
+          </a:fillRef>
+          <a:effectRef idx="0">
+            <a:schemeClr val="accent1"/>
+          </a:effectRef>
+          <a:fontRef idx="minor">
+            <a:schemeClr val="tx1"/>
+          </a:fontRef>
+        </p:style>
+      </p:cxnSp>
+      <p:grpSp>
+        <p:nvGrpSpPr>
+          <p:cNvPr id="42" name="Gruppieren 41"/>
+          <p:cNvGrpSpPr/>
+          <p:nvPr/>
+        </p:nvGrpSpPr>
+        <p:grpSpPr>
+          <a:xfrm>
+            <a:off x="3970034" y="3281995"/>
+            <a:ext cx="682943" cy="246221"/>
+            <a:chOff x="2653308" y="1412776"/>
+            <a:chExt cx="682943" cy="246221"/>
+          </a:xfrm>
+        </p:grpSpPr>
+        <p:sp>
+          <p:nvSpPr>
+            <p:cNvPr id="43" name="Textfeld 42"/>
+            <p:cNvSpPr txBox="1"/>
+            <p:nvPr/>
+          </p:nvSpPr>
+          <p:spPr>
+            <a:xfrm>
+              <a:off x="2843808" y="1412776"/>
+              <a:ext cx="492443" cy="246221"/>
+            </a:xfrm>
+            <a:prstGeom prst="rect">
+              <a:avLst/>
+            </a:prstGeom>
+            <a:noFill/>
+          </p:spPr>
+          <p:txBody>
+            <a:bodyPr wrap="none" rtlCol="0">
+              <a:spAutoFit/>
+            </a:bodyPr>
+            <a:lstStyle/>
+            <a:p>
+              <a:r>
+                <a:rPr lang="de-DE" sz="1000" dirty="0" smtClean="0"/>
+                <a:t>Marie</a:t>
+              </a:r>
+              <a:endParaRPr lang="en-US" sz="1000" dirty="0"/>
+            </a:p>
+          </p:txBody>
+        </p:sp>
+        <p:pic>
+          <p:nvPicPr>
+            <p:cNvPr id="44" name="Picture 3" descr="C:\Users\MoritzTheile\eclipse_SupeYou\com.supeyou.app\src\main\webapp\heroPics\skype_smile.png"/>
+            <p:cNvPicPr>
+              <a:picLocks noChangeAspect="1" noChangeArrowheads="1"/>
+            </p:cNvPicPr>
+            <p:nvPr/>
+          </p:nvPicPr>
+          <p:blipFill>
+            <a:blip r:embed="rId2">
+              <a:extLst>
+                <a:ext uri="{28A0092B-C50C-407E-A947-70E740481C1C}">
+                  <a14:useLocalDpi xmlns:a14="http://schemas.microsoft.com/office/drawing/2010/main" val="0"/>
+                </a:ext>
+              </a:extLst>
+            </a:blip>
+            <a:srcRect/>
+            <a:stretch>
+              <a:fillRect/>
+            </a:stretch>
+          </p:blipFill>
+          <p:spPr bwMode="auto">
+            <a:xfrm>
+              <a:off x="2653308" y="1440636"/>
+              <a:ext cx="190500" cy="190500"/>
+            </a:xfrm>
+            <a:prstGeom prst="rect">
+              <a:avLst/>
+            </a:prstGeom>
+            <a:noFill/>
+            <a:extLst>
+              <a:ext uri="{909E8E84-426E-40DD-AFC4-6F175D3DCCD1}">
+                <a14:hiddenFill xmlns:a14="http://schemas.microsoft.com/office/drawing/2010/main">
+                  <a:solidFill>
+                    <a:srgbClr val="FFFFFF"/>
+                  </a:solidFill>
+                </a14:hiddenFill>
+              </a:ext>
+            </a:extLst>
+          </p:spPr>
+        </p:pic>
+      </p:grpSp>
+      <p:cxnSp>
+        <p:nvCxnSpPr>
+          <p:cNvPr id="45" name="Gekrümmte Verbindung 44"/>
+          <p:cNvCxnSpPr>
+            <a:stCxn id="28" idx="2"/>
+            <a:endCxn id="44" idx="0"/>
+          </p:cNvCxnSpPr>
+          <p:nvPr/>
+        </p:nvCxnSpPr>
+        <p:spPr>
+          <a:xfrm rot="5400000">
+            <a:off x="4160767" y="1905217"/>
+            <a:ext cx="1309155" cy="1500120"/>
+          </a:xfrm>
+          <a:prstGeom prst="curvedConnector3">
+            <a:avLst>
+              <a:gd name="adj1" fmla="val 50000"/>
+            </a:avLst>
+          </a:prstGeom>
+        </p:spPr>
+        <p:style>
+          <a:lnRef idx="1">
+            <a:schemeClr val="accent1"/>
+          </a:lnRef>
+          <a:fillRef idx="0">
+            <a:schemeClr val="accent1"/>
+          </a:fillRef>
+          <a:effectRef idx="0">
+            <a:schemeClr val="accent1"/>
+          </a:effectRef>
+          <a:fontRef idx="minor">
+            <a:schemeClr val="tx1"/>
+          </a:fontRef>
+        </p:style>
+      </p:cxnSp>
+      <p:grpSp>
+        <p:nvGrpSpPr>
+          <p:cNvPr id="48" name="Gruppieren 47"/>
+          <p:cNvGrpSpPr/>
+          <p:nvPr/>
+        </p:nvGrpSpPr>
+        <p:grpSpPr>
+          <a:xfrm>
+            <a:off x="6740396" y="3299423"/>
+            <a:ext cx="783932" cy="246221"/>
+            <a:chOff x="2653308" y="1412776"/>
+            <a:chExt cx="783932" cy="246221"/>
+          </a:xfrm>
+        </p:grpSpPr>
+        <p:sp>
+          <p:nvSpPr>
+            <p:cNvPr id="49" name="Textfeld 48"/>
+            <p:cNvSpPr txBox="1"/>
+            <p:nvPr/>
+          </p:nvSpPr>
+          <p:spPr>
+            <a:xfrm>
+              <a:off x="2843808" y="1412776"/>
+              <a:ext cx="593432" cy="246221"/>
+            </a:xfrm>
+            <a:prstGeom prst="rect">
+              <a:avLst/>
+            </a:prstGeom>
+            <a:noFill/>
+          </p:spPr>
+          <p:txBody>
+            <a:bodyPr wrap="none" rtlCol="0">
+              <a:spAutoFit/>
+            </a:bodyPr>
+            <a:lstStyle/>
+            <a:p>
+              <a:r>
+                <a:rPr lang="de-DE" sz="1000" dirty="0" smtClean="0"/>
+                <a:t>Herbert</a:t>
+              </a:r>
+              <a:endParaRPr lang="en-US" sz="1000" dirty="0"/>
+            </a:p>
+          </p:txBody>
+        </p:sp>
+        <p:pic>
+          <p:nvPicPr>
+            <p:cNvPr id="50" name="Picture 3" descr="C:\Users\MoritzTheile\eclipse_SupeYou\com.supeyou.app\src\main\webapp\heroPics\skype_smile.png"/>
+            <p:cNvPicPr>
+              <a:picLocks noChangeAspect="1" noChangeArrowheads="1"/>
+            </p:cNvPicPr>
+            <p:nvPr/>
+          </p:nvPicPr>
+          <p:blipFill>
+            <a:blip r:embed="rId2">
+              <a:extLst>
+                <a:ext uri="{28A0092B-C50C-407E-A947-70E740481C1C}">
+                  <a14:useLocalDpi xmlns:a14="http://schemas.microsoft.com/office/drawing/2010/main" val="0"/>
+                </a:ext>
+              </a:extLst>
+            </a:blip>
+            <a:srcRect/>
+            <a:stretch>
+              <a:fillRect/>
+            </a:stretch>
+          </p:blipFill>
+          <p:spPr bwMode="auto">
+            <a:xfrm>
+              <a:off x="2653308" y="1440636"/>
+              <a:ext cx="190500" cy="190500"/>
+            </a:xfrm>
+            <a:prstGeom prst="rect">
+              <a:avLst/>
+            </a:prstGeom>
+            <a:noFill/>
+            <a:extLst>
+              <a:ext uri="{909E8E84-426E-40DD-AFC4-6F175D3DCCD1}">
+                <a14:hiddenFill xmlns:a14="http://schemas.microsoft.com/office/drawing/2010/main">
+                  <a:solidFill>
+                    <a:srgbClr val="FFFFFF"/>
+                  </a:solidFill>
+                </a14:hiddenFill>
+              </a:ext>
+            </a:extLst>
+          </p:spPr>
+        </p:pic>
+      </p:grpSp>
+      <p:cxnSp>
+        <p:nvCxnSpPr>
+          <p:cNvPr id="51" name="Gekrümmte Verbindung 50"/>
+          <p:cNvCxnSpPr>
+            <a:stCxn id="28" idx="2"/>
+            <a:endCxn id="50" idx="0"/>
+          </p:cNvCxnSpPr>
+          <p:nvPr/>
+        </p:nvCxnSpPr>
+        <p:spPr>
+          <a:xfrm rot="16200000" flipH="1">
+            <a:off x="5537234" y="2028870"/>
+            <a:ext cx="1326583" cy="1270242"/>
+          </a:xfrm>
+          <a:prstGeom prst="curvedConnector3">
+            <a:avLst>
+              <a:gd name="adj1" fmla="val 50000"/>
+            </a:avLst>
+          </a:prstGeom>
+        </p:spPr>
+        <p:style>
+          <a:lnRef idx="1">
+            <a:schemeClr val="accent1"/>
+          </a:lnRef>
+          <a:fillRef idx="0">
+            <a:schemeClr val="accent1"/>
+          </a:fillRef>
+          <a:effectRef idx="0">
+            <a:schemeClr val="accent1"/>
+          </a:effectRef>
+          <a:fontRef idx="minor">
+            <a:schemeClr val="tx1"/>
+          </a:fontRef>
+        </p:style>
+      </p:cxnSp>
+      <p:grpSp>
+        <p:nvGrpSpPr>
+          <p:cNvPr id="55" name="Gruppieren 54"/>
+          <p:cNvGrpSpPr/>
+          <p:nvPr/>
+        </p:nvGrpSpPr>
+        <p:grpSpPr>
+          <a:xfrm>
+            <a:off x="2817906" y="3277326"/>
+            <a:ext cx="862479" cy="246221"/>
+            <a:chOff x="2653308" y="1412776"/>
+            <a:chExt cx="862479" cy="246221"/>
+          </a:xfrm>
+        </p:grpSpPr>
+        <p:sp>
+          <p:nvSpPr>
+            <p:cNvPr id="56" name="Textfeld 55"/>
+            <p:cNvSpPr txBox="1"/>
+            <p:nvPr/>
+          </p:nvSpPr>
+          <p:spPr>
+            <a:xfrm>
+              <a:off x="2843808" y="1412776"/>
+              <a:ext cx="671979" cy="246221"/>
+            </a:xfrm>
+            <a:prstGeom prst="rect">
+              <a:avLst/>
+            </a:prstGeom>
+            <a:noFill/>
+          </p:spPr>
+          <p:txBody>
+            <a:bodyPr wrap="none" rtlCol="0">
+              <a:spAutoFit/>
+            </a:bodyPr>
+            <a:lstStyle/>
+            <a:p>
+              <a:r>
+                <a:rPr lang="de-DE" sz="1000" dirty="0" smtClean="0"/>
+                <a:t>Hermann</a:t>
+              </a:r>
+              <a:endParaRPr lang="en-US" sz="1000" dirty="0"/>
+            </a:p>
+          </p:txBody>
+        </p:sp>
+        <p:pic>
+          <p:nvPicPr>
+            <p:cNvPr id="57" name="Picture 3" descr="C:\Users\MoritzTheile\eclipse_SupeYou\com.supeyou.app\src\main\webapp\heroPics\skype_smile.png"/>
+            <p:cNvPicPr>
+              <a:picLocks noChangeAspect="1" noChangeArrowheads="1"/>
+            </p:cNvPicPr>
+            <p:nvPr/>
+          </p:nvPicPr>
+          <p:blipFill>
+            <a:blip r:embed="rId2">
+              <a:extLst>
+                <a:ext uri="{28A0092B-C50C-407E-A947-70E740481C1C}">
+                  <a14:useLocalDpi xmlns:a14="http://schemas.microsoft.com/office/drawing/2010/main" val="0"/>
+                </a:ext>
+              </a:extLst>
+            </a:blip>
+            <a:srcRect/>
+            <a:stretch>
+              <a:fillRect/>
+            </a:stretch>
+          </p:blipFill>
+          <p:spPr bwMode="auto">
+            <a:xfrm>
+              <a:off x="2653308" y="1440636"/>
+              <a:ext cx="190500" cy="190500"/>
+            </a:xfrm>
+            <a:prstGeom prst="rect">
+              <a:avLst/>
+            </a:prstGeom>
+            <a:noFill/>
+            <a:extLst>
+              <a:ext uri="{909E8E84-426E-40DD-AFC4-6F175D3DCCD1}">
+                <a14:hiddenFill xmlns:a14="http://schemas.microsoft.com/office/drawing/2010/main">
+                  <a:solidFill>
+                    <a:srgbClr val="FFFFFF"/>
+                  </a:solidFill>
+                </a14:hiddenFill>
+              </a:ext>
+            </a:extLst>
+          </p:spPr>
+        </p:pic>
+      </p:grpSp>
+      <p:cxnSp>
+        <p:nvCxnSpPr>
+          <p:cNvPr id="58" name="Gekrümmte Verbindung 57"/>
+          <p:cNvCxnSpPr>
+            <a:stCxn id="9" idx="2"/>
+            <a:endCxn id="57" idx="0"/>
+          </p:cNvCxnSpPr>
+          <p:nvPr/>
+        </p:nvCxnSpPr>
+        <p:spPr>
+          <a:xfrm rot="16200000" flipH="1">
+            <a:off x="2044806" y="2436836"/>
+            <a:ext cx="1314010" cy="422689"/>
+          </a:xfrm>
+          <a:prstGeom prst="curvedConnector3">
+            <a:avLst>
+              <a:gd name="adj1" fmla="val 50000"/>
+            </a:avLst>
+          </a:prstGeom>
+        </p:spPr>
+        <p:style>
+          <a:lnRef idx="1">
+            <a:schemeClr val="accent1"/>
+          </a:lnRef>
+          <a:fillRef idx="0">
+            <a:schemeClr val="accent1"/>
+          </a:fillRef>
+          <a:effectRef idx="0">
+            <a:schemeClr val="accent1"/>
+          </a:effectRef>
+          <a:fontRef idx="minor">
+            <a:schemeClr val="tx1"/>
+          </a:fontRef>
+        </p:style>
+      </p:cxnSp>
+      <p:grpSp>
+        <p:nvGrpSpPr>
+          <p:cNvPr id="59" name="Gruppieren 58"/>
+          <p:cNvGrpSpPr/>
+          <p:nvPr/>
+        </p:nvGrpSpPr>
+        <p:grpSpPr>
+          <a:xfrm>
+            <a:off x="1809794" y="3281282"/>
+            <a:ext cx="703782" cy="246221"/>
+            <a:chOff x="2653308" y="1412776"/>
+            <a:chExt cx="703782" cy="246221"/>
+          </a:xfrm>
+        </p:grpSpPr>
+        <p:sp>
+          <p:nvSpPr>
+            <p:cNvPr id="60" name="Textfeld 59"/>
+            <p:cNvSpPr txBox="1"/>
+            <p:nvPr/>
+          </p:nvSpPr>
+          <p:spPr>
+            <a:xfrm>
+              <a:off x="2843808" y="1412776"/>
+              <a:ext cx="513282" cy="246221"/>
+            </a:xfrm>
+            <a:prstGeom prst="rect">
+              <a:avLst/>
+            </a:prstGeom>
+            <a:noFill/>
+          </p:spPr>
+          <p:txBody>
+            <a:bodyPr wrap="none" rtlCol="0">
+              <a:spAutoFit/>
+            </a:bodyPr>
+            <a:lstStyle/>
+            <a:p>
+              <a:r>
+                <a:rPr lang="de-DE" sz="1000" dirty="0" smtClean="0"/>
+                <a:t>Emma</a:t>
+              </a:r>
+              <a:endParaRPr lang="en-US" sz="1000" dirty="0"/>
+            </a:p>
+          </p:txBody>
+        </p:sp>
+        <p:pic>
+          <p:nvPicPr>
+            <p:cNvPr id="61" name="Picture 3" descr="C:\Users\MoritzTheile\eclipse_SupeYou\com.supeyou.app\src\main\webapp\heroPics\skype_smile.png"/>
+            <p:cNvPicPr>
+              <a:picLocks noChangeAspect="1" noChangeArrowheads="1"/>
+            </p:cNvPicPr>
+            <p:nvPr/>
+          </p:nvPicPr>
+          <p:blipFill>
+            <a:blip r:embed="rId2">
+              <a:extLst>
+                <a:ext uri="{28A0092B-C50C-407E-A947-70E740481C1C}">
+                  <a14:useLocalDpi xmlns:a14="http://schemas.microsoft.com/office/drawing/2010/main" val="0"/>
+                </a:ext>
+              </a:extLst>
+            </a:blip>
+            <a:srcRect/>
+            <a:stretch>
+              <a:fillRect/>
+            </a:stretch>
+          </p:blipFill>
+          <p:spPr bwMode="auto">
+            <a:xfrm>
+              <a:off x="2653308" y="1440636"/>
+              <a:ext cx="190500" cy="190500"/>
+            </a:xfrm>
+            <a:prstGeom prst="rect">
+              <a:avLst/>
+            </a:prstGeom>
+            <a:noFill/>
+            <a:extLst>
+              <a:ext uri="{909E8E84-426E-40DD-AFC4-6F175D3DCCD1}">
+                <a14:hiddenFill xmlns:a14="http://schemas.microsoft.com/office/drawing/2010/main">
+                  <a:solidFill>
+                    <a:srgbClr val="FFFFFF"/>
+                  </a:solidFill>
+                </a14:hiddenFill>
+              </a:ext>
+            </a:extLst>
+          </p:spPr>
+        </p:pic>
+      </p:grpSp>
+      <p:cxnSp>
+        <p:nvCxnSpPr>
+          <p:cNvPr id="62" name="Gekrümmte Verbindung 61"/>
+          <p:cNvCxnSpPr>
+            <a:stCxn id="9" idx="2"/>
+            <a:endCxn id="61" idx="0"/>
+          </p:cNvCxnSpPr>
+          <p:nvPr/>
+        </p:nvCxnSpPr>
+        <p:spPr>
+          <a:xfrm rot="5400000">
+            <a:off x="1538773" y="2357448"/>
+            <a:ext cx="1317966" cy="585423"/>
+          </a:xfrm>
+          <a:prstGeom prst="curvedConnector3">
+            <a:avLst>
+              <a:gd name="adj1" fmla="val 50000"/>
+            </a:avLst>
+          </a:prstGeom>
+        </p:spPr>
+        <p:style>
+          <a:lnRef idx="1">
+            <a:schemeClr val="accent1"/>
+          </a:lnRef>
+          <a:fillRef idx="0">
+            <a:schemeClr val="accent1"/>
+          </a:fillRef>
+          <a:effectRef idx="0">
+            <a:schemeClr val="accent1"/>
+          </a:effectRef>
+          <a:fontRef idx="minor">
+            <a:schemeClr val="tx1"/>
+          </a:fontRef>
+        </p:style>
+      </p:cxnSp>
+      <p:grpSp>
+        <p:nvGrpSpPr>
+          <p:cNvPr id="65" name="Gruppieren 64"/>
+          <p:cNvGrpSpPr/>
+          <p:nvPr/>
+        </p:nvGrpSpPr>
+        <p:grpSpPr>
+          <a:xfrm>
+            <a:off x="2652371" y="4502173"/>
+            <a:ext cx="697370" cy="246221"/>
+            <a:chOff x="2653308" y="1412776"/>
+            <a:chExt cx="697370" cy="246221"/>
+          </a:xfrm>
+        </p:grpSpPr>
+        <p:sp>
+          <p:nvSpPr>
+            <p:cNvPr id="66" name="Textfeld 65"/>
+            <p:cNvSpPr txBox="1"/>
+            <p:nvPr/>
+          </p:nvSpPr>
+          <p:spPr>
+            <a:xfrm>
+              <a:off x="2843808" y="1412776"/>
+              <a:ext cx="506870" cy="246221"/>
+            </a:xfrm>
+            <a:prstGeom prst="rect">
+              <a:avLst/>
+            </a:prstGeom>
+            <a:noFill/>
+          </p:spPr>
+          <p:txBody>
+            <a:bodyPr wrap="none" rtlCol="0">
+              <a:spAutoFit/>
+            </a:bodyPr>
+            <a:lstStyle/>
+            <a:p>
+              <a:r>
+                <a:rPr lang="de-DE" sz="1000" dirty="0" smtClean="0"/>
+                <a:t>Eugen</a:t>
+              </a:r>
+              <a:endParaRPr lang="en-US" sz="1000" dirty="0"/>
+            </a:p>
+          </p:txBody>
+        </p:sp>
+        <p:pic>
+          <p:nvPicPr>
+            <p:cNvPr id="67" name="Picture 3" descr="C:\Users\MoritzTheile\eclipse_SupeYou\com.supeyou.app\src\main\webapp\heroPics\skype_smile.png"/>
+            <p:cNvPicPr>
+              <a:picLocks noChangeAspect="1" noChangeArrowheads="1"/>
+            </p:cNvPicPr>
+            <p:nvPr/>
+          </p:nvPicPr>
+          <p:blipFill>
+            <a:blip r:embed="rId2">
+              <a:extLst>
+                <a:ext uri="{28A0092B-C50C-407E-A947-70E740481C1C}">
+                  <a14:useLocalDpi xmlns:a14="http://schemas.microsoft.com/office/drawing/2010/main" val="0"/>
+                </a:ext>
+              </a:extLst>
+            </a:blip>
+            <a:srcRect/>
+            <a:stretch>
+              <a:fillRect/>
+            </a:stretch>
+          </p:blipFill>
+          <p:spPr bwMode="auto">
+            <a:xfrm>
+              <a:off x="2653308" y="1440636"/>
+              <a:ext cx="190500" cy="190500"/>
+            </a:xfrm>
+            <a:prstGeom prst="rect">
+              <a:avLst/>
+            </a:prstGeom>
+            <a:noFill/>
+            <a:extLst>
+              <a:ext uri="{909E8E84-426E-40DD-AFC4-6F175D3DCCD1}">
+                <a14:hiddenFill xmlns:a14="http://schemas.microsoft.com/office/drawing/2010/main">
+                  <a:solidFill>
+                    <a:srgbClr val="FFFFFF"/>
+                  </a:solidFill>
+                </a14:hiddenFill>
+              </a:ext>
+            </a:extLst>
+          </p:spPr>
+        </p:pic>
+      </p:grpSp>
+      <p:cxnSp>
+        <p:nvCxnSpPr>
+          <p:cNvPr id="68" name="Gekrümmte Verbindung 67"/>
+          <p:cNvCxnSpPr>
+            <a:stCxn id="57" idx="2"/>
+            <a:endCxn id="67" idx="0"/>
+          </p:cNvCxnSpPr>
+          <p:nvPr/>
+        </p:nvCxnSpPr>
+        <p:spPr>
+          <a:xfrm rot="5400000">
+            <a:off x="2313216" y="3930092"/>
+            <a:ext cx="1034347" cy="165535"/>
+          </a:xfrm>
+          <a:prstGeom prst="curvedConnector3">
+            <a:avLst>
+              <a:gd name="adj1" fmla="val 41712"/>
+            </a:avLst>
+          </a:prstGeom>
+        </p:spPr>
+        <p:style>
+          <a:lnRef idx="1">
+            <a:schemeClr val="accent1"/>
+          </a:lnRef>
+          <a:fillRef idx="0">
+            <a:schemeClr val="accent1"/>
+          </a:fillRef>
+          <a:effectRef idx="0">
+            <a:schemeClr val="accent1"/>
+          </a:effectRef>
+          <a:fontRef idx="minor">
+            <a:schemeClr val="tx1"/>
+          </a:fontRef>
+        </p:style>
+      </p:cxnSp>
+      <p:cxnSp>
+        <p:nvCxnSpPr>
+          <p:cNvPr id="69" name="Gekrümmte Verbindung 68"/>
+          <p:cNvCxnSpPr>
+            <a:stCxn id="1027" idx="2"/>
+            <a:endCxn id="28" idx="0"/>
+          </p:cNvCxnSpPr>
+          <p:nvPr/>
+        </p:nvCxnSpPr>
+        <p:spPr>
+          <a:xfrm rot="16200000" flipH="1">
+            <a:off x="4306526" y="551322"/>
+            <a:ext cx="971152" cy="1546604"/>
+          </a:xfrm>
+          <a:prstGeom prst="curvedConnector3">
+            <a:avLst>
+              <a:gd name="adj1" fmla="val 50000"/>
+            </a:avLst>
+          </a:prstGeom>
+        </p:spPr>
+        <p:style>
+          <a:lnRef idx="1">
+            <a:schemeClr val="accent1"/>
+          </a:lnRef>
+          <a:fillRef idx="0">
+            <a:schemeClr val="accent1"/>
+          </a:fillRef>
+          <a:effectRef idx="0">
+            <a:schemeClr val="accent1"/>
+          </a:effectRef>
+          <a:fontRef idx="minor">
+            <a:schemeClr val="tx1"/>
+          </a:fontRef>
+        </p:style>
+      </p:cxnSp>
+      <p:grpSp>
+        <p:nvGrpSpPr>
+          <p:cNvPr id="130" name="Gruppieren 129"/>
+          <p:cNvGrpSpPr/>
+          <p:nvPr/>
+        </p:nvGrpSpPr>
+        <p:grpSpPr>
+          <a:xfrm>
+            <a:off x="2915816" y="5915127"/>
+            <a:ext cx="753475" cy="246221"/>
+            <a:chOff x="2653308" y="1412776"/>
+            <a:chExt cx="753475" cy="246221"/>
+          </a:xfrm>
+        </p:grpSpPr>
+        <p:sp>
+          <p:nvSpPr>
+            <p:cNvPr id="131" name="Textfeld 130"/>
+            <p:cNvSpPr txBox="1"/>
+            <p:nvPr/>
+          </p:nvSpPr>
+          <p:spPr>
+            <a:xfrm>
+              <a:off x="2843808" y="1412776"/>
+              <a:ext cx="562975" cy="246221"/>
+            </a:xfrm>
+            <a:prstGeom prst="rect">
+              <a:avLst/>
+            </a:prstGeom>
+            <a:noFill/>
+          </p:spPr>
+          <p:txBody>
+            <a:bodyPr wrap="none" rtlCol="0">
+              <a:spAutoFit/>
+            </a:bodyPr>
+            <a:lstStyle/>
+            <a:p>
+              <a:r>
+                <a:rPr lang="de-DE" sz="1000" dirty="0" smtClean="0"/>
+                <a:t>Marion</a:t>
+              </a:r>
+              <a:endParaRPr lang="en-US" sz="1000" dirty="0"/>
+            </a:p>
+          </p:txBody>
+        </p:sp>
+        <p:pic>
+          <p:nvPicPr>
+            <p:cNvPr id="132" name="Picture 3" descr="C:\Users\MoritzTheile\eclipse_SupeYou\com.supeyou.app\src\main\webapp\heroPics\skype_smile.png"/>
+            <p:cNvPicPr>
+              <a:picLocks noChangeAspect="1" noChangeArrowheads="1"/>
+            </p:cNvPicPr>
+            <p:nvPr/>
+          </p:nvPicPr>
+          <p:blipFill>
+            <a:blip r:embed="rId2">
+              <a:extLst>
+                <a:ext uri="{28A0092B-C50C-407E-A947-70E740481C1C}">
+                  <a14:useLocalDpi xmlns:a14="http://schemas.microsoft.com/office/drawing/2010/main" val="0"/>
+                </a:ext>
+              </a:extLst>
+            </a:blip>
+            <a:srcRect/>
+            <a:stretch>
+              <a:fillRect/>
+            </a:stretch>
+          </p:blipFill>
+          <p:spPr bwMode="auto">
+            <a:xfrm>
+              <a:off x="2653308" y="1440636"/>
+              <a:ext cx="190500" cy="190500"/>
+            </a:xfrm>
+            <a:prstGeom prst="rect">
+              <a:avLst/>
+            </a:prstGeom>
+            <a:noFill/>
+            <a:extLst>
+              <a:ext uri="{909E8E84-426E-40DD-AFC4-6F175D3DCCD1}">
+                <a14:hiddenFill xmlns:a14="http://schemas.microsoft.com/office/drawing/2010/main">
+                  <a:solidFill>
+                    <a:srgbClr val="FFFFFF"/>
+                  </a:solidFill>
+                </a14:hiddenFill>
+              </a:ext>
+            </a:extLst>
+          </p:spPr>
+        </p:pic>
+      </p:grpSp>
+      <p:cxnSp>
+        <p:nvCxnSpPr>
+          <p:cNvPr id="133" name="Gekrümmte Verbindung 132"/>
+          <p:cNvCxnSpPr>
+            <a:stCxn id="67" idx="2"/>
+            <a:endCxn id="132" idx="0"/>
+          </p:cNvCxnSpPr>
+          <p:nvPr/>
+        </p:nvCxnSpPr>
+        <p:spPr>
+          <a:xfrm rot="16200000" flipH="1">
+            <a:off x="2268116" y="5200037"/>
+            <a:ext cx="1222454" cy="263445"/>
+          </a:xfrm>
+          <a:prstGeom prst="curvedConnector3">
+            <a:avLst>
+              <a:gd name="adj1" fmla="val 50000"/>
+            </a:avLst>
+          </a:prstGeom>
+        </p:spPr>
+        <p:style>
+          <a:lnRef idx="1">
+            <a:schemeClr val="accent1"/>
+          </a:lnRef>
+          <a:fillRef idx="0">
+            <a:schemeClr val="accent1"/>
+          </a:fillRef>
+          <a:effectRef idx="0">
+            <a:schemeClr val="accent1"/>
+          </a:effectRef>
+          <a:fontRef idx="minor">
+            <a:schemeClr val="tx1"/>
+          </a:fontRef>
+        </p:style>
+      </p:cxnSp>
+      <p:grpSp>
+        <p:nvGrpSpPr>
+          <p:cNvPr id="134" name="Gruppieren 133"/>
+          <p:cNvGrpSpPr/>
+          <p:nvPr/>
+        </p:nvGrpSpPr>
+        <p:grpSpPr>
+          <a:xfrm>
+            <a:off x="1979712" y="5919083"/>
+            <a:ext cx="798359" cy="246221"/>
+            <a:chOff x="2653308" y="1412776"/>
+            <a:chExt cx="798359" cy="246221"/>
+          </a:xfrm>
+        </p:grpSpPr>
+        <p:sp>
+          <p:nvSpPr>
+            <p:cNvPr id="135" name="Textfeld 134"/>
+            <p:cNvSpPr txBox="1"/>
+            <p:nvPr/>
+          </p:nvSpPr>
+          <p:spPr>
+            <a:xfrm>
+              <a:off x="2843808" y="1412776"/>
+              <a:ext cx="607859" cy="246221"/>
+            </a:xfrm>
+            <a:prstGeom prst="rect">
+              <a:avLst/>
+            </a:prstGeom>
+            <a:noFill/>
+          </p:spPr>
+          <p:txBody>
+            <a:bodyPr wrap="none" rtlCol="0">
+              <a:spAutoFit/>
+            </a:bodyPr>
+            <a:lstStyle/>
+            <a:p>
+              <a:r>
+                <a:rPr lang="de-DE" sz="1000" dirty="0" smtClean="0"/>
+                <a:t>Melanie</a:t>
+              </a:r>
+              <a:endParaRPr lang="en-US" sz="1000" dirty="0"/>
+            </a:p>
+          </p:txBody>
+        </p:sp>
+        <p:pic>
+          <p:nvPicPr>
+            <p:cNvPr id="136" name="Picture 3" descr="C:\Users\MoritzTheile\eclipse_SupeYou\com.supeyou.app\src\main\webapp\heroPics\skype_smile.png"/>
+            <p:cNvPicPr>
+              <a:picLocks noChangeAspect="1" noChangeArrowheads="1"/>
+            </p:cNvPicPr>
+            <p:nvPr/>
+          </p:nvPicPr>
+          <p:blipFill>
+            <a:blip r:embed="rId2">
+              <a:extLst>
+                <a:ext uri="{28A0092B-C50C-407E-A947-70E740481C1C}">
+                  <a14:useLocalDpi xmlns:a14="http://schemas.microsoft.com/office/drawing/2010/main" val="0"/>
+                </a:ext>
+              </a:extLst>
+            </a:blip>
+            <a:srcRect/>
+            <a:stretch>
+              <a:fillRect/>
+            </a:stretch>
+          </p:blipFill>
+          <p:spPr bwMode="auto">
+            <a:xfrm>
+              <a:off x="2653308" y="1440636"/>
+              <a:ext cx="190500" cy="190500"/>
+            </a:xfrm>
+            <a:prstGeom prst="rect">
+              <a:avLst/>
+            </a:prstGeom>
+            <a:noFill/>
+            <a:extLst>
+              <a:ext uri="{909E8E84-426E-40DD-AFC4-6F175D3DCCD1}">
+                <a14:hiddenFill xmlns:a14="http://schemas.microsoft.com/office/drawing/2010/main">
+                  <a:solidFill>
+                    <a:srgbClr val="FFFFFF"/>
+                  </a:solidFill>
+                </a14:hiddenFill>
+              </a:ext>
+            </a:extLst>
+          </p:spPr>
+        </p:pic>
+      </p:grpSp>
+      <p:cxnSp>
+        <p:nvCxnSpPr>
+          <p:cNvPr id="137" name="Gekrümmte Verbindung 136"/>
+          <p:cNvCxnSpPr>
+            <a:stCxn id="67" idx="2"/>
+            <a:endCxn id="136" idx="0"/>
+          </p:cNvCxnSpPr>
+          <p:nvPr/>
+        </p:nvCxnSpPr>
+        <p:spPr>
+          <a:xfrm rot="5400000">
+            <a:off x="1798087" y="4997409"/>
+            <a:ext cx="1226410" cy="672659"/>
+          </a:xfrm>
+          <a:prstGeom prst="curvedConnector3">
+            <a:avLst>
+              <a:gd name="adj1" fmla="val 50000"/>
+            </a:avLst>
+          </a:prstGeom>
+        </p:spPr>
+        <p:style>
+          <a:lnRef idx="1">
+            <a:schemeClr val="accent1"/>
+          </a:lnRef>
+          <a:fillRef idx="0">
+            <a:schemeClr val="accent1"/>
+          </a:fillRef>
+          <a:effectRef idx="0">
+            <a:schemeClr val="accent1"/>
+          </a:effectRef>
+          <a:fontRef idx="minor">
+            <a:schemeClr val="tx1"/>
+          </a:fontRef>
+        </p:style>
+      </p:cxnSp>
+      <p:grpSp>
+        <p:nvGrpSpPr>
+          <p:cNvPr id="149" name="Gruppieren 148"/>
+          <p:cNvGrpSpPr/>
+          <p:nvPr/>
+        </p:nvGrpSpPr>
+        <p:grpSpPr>
+          <a:xfrm>
+            <a:off x="4716016" y="4509120"/>
+            <a:ext cx="785535" cy="246221"/>
+            <a:chOff x="2653308" y="1412776"/>
+            <a:chExt cx="785535" cy="246221"/>
+          </a:xfrm>
+        </p:grpSpPr>
+        <p:sp>
+          <p:nvSpPr>
+            <p:cNvPr id="150" name="Textfeld 149"/>
+            <p:cNvSpPr txBox="1"/>
+            <p:nvPr/>
+          </p:nvSpPr>
+          <p:spPr>
+            <a:xfrm>
+              <a:off x="2843808" y="1412776"/>
+              <a:ext cx="595035" cy="246221"/>
+            </a:xfrm>
+            <a:prstGeom prst="rect">
+              <a:avLst/>
+            </a:prstGeom>
+            <a:noFill/>
+          </p:spPr>
+          <p:txBody>
+            <a:bodyPr wrap="none" rtlCol="0">
+              <a:spAutoFit/>
+            </a:bodyPr>
+            <a:lstStyle/>
+            <a:p>
+              <a:r>
+                <a:rPr lang="de-DE" sz="1000" dirty="0" smtClean="0"/>
+                <a:t>Thomas</a:t>
+              </a:r>
+              <a:endParaRPr lang="en-US" sz="1000" dirty="0"/>
+            </a:p>
+          </p:txBody>
+        </p:sp>
+        <p:pic>
+          <p:nvPicPr>
+            <p:cNvPr id="151" name="Picture 3" descr="C:\Users\MoritzTheile\eclipse_SupeYou\com.supeyou.app\src\main\webapp\heroPics\skype_smile.png"/>
+            <p:cNvPicPr>
+              <a:picLocks noChangeAspect="1" noChangeArrowheads="1"/>
+            </p:cNvPicPr>
+            <p:nvPr/>
+          </p:nvPicPr>
+          <p:blipFill>
+            <a:blip r:embed="rId2">
+              <a:extLst>
+                <a:ext uri="{28A0092B-C50C-407E-A947-70E740481C1C}">
+                  <a14:useLocalDpi xmlns:a14="http://schemas.microsoft.com/office/drawing/2010/main" val="0"/>
+                </a:ext>
+              </a:extLst>
+            </a:blip>
+            <a:srcRect/>
+            <a:stretch>
+              <a:fillRect/>
+            </a:stretch>
+          </p:blipFill>
+          <p:spPr bwMode="auto">
+            <a:xfrm>
+              <a:off x="2653308" y="1440636"/>
+              <a:ext cx="190500" cy="190500"/>
+            </a:xfrm>
+            <a:prstGeom prst="rect">
+              <a:avLst/>
+            </a:prstGeom>
+            <a:noFill/>
+            <a:extLst>
+              <a:ext uri="{909E8E84-426E-40DD-AFC4-6F175D3DCCD1}">
+                <a14:hiddenFill xmlns:a14="http://schemas.microsoft.com/office/drawing/2010/main">
+                  <a:solidFill>
+                    <a:srgbClr val="FFFFFF"/>
+                  </a:solidFill>
+                </a14:hiddenFill>
+              </a:ext>
+            </a:extLst>
+          </p:spPr>
+        </p:pic>
+      </p:grpSp>
+      <p:cxnSp>
+        <p:nvCxnSpPr>
+          <p:cNvPr id="152" name="Gekrümmte Verbindung 151"/>
+          <p:cNvCxnSpPr>
+            <a:stCxn id="34" idx="2"/>
+            <a:endCxn id="151" idx="0"/>
+          </p:cNvCxnSpPr>
+          <p:nvPr/>
+        </p:nvCxnSpPr>
+        <p:spPr>
+          <a:xfrm rot="5400000">
+            <a:off x="4386037" y="3921628"/>
+            <a:ext cx="1040581" cy="190122"/>
+          </a:xfrm>
+          <a:prstGeom prst="curvedConnector3">
+            <a:avLst>
+              <a:gd name="adj1" fmla="val 50000"/>
+            </a:avLst>
+          </a:prstGeom>
+        </p:spPr>
+        <p:style>
+          <a:lnRef idx="1">
+            <a:schemeClr val="accent1"/>
+          </a:lnRef>
+          <a:fillRef idx="0">
+            <a:schemeClr val="accent1"/>
+          </a:fillRef>
+          <a:effectRef idx="0">
+            <a:schemeClr val="accent1"/>
+          </a:effectRef>
+          <a:fontRef idx="minor">
+            <a:schemeClr val="tx1"/>
+          </a:fontRef>
+        </p:style>
+      </p:cxnSp>
+      <p:sp>
+        <p:nvSpPr>
+          <p:cNvPr id="93" name="Textfeld 92"/>
+          <p:cNvSpPr txBox="1"/>
+          <p:nvPr/>
+        </p:nvSpPr>
+        <p:spPr>
+          <a:xfrm>
+            <a:off x="2606239" y="3328808"/>
+            <a:ext cx="242374" cy="160310"/>
+          </a:xfrm>
+          <a:prstGeom prst="rect">
+            <a:avLst/>
+          </a:prstGeom>
+          <a:noFill/>
+        </p:spPr>
+        <p:txBody>
+          <a:bodyPr wrap="none" tIns="18000" bIns="3600" rtlCol="0">
+            <a:spAutoFit/>
+          </a:bodyPr>
+          <a:lstStyle/>
+          <a:p>
+            <a:r>
+              <a:rPr lang="de-DE" sz="900" dirty="0" smtClean="0"/>
+              <a:t>3</a:t>
+            </a:r>
+            <a:endParaRPr lang="en-US" sz="900" dirty="0"/>
+          </a:p>
+        </p:txBody>
+      </p:sp>
+      <p:sp>
+        <p:nvSpPr>
+          <p:cNvPr id="94" name="Textfeld 93"/>
+          <p:cNvSpPr txBox="1"/>
+          <p:nvPr/>
+        </p:nvSpPr>
+        <p:spPr>
+          <a:xfrm>
+            <a:off x="2409997" y="4545128"/>
+            <a:ext cx="242374" cy="160310"/>
+          </a:xfrm>
+          <a:prstGeom prst="rect">
+            <a:avLst/>
+          </a:prstGeom>
+          <a:noFill/>
+        </p:spPr>
+        <p:txBody>
+          <a:bodyPr wrap="none" tIns="18000" bIns="3600" rtlCol="0">
+            <a:spAutoFit/>
+          </a:bodyPr>
+          <a:lstStyle/>
+          <a:p>
+            <a:r>
+              <a:rPr lang="de-DE" sz="900" dirty="0" smtClean="0"/>
+              <a:t>2</a:t>
+            </a:r>
+            <a:endParaRPr lang="en-US" sz="900" dirty="0"/>
+          </a:p>
+        </p:txBody>
+      </p:sp>
+      <p:sp>
+        <p:nvSpPr>
+          <p:cNvPr id="95" name="Textfeld 94"/>
+          <p:cNvSpPr txBox="1"/>
+          <p:nvPr/>
+        </p:nvSpPr>
+        <p:spPr>
+          <a:xfrm>
+            <a:off x="2170212" y="1836121"/>
+            <a:ext cx="242374" cy="160310"/>
+          </a:xfrm>
+          <a:prstGeom prst="rect">
+            <a:avLst/>
+          </a:prstGeom>
+          <a:noFill/>
+        </p:spPr>
+        <p:txBody>
+          <a:bodyPr wrap="none" tIns="18000" bIns="3600" rtlCol="0">
+            <a:spAutoFit/>
+          </a:bodyPr>
+          <a:lstStyle/>
+          <a:p>
+            <a:r>
+              <a:rPr lang="de-DE" sz="900" dirty="0" smtClean="0"/>
+              <a:t>5</a:t>
+            </a:r>
+            <a:endParaRPr lang="en-US" sz="900" dirty="0"/>
+          </a:p>
+        </p:txBody>
+      </p:sp>
+      <p:sp>
+        <p:nvSpPr>
+          <p:cNvPr id="96" name="Textfeld 95"/>
+          <p:cNvSpPr txBox="1"/>
+          <p:nvPr/>
+        </p:nvSpPr>
+        <p:spPr>
+          <a:xfrm>
+            <a:off x="1594696" y="3322294"/>
+            <a:ext cx="242374" cy="160310"/>
+          </a:xfrm>
+          <a:prstGeom prst="rect">
+            <a:avLst/>
+          </a:prstGeom>
+          <a:noFill/>
+        </p:spPr>
+        <p:txBody>
+          <a:bodyPr wrap="none" tIns="18000" bIns="3600" rtlCol="0">
+            <a:spAutoFit/>
+          </a:bodyPr>
+          <a:lstStyle/>
+          <a:p>
+            <a:r>
+              <a:rPr lang="de-DE" sz="900" dirty="0" smtClean="0"/>
+              <a:t>0</a:t>
+            </a:r>
+            <a:endParaRPr lang="en-US" sz="900" dirty="0"/>
+          </a:p>
+        </p:txBody>
+      </p:sp>
+      <p:sp>
+        <p:nvSpPr>
+          <p:cNvPr id="102" name="Textfeld 101"/>
+          <p:cNvSpPr txBox="1"/>
+          <p:nvPr/>
+        </p:nvSpPr>
+        <p:spPr>
+          <a:xfrm>
+            <a:off x="3635896" y="663643"/>
+            <a:ext cx="300082" cy="160310"/>
+          </a:xfrm>
+          <a:prstGeom prst="rect">
+            <a:avLst/>
+          </a:prstGeom>
+          <a:noFill/>
+        </p:spPr>
+        <p:txBody>
+          <a:bodyPr wrap="none" tIns="18000" bIns="3600" rtlCol="0">
+            <a:spAutoFit/>
+          </a:bodyPr>
+          <a:lstStyle/>
+          <a:p>
+            <a:r>
+              <a:rPr lang="de-DE" sz="900" dirty="0" smtClean="0"/>
+              <a:t>13</a:t>
+            </a:r>
+            <a:endParaRPr lang="en-US" sz="900" dirty="0"/>
+          </a:p>
+        </p:txBody>
+      </p:sp>
+      <p:sp>
+        <p:nvSpPr>
+          <p:cNvPr id="106" name="Textfeld 105"/>
+          <p:cNvSpPr txBox="1"/>
+          <p:nvPr/>
+        </p:nvSpPr>
+        <p:spPr>
+          <a:xfrm>
+            <a:off x="3749895" y="3328808"/>
+            <a:ext cx="242374" cy="160310"/>
+          </a:xfrm>
+          <a:prstGeom prst="rect">
+            <a:avLst/>
+          </a:prstGeom>
+          <a:noFill/>
+        </p:spPr>
+        <p:txBody>
+          <a:bodyPr wrap="none" tIns="18000" bIns="3600" rtlCol="0">
+            <a:spAutoFit/>
+          </a:bodyPr>
+          <a:lstStyle/>
+          <a:p>
+            <a:r>
+              <a:rPr lang="de-DE" sz="900" dirty="0" smtClean="0"/>
+              <a:t>0</a:t>
+            </a:r>
+            <a:endParaRPr lang="en-US" sz="900" dirty="0"/>
+          </a:p>
+        </p:txBody>
+      </p:sp>
+      <p:sp>
+        <p:nvSpPr>
+          <p:cNvPr id="115" name="Textfeld 114"/>
+          <p:cNvSpPr txBox="1"/>
+          <p:nvPr/>
+        </p:nvSpPr>
+        <p:spPr>
+          <a:xfrm>
+            <a:off x="5253878" y="1830865"/>
+            <a:ext cx="242374" cy="160310"/>
+          </a:xfrm>
+          <a:prstGeom prst="rect">
+            <a:avLst/>
+          </a:prstGeom>
+          <a:noFill/>
+        </p:spPr>
+        <p:txBody>
+          <a:bodyPr wrap="none" tIns="18000" bIns="3600" rtlCol="0">
+            <a:spAutoFit/>
+          </a:bodyPr>
+          <a:lstStyle/>
+          <a:p>
+            <a:r>
+              <a:rPr lang="de-DE" sz="900" dirty="0" smtClean="0"/>
+              <a:t>5</a:t>
+            </a:r>
+            <a:endParaRPr lang="en-US" sz="900" dirty="0"/>
+          </a:p>
+        </p:txBody>
+      </p:sp>
+      <p:cxnSp>
+        <p:nvCxnSpPr>
+          <p:cNvPr id="116" name="Gekrümmte Verbindung 115"/>
+          <p:cNvCxnSpPr>
+            <a:stCxn id="28" idx="0"/>
+            <a:endCxn id="50" idx="2"/>
+          </p:cNvCxnSpPr>
+          <p:nvPr/>
+        </p:nvCxnSpPr>
+        <p:spPr>
+          <a:xfrm rot="16200000" flipH="1">
+            <a:off x="5346733" y="2028870"/>
+            <a:ext cx="1707583" cy="1270242"/>
+          </a:xfrm>
+          <a:prstGeom prst="curvedConnector5">
+            <a:avLst>
+              <a:gd name="adj1" fmla="val -13387"/>
+              <a:gd name="adj2" fmla="val 190973"/>
+              <a:gd name="adj3" fmla="val 113387"/>
+            </a:avLst>
+          </a:prstGeom>
+          <a:ln w="15875">
+            <a:solidFill>
+              <a:srgbClr val="C00000"/>
+            </a:solidFill>
+          </a:ln>
+        </p:spPr>
+        <p:style>
+          <a:lnRef idx="1">
+            <a:schemeClr val="accent1"/>
+          </a:lnRef>
+          <a:fillRef idx="0">
+            <a:schemeClr val="accent1"/>
+          </a:fillRef>
+          <a:effectRef idx="0">
+            <a:schemeClr val="accent1"/>
+          </a:effectRef>
+          <a:fontRef idx="minor">
+            <a:schemeClr val="tx1"/>
+          </a:fontRef>
+        </p:style>
+      </p:cxnSp>
+      <p:cxnSp>
+        <p:nvCxnSpPr>
+          <p:cNvPr id="118" name="Gekrümmte Verbindung 117"/>
+          <p:cNvCxnSpPr>
+            <a:stCxn id="9" idx="2"/>
+            <a:endCxn id="67" idx="0"/>
+          </p:cNvCxnSpPr>
+          <p:nvPr/>
+        </p:nvCxnSpPr>
+        <p:spPr>
+          <a:xfrm rot="16200000" flipH="1">
+            <a:off x="1349616" y="3132027"/>
+            <a:ext cx="2538857" cy="257154"/>
+          </a:xfrm>
+          <a:prstGeom prst="curvedConnector3">
+            <a:avLst>
+              <a:gd name="adj1" fmla="val 77013"/>
+            </a:avLst>
+          </a:prstGeom>
+          <a:ln w="15875">
+            <a:solidFill>
+              <a:srgbClr val="C00000"/>
+            </a:solidFill>
+          </a:ln>
+        </p:spPr>
+        <p:style>
+          <a:lnRef idx="1">
+            <a:schemeClr val="accent1"/>
+          </a:lnRef>
+          <a:fillRef idx="0">
+            <a:schemeClr val="accent1"/>
+          </a:fillRef>
+          <a:effectRef idx="0">
+            <a:schemeClr val="accent1"/>
+          </a:effectRef>
+          <a:fontRef idx="minor">
+            <a:schemeClr val="tx1"/>
+          </a:fontRef>
+        </p:style>
+      </p:cxnSp>
+      <p:sp>
+        <p:nvSpPr>
+          <p:cNvPr id="125" name="Textfeld 124"/>
+          <p:cNvSpPr txBox="1"/>
+          <p:nvPr/>
+        </p:nvSpPr>
+        <p:spPr>
+          <a:xfrm>
+            <a:off x="3583644" y="1825295"/>
+            <a:ext cx="242374" cy="160310"/>
+          </a:xfrm>
+          <a:prstGeom prst="rect">
+            <a:avLst/>
+          </a:prstGeom>
+          <a:noFill/>
+        </p:spPr>
+        <p:txBody>
+          <a:bodyPr wrap="none" tIns="18000" bIns="3600" rtlCol="0">
+            <a:spAutoFit/>
+          </a:bodyPr>
+          <a:lstStyle/>
+          <a:p>
+            <a:r>
+              <a:rPr lang="de-DE" sz="900" dirty="0" smtClean="0"/>
+              <a:t>0</a:t>
+            </a:r>
+            <a:endParaRPr lang="en-US" sz="900" dirty="0"/>
+          </a:p>
+        </p:txBody>
+      </p:sp>
+      <p:sp>
+        <p:nvSpPr>
+          <p:cNvPr id="126" name="Textfeld 125"/>
+          <p:cNvSpPr txBox="1"/>
+          <p:nvPr/>
+        </p:nvSpPr>
+        <p:spPr>
+          <a:xfrm>
+            <a:off x="4474949" y="4552075"/>
+            <a:ext cx="242374" cy="160310"/>
+          </a:xfrm>
+          <a:prstGeom prst="rect">
+            <a:avLst/>
+          </a:prstGeom>
+          <a:noFill/>
+        </p:spPr>
+        <p:txBody>
+          <a:bodyPr wrap="none" tIns="18000" bIns="3600" rtlCol="0">
+            <a:spAutoFit/>
+          </a:bodyPr>
+          <a:lstStyle/>
+          <a:p>
+            <a:r>
+              <a:rPr lang="de-DE" sz="900" dirty="0" smtClean="0"/>
+              <a:t>0</a:t>
+            </a:r>
+            <a:endParaRPr lang="en-US" sz="900" dirty="0"/>
+          </a:p>
+        </p:txBody>
+      </p:sp>
+      <p:sp>
+        <p:nvSpPr>
+          <p:cNvPr id="129" name="Textfeld 128"/>
+          <p:cNvSpPr txBox="1"/>
+          <p:nvPr/>
+        </p:nvSpPr>
+        <p:spPr>
+          <a:xfrm>
+            <a:off x="2735840" y="5958082"/>
+            <a:ext cx="242374" cy="160310"/>
+          </a:xfrm>
+          <a:prstGeom prst="rect">
+            <a:avLst/>
+          </a:prstGeom>
+          <a:noFill/>
+        </p:spPr>
+        <p:txBody>
+          <a:bodyPr wrap="none" tIns="18000" bIns="3600" rtlCol="0">
+            <a:spAutoFit/>
+          </a:bodyPr>
+          <a:lstStyle/>
+          <a:p>
+            <a:r>
+              <a:rPr lang="de-DE" sz="900" dirty="0" smtClean="0"/>
+              <a:t>0</a:t>
+            </a:r>
+            <a:endParaRPr lang="en-US" sz="900" dirty="0"/>
+          </a:p>
+        </p:txBody>
+      </p:sp>
+      <p:sp>
+        <p:nvSpPr>
+          <p:cNvPr id="140" name="Textfeld 139"/>
+          <p:cNvSpPr txBox="1"/>
+          <p:nvPr/>
+        </p:nvSpPr>
+        <p:spPr>
+          <a:xfrm>
+            <a:off x="1783857" y="5962038"/>
+            <a:ext cx="242374" cy="160310"/>
+          </a:xfrm>
+          <a:prstGeom prst="rect">
+            <a:avLst/>
+          </a:prstGeom>
+          <a:noFill/>
+        </p:spPr>
+        <p:txBody>
+          <a:bodyPr wrap="none" tIns="18000" bIns="3600" rtlCol="0">
+            <a:spAutoFit/>
+          </a:bodyPr>
+          <a:lstStyle/>
+          <a:p>
+            <a:r>
+              <a:rPr lang="de-DE" sz="900" dirty="0" smtClean="0"/>
+              <a:t>0</a:t>
+            </a:r>
+            <a:endParaRPr lang="en-US" sz="900" dirty="0"/>
+          </a:p>
+        </p:txBody>
+      </p:sp>
+      <p:sp>
+        <p:nvSpPr>
+          <p:cNvPr id="141" name="Textfeld 140"/>
+          <p:cNvSpPr txBox="1"/>
+          <p:nvPr/>
+        </p:nvSpPr>
+        <p:spPr>
+          <a:xfrm>
+            <a:off x="4681755" y="3328808"/>
+            <a:ext cx="242374" cy="160310"/>
+          </a:xfrm>
+          <a:prstGeom prst="rect">
+            <a:avLst/>
+          </a:prstGeom>
+          <a:noFill/>
+        </p:spPr>
+        <p:txBody>
+          <a:bodyPr wrap="none" tIns="18000" bIns="3600" rtlCol="0">
+            <a:spAutoFit/>
+          </a:bodyPr>
+          <a:lstStyle/>
+          <a:p>
+            <a:r>
+              <a:rPr lang="de-DE" sz="900" dirty="0" smtClean="0"/>
+              <a:t>1</a:t>
+            </a:r>
+            <a:endParaRPr lang="en-US" sz="900" dirty="0"/>
+          </a:p>
+        </p:txBody>
+      </p:sp>
+      <p:sp>
+        <p:nvSpPr>
+          <p:cNvPr id="142" name="Textfeld 141"/>
+          <p:cNvSpPr txBox="1"/>
+          <p:nvPr/>
+        </p:nvSpPr>
+        <p:spPr>
+          <a:xfrm>
+            <a:off x="5681597" y="3328808"/>
+            <a:ext cx="242374" cy="160310"/>
+          </a:xfrm>
+          <a:prstGeom prst="rect">
+            <a:avLst/>
+          </a:prstGeom>
+          <a:noFill/>
+        </p:spPr>
+        <p:txBody>
+          <a:bodyPr wrap="none" tIns="18000" bIns="3600" rtlCol="0">
+            <a:spAutoFit/>
+          </a:bodyPr>
+          <a:lstStyle/>
+          <a:p>
+            <a:r>
+              <a:rPr lang="de-DE" sz="900" dirty="0" smtClean="0"/>
+              <a:t>0</a:t>
+            </a:r>
+            <a:endParaRPr lang="en-US" sz="900" dirty="0"/>
+          </a:p>
+        </p:txBody>
+      </p:sp>
+      <p:sp>
+        <p:nvSpPr>
+          <p:cNvPr id="147" name="Textfeld 146"/>
+          <p:cNvSpPr txBox="1"/>
+          <p:nvPr/>
+        </p:nvSpPr>
+        <p:spPr>
+          <a:xfrm>
+            <a:off x="6571399" y="3331173"/>
+            <a:ext cx="242374" cy="160310"/>
+          </a:xfrm>
+          <a:prstGeom prst="rect">
+            <a:avLst/>
+          </a:prstGeom>
+          <a:noFill/>
+        </p:spPr>
+        <p:txBody>
+          <a:bodyPr wrap="none" tIns="18000" bIns="3600" rtlCol="0">
+            <a:spAutoFit/>
+          </a:bodyPr>
+          <a:lstStyle/>
+          <a:p>
+            <a:r>
+              <a:rPr lang="de-DE" sz="900" dirty="0" smtClean="0"/>
+              <a:t>0</a:t>
+            </a:r>
+            <a:endParaRPr lang="en-US" sz="900" dirty="0"/>
+          </a:p>
+        </p:txBody>
+      </p:sp>
+    </p:spTree>
+    <p:extLst>
+      <p:ext uri="{BB962C8B-B14F-4D97-AF65-F5344CB8AC3E}">
+        <p14:creationId xmlns:p14="http://schemas.microsoft.com/office/powerpoint/2010/main" val="244877346"/>
+      </p:ext>
+    </p:extLst>
+  </p:cSld>
+  <p:clrMapOvr>
+    <a:masterClrMapping/>
+  </p:clrMapOvr>
+</p:sld>
+</file>
+
+<file path=ppt/slides/slide4.xml><?xml version="1.0" encoding="utf-8"?>
 <p:sld xmlns:a="http://schemas.openxmlformats.org/drawingml/2006/main" xmlns:r="http://schemas.openxmlformats.org/officeDocument/2006/relationships" xmlns:p="http://schemas.openxmlformats.org/presentationml/2006/main">
   <p:cSld>
     <p:spTree>
@@ -16372,7 +18561,7 @@
     </p:spTree>
     <p:extLst>
       <p:ext uri="{BB962C8B-B14F-4D97-AF65-F5344CB8AC3E}">
-        <p14:creationId xmlns:p14="http://schemas.microsoft.com/office/powerpoint/2010/main" val="244877346"/>
+        <p14:creationId xmlns:p14="http://schemas.microsoft.com/office/powerpoint/2010/main" val="4226123374"/>
       </p:ext>
     </p:extLst>
   </p:cSld>
@@ -16382,7 +18571,7 @@
 </p:sld>
 </file>
 
-<file path=ppt/slides/slide4.xml><?xml version="1.0" encoding="utf-8"?>
+<file path=ppt/slides/slide5.xml><?xml version="1.0" encoding="utf-8"?>
 <p:sld xmlns:a="http://schemas.openxmlformats.org/drawingml/2006/main" xmlns:r="http://schemas.openxmlformats.org/officeDocument/2006/relationships" xmlns:p="http://schemas.openxmlformats.org/presentationml/2006/main">
   <p:cSld>
     <p:spTree>

</xml_diff>

<commit_message>
decendent amount is added recursively now
</commit_message>
<xml_diff>
--- a/com.supeyou.project/doc/SupeYou.entities.pptx
+++ b/com.supeyou.project/doc/SupeYou.entities.pptx
@@ -332,7 +332,7 @@
               <a:pPr>
                 <a:defRPr/>
               </a:pPr>
-              <a:t>22.07.2015</a:t>
+              <a:t>29.07.2015</a:t>
             </a:fld>
             <a:endParaRPr lang="de-CH"/>
           </a:p>
@@ -529,7 +529,7 @@
               <a:pPr>
                 <a:defRPr/>
               </a:pPr>
-              <a:t>22.07.2015</a:t>
+              <a:t>29.07.2015</a:t>
             </a:fld>
             <a:endParaRPr lang="de-CH"/>
           </a:p>
@@ -736,7 +736,7 @@
               <a:pPr>
                 <a:defRPr/>
               </a:pPr>
-              <a:t>22.07.2015</a:t>
+              <a:t>29.07.2015</a:t>
             </a:fld>
             <a:endParaRPr lang="de-CH"/>
           </a:p>
@@ -933,7 +933,7 @@
               <a:pPr>
                 <a:defRPr/>
               </a:pPr>
-              <a:t>22.07.2015</a:t>
+              <a:t>29.07.2015</a:t>
             </a:fld>
             <a:endParaRPr lang="de-CH"/>
           </a:p>
@@ -1206,7 +1206,7 @@
               <a:pPr>
                 <a:defRPr/>
               </a:pPr>
-              <a:t>22.07.2015</a:t>
+              <a:t>29.07.2015</a:t>
             </a:fld>
             <a:endParaRPr lang="de-CH"/>
           </a:p>
@@ -1521,7 +1521,7 @@
               <a:pPr>
                 <a:defRPr/>
               </a:pPr>
-              <a:t>22.07.2015</a:t>
+              <a:t>29.07.2015</a:t>
             </a:fld>
             <a:endParaRPr lang="de-CH"/>
           </a:p>
@@ -1970,7 +1970,7 @@
               <a:pPr>
                 <a:defRPr/>
               </a:pPr>
-              <a:t>22.07.2015</a:t>
+              <a:t>29.07.2015</a:t>
             </a:fld>
             <a:endParaRPr lang="de-CH"/>
           </a:p>
@@ -2115,7 +2115,7 @@
               <a:pPr>
                 <a:defRPr/>
               </a:pPr>
-              <a:t>22.07.2015</a:t>
+              <a:t>29.07.2015</a:t>
             </a:fld>
             <a:endParaRPr lang="de-CH"/>
           </a:p>
@@ -2237,7 +2237,7 @@
               <a:pPr>
                 <a:defRPr/>
               </a:pPr>
-              <a:t>22.07.2015</a:t>
+              <a:t>29.07.2015</a:t>
             </a:fld>
             <a:endParaRPr lang="de-CH"/>
           </a:p>
@@ -2541,7 +2541,7 @@
               <a:pPr>
                 <a:defRPr/>
               </a:pPr>
-              <a:t>22.07.2015</a:t>
+              <a:t>29.07.2015</a:t>
             </a:fld>
             <a:endParaRPr lang="de-CH"/>
           </a:p>
@@ -2824,7 +2824,7 @@
               <a:pPr>
                 <a:defRPr/>
               </a:pPr>
-              <a:t>22.07.2015</a:t>
+              <a:t>29.07.2015</a:t>
             </a:fld>
             <a:endParaRPr lang="de-CH"/>
           </a:p>
@@ -3122,7 +3122,7 @@
               <a:pPr>
                 <a:defRPr/>
               </a:pPr>
-              <a:t>22.07.2015</a:t>
+              <a:t>29.07.2015</a:t>
             </a:fld>
             <a:endParaRPr lang="de-CH"/>
           </a:p>
@@ -13417,9 +13417,9 @@
         <p:grpSpPr>
           <a:xfrm>
             <a:off x="2395217" y="1772816"/>
-            <a:ext cx="753475" cy="246221"/>
+            <a:ext cx="753475" cy="400110"/>
             <a:chOff x="2653308" y="1412776"/>
-            <a:chExt cx="753475" cy="246221"/>
+            <a:chExt cx="753475" cy="400110"/>
           </a:xfrm>
         </p:grpSpPr>
         <p:sp>
@@ -13431,7 +13431,7 @@
           <p:spPr>
             <a:xfrm>
               <a:off x="2843808" y="1412776"/>
-              <a:ext cx="562975" cy="246221"/>
+              <a:ext cx="562975" cy="400110"/>
             </a:xfrm>
             <a:prstGeom prst="rect">
               <a:avLst/>
@@ -13447,6 +13447,12 @@
               <a:r>
                 <a:rPr lang="de-DE" sz="1000" dirty="0" smtClean="0"/>
                 <a:t>Andrea</a:t>
+              </a:r>
+            </a:p>
+            <a:p>
+              <a:r>
+                <a:rPr lang="de-DE" sz="1000" dirty="0" smtClean="0"/>
+                <a:t>1€</a:t>
               </a:r>
               <a:endParaRPr lang="en-US" sz="1000" dirty="0"/>
             </a:p>
@@ -14227,9 +14233,9 @@
         <p:grpSpPr>
           <a:xfrm>
             <a:off x="2817906" y="3277326"/>
-            <a:ext cx="862479" cy="246221"/>
+            <a:ext cx="862479" cy="553998"/>
             <a:chOff x="2653308" y="1412776"/>
-            <a:chExt cx="862479" cy="246221"/>
+            <a:chExt cx="862479" cy="553998"/>
           </a:xfrm>
         </p:grpSpPr>
         <p:sp>
@@ -14241,7 +14247,7 @@
           <p:spPr>
             <a:xfrm>
               <a:off x="2843808" y="1412776"/>
-              <a:ext cx="671979" cy="246221"/>
+              <a:ext cx="671979" cy="553998"/>
             </a:xfrm>
             <a:prstGeom prst="rect">
               <a:avLst/>
@@ -14257,6 +14263,18 @@
               <a:r>
                 <a:rPr lang="de-DE" sz="1000" dirty="0" smtClean="0"/>
                 <a:t>Hermann</a:t>
+              </a:r>
+            </a:p>
+            <a:p>
+              <a:r>
+                <a:rPr lang="de-DE" sz="1000" dirty="0" smtClean="0"/>
+                <a:t>1€</a:t>
+              </a:r>
+            </a:p>
+            <a:p>
+              <a:r>
+                <a:rPr lang="de-DE" sz="1000" dirty="0" smtClean="0"/>
+                <a:t>1€</a:t>
               </a:r>
               <a:endParaRPr lang="en-US" sz="1000" dirty="0"/>
             </a:p>
@@ -14348,9 +14366,9 @@
         <p:grpSpPr>
           <a:xfrm>
             <a:off x="1809794" y="3281282"/>
-            <a:ext cx="703782" cy="246221"/>
+            <a:ext cx="703782" cy="400110"/>
             <a:chOff x="2653308" y="1412776"/>
-            <a:chExt cx="703782" cy="246221"/>
+            <a:chExt cx="703782" cy="400110"/>
           </a:xfrm>
         </p:grpSpPr>
         <p:sp>
@@ -14362,7 +14380,7 @@
           <p:spPr>
             <a:xfrm>
               <a:off x="2843808" y="1412776"/>
-              <a:ext cx="513282" cy="246221"/>
+              <a:ext cx="513282" cy="400110"/>
             </a:xfrm>
             <a:prstGeom prst="rect">
               <a:avLst/>
@@ -14378,6 +14396,12 @@
               <a:r>
                 <a:rPr lang="de-DE" sz="1000" dirty="0" smtClean="0"/>
                 <a:t>Emma</a:t>
+              </a:r>
+            </a:p>
+            <a:p>
+              <a:r>
+                <a:rPr lang="de-DE" sz="1000" dirty="0" smtClean="0"/>
+                <a:t>1€</a:t>
               </a:r>
               <a:endParaRPr lang="en-US" sz="1000" dirty="0"/>
             </a:p>
@@ -14469,9 +14493,9 @@
         <p:grpSpPr>
           <a:xfrm>
             <a:off x="2652371" y="4502173"/>
-            <a:ext cx="697370" cy="246221"/>
+            <a:ext cx="697370" cy="400110"/>
             <a:chOff x="2653308" y="1412776"/>
-            <a:chExt cx="697370" cy="246221"/>
+            <a:chExt cx="697370" cy="400110"/>
           </a:xfrm>
         </p:grpSpPr>
         <p:sp>
@@ -14483,7 +14507,7 @@
           <p:spPr>
             <a:xfrm>
               <a:off x="2843808" y="1412776"/>
-              <a:ext cx="506870" cy="246221"/>
+              <a:ext cx="506870" cy="400110"/>
             </a:xfrm>
             <a:prstGeom prst="rect">
               <a:avLst/>
@@ -14499,6 +14523,12 @@
               <a:r>
                 <a:rPr lang="de-DE" sz="1000" dirty="0" smtClean="0"/>
                 <a:t>Eugen</a:t>
+              </a:r>
+            </a:p>
+            <a:p>
+              <a:r>
+                <a:rPr lang="de-DE" sz="1000" dirty="0" smtClean="0"/>
+                <a:t>1€</a:t>
               </a:r>
               <a:endParaRPr lang="en-US" sz="1000" dirty="0"/>
             </a:p>
@@ -14625,9 +14655,9 @@
         <p:grpSpPr>
           <a:xfrm>
             <a:off x="2915816" y="5915127"/>
-            <a:ext cx="753475" cy="246221"/>
+            <a:ext cx="753475" cy="400110"/>
             <a:chOff x="2653308" y="1412776"/>
-            <a:chExt cx="753475" cy="246221"/>
+            <a:chExt cx="753475" cy="400110"/>
           </a:xfrm>
         </p:grpSpPr>
         <p:sp>
@@ -14639,7 +14669,7 @@
           <p:spPr>
             <a:xfrm>
               <a:off x="2843808" y="1412776"/>
-              <a:ext cx="562975" cy="246221"/>
+              <a:ext cx="562975" cy="400110"/>
             </a:xfrm>
             <a:prstGeom prst="rect">
               <a:avLst/>
@@ -14655,6 +14685,12 @@
               <a:r>
                 <a:rPr lang="de-DE" sz="1000" dirty="0" smtClean="0"/>
                 <a:t>Marion</a:t>
+              </a:r>
+            </a:p>
+            <a:p>
+              <a:r>
+                <a:rPr lang="de-DE" sz="1000" dirty="0" smtClean="0"/>
+                <a:t>2€</a:t>
               </a:r>
               <a:endParaRPr lang="en-US" sz="1000" dirty="0"/>
             </a:p>
@@ -14988,7 +15024,7 @@
         <p:spPr>
           <a:xfrm>
             <a:off x="2606239" y="3328808"/>
-            <a:ext cx="242374" cy="160310"/>
+            <a:ext cx="300082" cy="298810"/>
           </a:xfrm>
           <a:prstGeom prst="rect">
             <a:avLst/>
@@ -15004,6 +15040,12 @@
             <a:r>
               <a:rPr lang="de-DE" sz="900" dirty="0" smtClean="0"/>
               <a:t>3</a:t>
+            </a:r>
+          </a:p>
+          <a:p>
+            <a:r>
+              <a:rPr lang="de-DE" sz="900" dirty="0" smtClean="0"/>
+              <a:t>3€</a:t>
             </a:r>
             <a:endParaRPr lang="en-US" sz="900" dirty="0"/>
           </a:p>
@@ -15018,7 +15060,7 @@
         <p:spPr>
           <a:xfrm>
             <a:off x="2409997" y="4545128"/>
-            <a:ext cx="242374" cy="160310"/>
+            <a:ext cx="300082" cy="298810"/>
           </a:xfrm>
           <a:prstGeom prst="rect">
             <a:avLst/>
@@ -15034,6 +15076,12 @@
             <a:r>
               <a:rPr lang="de-DE" sz="900" dirty="0" smtClean="0"/>
               <a:t>2</a:t>
+            </a:r>
+          </a:p>
+          <a:p>
+            <a:r>
+              <a:rPr lang="de-DE" sz="900" dirty="0" smtClean="0"/>
+              <a:t>2€</a:t>
             </a:r>
             <a:endParaRPr lang="en-US" sz="900" dirty="0"/>
           </a:p>
@@ -15048,7 +15096,7 @@
         <p:spPr>
           <a:xfrm>
             <a:off x="2170212" y="1836121"/>
-            <a:ext cx="242374" cy="160310"/>
+            <a:ext cx="300082" cy="298810"/>
           </a:xfrm>
           <a:prstGeom prst="rect">
             <a:avLst/>
@@ -15064,6 +15112,12 @@
             <a:r>
               <a:rPr lang="de-DE" sz="900" dirty="0" smtClean="0"/>
               <a:t>5</a:t>
+            </a:r>
+          </a:p>
+          <a:p>
+            <a:r>
+              <a:rPr lang="de-DE" sz="900" dirty="0" smtClean="0"/>
+              <a:t>6€</a:t>
             </a:r>
             <a:endParaRPr lang="en-US" sz="900" dirty="0"/>
           </a:p>
@@ -15108,7 +15162,7 @@
         <p:spPr>
           <a:xfrm>
             <a:off x="3635896" y="663643"/>
-            <a:ext cx="300082" cy="160310"/>
+            <a:ext cx="300082" cy="298810"/>
           </a:xfrm>
           <a:prstGeom prst="rect">
             <a:avLst/>
@@ -15124,6 +15178,12 @@
             <a:r>
               <a:rPr lang="de-DE" sz="900" dirty="0" smtClean="0"/>
               <a:t>13</a:t>
+            </a:r>
+          </a:p>
+          <a:p>
+            <a:r>
+              <a:rPr lang="de-DE" sz="900" dirty="0" smtClean="0"/>
+              <a:t>7€</a:t>
             </a:r>
             <a:endParaRPr lang="en-US" sz="900" dirty="0"/>
           </a:p>

</xml_diff>

<commit_message>
added treeDestroying edges in ppt diagram
</commit_message>
<xml_diff>
--- a/com.supeyou.project/doc/SupeYou.entities.pptx
+++ b/com.supeyou.project/doc/SupeYou.entities.pptx
@@ -332,7 +332,7 @@
               <a:pPr>
                 <a:defRPr/>
               </a:pPr>
-              <a:t>29.07.2015</a:t>
+              <a:t>12.08.2015</a:t>
             </a:fld>
             <a:endParaRPr lang="de-CH"/>
           </a:p>
@@ -529,7 +529,7 @@
               <a:pPr>
                 <a:defRPr/>
               </a:pPr>
-              <a:t>29.07.2015</a:t>
+              <a:t>12.08.2015</a:t>
             </a:fld>
             <a:endParaRPr lang="de-CH"/>
           </a:p>
@@ -736,7 +736,7 @@
               <a:pPr>
                 <a:defRPr/>
               </a:pPr>
-              <a:t>29.07.2015</a:t>
+              <a:t>12.08.2015</a:t>
             </a:fld>
             <a:endParaRPr lang="de-CH"/>
           </a:p>
@@ -933,7 +933,7 @@
               <a:pPr>
                 <a:defRPr/>
               </a:pPr>
-              <a:t>29.07.2015</a:t>
+              <a:t>12.08.2015</a:t>
             </a:fld>
             <a:endParaRPr lang="de-CH"/>
           </a:p>
@@ -1206,7 +1206,7 @@
               <a:pPr>
                 <a:defRPr/>
               </a:pPr>
-              <a:t>29.07.2015</a:t>
+              <a:t>12.08.2015</a:t>
             </a:fld>
             <a:endParaRPr lang="de-CH"/>
           </a:p>
@@ -1521,7 +1521,7 @@
               <a:pPr>
                 <a:defRPr/>
               </a:pPr>
-              <a:t>29.07.2015</a:t>
+              <a:t>12.08.2015</a:t>
             </a:fld>
             <a:endParaRPr lang="de-CH"/>
           </a:p>
@@ -1970,7 +1970,7 @@
               <a:pPr>
                 <a:defRPr/>
               </a:pPr>
-              <a:t>29.07.2015</a:t>
+              <a:t>12.08.2015</a:t>
             </a:fld>
             <a:endParaRPr lang="de-CH"/>
           </a:p>
@@ -2115,7 +2115,7 @@
               <a:pPr>
                 <a:defRPr/>
               </a:pPr>
-              <a:t>29.07.2015</a:t>
+              <a:t>12.08.2015</a:t>
             </a:fld>
             <a:endParaRPr lang="de-CH"/>
           </a:p>
@@ -2237,7 +2237,7 @@
               <a:pPr>
                 <a:defRPr/>
               </a:pPr>
-              <a:t>29.07.2015</a:t>
+              <a:t>12.08.2015</a:t>
             </a:fld>
             <a:endParaRPr lang="de-CH"/>
           </a:p>
@@ -2541,7 +2541,7 @@
               <a:pPr>
                 <a:defRPr/>
               </a:pPr>
-              <a:t>29.07.2015</a:t>
+              <a:t>12.08.2015</a:t>
             </a:fld>
             <a:endParaRPr lang="de-CH"/>
           </a:p>
@@ -2824,7 +2824,7 @@
               <a:pPr>
                 <a:defRPr/>
               </a:pPr>
-              <a:t>29.07.2015</a:t>
+              <a:t>12.08.2015</a:t>
             </a:fld>
             <a:endParaRPr lang="de-CH"/>
           </a:p>
@@ -3122,7 +3122,7 @@
               <a:pPr>
                 <a:defRPr/>
               </a:pPr>
-              <a:t>29.07.2015</a:t>
+              <a:t>12.08.2015</a:t>
             </a:fld>
             <a:endParaRPr lang="de-CH"/>
           </a:p>
@@ -15274,6 +15274,7 @@
             <a:solidFill>
               <a:srgbClr val="C00000"/>
             </a:solidFill>
+            <a:prstDash val="dash"/>
           </a:ln>
         </p:spPr>
         <p:style>
@@ -15538,6 +15539,117 @@
               <a:t>0</a:t>
             </a:r>
             <a:endParaRPr lang="en-US" sz="900" dirty="0"/>
+          </a:p>
+        </p:txBody>
+      </p:sp>
+      <p:cxnSp>
+        <p:nvCxnSpPr>
+          <p:cNvPr id="77" name="Gekrümmte Verbindung 76"/>
+          <p:cNvCxnSpPr>
+            <a:stCxn id="9" idx="2"/>
+            <a:endCxn id="44" idx="0"/>
+          </p:cNvCxnSpPr>
+          <p:nvPr/>
+        </p:nvCxnSpPr>
+        <p:spPr>
+          <a:xfrm rot="16200000" flipH="1">
+            <a:off x="2618536" y="1863106"/>
+            <a:ext cx="1318679" cy="1574817"/>
+          </a:xfrm>
+          <a:prstGeom prst="curvedConnector3">
+            <a:avLst>
+              <a:gd name="adj1" fmla="val 50000"/>
+            </a:avLst>
+          </a:prstGeom>
+          <a:ln w="15875">
+            <a:solidFill>
+              <a:srgbClr val="C00000"/>
+            </a:solidFill>
+          </a:ln>
+        </p:spPr>
+        <p:style>
+          <a:lnRef idx="1">
+            <a:schemeClr val="accent1"/>
+          </a:lnRef>
+          <a:fillRef idx="0">
+            <a:schemeClr val="accent1"/>
+          </a:fillRef>
+          <a:effectRef idx="0">
+            <a:schemeClr val="accent1"/>
+          </a:effectRef>
+          <a:fontRef idx="minor">
+            <a:schemeClr val="tx1"/>
+          </a:fontRef>
+        </p:style>
+      </p:cxnSp>
+      <p:cxnSp>
+        <p:nvCxnSpPr>
+          <p:cNvPr id="74" name="Gekrümmte Verbindung 73"/>
+          <p:cNvCxnSpPr/>
+          <p:nvPr/>
+        </p:nvCxnSpPr>
+        <p:spPr>
+          <a:xfrm rot="16200000" flipH="1">
+            <a:off x="6920932" y="5815936"/>
+            <a:ext cx="236221" cy="216293"/>
+          </a:xfrm>
+          <a:prstGeom prst="curvedConnector3">
+            <a:avLst>
+              <a:gd name="adj1" fmla="val 50000"/>
+            </a:avLst>
+          </a:prstGeom>
+          <a:ln w="15875">
+            <a:solidFill>
+              <a:srgbClr val="C00000"/>
+            </a:solidFill>
+          </a:ln>
+        </p:spPr>
+        <p:style>
+          <a:lnRef idx="1">
+            <a:schemeClr val="accent1"/>
+          </a:lnRef>
+          <a:fillRef idx="0">
+            <a:schemeClr val="accent1"/>
+          </a:fillRef>
+          <a:effectRef idx="0">
+            <a:schemeClr val="accent1"/>
+          </a:effectRef>
+          <a:fontRef idx="minor">
+            <a:schemeClr val="tx1"/>
+          </a:fontRef>
+        </p:style>
+      </p:cxnSp>
+      <p:sp>
+        <p:nvSpPr>
+          <p:cNvPr id="5" name="Textfeld 4"/>
+          <p:cNvSpPr txBox="1"/>
+          <p:nvPr/>
+        </p:nvSpPr>
+        <p:spPr>
+          <a:xfrm>
+            <a:off x="7164288" y="5816297"/>
+            <a:ext cx="1237198" cy="276999"/>
+          </a:xfrm>
+          <a:prstGeom prst="rect">
+            <a:avLst/>
+          </a:prstGeom>
+          <a:noFill/>
+        </p:spPr>
+        <p:txBody>
+          <a:bodyPr wrap="none" rtlCol="0">
+            <a:spAutoFit/>
+          </a:bodyPr>
+          <a:lstStyle/>
+          <a:p>
+            <a:r>
+              <a:rPr lang="de-DE" sz="1200" dirty="0" smtClean="0"/>
+              <a:t>= </a:t>
+            </a:r>
+            <a:r>
+              <a:rPr lang="de-DE" sz="1200" dirty="0" err="1" smtClean="0"/>
+              <a:t>TreeDestroying</a:t>
+            </a:r>
+            <a:endParaRPr lang="en-US" sz="1200" dirty="0"/>
           </a:p>
         </p:txBody>
       </p:sp>
@@ -18602,6 +18714,254 @@
               <a:gd name="adj1" fmla="val 50000"/>
             </a:avLst>
           </a:prstGeom>
+        </p:spPr>
+        <p:style>
+          <a:lnRef idx="1">
+            <a:schemeClr val="accent1"/>
+          </a:lnRef>
+          <a:fillRef idx="0">
+            <a:schemeClr val="accent1"/>
+          </a:fillRef>
+          <a:effectRef idx="0">
+            <a:schemeClr val="accent1"/>
+          </a:effectRef>
+          <a:fontRef idx="minor">
+            <a:schemeClr val="tx1"/>
+          </a:fontRef>
+        </p:style>
+      </p:cxnSp>
+      <p:cxnSp>
+        <p:nvCxnSpPr>
+          <p:cNvPr id="81" name="Gekrümmte Verbindung 80"/>
+          <p:cNvCxnSpPr>
+            <a:stCxn id="98" idx="2"/>
+            <a:endCxn id="67" idx="0"/>
+          </p:cNvCxnSpPr>
+          <p:nvPr/>
+        </p:nvCxnSpPr>
+        <p:spPr>
+          <a:xfrm rot="5400000">
+            <a:off x="1944633" y="3576259"/>
+            <a:ext cx="1756763" cy="150785"/>
+          </a:xfrm>
+          <a:prstGeom prst="curvedConnector3">
+            <a:avLst>
+              <a:gd name="adj1" fmla="val 9878"/>
+            </a:avLst>
+          </a:prstGeom>
+          <a:ln w="15875">
+            <a:solidFill>
+              <a:srgbClr val="C00000"/>
+            </a:solidFill>
+          </a:ln>
+        </p:spPr>
+        <p:style>
+          <a:lnRef idx="1">
+            <a:schemeClr val="accent1"/>
+          </a:lnRef>
+          <a:fillRef idx="0">
+            <a:schemeClr val="accent1"/>
+          </a:fillRef>
+          <a:effectRef idx="0">
+            <a:schemeClr val="accent1"/>
+          </a:effectRef>
+          <a:fontRef idx="minor">
+            <a:schemeClr val="tx1"/>
+          </a:fontRef>
+        </p:style>
+      </p:cxnSp>
+      <p:cxnSp>
+        <p:nvCxnSpPr>
+          <p:cNvPr id="82" name="Gekrümmte Verbindung 81"/>
+          <p:cNvCxnSpPr>
+            <a:stCxn id="98" idx="2"/>
+            <a:endCxn id="44" idx="0"/>
+          </p:cNvCxnSpPr>
+          <p:nvPr/>
+        </p:nvCxnSpPr>
+        <p:spPr>
+          <a:xfrm rot="16200000" flipH="1">
+            <a:off x="3213553" y="2458123"/>
+            <a:ext cx="536585" cy="1166878"/>
+          </a:xfrm>
+          <a:prstGeom prst="curvedConnector3">
+            <a:avLst>
+              <a:gd name="adj1" fmla="val 50000"/>
+            </a:avLst>
+          </a:prstGeom>
+          <a:ln w="15875">
+            <a:solidFill>
+              <a:srgbClr val="C00000"/>
+            </a:solidFill>
+          </a:ln>
+        </p:spPr>
+        <p:style>
+          <a:lnRef idx="1">
+            <a:schemeClr val="accent1"/>
+          </a:lnRef>
+          <a:fillRef idx="0">
+            <a:schemeClr val="accent1"/>
+          </a:fillRef>
+          <a:effectRef idx="0">
+            <a:schemeClr val="accent1"/>
+          </a:effectRef>
+          <a:fontRef idx="minor">
+            <a:schemeClr val="tx1"/>
+          </a:fontRef>
+        </p:style>
+      </p:cxnSp>
+      <p:sp>
+        <p:nvSpPr>
+          <p:cNvPr id="85" name="Rechteck 84"/>
+          <p:cNvSpPr/>
+          <p:nvPr/>
+        </p:nvSpPr>
+        <p:spPr>
+          <a:xfrm>
+            <a:off x="7189794" y="3793651"/>
+            <a:ext cx="382886" cy="360040"/>
+          </a:xfrm>
+          <a:prstGeom prst="rect">
+            <a:avLst/>
+          </a:prstGeom>
+          <a:noFill/>
+          <a:ln w="12700">
+            <a:solidFill>
+              <a:schemeClr val="bg1">
+                <a:lumMod val="50000"/>
+              </a:schemeClr>
+            </a:solidFill>
+          </a:ln>
+        </p:spPr>
+        <p:style>
+          <a:lnRef idx="2">
+            <a:schemeClr val="accent1">
+              <a:shade val="50000"/>
+            </a:schemeClr>
+          </a:lnRef>
+          <a:fillRef idx="1">
+            <a:schemeClr val="accent1"/>
+          </a:fillRef>
+          <a:effectRef idx="0">
+            <a:schemeClr val="accent1"/>
+          </a:effectRef>
+          <a:fontRef idx="minor">
+            <a:schemeClr val="lt1"/>
+          </a:fontRef>
+        </p:style>
+        <p:txBody>
+          <a:bodyPr lIns="0" tIns="0" rIns="0" bIns="0" rtlCol="0" anchor="ctr"/>
+          <a:lstStyle/>
+          <a:p>
+            <a:pPr algn="ctr"/>
+            <a:r>
+              <a:rPr lang="de-DE" sz="900" dirty="0" smtClean="0">
+                <a:solidFill>
+                  <a:schemeClr val="tx1">
+                    <a:lumMod val="50000"/>
+                    <a:lumOff val="50000"/>
+                  </a:schemeClr>
+                </a:solidFill>
+              </a:rPr>
+              <a:t>04.05. </a:t>
+            </a:r>
+          </a:p>
+          <a:p>
+            <a:pPr algn="ctr"/>
+            <a:r>
+              <a:rPr lang="de-DE" sz="900" dirty="0">
+                <a:solidFill>
+                  <a:schemeClr val="tx1">
+                    <a:lumMod val="50000"/>
+                    <a:lumOff val="50000"/>
+                  </a:schemeClr>
+                </a:solidFill>
+              </a:rPr>
+              <a:t>0</a:t>
+            </a:r>
+            <a:r>
+              <a:rPr lang="de-DE" sz="900" dirty="0" smtClean="0">
+                <a:solidFill>
+                  <a:schemeClr val="tx1">
+                    <a:lumMod val="50000"/>
+                    <a:lumOff val="50000"/>
+                  </a:schemeClr>
+                </a:solidFill>
+              </a:rPr>
+              <a:t>9:45</a:t>
+            </a:r>
+            <a:endParaRPr lang="en-US" sz="900" dirty="0">
+              <a:solidFill>
+                <a:schemeClr val="tx1">
+                  <a:lumMod val="50000"/>
+                  <a:lumOff val="50000"/>
+                </a:schemeClr>
+              </a:solidFill>
+            </a:endParaRPr>
+          </a:p>
+        </p:txBody>
+      </p:sp>
+      <p:cxnSp>
+        <p:nvCxnSpPr>
+          <p:cNvPr id="86" name="Gekrümmte Verbindung 85"/>
+          <p:cNvCxnSpPr>
+            <a:stCxn id="50" idx="2"/>
+            <a:endCxn id="85" idx="0"/>
+          </p:cNvCxnSpPr>
+          <p:nvPr/>
+        </p:nvCxnSpPr>
+        <p:spPr>
+          <a:xfrm rot="16200000" flipH="1">
+            <a:off x="6970507" y="3382921"/>
+            <a:ext cx="275868" cy="545591"/>
+          </a:xfrm>
+          <a:prstGeom prst="curvedConnector3">
+            <a:avLst>
+              <a:gd name="adj1" fmla="val 50000"/>
+            </a:avLst>
+          </a:prstGeom>
+        </p:spPr>
+        <p:style>
+          <a:lnRef idx="1">
+            <a:schemeClr val="accent1"/>
+          </a:lnRef>
+          <a:fillRef idx="0">
+            <a:schemeClr val="accent1"/>
+          </a:fillRef>
+          <a:effectRef idx="0">
+            <a:schemeClr val="accent1"/>
+          </a:effectRef>
+          <a:fontRef idx="minor">
+            <a:schemeClr val="tx1"/>
+          </a:fontRef>
+        </p:style>
+      </p:cxnSp>
+      <p:cxnSp>
+        <p:nvCxnSpPr>
+          <p:cNvPr id="88" name="Gekrümmte Verbindung 87"/>
+          <p:cNvCxnSpPr>
+            <a:stCxn id="85" idx="2"/>
+            <a:endCxn id="28" idx="0"/>
+          </p:cNvCxnSpPr>
+          <p:nvPr/>
+        </p:nvCxnSpPr>
+        <p:spPr>
+          <a:xfrm rot="5400000" flipH="1">
+            <a:off x="5301575" y="2074030"/>
+            <a:ext cx="2343491" cy="1815833"/>
+          </a:xfrm>
+          <a:prstGeom prst="curvedConnector5">
+            <a:avLst>
+              <a:gd name="adj1" fmla="val -9755"/>
+              <a:gd name="adj2" fmla="val -44393"/>
+              <a:gd name="adj3" fmla="val 109755"/>
+            </a:avLst>
+          </a:prstGeom>
+          <a:ln w="15875">
+            <a:solidFill>
+              <a:srgbClr val="C00000"/>
+            </a:solidFill>
+          </a:ln>
         </p:spPr>
         <p:style>
           <a:lnRef idx="1">

</xml_diff>